<commit_message>
Update Equipment details in model class diagram
</commit_message>
<xml_diff>
--- a/docs/diagrams/ModelComponentClassDiagram.pptx
+++ b/docs/diagrams/ModelComponentClassDiagram.pptx
@@ -4351,7 +4351,7 @@
         <p:spPr>
           <a:xfrm>
             <a:off x="6827706" y="2503583"/>
-            <a:ext cx="827204" cy="285783"/>
+            <a:ext cx="1020894" cy="285783"/>
           </a:xfrm>
           <a:prstGeom prst="rect">
             <a:avLst/>
@@ -4388,7 +4388,7 @@
                   <a:srgbClr val="7030A0"/>
                 </a:solidFill>
               </a:rPr>
-              <a:t>Name</a:t>
+              <a:t>Serial Number</a:t>
             </a:r>
             <a:endParaRPr lang="en-SG" sz="1050" dirty="0">
               <a:solidFill>
@@ -4485,69 +4485,12 @@
           </a:fontRef>
         </p:style>
       </p:cxnSp>
-      <p:sp>
-        <p:nvSpPr>
-          <p:cNvPr id="80" name="Rectangle 8"/>
-          <p:cNvSpPr/>
-          <p:nvPr/>
-        </p:nvSpPr>
-        <p:spPr>
-          <a:xfrm>
-            <a:off x="6827706" y="2826561"/>
-            <a:ext cx="827204" cy="285783"/>
-          </a:xfrm>
-          <a:prstGeom prst="rect">
-            <a:avLst/>
-          </a:prstGeom>
-          <a:ln w="19050">
-            <a:solidFill>
-              <a:srgbClr val="7030A0"/>
-            </a:solidFill>
-          </a:ln>
-          <a:effectLst/>
-        </p:spPr>
-        <p:style>
-          <a:lnRef idx="1">
-            <a:schemeClr val="accent4"/>
-          </a:lnRef>
-          <a:fillRef idx="2">
-            <a:schemeClr val="accent4"/>
-          </a:fillRef>
-          <a:effectRef idx="1">
-            <a:schemeClr val="accent4"/>
-          </a:effectRef>
-          <a:fontRef idx="minor">
-            <a:schemeClr val="dk1"/>
-          </a:fontRef>
-        </p:style>
-        <p:txBody>
-          <a:bodyPr rtlCol="0" anchor="ctr"/>
-          <a:lstStyle/>
-          <a:p>
-            <a:pPr algn="ctr"/>
-            <a:r>
-              <a:rPr lang="en-US" sz="1050" dirty="0">
-                <a:solidFill>
-                  <a:srgbClr val="7030A0"/>
-                </a:solidFill>
-              </a:rPr>
-              <a:t>Phone</a:t>
-            </a:r>
-            <a:endParaRPr lang="en-SG" sz="1050" dirty="0">
-              <a:solidFill>
-                <a:srgbClr val="7030A0"/>
-              </a:solidFill>
-            </a:endParaRPr>
-          </a:p>
-        </p:txBody>
-      </p:sp>
       <p:cxnSp>
         <p:nvCxnSpPr>
           <p:cNvPr id="81" name="Elbow Connector 80"/>
           <p:cNvCxnSpPr>
             <a:cxnSpLocks/>
             <a:stCxn id="78" idx="3"/>
-            <a:endCxn id="80" idx="1"/>
           </p:cNvCxnSpPr>
           <p:nvPr/>
         </p:nvCxnSpPr>
@@ -4583,69 +4526,12 @@
           </a:fontRef>
         </p:style>
       </p:cxnSp>
-      <p:sp>
-        <p:nvSpPr>
-          <p:cNvPr id="83" name="Rectangle 8"/>
-          <p:cNvSpPr/>
-          <p:nvPr/>
-        </p:nvSpPr>
-        <p:spPr>
-          <a:xfrm>
-            <a:off x="6827705" y="3149539"/>
-            <a:ext cx="827205" cy="285783"/>
-          </a:xfrm>
-          <a:prstGeom prst="rect">
-            <a:avLst/>
-          </a:prstGeom>
-          <a:ln w="19050">
-            <a:solidFill>
-              <a:srgbClr val="7030A0"/>
-            </a:solidFill>
-          </a:ln>
-          <a:effectLst/>
-        </p:spPr>
-        <p:style>
-          <a:lnRef idx="1">
-            <a:schemeClr val="accent4"/>
-          </a:lnRef>
-          <a:fillRef idx="2">
-            <a:schemeClr val="accent4"/>
-          </a:fillRef>
-          <a:effectRef idx="1">
-            <a:schemeClr val="accent4"/>
-          </a:effectRef>
-          <a:fontRef idx="minor">
-            <a:schemeClr val="dk1"/>
-          </a:fontRef>
-        </p:style>
-        <p:txBody>
-          <a:bodyPr rtlCol="0" anchor="ctr"/>
-          <a:lstStyle/>
-          <a:p>
-            <a:pPr algn="ctr"/>
-            <a:r>
-              <a:rPr lang="en-US" sz="1050" dirty="0">
-                <a:solidFill>
-                  <a:srgbClr val="7030A0"/>
-                </a:solidFill>
-              </a:rPr>
-              <a:t>Email</a:t>
-            </a:r>
-            <a:endParaRPr lang="en-SG" sz="1050" dirty="0">
-              <a:solidFill>
-                <a:srgbClr val="7030A0"/>
-              </a:solidFill>
-            </a:endParaRPr>
-          </a:p>
-        </p:txBody>
-      </p:sp>
       <p:cxnSp>
         <p:nvCxnSpPr>
           <p:cNvPr id="84" name="Elbow Connector 83"/>
           <p:cNvCxnSpPr>
             <a:cxnSpLocks/>
             <a:stCxn id="78" idx="3"/>
-            <a:endCxn id="83" idx="1"/>
           </p:cNvCxnSpPr>
           <p:nvPr/>
         </p:nvCxnSpPr>
@@ -4689,8 +4575,8 @@
         </p:nvSpPr>
         <p:spPr>
           <a:xfrm>
-            <a:off x="6827706" y="3489275"/>
-            <a:ext cx="827206" cy="269024"/>
+            <a:off x="6827705" y="3489275"/>
+            <a:ext cx="1443093" cy="269024"/>
           </a:xfrm>
           <a:prstGeom prst="rect">
             <a:avLst/>
@@ -4727,7 +4613,7 @@
                   <a:srgbClr val="7030A0"/>
                 </a:solidFill>
               </a:rPr>
-              <a:t>Sublocation</a:t>
+              <a:t>Equipment Sublocation</a:t>
             </a:r>
             <a:endParaRPr lang="en-SG" sz="800" dirty="0">
               <a:solidFill>
@@ -4750,7 +4636,7 @@
         <p:spPr>
           <a:xfrm>
             <a:off x="6399810" y="2974236"/>
-            <a:ext cx="427896" cy="649551"/>
+            <a:ext cx="427895" cy="649551"/>
           </a:xfrm>
           <a:prstGeom prst="bentConnector3">
             <a:avLst/>
@@ -5311,7 +5197,7 @@
         <p:spPr>
           <a:xfrm>
             <a:off x="6827705" y="2168162"/>
-            <a:ext cx="827203" cy="285783"/>
+            <a:ext cx="1013365" cy="285783"/>
           </a:xfrm>
           <a:prstGeom prst="rect">
             <a:avLst/>
@@ -6246,8 +6132,8 @@
         </p:nvSpPr>
         <p:spPr>
           <a:xfrm>
-            <a:off x="6842765" y="1868480"/>
-            <a:ext cx="556951" cy="236049"/>
+            <a:off x="6835235" y="2855351"/>
+            <a:ext cx="1005835" cy="236049"/>
           </a:xfrm>
           <a:prstGeom prst="rect">
             <a:avLst/>
@@ -6279,14 +6165,14 @@
           <a:p>
             <a:pPr algn="ctr"/>
             <a:r>
-              <a:rPr lang="en-US" sz="900" dirty="0">
+              <a:rPr lang="en-US" sz="1050" dirty="0">
                 <a:solidFill>
                   <a:srgbClr val="7030A0"/>
                 </a:solidFill>
               </a:rPr>
-              <a:t>Client</a:t>
-            </a:r>
-            <a:endParaRPr lang="en-SG" sz="900" dirty="0">
+              <a:t>Client Name</a:t>
+            </a:r>
+            <a:endParaRPr lang="en-SG" sz="1050" dirty="0">
               <a:solidFill>
                 <a:srgbClr val="7030A0"/>
               </a:solidFill>
@@ -6439,105 +6325,6 @@
       </p:sp>
       <p:sp>
         <p:nvSpPr>
-          <p:cNvPr id="125" name="Flowchart: Decision 96">
-            <a:extLst>
-              <a:ext uri="{FF2B5EF4-FFF2-40B4-BE49-F238E27FC236}">
-                <a16:creationId xmlns:a16="http://schemas.microsoft.com/office/drawing/2014/main" id="{B36C6F75-782D-8140-B232-FCE18F2BE333}"/>
-              </a:ext>
-            </a:extLst>
-          </p:cNvPr>
-          <p:cNvSpPr/>
-          <p:nvPr/>
-        </p:nvSpPr>
-        <p:spPr>
-          <a:xfrm>
-            <a:off x="7417380" y="1910166"/>
-            <a:ext cx="242555" cy="173380"/>
-          </a:xfrm>
-          <a:prstGeom prst="flowChartDecision">
-            <a:avLst/>
-          </a:prstGeom>
-          <a:solidFill>
-            <a:srgbClr val="7030A0"/>
-          </a:solidFill>
-          <a:ln w="19050">
-            <a:solidFill>
-              <a:srgbClr val="7030A0"/>
-            </a:solidFill>
-          </a:ln>
-          <a:effectLst/>
-        </p:spPr>
-        <p:style>
-          <a:lnRef idx="1">
-            <a:schemeClr val="accent6"/>
-          </a:lnRef>
-          <a:fillRef idx="2">
-            <a:schemeClr val="accent6"/>
-          </a:fillRef>
-          <a:effectRef idx="1">
-            <a:schemeClr val="accent6"/>
-          </a:effectRef>
-          <a:fontRef idx="minor">
-            <a:schemeClr val="dk1"/>
-          </a:fontRef>
-        </p:style>
-        <p:txBody>
-          <a:bodyPr rtlCol="0" anchor="ctr"/>
-          <a:lstStyle/>
-          <a:p>
-            <a:pPr algn="ctr"/>
-            <a:endParaRPr lang="en-US" sz="1050"/>
-          </a:p>
-        </p:txBody>
-      </p:sp>
-      <p:cxnSp>
-        <p:nvCxnSpPr>
-          <p:cNvPr id="126" name="Elbow Connector 125">
-            <a:extLst>
-              <a:ext uri="{FF2B5EF4-FFF2-40B4-BE49-F238E27FC236}">
-                <a16:creationId xmlns:a16="http://schemas.microsoft.com/office/drawing/2014/main" id="{5CEAF487-0294-334F-8185-2EA3323EEED8}"/>
-              </a:ext>
-            </a:extLst>
-          </p:cNvPr>
-          <p:cNvCxnSpPr>
-            <a:stCxn id="125" idx="3"/>
-          </p:cNvCxnSpPr>
-          <p:nvPr/>
-        </p:nvCxnSpPr>
-        <p:spPr>
-          <a:xfrm flipV="1">
-            <a:off x="7659935" y="1992074"/>
-            <a:ext cx="427896" cy="4782"/>
-          </a:xfrm>
-          <a:prstGeom prst="bentConnector3">
-            <a:avLst/>
-          </a:prstGeom>
-          <a:ln w="19050">
-            <a:solidFill>
-              <a:srgbClr val="7030A0"/>
-            </a:solidFill>
-            <a:headEnd type="none" w="med" len="med"/>
-            <a:tailEnd type="arrow" w="med" len="med"/>
-          </a:ln>
-          <a:effectLst/>
-        </p:spPr>
-        <p:style>
-          <a:lnRef idx="1">
-            <a:schemeClr val="accent2"/>
-          </a:lnRef>
-          <a:fillRef idx="2">
-            <a:schemeClr val="accent2"/>
-          </a:fillRef>
-          <a:effectRef idx="1">
-            <a:schemeClr val="accent2"/>
-          </a:effectRef>
-          <a:fontRef idx="minor">
-            <a:schemeClr val="dk1"/>
-          </a:fontRef>
-        </p:style>
-      </p:cxnSp>
-      <p:sp>
-        <p:nvSpPr>
           <p:cNvPr id="127" name="Rectangle 8">
             <a:extLst>
               <a:ext uri="{FF2B5EF4-FFF2-40B4-BE49-F238E27FC236}">
@@ -6550,8 +6337,8 @@
         </p:nvSpPr>
         <p:spPr>
           <a:xfrm>
-            <a:off x="8070605" y="1816080"/>
-            <a:ext cx="727708" cy="285783"/>
+            <a:off x="6835833" y="3149539"/>
+            <a:ext cx="1020894" cy="285783"/>
           </a:xfrm>
           <a:prstGeom prst="rect">
             <a:avLst/>
@@ -6588,54 +6375,9 @@
                   <a:srgbClr val="7030A0"/>
                 </a:solidFill>
               </a:rPr>
-              <a:t>Address</a:t>
+              <a:t>Client Address</a:t>
             </a:r>
             <a:endParaRPr lang="en-SG" sz="1000" dirty="0">
-              <a:solidFill>
-                <a:srgbClr val="7030A0"/>
-              </a:solidFill>
-            </a:endParaRPr>
-          </a:p>
-        </p:txBody>
-      </p:sp>
-      <p:sp>
-        <p:nvSpPr>
-          <p:cNvPr id="136" name="TextBox 135">
-            <a:extLst>
-              <a:ext uri="{FF2B5EF4-FFF2-40B4-BE49-F238E27FC236}">
-                <a16:creationId xmlns:a16="http://schemas.microsoft.com/office/drawing/2014/main" id="{E45C8326-2821-334B-96D3-DFE249903448}"/>
-              </a:ext>
-            </a:extLst>
-          </p:cNvPr>
-          <p:cNvSpPr txBox="1"/>
-          <p:nvPr/>
-        </p:nvSpPr>
-        <p:spPr>
-          <a:xfrm>
-            <a:off x="7875453" y="1762588"/>
-            <a:ext cx="194474" cy="178683"/>
-          </a:xfrm>
-          <a:prstGeom prst="rect">
-            <a:avLst/>
-          </a:prstGeom>
-          <a:noFill/>
-        </p:spPr>
-        <p:txBody>
-          <a:bodyPr wrap="square" lIns="0" tIns="0" rIns="0" bIns="0" rtlCol="0">
-            <a:noAutofit/>
-          </a:bodyPr>
-          <a:lstStyle/>
-          <a:p>
-            <a:pPr algn="ctr"/>
-            <a:r>
-              <a:rPr lang="en-US" sz="1100" dirty="0">
-                <a:solidFill>
-                  <a:srgbClr val="7030A0"/>
-                </a:solidFill>
-              </a:rPr>
-              <a:t>1</a:t>
-            </a:r>
-            <a:endParaRPr lang="en-SG" sz="1100" dirty="0">
               <a:solidFill>
                 <a:srgbClr val="7030A0"/>
               </a:solidFill>
@@ -6659,12 +6401,12 @@
         </p:nvCxnSpPr>
         <p:spPr>
           <a:xfrm rot="5400000" flipH="1" flipV="1">
-            <a:off x="6576237" y="2033651"/>
-            <a:ext cx="324240" cy="250650"/>
+            <a:off x="6553858" y="2047250"/>
+            <a:ext cx="333021" cy="214673"/>
           </a:xfrm>
           <a:prstGeom prst="bentConnector3">
             <a:avLst>
-              <a:gd name="adj1" fmla="val 99241"/>
+              <a:gd name="adj1" fmla="val 100304"/>
             </a:avLst>
           </a:prstGeom>
           <a:ln w="19050">
@@ -6690,6 +6432,68 @@
           </a:fontRef>
         </p:style>
       </p:cxnSp>
+      <p:sp>
+        <p:nvSpPr>
+          <p:cNvPr id="72" name="Rectangle 8">
+            <a:extLst>
+              <a:ext uri="{FF2B5EF4-FFF2-40B4-BE49-F238E27FC236}">
+                <a16:creationId xmlns:a16="http://schemas.microsoft.com/office/drawing/2014/main" id="{47E04EE6-602C-EE4B-982D-E248D4F778BA}"/>
+              </a:ext>
+            </a:extLst>
+          </p:cNvPr>
+          <p:cNvSpPr/>
+          <p:nvPr/>
+        </p:nvSpPr>
+        <p:spPr>
+          <a:xfrm>
+            <a:off x="6835235" y="1849386"/>
+            <a:ext cx="1471131" cy="285783"/>
+          </a:xfrm>
+          <a:prstGeom prst="rect">
+            <a:avLst/>
+          </a:prstGeom>
+          <a:ln w="19050">
+            <a:solidFill>
+              <a:srgbClr val="7030A0"/>
+            </a:solidFill>
+          </a:ln>
+          <a:effectLst/>
+        </p:spPr>
+        <p:style>
+          <a:lnRef idx="1">
+            <a:schemeClr val="accent4"/>
+          </a:lnRef>
+          <a:fillRef idx="2">
+            <a:schemeClr val="accent4"/>
+          </a:fillRef>
+          <a:effectRef idx="1">
+            <a:schemeClr val="accent4"/>
+          </a:effectRef>
+          <a:fontRef idx="minor">
+            <a:schemeClr val="dk1"/>
+          </a:fontRef>
+        </p:style>
+        <p:txBody>
+          <a:bodyPr rtlCol="0" anchor="ctr"/>
+          <a:lstStyle/>
+          <a:p>
+            <a:pPr algn="ctr"/>
+            <a:r>
+              <a:rPr lang="en-US" sz="800" dirty="0">
+                <a:solidFill>
+                  <a:srgbClr val="7030A0"/>
+                </a:solidFill>
+              </a:rPr>
+              <a:t>Preventive Maintenance Date</a:t>
+            </a:r>
+            <a:endParaRPr lang="en-SG" sz="800" dirty="0">
+              <a:solidFill>
+                <a:srgbClr val="7030A0"/>
+              </a:solidFill>
+            </a:endParaRPr>
+          </a:p>
+        </p:txBody>
+      </p:sp>
     </p:spTree>
     <p:extLst>
       <p:ext uri="{BB962C8B-B14F-4D97-AF65-F5344CB8AC3E}">

</xml_diff>

<commit_message>
Update UI Mockup with actual screenshot, update Developer Guide with updated component class diagrams
</commit_message>
<xml_diff>
--- a/docs/diagrams/ModelComponentClassDiagram.pptx
+++ b/docs/diagrams/ModelComponentClassDiagram.pptx
@@ -208,7 +208,7 @@
           <a:p>
             <a:fld id="{F5CC4B3F-88C1-4FFA-B1B6-F41C21DC6924}" type="datetimeFigureOut">
               <a:rPr lang="en-US" smtClean="0"/>
-              <a:t>12/5/2018</a:t>
+              <a:t>3/19/19</a:t>
             </a:fld>
             <a:endParaRPr lang="en-US"/>
           </a:p>
@@ -654,7 +654,7 @@
           <a:p>
             <a:fld id="{78C97017-6FC3-485B-9764-EAC9E56C1D49}" type="datetimeFigureOut">
               <a:rPr lang="en-US" smtClean="0"/>
-              <a:t>12/5/2018</a:t>
+              <a:t>3/19/19</a:t>
             </a:fld>
             <a:endParaRPr lang="en-US"/>
           </a:p>
@@ -822,7 +822,7 @@
           <a:p>
             <a:fld id="{78C97017-6FC3-485B-9764-EAC9E56C1D49}" type="datetimeFigureOut">
               <a:rPr lang="en-US" smtClean="0"/>
-              <a:t>12/5/2018</a:t>
+              <a:t>3/19/19</a:t>
             </a:fld>
             <a:endParaRPr lang="en-US"/>
           </a:p>
@@ -1000,7 +1000,7 @@
           <a:p>
             <a:fld id="{78C97017-6FC3-485B-9764-EAC9E56C1D49}" type="datetimeFigureOut">
               <a:rPr lang="en-US" smtClean="0"/>
-              <a:t>12/5/2018</a:t>
+              <a:t>3/19/19</a:t>
             </a:fld>
             <a:endParaRPr lang="en-US"/>
           </a:p>
@@ -1168,7 +1168,7 @@
           <a:p>
             <a:fld id="{78C97017-6FC3-485B-9764-EAC9E56C1D49}" type="datetimeFigureOut">
               <a:rPr lang="en-US" smtClean="0"/>
-              <a:t>12/5/2018</a:t>
+              <a:t>3/19/19</a:t>
             </a:fld>
             <a:endParaRPr lang="en-US"/>
           </a:p>
@@ -1413,7 +1413,7 @@
           <a:p>
             <a:fld id="{78C97017-6FC3-485B-9764-EAC9E56C1D49}" type="datetimeFigureOut">
               <a:rPr lang="en-US" smtClean="0"/>
-              <a:t>12/5/2018</a:t>
+              <a:t>3/19/19</a:t>
             </a:fld>
             <a:endParaRPr lang="en-US"/>
           </a:p>
@@ -1698,7 +1698,7 @@
           <a:p>
             <a:fld id="{78C97017-6FC3-485B-9764-EAC9E56C1D49}" type="datetimeFigureOut">
               <a:rPr lang="en-US" smtClean="0"/>
-              <a:t>12/5/2018</a:t>
+              <a:t>3/19/19</a:t>
             </a:fld>
             <a:endParaRPr lang="en-US"/>
           </a:p>
@@ -2117,7 +2117,7 @@
           <a:p>
             <a:fld id="{78C97017-6FC3-485B-9764-EAC9E56C1D49}" type="datetimeFigureOut">
               <a:rPr lang="en-US" smtClean="0"/>
-              <a:t>12/5/2018</a:t>
+              <a:t>3/19/19</a:t>
             </a:fld>
             <a:endParaRPr lang="en-US"/>
           </a:p>
@@ -2234,7 +2234,7 @@
           <a:p>
             <a:fld id="{78C97017-6FC3-485B-9764-EAC9E56C1D49}" type="datetimeFigureOut">
               <a:rPr lang="en-US" smtClean="0"/>
-              <a:t>12/5/2018</a:t>
+              <a:t>3/19/19</a:t>
             </a:fld>
             <a:endParaRPr lang="en-US"/>
           </a:p>
@@ -2329,7 +2329,7 @@
           <a:p>
             <a:fld id="{78C97017-6FC3-485B-9764-EAC9E56C1D49}" type="datetimeFigureOut">
               <a:rPr lang="en-US" smtClean="0"/>
-              <a:t>12/5/2018</a:t>
+              <a:t>3/19/19</a:t>
             </a:fld>
             <a:endParaRPr lang="en-US"/>
           </a:p>
@@ -2604,7 +2604,7 @@
           <a:p>
             <a:fld id="{78C97017-6FC3-485B-9764-EAC9E56C1D49}" type="datetimeFigureOut">
               <a:rPr lang="en-US" smtClean="0"/>
-              <a:t>12/5/2018</a:t>
+              <a:t>3/19/19</a:t>
             </a:fld>
             <a:endParaRPr lang="en-US"/>
           </a:p>
@@ -2856,7 +2856,7 @@
           <a:p>
             <a:fld id="{78C97017-6FC3-485B-9764-EAC9E56C1D49}" type="datetimeFigureOut">
               <a:rPr lang="en-US" smtClean="0"/>
-              <a:t>12/5/2018</a:t>
+              <a:t>3/19/19</a:t>
             </a:fld>
             <a:endParaRPr lang="en-US"/>
           </a:p>
@@ -3067,7 +3067,7 @@
           <a:p>
             <a:fld id="{78C97017-6FC3-485B-9764-EAC9E56C1D49}" type="datetimeFigureOut">
               <a:rPr lang="en-US" smtClean="0"/>
-              <a:t>12/5/2018</a:t>
+              <a:t>3/19/19</a:t>
             </a:fld>
             <a:endParaRPr lang="en-US"/>
           </a:p>
@@ -3450,8 +3450,8 @@
         </p:nvSpPr>
         <p:spPr>
           <a:xfrm>
-            <a:off x="1119865" y="1600200"/>
-            <a:ext cx="7490735" cy="3124200"/>
+            <a:off x="438374" y="1600200"/>
+            <a:ext cx="8456045" cy="3276600"/>
           </a:xfrm>
           <a:prstGeom prst="roundRect">
             <a:avLst>
@@ -3511,7 +3511,7 @@
         </p:nvSpPr>
         <p:spPr>
           <a:xfrm>
-            <a:off x="2825280" y="3463240"/>
+            <a:off x="2143789" y="3463240"/>
             <a:ext cx="878211" cy="346760"/>
           </a:xfrm>
           <a:prstGeom prst="rect">
@@ -3567,7 +3567,7 @@
         </p:nvSpPr>
         <p:spPr>
           <a:xfrm rot="16200000">
-            <a:off x="1661548" y="3097750"/>
+            <a:off x="980057" y="3097750"/>
             <a:ext cx="1093635" cy="346760"/>
           </a:xfrm>
           <a:prstGeom prst="rect">
@@ -3630,12 +3630,12 @@
         </p:nvCxnSpPr>
         <p:spPr>
           <a:xfrm rot="5400000" flipH="1" flipV="1">
-            <a:off x="4131507" y="1281685"/>
-            <a:ext cx="613122" cy="4459404"/>
+            <a:off x="3554286" y="1173409"/>
+            <a:ext cx="617128" cy="4671950"/>
           </a:xfrm>
           <a:prstGeom prst="bentConnector3">
             <a:avLst>
-              <a:gd name="adj1" fmla="val -26668"/>
+              <a:gd name="adj1" fmla="val -39502"/>
             </a:avLst>
           </a:prstGeom>
           <a:ln w="19050">
@@ -3671,7 +3671,7 @@
         </p:nvSpPr>
         <p:spPr>
           <a:xfrm rot="16200000">
-            <a:off x="956202" y="2861202"/>
+            <a:off x="274711" y="2861202"/>
             <a:ext cx="1093635" cy="346760"/>
           </a:xfrm>
           <a:prstGeom prst="rect">
@@ -3741,7 +3741,7 @@
         </p:nvSpPr>
         <p:spPr>
           <a:xfrm rot="16200000">
-            <a:off x="1626910" y="2952291"/>
+            <a:off x="945419" y="2952291"/>
             <a:ext cx="270504" cy="175523"/>
           </a:xfrm>
           <a:prstGeom prst="triangle">
@@ -3792,7 +3792,7 @@
         </p:nvCxnSpPr>
         <p:spPr>
           <a:xfrm>
-            <a:off x="2609828" y="3636620"/>
+            <a:off x="1928337" y="3636620"/>
             <a:ext cx="215452" cy="0"/>
           </a:xfrm>
           <a:prstGeom prst="straightConnector1">
@@ -3825,12 +3825,14 @@
       <p:cxnSp>
         <p:nvCxnSpPr>
           <p:cNvPr id="75" name="Elbow Connector 122"/>
-          <p:cNvCxnSpPr/>
+          <p:cNvCxnSpPr>
+            <a:cxnSpLocks/>
+          </p:cNvCxnSpPr>
           <p:nvPr/>
         </p:nvCxnSpPr>
         <p:spPr>
           <a:xfrm>
-            <a:off x="910091" y="3040053"/>
+            <a:off x="228600" y="3040053"/>
             <a:ext cx="419548" cy="2860"/>
           </a:xfrm>
           <a:prstGeom prst="bentConnector3">
@@ -3875,7 +3877,7 @@
         </p:nvCxnSpPr>
         <p:spPr>
           <a:xfrm flipV="1">
-            <a:off x="1849924" y="3040052"/>
+            <a:off x="1168433" y="3040052"/>
             <a:ext cx="216105" cy="1"/>
           </a:xfrm>
           <a:prstGeom prst="line">
@@ -3914,7 +3916,7 @@
         </p:nvSpPr>
         <p:spPr>
           <a:xfrm>
-            <a:off x="2373780" y="3549930"/>
+            <a:off x="1692289" y="3549930"/>
             <a:ext cx="236048" cy="173380"/>
           </a:xfrm>
           <a:prstGeom prst="flowChartDecision">
@@ -3959,7 +3961,7 @@
         </p:nvSpPr>
         <p:spPr>
           <a:xfrm>
-            <a:off x="2825280" y="2846162"/>
+            <a:off x="2143789" y="2846162"/>
             <a:ext cx="1490560" cy="334856"/>
           </a:xfrm>
           <a:prstGeom prst="rect">
@@ -3997,7 +3999,7 @@
                   <a:srgbClr val="7030A0"/>
                 </a:solidFill>
               </a:rPr>
-              <a:t>VersionedAddressBook</a:t>
+              <a:t>VersionedFoodDiary</a:t>
             </a:r>
             <a:endParaRPr lang="en-SG" sz="1050" dirty="0">
               <a:solidFill>
@@ -4018,7 +4020,7 @@
         </p:nvCxnSpPr>
         <p:spPr>
           <a:xfrm>
-            <a:off x="2624360" y="3003033"/>
+            <a:off x="1942869" y="3003033"/>
             <a:ext cx="200920" cy="10557"/>
           </a:xfrm>
           <a:prstGeom prst="straightConnector1">
@@ -4056,7 +4058,7 @@
         </p:nvSpPr>
         <p:spPr>
           <a:xfrm>
-            <a:off x="2388312" y="2916343"/>
+            <a:off x="1706821" y="2916343"/>
             <a:ext cx="236048" cy="173380"/>
           </a:xfrm>
           <a:prstGeom prst="flowChartDecision">
@@ -4101,8 +4103,8 @@
         </p:nvSpPr>
         <p:spPr>
           <a:xfrm>
-            <a:off x="4692650" y="2846162"/>
-            <a:ext cx="1156969" cy="346760"/>
+            <a:off x="4011159" y="2846162"/>
+            <a:ext cx="1365019" cy="346760"/>
           </a:xfrm>
           <a:prstGeom prst="rect">
             <a:avLst/>
@@ -4139,7 +4141,7 @@
                   <a:srgbClr val="7030A0"/>
                 </a:solidFill>
               </a:rPr>
-              <a:t>UniquePersonList</a:t>
+              <a:t>UniqueRestaurantList</a:t>
             </a:r>
             <a:endParaRPr lang="en-SG" sz="1050" dirty="0">
               <a:solidFill>
@@ -4157,7 +4159,7 @@
         </p:nvSpPr>
         <p:spPr>
           <a:xfrm>
-            <a:off x="4324972" y="2920532"/>
+            <a:off x="3643481" y="2920532"/>
             <a:ext cx="236048" cy="173380"/>
           </a:xfrm>
           <a:prstGeom prst="flowChartDecision">
@@ -4204,8 +4206,8 @@
         </p:nvSpPr>
         <p:spPr>
           <a:xfrm>
-            <a:off x="6313677" y="2858066"/>
-            <a:ext cx="708186" cy="346760"/>
+            <a:off x="5808665" y="2854060"/>
+            <a:ext cx="780320" cy="346760"/>
           </a:xfrm>
           <a:prstGeom prst="rect">
             <a:avLst/>
@@ -4242,7 +4244,7 @@
                   <a:srgbClr val="7030A0"/>
                 </a:solidFill>
               </a:rPr>
-              <a:t>Person</a:t>
+              <a:t>Restaurant</a:t>
             </a:r>
             <a:endParaRPr lang="en-SG" sz="1050" dirty="0">
               <a:solidFill>
@@ -4260,7 +4262,7 @@
         </p:nvSpPr>
         <p:spPr>
           <a:xfrm>
-            <a:off x="5858751" y="2941676"/>
+            <a:off x="5380932" y="2943396"/>
             <a:ext cx="236048" cy="173380"/>
           </a:xfrm>
           <a:prstGeom prst="flowChartDecision">
@@ -4301,15 +4303,16 @@
         <p:nvCxnSpPr>
           <p:cNvPr id="64" name="Elbow Connector 63"/>
           <p:cNvCxnSpPr>
+            <a:cxnSpLocks/>
             <a:stCxn id="63" idx="3"/>
             <a:endCxn id="62" idx="1"/>
           </p:cNvCxnSpPr>
           <p:nvPr/>
         </p:nvCxnSpPr>
         <p:spPr>
-          <a:xfrm>
-            <a:off x="6094799" y="3028366"/>
-            <a:ext cx="218878" cy="3080"/>
+          <a:xfrm flipV="1">
+            <a:off x="5616980" y="3027440"/>
+            <a:ext cx="191685" cy="2646"/>
           </a:xfrm>
           <a:prstGeom prst="bentConnector3">
             <a:avLst/>
@@ -4346,7 +4349,7 @@
         </p:nvSpPr>
         <p:spPr>
           <a:xfrm>
-            <a:off x="7712397" y="2564238"/>
+            <a:off x="7260863" y="2236888"/>
             <a:ext cx="708186" cy="285783"/>
           </a:xfrm>
           <a:prstGeom prst="rect">
@@ -4402,7 +4405,7 @@
         </p:nvSpPr>
         <p:spPr>
           <a:xfrm>
-            <a:off x="7041947" y="2948201"/>
+            <a:off x="6600800" y="2939247"/>
             <a:ext cx="236048" cy="173380"/>
           </a:xfrm>
           <a:prstGeom prst="flowChartDecision">
@@ -4446,16 +4449,20 @@
           <p:cNvPr id="79" name="Elbow Connector 78"/>
           <p:cNvCxnSpPr>
             <a:cxnSpLocks/>
+            <a:stCxn id="78" idx="3"/>
+            <a:endCxn id="76" idx="1"/>
           </p:cNvCxnSpPr>
           <p:nvPr/>
         </p:nvCxnSpPr>
         <p:spPr>
           <a:xfrm flipV="1">
-            <a:off x="7277995" y="2706821"/>
-            <a:ext cx="434402" cy="327761"/>
+            <a:off x="6836848" y="2379780"/>
+            <a:ext cx="424015" cy="646157"/>
           </a:xfrm>
           <a:prstGeom prst="bentConnector3">
-            <a:avLst/>
+            <a:avLst>
+              <a:gd name="adj1" fmla="val 50000"/>
+            </a:avLst>
           </a:prstGeom>
           <a:ln w="19050">
             <a:solidFill>
@@ -4489,7 +4496,7 @@
         </p:nvSpPr>
         <p:spPr>
           <a:xfrm>
-            <a:off x="7712397" y="2887216"/>
+            <a:off x="7260863" y="2559866"/>
             <a:ext cx="708186" cy="285783"/>
           </a:xfrm>
           <a:prstGeom prst="rect">
@@ -4541,6 +4548,7 @@
         <p:nvCxnSpPr>
           <p:cNvPr id="81" name="Elbow Connector 80"/>
           <p:cNvCxnSpPr>
+            <a:cxnSpLocks/>
             <a:stCxn id="78" idx="3"/>
             <a:endCxn id="80" idx="1"/>
           </p:cNvCxnSpPr>
@@ -4548,11 +4556,13 @@
         </p:nvCxnSpPr>
         <p:spPr>
           <a:xfrm flipV="1">
-            <a:off x="7277995" y="3030108"/>
-            <a:ext cx="434402" cy="4783"/>
+            <a:off x="6836848" y="2702758"/>
+            <a:ext cx="424015" cy="323179"/>
           </a:xfrm>
           <a:prstGeom prst="bentConnector3">
-            <a:avLst/>
+            <a:avLst>
+              <a:gd name="adj1" fmla="val 50000"/>
+            </a:avLst>
           </a:prstGeom>
           <a:ln w="19050">
             <a:solidFill>
@@ -4586,7 +4596,7 @@
         </p:nvSpPr>
         <p:spPr>
           <a:xfrm>
-            <a:off x="7712397" y="3210194"/>
+            <a:off x="7260863" y="2882844"/>
             <a:ext cx="708186" cy="285783"/>
           </a:xfrm>
           <a:prstGeom prst="rect">
@@ -4638,15 +4648,16 @@
         <p:nvCxnSpPr>
           <p:cNvPr id="84" name="Elbow Connector 83"/>
           <p:cNvCxnSpPr>
+            <a:cxnSpLocks/>
             <a:stCxn id="78" idx="3"/>
             <a:endCxn id="83" idx="1"/>
           </p:cNvCxnSpPr>
           <p:nvPr/>
         </p:nvCxnSpPr>
         <p:spPr>
-          <a:xfrm>
-            <a:off x="7277995" y="3034891"/>
-            <a:ext cx="434402" cy="318195"/>
+          <a:xfrm flipV="1">
+            <a:off x="6836848" y="3025736"/>
+            <a:ext cx="424015" cy="201"/>
           </a:xfrm>
           <a:prstGeom prst="bentConnector3">
             <a:avLst/>
@@ -4683,7 +4694,7 @@
         </p:nvSpPr>
         <p:spPr>
           <a:xfrm>
-            <a:off x="7712397" y="3533171"/>
+            <a:off x="7260863" y="3205821"/>
             <a:ext cx="708186" cy="285783"/>
           </a:xfrm>
           <a:prstGeom prst="rect">
@@ -4735,6 +4746,7 @@
         <p:nvCxnSpPr>
           <p:cNvPr id="86" name="Elbow Connector 85"/>
           <p:cNvCxnSpPr>
+            <a:cxnSpLocks/>
             <a:stCxn id="78" idx="3"/>
             <a:endCxn id="85" idx="1"/>
           </p:cNvCxnSpPr>
@@ -4742,8 +4754,8 @@
         </p:nvCxnSpPr>
         <p:spPr>
           <a:xfrm>
-            <a:off x="7277995" y="3034891"/>
-            <a:ext cx="434402" cy="641172"/>
+            <a:off x="6836848" y="3025937"/>
+            <a:ext cx="424015" cy="322776"/>
           </a:xfrm>
           <a:prstGeom prst="bentConnector3">
             <a:avLst/>
@@ -4783,7 +4795,7 @@
         </p:nvCxnSpPr>
         <p:spPr>
           <a:xfrm rot="16200000" flipH="1">
-            <a:off x="3566454" y="2680653"/>
+            <a:off x="2884963" y="2680653"/>
             <a:ext cx="274076" cy="1"/>
           </a:xfrm>
           <a:prstGeom prst="bentConnector3">
@@ -4824,7 +4836,7 @@
         </p:nvSpPr>
         <p:spPr>
           <a:xfrm rot="10800000" flipV="1">
-            <a:off x="3562299" y="2386554"/>
+            <a:off x="2880808" y="2386554"/>
             <a:ext cx="282387" cy="157062"/>
           </a:xfrm>
           <a:prstGeom prst="triangle">
@@ -4878,7 +4890,7 @@
         </p:nvSpPr>
         <p:spPr>
           <a:xfrm>
-            <a:off x="1260922" y="1998350"/>
+            <a:off x="579431" y="1998350"/>
             <a:ext cx="1443661" cy="364396"/>
           </a:xfrm>
           <a:prstGeom prst="rect">
@@ -4931,7 +4943,7 @@
                   <a:srgbClr val="7030A0"/>
                 </a:solidFill>
               </a:rPr>
-              <a:t>ReadOnlyAddressBook</a:t>
+              <a:t>ReadOnlyFoodDiary</a:t>
             </a:r>
             <a:endParaRPr lang="en-SG" sz="1050" dirty="0">
               <a:solidFill>
@@ -4949,7 +4961,7 @@
         </p:nvSpPr>
         <p:spPr>
           <a:xfrm rot="16200000">
-            <a:off x="6362886" y="3586305"/>
+            <a:off x="5909995" y="3586305"/>
             <a:ext cx="881018" cy="261610"/>
           </a:xfrm>
           <a:prstGeom prst="rect">
@@ -4988,7 +5000,7 @@
         </p:nvSpPr>
         <p:spPr>
           <a:xfrm>
-            <a:off x="2057401" y="4239491"/>
+            <a:off x="1375910" y="4239491"/>
             <a:ext cx="1066800" cy="346760"/>
           </a:xfrm>
           <a:prstGeom prst="rect">
@@ -5062,7 +5074,7 @@
         </p:nvCxnSpPr>
         <p:spPr>
           <a:xfrm rot="16200000" flipH="1">
-            <a:off x="1364475" y="3719944"/>
+            <a:off x="682984" y="3719944"/>
             <a:ext cx="831471" cy="554381"/>
           </a:xfrm>
           <a:prstGeom prst="bentConnector2">
@@ -5101,7 +5113,7 @@
         </p:nvSpPr>
         <p:spPr>
           <a:xfrm>
-            <a:off x="4429979" y="3111479"/>
+            <a:off x="3748488" y="3111479"/>
             <a:ext cx="189257" cy="178683"/>
           </a:xfrm>
           <a:prstGeom prst="rect">
@@ -5140,7 +5152,7 @@
         </p:nvSpPr>
         <p:spPr>
           <a:xfrm>
-            <a:off x="6135256" y="3097917"/>
+            <a:off x="5453765" y="3097917"/>
             <a:ext cx="189257" cy="178683"/>
           </a:xfrm>
           <a:prstGeom prst="rect">
@@ -5179,7 +5191,7 @@
         </p:nvSpPr>
         <p:spPr>
           <a:xfrm>
-            <a:off x="2573394" y="2756715"/>
+            <a:off x="1891903" y="2756715"/>
             <a:ext cx="170110" cy="137542"/>
           </a:xfrm>
           <a:prstGeom prst="rect">
@@ -5218,7 +5230,7 @@
         </p:nvSpPr>
         <p:spPr>
           <a:xfrm>
-            <a:off x="2630191" y="3667737"/>
+            <a:off x="1948700" y="3667737"/>
             <a:ext cx="189257" cy="178683"/>
           </a:xfrm>
           <a:prstGeom prst="rect">
@@ -5257,7 +5269,7 @@
         </p:nvSpPr>
         <p:spPr>
           <a:xfrm>
-            <a:off x="6449896" y="3204826"/>
+            <a:off x="5768405" y="3204826"/>
             <a:ext cx="189257" cy="178683"/>
           </a:xfrm>
           <a:prstGeom prst="rect">
@@ -5302,7 +5314,7 @@
         </p:nvSpPr>
         <p:spPr>
           <a:xfrm>
-            <a:off x="7712397" y="2228817"/>
+            <a:off x="7260863" y="1913136"/>
             <a:ext cx="708186" cy="285783"/>
           </a:xfrm>
           <a:prstGeom prst="rect">
@@ -5368,8 +5380,8 @@
         </p:nvCxnSpPr>
         <p:spPr>
           <a:xfrm flipV="1">
-            <a:off x="7277995" y="2371709"/>
-            <a:ext cx="434402" cy="663182"/>
+            <a:off x="6836848" y="2056028"/>
+            <a:ext cx="424015" cy="969909"/>
           </a:xfrm>
           <a:prstGeom prst="bentConnector3">
             <a:avLst>
@@ -5414,7 +5426,7 @@
         </p:nvSpPr>
         <p:spPr>
           <a:xfrm>
-            <a:off x="7466243" y="2255711"/>
+            <a:off x="7014708" y="1899577"/>
             <a:ext cx="189257" cy="178683"/>
           </a:xfrm>
           <a:prstGeom prst="rect">
@@ -5453,7 +5465,7 @@
         </p:nvSpPr>
         <p:spPr>
           <a:xfrm>
-            <a:off x="3170181" y="1998350"/>
+            <a:off x="2488690" y="1998350"/>
             <a:ext cx="1060683" cy="364396"/>
           </a:xfrm>
           <a:prstGeom prst="rect">
@@ -5491,7 +5503,7 @@
                   <a:srgbClr val="7030A0"/>
                 </a:solidFill>
               </a:rPr>
-              <a:t>AddressBook</a:t>
+              <a:t>FoodDiary</a:t>
             </a:r>
             <a:endParaRPr lang="en-SG" sz="1050" dirty="0">
               <a:solidFill>
@@ -5505,6 +5517,7 @@
         <p:nvCxnSpPr>
           <p:cNvPr id="60" name="Straight Arrow Connector 59"/>
           <p:cNvCxnSpPr>
+            <a:cxnSpLocks/>
             <a:stCxn id="51" idx="1"/>
             <a:endCxn id="49" idx="1"/>
           </p:cNvCxnSpPr>
@@ -5512,7 +5525,7 @@
         </p:nvCxnSpPr>
         <p:spPr>
           <a:xfrm>
-            <a:off x="4324972" y="3007222"/>
+            <a:off x="3643481" y="3007222"/>
             <a:ext cx="367678" cy="12320"/>
           </a:xfrm>
           <a:prstGeom prst="straightConnector1">
@@ -5550,7 +5563,7 @@
         </p:nvSpPr>
         <p:spPr>
           <a:xfrm rot="16200000">
-            <a:off x="2669073" y="2069158"/>
+            <a:off x="1987582" y="2069158"/>
             <a:ext cx="271014" cy="187417"/>
           </a:xfrm>
           <a:prstGeom prst="triangle">
@@ -5605,7 +5618,7 @@
         </p:nvCxnSpPr>
         <p:spPr>
           <a:xfrm>
-            <a:off x="2898289" y="2177727"/>
+            <a:off x="2216798" y="2177727"/>
             <a:ext cx="271892" cy="2821"/>
           </a:xfrm>
           <a:prstGeom prst="bentConnector3">
@@ -5652,7 +5665,7 @@
         </p:nvSpPr>
         <p:spPr>
           <a:xfrm>
-            <a:off x="4238892" y="3460864"/>
+            <a:off x="3557401" y="3460864"/>
             <a:ext cx="1293486" cy="346760"/>
           </a:xfrm>
           <a:prstGeom prst="rect">
@@ -5725,7 +5738,7 @@
         </p:nvSpPr>
         <p:spPr>
           <a:xfrm rot="5400000" flipH="1">
-            <a:off x="3992636" y="3514414"/>
+            <a:off x="3311145" y="3514414"/>
             <a:ext cx="271014" cy="221497"/>
           </a:xfrm>
           <a:prstGeom prst="triangle">
@@ -5787,7 +5800,7 @@
         </p:nvCxnSpPr>
         <p:spPr>
           <a:xfrm rot="10800000">
-            <a:off x="3703491" y="3636621"/>
+            <a:off x="3022000" y="3636621"/>
             <a:ext cx="313904" cy="3403"/>
           </a:xfrm>
           <a:prstGeom prst="bentConnector3">
@@ -5802,6 +5815,552 @@
             <a:prstDash val="sysDot"/>
             <a:headEnd type="none" w="med" len="med"/>
             <a:tailEnd type="none" w="med" len="med"/>
+          </a:ln>
+          <a:effectLst/>
+        </p:spPr>
+        <p:style>
+          <a:lnRef idx="1">
+            <a:schemeClr val="accent2"/>
+          </a:lnRef>
+          <a:fillRef idx="2">
+            <a:schemeClr val="accent2"/>
+          </a:fillRef>
+          <a:effectRef idx="1">
+            <a:schemeClr val="accent2"/>
+          </a:effectRef>
+          <a:fontRef idx="minor">
+            <a:schemeClr val="dk1"/>
+          </a:fontRef>
+        </p:style>
+      </p:cxnSp>
+      <p:sp>
+        <p:nvSpPr>
+          <p:cNvPr id="72" name="Rectangle 8">
+            <a:extLst>
+              <a:ext uri="{FF2B5EF4-FFF2-40B4-BE49-F238E27FC236}">
+                <a16:creationId xmlns:a16="http://schemas.microsoft.com/office/drawing/2014/main" id="{CBA319B1-DCBE-1E40-BEAB-513323C29798}"/>
+              </a:ext>
+            </a:extLst>
+          </p:cNvPr>
+          <p:cNvSpPr/>
+          <p:nvPr/>
+        </p:nvSpPr>
+        <p:spPr>
+          <a:xfrm>
+            <a:off x="7260863" y="3532343"/>
+            <a:ext cx="708186" cy="285783"/>
+          </a:xfrm>
+          <a:prstGeom prst="rect">
+            <a:avLst/>
+          </a:prstGeom>
+          <a:ln w="19050">
+            <a:solidFill>
+              <a:srgbClr val="7030A0"/>
+            </a:solidFill>
+          </a:ln>
+          <a:effectLst/>
+        </p:spPr>
+        <p:style>
+          <a:lnRef idx="1">
+            <a:schemeClr val="accent4"/>
+          </a:lnRef>
+          <a:fillRef idx="2">
+            <a:schemeClr val="accent4"/>
+          </a:fillRef>
+          <a:effectRef idx="1">
+            <a:schemeClr val="accent4"/>
+          </a:effectRef>
+          <a:fontRef idx="minor">
+            <a:schemeClr val="dk1"/>
+          </a:fontRef>
+        </p:style>
+        <p:txBody>
+          <a:bodyPr rtlCol="0" anchor="ctr"/>
+          <a:lstStyle/>
+          <a:p>
+            <a:pPr algn="ctr"/>
+            <a:r>
+              <a:rPr lang="en-US" sz="1050" dirty="0">
+                <a:solidFill>
+                  <a:srgbClr val="7030A0"/>
+                </a:solidFill>
+              </a:rPr>
+              <a:t>Review</a:t>
+            </a:r>
+            <a:endParaRPr lang="en-SG" sz="1050" dirty="0">
+              <a:solidFill>
+                <a:srgbClr val="7030A0"/>
+              </a:solidFill>
+            </a:endParaRPr>
+          </a:p>
+        </p:txBody>
+      </p:sp>
+      <p:cxnSp>
+        <p:nvCxnSpPr>
+          <p:cNvPr id="87" name="Elbow Connector 86">
+            <a:extLst>
+              <a:ext uri="{FF2B5EF4-FFF2-40B4-BE49-F238E27FC236}">
+                <a16:creationId xmlns:a16="http://schemas.microsoft.com/office/drawing/2014/main" id="{DCB3B358-F21C-6542-B737-DFE2F9B3FED6}"/>
+              </a:ext>
+            </a:extLst>
+          </p:cNvPr>
+          <p:cNvCxnSpPr>
+            <a:cxnSpLocks/>
+            <a:stCxn id="78" idx="3"/>
+            <a:endCxn id="72" idx="1"/>
+          </p:cNvCxnSpPr>
+          <p:nvPr/>
+        </p:nvCxnSpPr>
+        <p:spPr>
+          <a:xfrm>
+            <a:off x="6836848" y="3025937"/>
+            <a:ext cx="424015" cy="649298"/>
+          </a:xfrm>
+          <a:prstGeom prst="bentConnector3">
+            <a:avLst>
+              <a:gd name="adj1" fmla="val 50000"/>
+            </a:avLst>
+          </a:prstGeom>
+          <a:ln w="19050">
+            <a:solidFill>
+              <a:srgbClr val="7030A0"/>
+            </a:solidFill>
+            <a:headEnd type="none" w="med" len="med"/>
+            <a:tailEnd type="arrow" w="med" len="med"/>
+          </a:ln>
+          <a:effectLst/>
+        </p:spPr>
+        <p:style>
+          <a:lnRef idx="1">
+            <a:schemeClr val="accent2"/>
+          </a:lnRef>
+          <a:fillRef idx="2">
+            <a:schemeClr val="accent2"/>
+          </a:fillRef>
+          <a:effectRef idx="1">
+            <a:schemeClr val="accent2"/>
+          </a:effectRef>
+          <a:fontRef idx="minor">
+            <a:schemeClr val="dk1"/>
+          </a:fontRef>
+        </p:style>
+      </p:cxnSp>
+      <p:sp>
+        <p:nvSpPr>
+          <p:cNvPr id="105" name="TextBox 104">
+            <a:extLst>
+              <a:ext uri="{FF2B5EF4-FFF2-40B4-BE49-F238E27FC236}">
+                <a16:creationId xmlns:a16="http://schemas.microsoft.com/office/drawing/2014/main" id="{B11F9329-C652-DC42-A28F-B8F2C6189045}"/>
+              </a:ext>
+            </a:extLst>
+          </p:cNvPr>
+          <p:cNvSpPr txBox="1"/>
+          <p:nvPr/>
+        </p:nvSpPr>
+        <p:spPr>
+          <a:xfrm>
+            <a:off x="7014708" y="3697246"/>
+            <a:ext cx="189257" cy="178683"/>
+          </a:xfrm>
+          <a:prstGeom prst="rect">
+            <a:avLst/>
+          </a:prstGeom>
+          <a:noFill/>
+        </p:spPr>
+        <p:txBody>
+          <a:bodyPr wrap="square" lIns="0" tIns="0" rIns="0" bIns="0" rtlCol="0">
+            <a:noAutofit/>
+          </a:bodyPr>
+          <a:lstStyle/>
+          <a:p>
+            <a:pPr algn="ctr"/>
+            <a:r>
+              <a:rPr lang="en-US" sz="1100" dirty="0">
+                <a:solidFill>
+                  <a:srgbClr val="7030A0"/>
+                </a:solidFill>
+              </a:rPr>
+              <a:t>*</a:t>
+            </a:r>
+            <a:endParaRPr lang="en-SG" sz="1100" dirty="0">
+              <a:solidFill>
+                <a:srgbClr val="7030A0"/>
+              </a:solidFill>
+            </a:endParaRPr>
+          </a:p>
+        </p:txBody>
+      </p:sp>
+      <p:sp>
+        <p:nvSpPr>
+          <p:cNvPr id="106" name="Flowchart: Decision 96">
+            <a:extLst>
+              <a:ext uri="{FF2B5EF4-FFF2-40B4-BE49-F238E27FC236}">
+                <a16:creationId xmlns:a16="http://schemas.microsoft.com/office/drawing/2014/main" id="{6A47F553-9EB2-A745-8BD1-8CD1006461DE}"/>
+              </a:ext>
+            </a:extLst>
+          </p:cNvPr>
+          <p:cNvSpPr/>
+          <p:nvPr/>
+        </p:nvSpPr>
+        <p:spPr>
+          <a:xfrm rot="5400000">
+            <a:off x="7496932" y="3858014"/>
+            <a:ext cx="236048" cy="173380"/>
+          </a:xfrm>
+          <a:prstGeom prst="flowChartDecision">
+            <a:avLst/>
+          </a:prstGeom>
+          <a:solidFill>
+            <a:srgbClr val="7030A0"/>
+          </a:solidFill>
+          <a:ln w="19050">
+            <a:solidFill>
+              <a:srgbClr val="7030A0"/>
+            </a:solidFill>
+          </a:ln>
+          <a:effectLst/>
+        </p:spPr>
+        <p:style>
+          <a:lnRef idx="1">
+            <a:schemeClr val="accent6"/>
+          </a:lnRef>
+          <a:fillRef idx="2">
+            <a:schemeClr val="accent6"/>
+          </a:fillRef>
+          <a:effectRef idx="1">
+            <a:schemeClr val="accent6"/>
+          </a:effectRef>
+          <a:fontRef idx="minor">
+            <a:schemeClr val="dk1"/>
+          </a:fontRef>
+        </p:style>
+        <p:txBody>
+          <a:bodyPr rtlCol="0" anchor="ctr"/>
+          <a:lstStyle/>
+          <a:p>
+            <a:pPr algn="ctr"/>
+            <a:endParaRPr lang="en-US" sz="1050" dirty="0"/>
+          </a:p>
+        </p:txBody>
+      </p:sp>
+      <p:sp>
+        <p:nvSpPr>
+          <p:cNvPr id="108" name="Rectangle 8">
+            <a:extLst>
+              <a:ext uri="{FF2B5EF4-FFF2-40B4-BE49-F238E27FC236}">
+                <a16:creationId xmlns:a16="http://schemas.microsoft.com/office/drawing/2014/main" id="{9A5AA0EE-9C67-7044-B8B0-9431DED41B4B}"/>
+              </a:ext>
+            </a:extLst>
+          </p:cNvPr>
+          <p:cNvSpPr/>
+          <p:nvPr/>
+        </p:nvSpPr>
+        <p:spPr>
+          <a:xfrm>
+            <a:off x="8032364" y="4361621"/>
+            <a:ext cx="708186" cy="285783"/>
+          </a:xfrm>
+          <a:prstGeom prst="rect">
+            <a:avLst/>
+          </a:prstGeom>
+          <a:ln w="19050">
+            <a:solidFill>
+              <a:srgbClr val="7030A0"/>
+            </a:solidFill>
+          </a:ln>
+          <a:effectLst/>
+        </p:spPr>
+        <p:style>
+          <a:lnRef idx="1">
+            <a:schemeClr val="accent4"/>
+          </a:lnRef>
+          <a:fillRef idx="2">
+            <a:schemeClr val="accent4"/>
+          </a:fillRef>
+          <a:effectRef idx="1">
+            <a:schemeClr val="accent4"/>
+          </a:effectRef>
+          <a:fontRef idx="minor">
+            <a:schemeClr val="dk1"/>
+          </a:fontRef>
+        </p:style>
+        <p:txBody>
+          <a:bodyPr rtlCol="0" anchor="ctr"/>
+          <a:lstStyle/>
+          <a:p>
+            <a:pPr algn="ctr"/>
+            <a:r>
+              <a:rPr lang="en-US" sz="1050" dirty="0">
+                <a:solidFill>
+                  <a:srgbClr val="7030A0"/>
+                </a:solidFill>
+              </a:rPr>
+              <a:t>Entry</a:t>
+            </a:r>
+            <a:endParaRPr lang="en-SG" sz="1050" dirty="0">
+              <a:solidFill>
+                <a:srgbClr val="7030A0"/>
+              </a:solidFill>
+            </a:endParaRPr>
+          </a:p>
+        </p:txBody>
+      </p:sp>
+      <p:cxnSp>
+        <p:nvCxnSpPr>
+          <p:cNvPr id="109" name="Elbow Connector 108">
+            <a:extLst>
+              <a:ext uri="{FF2B5EF4-FFF2-40B4-BE49-F238E27FC236}">
+                <a16:creationId xmlns:a16="http://schemas.microsoft.com/office/drawing/2014/main" id="{053E592F-91B2-1C4A-AC78-61C49DB35AA2}"/>
+              </a:ext>
+            </a:extLst>
+          </p:cNvPr>
+          <p:cNvCxnSpPr>
+            <a:cxnSpLocks/>
+            <a:stCxn id="106" idx="3"/>
+            <a:endCxn id="108" idx="0"/>
+          </p:cNvCxnSpPr>
+          <p:nvPr/>
+        </p:nvCxnSpPr>
+        <p:spPr>
+          <a:xfrm rot="16200000" flipH="1">
+            <a:off x="7851260" y="3826423"/>
+            <a:ext cx="298893" cy="771501"/>
+          </a:xfrm>
+          <a:prstGeom prst="bentConnector3">
+            <a:avLst>
+              <a:gd name="adj1" fmla="val 50000"/>
+            </a:avLst>
+          </a:prstGeom>
+          <a:ln w="19050">
+            <a:solidFill>
+              <a:srgbClr val="7030A0"/>
+            </a:solidFill>
+            <a:headEnd type="none" w="med" len="med"/>
+            <a:tailEnd type="arrow" w="med" len="med"/>
+          </a:ln>
+          <a:effectLst/>
+        </p:spPr>
+        <p:style>
+          <a:lnRef idx="1">
+            <a:schemeClr val="accent2"/>
+          </a:lnRef>
+          <a:fillRef idx="2">
+            <a:schemeClr val="accent2"/>
+          </a:fillRef>
+          <a:effectRef idx="1">
+            <a:schemeClr val="accent2"/>
+          </a:effectRef>
+          <a:fontRef idx="minor">
+            <a:schemeClr val="dk1"/>
+          </a:fontRef>
+        </p:style>
+      </p:cxnSp>
+      <p:sp>
+        <p:nvSpPr>
+          <p:cNvPr id="110" name="Rectangle 8">
+            <a:extLst>
+              <a:ext uri="{FF2B5EF4-FFF2-40B4-BE49-F238E27FC236}">
+                <a16:creationId xmlns:a16="http://schemas.microsoft.com/office/drawing/2014/main" id="{27E6A32F-AF1E-BA47-ABCC-14B6FA19AFAC}"/>
+              </a:ext>
+            </a:extLst>
+          </p:cNvPr>
+          <p:cNvSpPr/>
+          <p:nvPr/>
+        </p:nvSpPr>
+        <p:spPr>
+          <a:xfrm>
+            <a:off x="7265908" y="4363951"/>
+            <a:ext cx="708186" cy="285783"/>
+          </a:xfrm>
+          <a:prstGeom prst="rect">
+            <a:avLst/>
+          </a:prstGeom>
+          <a:ln w="19050">
+            <a:solidFill>
+              <a:srgbClr val="7030A0"/>
+            </a:solidFill>
+          </a:ln>
+          <a:effectLst/>
+        </p:spPr>
+        <p:style>
+          <a:lnRef idx="1">
+            <a:schemeClr val="accent4"/>
+          </a:lnRef>
+          <a:fillRef idx="2">
+            <a:schemeClr val="accent4"/>
+          </a:fillRef>
+          <a:effectRef idx="1">
+            <a:schemeClr val="accent4"/>
+          </a:effectRef>
+          <a:fontRef idx="minor">
+            <a:schemeClr val="dk1"/>
+          </a:fontRef>
+        </p:style>
+        <p:txBody>
+          <a:bodyPr rtlCol="0" anchor="ctr"/>
+          <a:lstStyle/>
+          <a:p>
+            <a:pPr algn="ctr"/>
+            <a:r>
+              <a:rPr lang="en-US" sz="1050" dirty="0">
+                <a:solidFill>
+                  <a:srgbClr val="7030A0"/>
+                </a:solidFill>
+              </a:rPr>
+              <a:t>Rating</a:t>
+            </a:r>
+            <a:endParaRPr lang="en-SG" sz="1050" dirty="0">
+              <a:solidFill>
+                <a:srgbClr val="7030A0"/>
+              </a:solidFill>
+            </a:endParaRPr>
+          </a:p>
+        </p:txBody>
+      </p:sp>
+      <p:cxnSp>
+        <p:nvCxnSpPr>
+          <p:cNvPr id="111" name="Elbow Connector 110">
+            <a:extLst>
+              <a:ext uri="{FF2B5EF4-FFF2-40B4-BE49-F238E27FC236}">
+                <a16:creationId xmlns:a16="http://schemas.microsoft.com/office/drawing/2014/main" id="{42D108CE-FA23-0D49-95C6-B01522AA44C2}"/>
+              </a:ext>
+            </a:extLst>
+          </p:cNvPr>
+          <p:cNvCxnSpPr>
+            <a:cxnSpLocks/>
+            <a:stCxn id="106" idx="3"/>
+            <a:endCxn id="110" idx="0"/>
+          </p:cNvCxnSpPr>
+          <p:nvPr/>
+        </p:nvCxnSpPr>
+        <p:spPr>
+          <a:xfrm rot="16200000" flipH="1">
+            <a:off x="7466867" y="4210816"/>
+            <a:ext cx="301223" cy="5045"/>
+          </a:xfrm>
+          <a:prstGeom prst="bentConnector3">
+            <a:avLst>
+              <a:gd name="adj1" fmla="val 50000"/>
+            </a:avLst>
+          </a:prstGeom>
+          <a:ln w="19050">
+            <a:solidFill>
+              <a:srgbClr val="7030A0"/>
+            </a:solidFill>
+            <a:headEnd type="none" w="med" len="med"/>
+            <a:tailEnd type="arrow" w="med" len="med"/>
+          </a:ln>
+          <a:effectLst/>
+        </p:spPr>
+        <p:style>
+          <a:lnRef idx="1">
+            <a:schemeClr val="accent2"/>
+          </a:lnRef>
+          <a:fillRef idx="2">
+            <a:schemeClr val="accent2"/>
+          </a:fillRef>
+          <a:effectRef idx="1">
+            <a:schemeClr val="accent2"/>
+          </a:effectRef>
+          <a:fontRef idx="minor">
+            <a:schemeClr val="dk1"/>
+          </a:fontRef>
+        </p:style>
+      </p:cxnSp>
+      <p:sp>
+        <p:nvSpPr>
+          <p:cNvPr id="112" name="Rectangle 8">
+            <a:extLst>
+              <a:ext uri="{FF2B5EF4-FFF2-40B4-BE49-F238E27FC236}">
+                <a16:creationId xmlns:a16="http://schemas.microsoft.com/office/drawing/2014/main" id="{92E4AB15-C7FE-974E-AF5D-DFC9A72C0590}"/>
+              </a:ext>
+            </a:extLst>
+          </p:cNvPr>
+          <p:cNvSpPr/>
+          <p:nvPr/>
+        </p:nvSpPr>
+        <p:spPr>
+          <a:xfrm>
+            <a:off x="6381974" y="4361622"/>
+            <a:ext cx="825664" cy="285783"/>
+          </a:xfrm>
+          <a:prstGeom prst="rect">
+            <a:avLst/>
+          </a:prstGeom>
+          <a:ln w="19050">
+            <a:solidFill>
+              <a:srgbClr val="7030A0"/>
+            </a:solidFill>
+          </a:ln>
+          <a:effectLst/>
+        </p:spPr>
+        <p:style>
+          <a:lnRef idx="1">
+            <a:schemeClr val="accent4"/>
+          </a:lnRef>
+          <a:fillRef idx="2">
+            <a:schemeClr val="accent4"/>
+          </a:fillRef>
+          <a:effectRef idx="1">
+            <a:schemeClr val="accent4"/>
+          </a:effectRef>
+          <a:fontRef idx="minor">
+            <a:schemeClr val="dk1"/>
+          </a:fontRef>
+        </p:style>
+        <p:txBody>
+          <a:bodyPr rtlCol="0" anchor="ctr"/>
+          <a:lstStyle/>
+          <a:p>
+            <a:pPr algn="ctr"/>
+            <a:r>
+              <a:rPr lang="en-US" sz="1050" dirty="0" err="1">
+                <a:solidFill>
+                  <a:srgbClr val="7030A0"/>
+                </a:solidFill>
+              </a:rPr>
+              <a:t>TimeStamp</a:t>
+            </a:r>
+            <a:endParaRPr lang="en-SG" sz="1050" dirty="0">
+              <a:solidFill>
+                <a:srgbClr val="7030A0"/>
+              </a:solidFill>
+            </a:endParaRPr>
+          </a:p>
+        </p:txBody>
+      </p:sp>
+      <p:cxnSp>
+        <p:nvCxnSpPr>
+          <p:cNvPr id="113" name="Elbow Connector 112">
+            <a:extLst>
+              <a:ext uri="{FF2B5EF4-FFF2-40B4-BE49-F238E27FC236}">
+                <a16:creationId xmlns:a16="http://schemas.microsoft.com/office/drawing/2014/main" id="{001B057F-8022-F34D-948D-F8C8543722BD}"/>
+              </a:ext>
+            </a:extLst>
+          </p:cNvPr>
+          <p:cNvCxnSpPr>
+            <a:cxnSpLocks/>
+            <a:stCxn id="106" idx="3"/>
+            <a:endCxn id="112" idx="0"/>
+          </p:cNvCxnSpPr>
+          <p:nvPr/>
+        </p:nvCxnSpPr>
+        <p:spPr>
+          <a:xfrm rot="5400000">
+            <a:off x="7055434" y="3802100"/>
+            <a:ext cx="298894" cy="820150"/>
+          </a:xfrm>
+          <a:prstGeom prst="bentConnector3">
+            <a:avLst>
+              <a:gd name="adj1" fmla="val 50000"/>
+            </a:avLst>
+          </a:prstGeom>
+          <a:ln w="19050">
+            <a:solidFill>
+              <a:srgbClr val="7030A0"/>
+            </a:solidFill>
+            <a:headEnd type="none" w="med" len="med"/>
+            <a:tailEnd type="arrow" w="med" len="med"/>
           </a:ln>
           <a:effectLst/>
         </p:spPr>

</xml_diff>

<commit_message>
added Weblink and OpeningHours in model diagram
</commit_message>
<xml_diff>
--- a/docs/diagrams/ModelComponentClassDiagram.pptx
+++ b/docs/diagrams/ModelComponentClassDiagram.pptx
@@ -208,7 +208,7 @@
           <a:p>
             <a:fld id="{F5CC4B3F-88C1-4FFA-B1B6-F41C21DC6924}" type="datetimeFigureOut">
               <a:rPr lang="en-US" smtClean="0"/>
-              <a:t>3/19/19</a:t>
+              <a:t>19-Mar-19</a:t>
             </a:fld>
             <a:endParaRPr lang="en-US"/>
           </a:p>
@@ -654,7 +654,7 @@
           <a:p>
             <a:fld id="{78C97017-6FC3-485B-9764-EAC9E56C1D49}" type="datetimeFigureOut">
               <a:rPr lang="en-US" smtClean="0"/>
-              <a:t>3/19/19</a:t>
+              <a:t>19-Mar-19</a:t>
             </a:fld>
             <a:endParaRPr lang="en-US"/>
           </a:p>
@@ -822,7 +822,7 @@
           <a:p>
             <a:fld id="{78C97017-6FC3-485B-9764-EAC9E56C1D49}" type="datetimeFigureOut">
               <a:rPr lang="en-US" smtClean="0"/>
-              <a:t>3/19/19</a:t>
+              <a:t>19-Mar-19</a:t>
             </a:fld>
             <a:endParaRPr lang="en-US"/>
           </a:p>
@@ -1000,7 +1000,7 @@
           <a:p>
             <a:fld id="{78C97017-6FC3-485B-9764-EAC9E56C1D49}" type="datetimeFigureOut">
               <a:rPr lang="en-US" smtClean="0"/>
-              <a:t>3/19/19</a:t>
+              <a:t>19-Mar-19</a:t>
             </a:fld>
             <a:endParaRPr lang="en-US"/>
           </a:p>
@@ -1168,7 +1168,7 @@
           <a:p>
             <a:fld id="{78C97017-6FC3-485B-9764-EAC9E56C1D49}" type="datetimeFigureOut">
               <a:rPr lang="en-US" smtClean="0"/>
-              <a:t>3/19/19</a:t>
+              <a:t>19-Mar-19</a:t>
             </a:fld>
             <a:endParaRPr lang="en-US"/>
           </a:p>
@@ -1413,7 +1413,7 @@
           <a:p>
             <a:fld id="{78C97017-6FC3-485B-9764-EAC9E56C1D49}" type="datetimeFigureOut">
               <a:rPr lang="en-US" smtClean="0"/>
-              <a:t>3/19/19</a:t>
+              <a:t>19-Mar-19</a:t>
             </a:fld>
             <a:endParaRPr lang="en-US"/>
           </a:p>
@@ -1698,7 +1698,7 @@
           <a:p>
             <a:fld id="{78C97017-6FC3-485B-9764-EAC9E56C1D49}" type="datetimeFigureOut">
               <a:rPr lang="en-US" smtClean="0"/>
-              <a:t>3/19/19</a:t>
+              <a:t>19-Mar-19</a:t>
             </a:fld>
             <a:endParaRPr lang="en-US"/>
           </a:p>
@@ -2117,7 +2117,7 @@
           <a:p>
             <a:fld id="{78C97017-6FC3-485B-9764-EAC9E56C1D49}" type="datetimeFigureOut">
               <a:rPr lang="en-US" smtClean="0"/>
-              <a:t>3/19/19</a:t>
+              <a:t>19-Mar-19</a:t>
             </a:fld>
             <a:endParaRPr lang="en-US"/>
           </a:p>
@@ -2234,7 +2234,7 @@
           <a:p>
             <a:fld id="{78C97017-6FC3-485B-9764-EAC9E56C1D49}" type="datetimeFigureOut">
               <a:rPr lang="en-US" smtClean="0"/>
-              <a:t>3/19/19</a:t>
+              <a:t>19-Mar-19</a:t>
             </a:fld>
             <a:endParaRPr lang="en-US"/>
           </a:p>
@@ -2329,7 +2329,7 @@
           <a:p>
             <a:fld id="{78C97017-6FC3-485B-9764-EAC9E56C1D49}" type="datetimeFigureOut">
               <a:rPr lang="en-US" smtClean="0"/>
-              <a:t>3/19/19</a:t>
+              <a:t>19-Mar-19</a:t>
             </a:fld>
             <a:endParaRPr lang="en-US"/>
           </a:p>
@@ -2604,7 +2604,7 @@
           <a:p>
             <a:fld id="{78C97017-6FC3-485B-9764-EAC9E56C1D49}" type="datetimeFigureOut">
               <a:rPr lang="en-US" smtClean="0"/>
-              <a:t>3/19/19</a:t>
+              <a:t>19-Mar-19</a:t>
             </a:fld>
             <a:endParaRPr lang="en-US"/>
           </a:p>
@@ -2856,7 +2856,7 @@
           <a:p>
             <a:fld id="{78C97017-6FC3-485B-9764-EAC9E56C1D49}" type="datetimeFigureOut">
               <a:rPr lang="en-US" smtClean="0"/>
-              <a:t>3/19/19</a:t>
+              <a:t>19-Mar-19</a:t>
             </a:fld>
             <a:endParaRPr lang="en-US"/>
           </a:p>
@@ -3067,7 +3067,7 @@
           <a:p>
             <a:fld id="{78C97017-6FC3-485B-9764-EAC9E56C1D49}" type="datetimeFigureOut">
               <a:rPr lang="en-US" smtClean="0"/>
-              <a:t>3/19/19</a:t>
+              <a:t>19-Mar-19</a:t>
             </a:fld>
             <a:endParaRPr lang="en-US"/>
           </a:p>
@@ -3451,7 +3451,7 @@
         <p:spPr>
           <a:xfrm>
             <a:off x="438374" y="1600200"/>
-            <a:ext cx="8456045" cy="3276600"/>
+            <a:ext cx="8456045" cy="3733800"/>
           </a:xfrm>
           <a:prstGeom prst="roundRect">
             <a:avLst>
@@ -5040,6 +5040,14 @@
               </a:rPr>
               <a:t>&lt;&lt;interface&gt;&gt;</a:t>
             </a:r>
+            <a:r>
+              <a:rPr lang="en-US" sz="1050">
+                <a:solidFill>
+                  <a:srgbClr val="7030A0"/>
+                </a:solidFill>
+              </a:rPr>
+              <a:t/>
+            </a:r>
             <a:br>
               <a:rPr lang="en-US" sz="1050">
                 <a:solidFill>
@@ -5305,7 +5313,7 @@
           <p:cNvPr id="52" name="Rectangle 8">
             <a:extLst>
               <a:ext uri="{FF2B5EF4-FFF2-40B4-BE49-F238E27FC236}">
-                <a16:creationId xmlns:a16="http://schemas.microsoft.com/office/drawing/2014/main" id="{ABDCDBD2-131A-4B66-A2F2-43BBEE82C773}"/>
+                <a16:creationId xmlns:a16="http://schemas.microsoft.com/office/drawing/2014/main" xmlns="" id="{ABDCDBD2-131A-4B66-A2F2-43BBEE82C773}"/>
               </a:ext>
             </a:extLst>
           </p:cNvPr>
@@ -5367,7 +5375,7 @@
           <p:cNvPr id="53" name="Elbow Connector 78">
             <a:extLst>
               <a:ext uri="{FF2B5EF4-FFF2-40B4-BE49-F238E27FC236}">
-                <a16:creationId xmlns:a16="http://schemas.microsoft.com/office/drawing/2014/main" id="{B97967F8-618A-448B-81FD-CDFD4AF0EC64}"/>
+                <a16:creationId xmlns:a16="http://schemas.microsoft.com/office/drawing/2014/main" xmlns="" id="{B97967F8-618A-448B-81FD-CDFD4AF0EC64}"/>
               </a:ext>
             </a:extLst>
           </p:cNvPr>
@@ -5417,7 +5425,7 @@
           <p:cNvPr id="50" name="TextBox 49">
             <a:extLst>
               <a:ext uri="{FF2B5EF4-FFF2-40B4-BE49-F238E27FC236}">
-                <a16:creationId xmlns:a16="http://schemas.microsoft.com/office/drawing/2014/main" id="{B3FA9D57-880F-49C4-AD0B-A64E30D6F403}"/>
+                <a16:creationId xmlns:a16="http://schemas.microsoft.com/office/drawing/2014/main" xmlns="" id="{B3FA9D57-880F-49C4-AD0B-A64E30D6F403}"/>
               </a:ext>
             </a:extLst>
           </p:cNvPr>
@@ -5656,7 +5664,7 @@
           <p:cNvPr id="57" name="Rectangle 8">
             <a:extLst>
               <a:ext uri="{FF2B5EF4-FFF2-40B4-BE49-F238E27FC236}">
-                <a16:creationId xmlns:a16="http://schemas.microsoft.com/office/drawing/2014/main" id="{6A42DA50-9012-4391-9EF3-285E4FA3FCD8}"/>
+                <a16:creationId xmlns:a16="http://schemas.microsoft.com/office/drawing/2014/main" xmlns="" id="{6A42DA50-9012-4391-9EF3-285E4FA3FCD8}"/>
               </a:ext>
             </a:extLst>
           </p:cNvPr>
@@ -5729,7 +5737,7 @@
           <p:cNvPr id="59" name="Isosceles Triangle 102">
             <a:extLst>
               <a:ext uri="{FF2B5EF4-FFF2-40B4-BE49-F238E27FC236}">
-                <a16:creationId xmlns:a16="http://schemas.microsoft.com/office/drawing/2014/main" id="{B263B2D7-6E76-465E-B40E-7E2A46254A84}"/>
+                <a16:creationId xmlns:a16="http://schemas.microsoft.com/office/drawing/2014/main" xmlns="" id="{B263B2D7-6E76-465E-B40E-7E2A46254A84}"/>
               </a:ext>
             </a:extLst>
           </p:cNvPr>
@@ -5787,7 +5795,7 @@
           <p:cNvPr id="67" name="Elbow Connector 63">
             <a:extLst>
               <a:ext uri="{FF2B5EF4-FFF2-40B4-BE49-F238E27FC236}">
-                <a16:creationId xmlns:a16="http://schemas.microsoft.com/office/drawing/2014/main" id="{BA3A25CD-7C1D-4B3B-B294-1B05ABCFECFD}"/>
+                <a16:creationId xmlns:a16="http://schemas.microsoft.com/office/drawing/2014/main" xmlns="" id="{BA3A25CD-7C1D-4B3B-B294-1B05ABCFECFD}"/>
               </a:ext>
             </a:extLst>
           </p:cNvPr>
@@ -5838,7 +5846,7 @@
           <p:cNvPr id="72" name="Rectangle 8">
             <a:extLst>
               <a:ext uri="{FF2B5EF4-FFF2-40B4-BE49-F238E27FC236}">
-                <a16:creationId xmlns:a16="http://schemas.microsoft.com/office/drawing/2014/main" id="{CBA319B1-DCBE-1E40-BEAB-513323C29798}"/>
+                <a16:creationId xmlns:a16="http://schemas.microsoft.com/office/drawing/2014/main" xmlns="" id="{CBA319B1-DCBE-1E40-BEAB-513323C29798}"/>
               </a:ext>
             </a:extLst>
           </p:cNvPr>
@@ -5847,7 +5855,7 @@
         </p:nvSpPr>
         <p:spPr>
           <a:xfrm>
-            <a:off x="7260863" y="3532343"/>
+            <a:off x="7249923" y="4170319"/>
             <a:ext cx="708186" cy="285783"/>
           </a:xfrm>
           <a:prstGeom prst="rect">
@@ -5900,7 +5908,7 @@
           <p:cNvPr id="87" name="Elbow Connector 86">
             <a:extLst>
               <a:ext uri="{FF2B5EF4-FFF2-40B4-BE49-F238E27FC236}">
-                <a16:creationId xmlns:a16="http://schemas.microsoft.com/office/drawing/2014/main" id="{DCB3B358-F21C-6542-B737-DFE2F9B3FED6}"/>
+                <a16:creationId xmlns:a16="http://schemas.microsoft.com/office/drawing/2014/main" xmlns="" id="{DCB3B358-F21C-6542-B737-DFE2F9B3FED6}"/>
               </a:ext>
             </a:extLst>
           </p:cNvPr>
@@ -5914,7 +5922,7 @@
         <p:spPr>
           <a:xfrm>
             <a:off x="6836848" y="3025937"/>
-            <a:ext cx="424015" cy="649298"/>
+            <a:ext cx="413075" cy="1287274"/>
           </a:xfrm>
           <a:prstGeom prst="bentConnector3">
             <a:avLst>
@@ -5950,7 +5958,7 @@
           <p:cNvPr id="105" name="TextBox 104">
             <a:extLst>
               <a:ext uri="{FF2B5EF4-FFF2-40B4-BE49-F238E27FC236}">
-                <a16:creationId xmlns:a16="http://schemas.microsoft.com/office/drawing/2014/main" id="{B11F9329-C652-DC42-A28F-B8F2C6189045}"/>
+                <a16:creationId xmlns:a16="http://schemas.microsoft.com/office/drawing/2014/main" xmlns="" id="{B11F9329-C652-DC42-A28F-B8F2C6189045}"/>
               </a:ext>
             </a:extLst>
           </p:cNvPr>
@@ -5959,8 +5967,8 @@
         </p:nvSpPr>
         <p:spPr>
           <a:xfrm>
-            <a:off x="7014708" y="3697246"/>
-            <a:ext cx="189257" cy="178683"/>
+            <a:off x="7032242" y="4343154"/>
+            <a:ext cx="154188" cy="209185"/>
           </a:xfrm>
           <a:prstGeom prst="rect">
             <a:avLst/>
@@ -5995,7 +6003,7 @@
           <p:cNvPr id="106" name="Flowchart: Decision 96">
             <a:extLst>
               <a:ext uri="{FF2B5EF4-FFF2-40B4-BE49-F238E27FC236}">
-                <a16:creationId xmlns:a16="http://schemas.microsoft.com/office/drawing/2014/main" id="{6A47F553-9EB2-A745-8BD1-8CD1006461DE}"/>
+                <a16:creationId xmlns:a16="http://schemas.microsoft.com/office/drawing/2014/main" xmlns="" id="{6A47F553-9EB2-A745-8BD1-8CD1006461DE}"/>
               </a:ext>
             </a:extLst>
           </p:cNvPr>
@@ -6004,7 +6012,7 @@
         </p:nvSpPr>
         <p:spPr>
           <a:xfrm rot="5400000">
-            <a:off x="7496932" y="3858014"/>
+            <a:off x="7496932" y="4479080"/>
             <a:ext cx="236048" cy="173380"/>
           </a:xfrm>
           <a:prstGeom prst="flowChartDecision">
@@ -6048,7 +6056,7 @@
           <p:cNvPr id="108" name="Rectangle 8">
             <a:extLst>
               <a:ext uri="{FF2B5EF4-FFF2-40B4-BE49-F238E27FC236}">
-                <a16:creationId xmlns:a16="http://schemas.microsoft.com/office/drawing/2014/main" id="{9A5AA0EE-9C67-7044-B8B0-9431DED41B4B}"/>
+                <a16:creationId xmlns:a16="http://schemas.microsoft.com/office/drawing/2014/main" xmlns="" id="{9A5AA0EE-9C67-7044-B8B0-9431DED41B4B}"/>
               </a:ext>
             </a:extLst>
           </p:cNvPr>
@@ -6057,7 +6065,7 @@
         </p:nvSpPr>
         <p:spPr>
           <a:xfrm>
-            <a:off x="8032364" y="4361621"/>
+            <a:off x="8067933" y="4956826"/>
             <a:ext cx="708186" cy="285783"/>
           </a:xfrm>
           <a:prstGeom prst="rect">
@@ -6110,7 +6118,7 @@
           <p:cNvPr id="109" name="Elbow Connector 108">
             <a:extLst>
               <a:ext uri="{FF2B5EF4-FFF2-40B4-BE49-F238E27FC236}">
-                <a16:creationId xmlns:a16="http://schemas.microsoft.com/office/drawing/2014/main" id="{053E592F-91B2-1C4A-AC78-61C49DB35AA2}"/>
+                <a16:creationId xmlns:a16="http://schemas.microsoft.com/office/drawing/2014/main" xmlns="" id="{053E592F-91B2-1C4A-AC78-61C49DB35AA2}"/>
               </a:ext>
             </a:extLst>
           </p:cNvPr>
@@ -6123,8 +6131,8 @@
         </p:nvCxnSpPr>
         <p:spPr>
           <a:xfrm rot="16200000" flipH="1">
-            <a:off x="7851260" y="3826423"/>
-            <a:ext cx="298893" cy="771501"/>
+            <a:off x="7881975" y="4416775"/>
+            <a:ext cx="273032" cy="807070"/>
           </a:xfrm>
           <a:prstGeom prst="bentConnector3">
             <a:avLst>
@@ -6160,7 +6168,7 @@
           <p:cNvPr id="110" name="Rectangle 8">
             <a:extLst>
               <a:ext uri="{FF2B5EF4-FFF2-40B4-BE49-F238E27FC236}">
-                <a16:creationId xmlns:a16="http://schemas.microsoft.com/office/drawing/2014/main" id="{27E6A32F-AF1E-BA47-ABCC-14B6FA19AFAC}"/>
+                <a16:creationId xmlns:a16="http://schemas.microsoft.com/office/drawing/2014/main" xmlns="" id="{27E6A32F-AF1E-BA47-ABCC-14B6FA19AFAC}"/>
               </a:ext>
             </a:extLst>
           </p:cNvPr>
@@ -6169,7 +6177,7 @@
         </p:nvSpPr>
         <p:spPr>
           <a:xfrm>
-            <a:off x="7265908" y="4363951"/>
+            <a:off x="7260863" y="4956827"/>
             <a:ext cx="708186" cy="285783"/>
           </a:xfrm>
           <a:prstGeom prst="rect">
@@ -6222,7 +6230,7 @@
           <p:cNvPr id="111" name="Elbow Connector 110">
             <a:extLst>
               <a:ext uri="{FF2B5EF4-FFF2-40B4-BE49-F238E27FC236}">
-                <a16:creationId xmlns:a16="http://schemas.microsoft.com/office/drawing/2014/main" id="{42D108CE-FA23-0D49-95C6-B01522AA44C2}"/>
+                <a16:creationId xmlns:a16="http://schemas.microsoft.com/office/drawing/2014/main" xmlns="" id="{42D108CE-FA23-0D49-95C6-B01522AA44C2}"/>
               </a:ext>
             </a:extLst>
           </p:cNvPr>
@@ -6234,9 +6242,9 @@
           <p:nvPr/>
         </p:nvCxnSpPr>
         <p:spPr>
-          <a:xfrm rot="16200000" flipH="1">
-            <a:off x="7466867" y="4210816"/>
-            <a:ext cx="301223" cy="5045"/>
+          <a:xfrm rot="5400000">
+            <a:off x="7478440" y="4820310"/>
+            <a:ext cx="273033" cy="12700"/>
           </a:xfrm>
           <a:prstGeom prst="bentConnector3">
             <a:avLst>
@@ -6272,7 +6280,7 @@
           <p:cNvPr id="112" name="Rectangle 8">
             <a:extLst>
               <a:ext uri="{FF2B5EF4-FFF2-40B4-BE49-F238E27FC236}">
-                <a16:creationId xmlns:a16="http://schemas.microsoft.com/office/drawing/2014/main" id="{92E4AB15-C7FE-974E-AF5D-DFC9A72C0590}"/>
+                <a16:creationId xmlns:a16="http://schemas.microsoft.com/office/drawing/2014/main" xmlns="" id="{92E4AB15-C7FE-974E-AF5D-DFC9A72C0590}"/>
               </a:ext>
             </a:extLst>
           </p:cNvPr>
@@ -6281,7 +6289,7 @@
         </p:nvSpPr>
         <p:spPr>
           <a:xfrm>
-            <a:off x="6381974" y="4361622"/>
+            <a:off x="6388705" y="4970088"/>
             <a:ext cx="825664" cy="285783"/>
           </a:xfrm>
           <a:prstGeom prst="rect">
@@ -6334,7 +6342,7 @@
           <p:cNvPr id="113" name="Elbow Connector 112">
             <a:extLst>
               <a:ext uri="{FF2B5EF4-FFF2-40B4-BE49-F238E27FC236}">
-                <a16:creationId xmlns:a16="http://schemas.microsoft.com/office/drawing/2014/main" id="{001B057F-8022-F34D-948D-F8C8543722BD}"/>
+                <a16:creationId xmlns:a16="http://schemas.microsoft.com/office/drawing/2014/main" xmlns="" id="{001B057F-8022-F34D-948D-F8C8543722BD}"/>
               </a:ext>
             </a:extLst>
           </p:cNvPr>
@@ -6347,8 +6355,208 @@
         </p:nvCxnSpPr>
         <p:spPr>
           <a:xfrm rot="5400000">
-            <a:off x="7055434" y="3802100"/>
-            <a:ext cx="298894" cy="820150"/>
+            <a:off x="7065100" y="4420232"/>
+            <a:ext cx="286294" cy="813419"/>
+          </a:xfrm>
+          <a:prstGeom prst="bentConnector3">
+            <a:avLst>
+              <a:gd name="adj1" fmla="val 50000"/>
+            </a:avLst>
+          </a:prstGeom>
+          <a:ln w="19050">
+            <a:solidFill>
+              <a:srgbClr val="7030A0"/>
+            </a:solidFill>
+            <a:headEnd type="none" w="med" len="med"/>
+            <a:tailEnd type="arrow" w="med" len="med"/>
+          </a:ln>
+          <a:effectLst/>
+        </p:spPr>
+        <p:style>
+          <a:lnRef idx="1">
+            <a:schemeClr val="accent2"/>
+          </a:lnRef>
+          <a:fillRef idx="2">
+            <a:schemeClr val="accent2"/>
+          </a:fillRef>
+          <a:effectRef idx="1">
+            <a:schemeClr val="accent2"/>
+          </a:effectRef>
+          <a:fontRef idx="minor">
+            <a:schemeClr val="dk1"/>
+          </a:fontRef>
+        </p:style>
+      </p:cxnSp>
+      <p:sp>
+        <p:nvSpPr>
+          <p:cNvPr id="73" name="Rectangle 8"/>
+          <p:cNvSpPr/>
+          <p:nvPr/>
+        </p:nvSpPr>
+        <p:spPr>
+          <a:xfrm>
+            <a:off x="7260863" y="3531257"/>
+            <a:ext cx="708186" cy="285783"/>
+          </a:xfrm>
+          <a:prstGeom prst="rect">
+            <a:avLst/>
+          </a:prstGeom>
+          <a:ln w="19050">
+            <a:solidFill>
+              <a:srgbClr val="7030A0"/>
+            </a:solidFill>
+          </a:ln>
+          <a:effectLst/>
+        </p:spPr>
+        <p:style>
+          <a:lnRef idx="1">
+            <a:schemeClr val="accent4"/>
+          </a:lnRef>
+          <a:fillRef idx="2">
+            <a:schemeClr val="accent4"/>
+          </a:fillRef>
+          <a:effectRef idx="1">
+            <a:schemeClr val="accent4"/>
+          </a:effectRef>
+          <a:fontRef idx="minor">
+            <a:schemeClr val="dk1"/>
+          </a:fontRef>
+        </p:style>
+        <p:txBody>
+          <a:bodyPr rtlCol="0" anchor="ctr"/>
+          <a:lstStyle/>
+          <a:p>
+            <a:pPr algn="ctr"/>
+            <a:r>
+              <a:rPr lang="en-US" sz="1050" dirty="0" err="1" smtClean="0">
+                <a:solidFill>
+                  <a:srgbClr val="7030A0"/>
+                </a:solidFill>
+              </a:rPr>
+              <a:t>Weblink</a:t>
+            </a:r>
+            <a:endParaRPr lang="en-SG" sz="1050" dirty="0">
+              <a:solidFill>
+                <a:srgbClr val="7030A0"/>
+              </a:solidFill>
+            </a:endParaRPr>
+          </a:p>
+        </p:txBody>
+      </p:sp>
+      <p:sp>
+        <p:nvSpPr>
+          <p:cNvPr id="74" name="Rectangle 8"/>
+          <p:cNvSpPr/>
+          <p:nvPr/>
+        </p:nvSpPr>
+        <p:spPr>
+          <a:xfrm>
+            <a:off x="7254513" y="3851656"/>
+            <a:ext cx="708186" cy="285783"/>
+          </a:xfrm>
+          <a:prstGeom prst="rect">
+            <a:avLst/>
+          </a:prstGeom>
+          <a:ln w="19050">
+            <a:solidFill>
+              <a:srgbClr val="7030A0"/>
+            </a:solidFill>
+          </a:ln>
+          <a:effectLst/>
+        </p:spPr>
+        <p:style>
+          <a:lnRef idx="1">
+            <a:schemeClr val="accent4"/>
+          </a:lnRef>
+          <a:fillRef idx="2">
+            <a:schemeClr val="accent4"/>
+          </a:fillRef>
+          <a:effectRef idx="1">
+            <a:schemeClr val="accent4"/>
+          </a:effectRef>
+          <a:fontRef idx="minor">
+            <a:schemeClr val="dk1"/>
+          </a:fontRef>
+        </p:style>
+        <p:txBody>
+          <a:bodyPr rtlCol="0" anchor="ctr"/>
+          <a:lstStyle/>
+          <a:p>
+            <a:pPr algn="ctr"/>
+            <a:r>
+              <a:rPr lang="en-US" sz="1050" dirty="0" err="1" smtClean="0">
+                <a:solidFill>
+                  <a:srgbClr val="7030A0"/>
+                </a:solidFill>
+              </a:rPr>
+              <a:t>OpeningHours</a:t>
+            </a:r>
+            <a:endParaRPr lang="en-SG" sz="1050" dirty="0">
+              <a:solidFill>
+                <a:srgbClr val="7030A0"/>
+              </a:solidFill>
+            </a:endParaRPr>
+          </a:p>
+        </p:txBody>
+      </p:sp>
+      <p:cxnSp>
+        <p:nvCxnSpPr>
+          <p:cNvPr id="77" name="Elbow Connector 76"/>
+          <p:cNvCxnSpPr>
+            <a:cxnSpLocks/>
+            <a:stCxn id="78" idx="3"/>
+            <a:endCxn id="73" idx="1"/>
+          </p:cNvCxnSpPr>
+          <p:nvPr/>
+        </p:nvCxnSpPr>
+        <p:spPr>
+          <a:xfrm>
+            <a:off x="6836848" y="3025937"/>
+            <a:ext cx="424015" cy="648212"/>
+          </a:xfrm>
+          <a:prstGeom prst="bentConnector3">
+            <a:avLst>
+              <a:gd name="adj1" fmla="val 50000"/>
+            </a:avLst>
+          </a:prstGeom>
+          <a:ln w="19050">
+            <a:solidFill>
+              <a:srgbClr val="7030A0"/>
+            </a:solidFill>
+            <a:headEnd type="none" w="med" len="med"/>
+            <a:tailEnd type="arrow" w="med" len="med"/>
+          </a:ln>
+          <a:effectLst/>
+        </p:spPr>
+        <p:style>
+          <a:lnRef idx="1">
+            <a:schemeClr val="accent2"/>
+          </a:lnRef>
+          <a:fillRef idx="2">
+            <a:schemeClr val="accent2"/>
+          </a:fillRef>
+          <a:effectRef idx="1">
+            <a:schemeClr val="accent2"/>
+          </a:effectRef>
+          <a:fontRef idx="minor">
+            <a:schemeClr val="dk1"/>
+          </a:fontRef>
+        </p:style>
+      </p:cxnSp>
+      <p:cxnSp>
+        <p:nvCxnSpPr>
+          <p:cNvPr id="82" name="Elbow Connector 81"/>
+          <p:cNvCxnSpPr>
+            <a:cxnSpLocks/>
+            <a:stCxn id="78" idx="3"/>
+            <a:endCxn id="74" idx="1"/>
+          </p:cNvCxnSpPr>
+          <p:nvPr/>
+        </p:nvCxnSpPr>
+        <p:spPr>
+          <a:xfrm>
+            <a:off x="6836848" y="3025937"/>
+            <a:ext cx="417665" cy="968611"/>
           </a:xfrm>
           <a:prstGeom prst="bentConnector3">
             <a:avLst>

</xml_diff>

<commit_message>
updated model component image
</commit_message>
<xml_diff>
--- a/docs/diagrams/ModelComponentClassDiagram.pptx
+++ b/docs/diagrams/ModelComponentClassDiagram.pptx
@@ -2921,9 +2921,14 @@
 <p:sldMaster xmlns:a="http://schemas.openxmlformats.org/drawingml/2006/main" xmlns:r="http://schemas.openxmlformats.org/officeDocument/2006/relationships" xmlns:p="http://schemas.openxmlformats.org/presentationml/2006/main">
   <p:cSld>
     <p:bg>
-      <p:bgRef idx="1001">
-        <a:schemeClr val="bg1"/>
-      </p:bgRef>
+      <p:bgPr>
+        <a:solidFill>
+          <a:schemeClr val="bg1">
+            <a:alpha val="0"/>
+          </a:schemeClr>
+        </a:solidFill>
+        <a:effectLst/>
+      </p:bgPr>
     </p:bg>
     <p:spTree>
       <p:nvGrpSpPr>
@@ -5313,7 +5318,7 @@
           <p:cNvPr id="52" name="Rectangle 8">
             <a:extLst>
               <a:ext uri="{FF2B5EF4-FFF2-40B4-BE49-F238E27FC236}">
-                <a16:creationId xmlns:a16="http://schemas.microsoft.com/office/drawing/2014/main" xmlns="" id="{ABDCDBD2-131A-4B66-A2F2-43BBEE82C773}"/>
+                <a16:creationId xmlns="" xmlns:a16="http://schemas.microsoft.com/office/drawing/2014/main" id="{ABDCDBD2-131A-4B66-A2F2-43BBEE82C773}"/>
               </a:ext>
             </a:extLst>
           </p:cNvPr>
@@ -5375,7 +5380,7 @@
           <p:cNvPr id="53" name="Elbow Connector 78">
             <a:extLst>
               <a:ext uri="{FF2B5EF4-FFF2-40B4-BE49-F238E27FC236}">
-                <a16:creationId xmlns:a16="http://schemas.microsoft.com/office/drawing/2014/main" xmlns="" id="{B97967F8-618A-448B-81FD-CDFD4AF0EC64}"/>
+                <a16:creationId xmlns="" xmlns:a16="http://schemas.microsoft.com/office/drawing/2014/main" id="{B97967F8-618A-448B-81FD-CDFD4AF0EC64}"/>
               </a:ext>
             </a:extLst>
           </p:cNvPr>
@@ -5425,7 +5430,7 @@
           <p:cNvPr id="50" name="TextBox 49">
             <a:extLst>
               <a:ext uri="{FF2B5EF4-FFF2-40B4-BE49-F238E27FC236}">
-                <a16:creationId xmlns:a16="http://schemas.microsoft.com/office/drawing/2014/main" xmlns="" id="{B3FA9D57-880F-49C4-AD0B-A64E30D6F403}"/>
+                <a16:creationId xmlns="" xmlns:a16="http://schemas.microsoft.com/office/drawing/2014/main" id="{B3FA9D57-880F-49C4-AD0B-A64E30D6F403}"/>
               </a:ext>
             </a:extLst>
           </p:cNvPr>
@@ -5664,7 +5669,7 @@
           <p:cNvPr id="57" name="Rectangle 8">
             <a:extLst>
               <a:ext uri="{FF2B5EF4-FFF2-40B4-BE49-F238E27FC236}">
-                <a16:creationId xmlns:a16="http://schemas.microsoft.com/office/drawing/2014/main" xmlns="" id="{6A42DA50-9012-4391-9EF3-285E4FA3FCD8}"/>
+                <a16:creationId xmlns="" xmlns:a16="http://schemas.microsoft.com/office/drawing/2014/main" id="{6A42DA50-9012-4391-9EF3-285E4FA3FCD8}"/>
               </a:ext>
             </a:extLst>
           </p:cNvPr>
@@ -5737,7 +5742,7 @@
           <p:cNvPr id="59" name="Isosceles Triangle 102">
             <a:extLst>
               <a:ext uri="{FF2B5EF4-FFF2-40B4-BE49-F238E27FC236}">
-                <a16:creationId xmlns:a16="http://schemas.microsoft.com/office/drawing/2014/main" xmlns="" id="{B263B2D7-6E76-465E-B40E-7E2A46254A84}"/>
+                <a16:creationId xmlns="" xmlns:a16="http://schemas.microsoft.com/office/drawing/2014/main" id="{B263B2D7-6E76-465E-B40E-7E2A46254A84}"/>
               </a:ext>
             </a:extLst>
           </p:cNvPr>
@@ -5795,7 +5800,7 @@
           <p:cNvPr id="67" name="Elbow Connector 63">
             <a:extLst>
               <a:ext uri="{FF2B5EF4-FFF2-40B4-BE49-F238E27FC236}">
-                <a16:creationId xmlns:a16="http://schemas.microsoft.com/office/drawing/2014/main" xmlns="" id="{BA3A25CD-7C1D-4B3B-B294-1B05ABCFECFD}"/>
+                <a16:creationId xmlns="" xmlns:a16="http://schemas.microsoft.com/office/drawing/2014/main" id="{BA3A25CD-7C1D-4B3B-B294-1B05ABCFECFD}"/>
               </a:ext>
             </a:extLst>
           </p:cNvPr>
@@ -5846,7 +5851,7 @@
           <p:cNvPr id="72" name="Rectangle 8">
             <a:extLst>
               <a:ext uri="{FF2B5EF4-FFF2-40B4-BE49-F238E27FC236}">
-                <a16:creationId xmlns:a16="http://schemas.microsoft.com/office/drawing/2014/main" xmlns="" id="{CBA319B1-DCBE-1E40-BEAB-513323C29798}"/>
+                <a16:creationId xmlns="" xmlns:a16="http://schemas.microsoft.com/office/drawing/2014/main" id="{CBA319B1-DCBE-1E40-BEAB-513323C29798}"/>
               </a:ext>
             </a:extLst>
           </p:cNvPr>
@@ -5908,7 +5913,7 @@
           <p:cNvPr id="87" name="Elbow Connector 86">
             <a:extLst>
               <a:ext uri="{FF2B5EF4-FFF2-40B4-BE49-F238E27FC236}">
-                <a16:creationId xmlns:a16="http://schemas.microsoft.com/office/drawing/2014/main" xmlns="" id="{DCB3B358-F21C-6542-B737-DFE2F9B3FED6}"/>
+                <a16:creationId xmlns="" xmlns:a16="http://schemas.microsoft.com/office/drawing/2014/main" id="{DCB3B358-F21C-6542-B737-DFE2F9B3FED6}"/>
               </a:ext>
             </a:extLst>
           </p:cNvPr>
@@ -5958,7 +5963,7 @@
           <p:cNvPr id="105" name="TextBox 104">
             <a:extLst>
               <a:ext uri="{FF2B5EF4-FFF2-40B4-BE49-F238E27FC236}">
-                <a16:creationId xmlns:a16="http://schemas.microsoft.com/office/drawing/2014/main" xmlns="" id="{B11F9329-C652-DC42-A28F-B8F2C6189045}"/>
+                <a16:creationId xmlns="" xmlns:a16="http://schemas.microsoft.com/office/drawing/2014/main" id="{B11F9329-C652-DC42-A28F-B8F2C6189045}"/>
               </a:ext>
             </a:extLst>
           </p:cNvPr>
@@ -6003,7 +6008,7 @@
           <p:cNvPr id="106" name="Flowchart: Decision 96">
             <a:extLst>
               <a:ext uri="{FF2B5EF4-FFF2-40B4-BE49-F238E27FC236}">
-                <a16:creationId xmlns:a16="http://schemas.microsoft.com/office/drawing/2014/main" xmlns="" id="{6A47F553-9EB2-A745-8BD1-8CD1006461DE}"/>
+                <a16:creationId xmlns="" xmlns:a16="http://schemas.microsoft.com/office/drawing/2014/main" id="{6A47F553-9EB2-A745-8BD1-8CD1006461DE}"/>
               </a:ext>
             </a:extLst>
           </p:cNvPr>
@@ -6056,7 +6061,7 @@
           <p:cNvPr id="108" name="Rectangle 8">
             <a:extLst>
               <a:ext uri="{FF2B5EF4-FFF2-40B4-BE49-F238E27FC236}">
-                <a16:creationId xmlns:a16="http://schemas.microsoft.com/office/drawing/2014/main" xmlns="" id="{9A5AA0EE-9C67-7044-B8B0-9431DED41B4B}"/>
+                <a16:creationId xmlns="" xmlns:a16="http://schemas.microsoft.com/office/drawing/2014/main" id="{9A5AA0EE-9C67-7044-B8B0-9431DED41B4B}"/>
               </a:ext>
             </a:extLst>
           </p:cNvPr>
@@ -6118,7 +6123,7 @@
           <p:cNvPr id="109" name="Elbow Connector 108">
             <a:extLst>
               <a:ext uri="{FF2B5EF4-FFF2-40B4-BE49-F238E27FC236}">
-                <a16:creationId xmlns:a16="http://schemas.microsoft.com/office/drawing/2014/main" xmlns="" id="{053E592F-91B2-1C4A-AC78-61C49DB35AA2}"/>
+                <a16:creationId xmlns="" xmlns:a16="http://schemas.microsoft.com/office/drawing/2014/main" id="{053E592F-91B2-1C4A-AC78-61C49DB35AA2}"/>
               </a:ext>
             </a:extLst>
           </p:cNvPr>
@@ -6168,7 +6173,7 @@
           <p:cNvPr id="110" name="Rectangle 8">
             <a:extLst>
               <a:ext uri="{FF2B5EF4-FFF2-40B4-BE49-F238E27FC236}">
-                <a16:creationId xmlns:a16="http://schemas.microsoft.com/office/drawing/2014/main" xmlns="" id="{27E6A32F-AF1E-BA47-ABCC-14B6FA19AFAC}"/>
+                <a16:creationId xmlns="" xmlns:a16="http://schemas.microsoft.com/office/drawing/2014/main" id="{27E6A32F-AF1E-BA47-ABCC-14B6FA19AFAC}"/>
               </a:ext>
             </a:extLst>
           </p:cNvPr>
@@ -6230,7 +6235,7 @@
           <p:cNvPr id="111" name="Elbow Connector 110">
             <a:extLst>
               <a:ext uri="{FF2B5EF4-FFF2-40B4-BE49-F238E27FC236}">
-                <a16:creationId xmlns:a16="http://schemas.microsoft.com/office/drawing/2014/main" xmlns="" id="{42D108CE-FA23-0D49-95C6-B01522AA44C2}"/>
+                <a16:creationId xmlns="" xmlns:a16="http://schemas.microsoft.com/office/drawing/2014/main" id="{42D108CE-FA23-0D49-95C6-B01522AA44C2}"/>
               </a:ext>
             </a:extLst>
           </p:cNvPr>
@@ -6280,7 +6285,7 @@
           <p:cNvPr id="112" name="Rectangle 8">
             <a:extLst>
               <a:ext uri="{FF2B5EF4-FFF2-40B4-BE49-F238E27FC236}">
-                <a16:creationId xmlns:a16="http://schemas.microsoft.com/office/drawing/2014/main" xmlns="" id="{92E4AB15-C7FE-974E-AF5D-DFC9A72C0590}"/>
+                <a16:creationId xmlns="" xmlns:a16="http://schemas.microsoft.com/office/drawing/2014/main" id="{92E4AB15-C7FE-974E-AF5D-DFC9A72C0590}"/>
               </a:ext>
             </a:extLst>
           </p:cNvPr>
@@ -6342,7 +6347,7 @@
           <p:cNvPr id="113" name="Elbow Connector 112">
             <a:extLst>
               <a:ext uri="{FF2B5EF4-FFF2-40B4-BE49-F238E27FC236}">
-                <a16:creationId xmlns:a16="http://schemas.microsoft.com/office/drawing/2014/main" xmlns="" id="{001B057F-8022-F34D-948D-F8C8543722BD}"/>
+                <a16:creationId xmlns="" xmlns:a16="http://schemas.microsoft.com/office/drawing/2014/main" id="{001B057F-8022-F34D-948D-F8C8543722BD}"/>
               </a:ext>
             </a:extLst>
           </p:cNvPr>
@@ -6597,6 +6602,13 @@
   <p:clrMapOvr>
     <a:masterClrMapping/>
   </p:clrMapOvr>
+  <p:timing>
+    <p:tnLst>
+      <p:par>
+        <p:cTn id="1" dur="indefinite" restart="never" nodeType="tmRoot"/>
+      </p:par>
+    </p:tnLst>
+  </p:timing>
 </p:sld>
 </file>
 

</xml_diff>

<commit_message>
Update UiClassDiagram and ModelClassDiagram for V1.3, update developer guide and user guide, add PPP
</commit_message>
<xml_diff>
--- a/docs/diagrams/ModelComponentClassDiagram.pptx
+++ b/docs/diagrams/ModelComponentClassDiagram.pptx
@@ -208,7 +208,7 @@
           <a:p>
             <a:fld id="{F5CC4B3F-88C1-4FFA-B1B6-F41C21DC6924}" type="datetimeFigureOut">
               <a:rPr lang="en-US" smtClean="0"/>
-              <a:t>19-Mar-19</a:t>
+              <a:t>4/2/19</a:t>
             </a:fld>
             <a:endParaRPr lang="en-US"/>
           </a:p>
@@ -654,7 +654,7 @@
           <a:p>
             <a:fld id="{78C97017-6FC3-485B-9764-EAC9E56C1D49}" type="datetimeFigureOut">
               <a:rPr lang="en-US" smtClean="0"/>
-              <a:t>19-Mar-19</a:t>
+              <a:t>4/2/19</a:t>
             </a:fld>
             <a:endParaRPr lang="en-US"/>
           </a:p>
@@ -822,7 +822,7 @@
           <a:p>
             <a:fld id="{78C97017-6FC3-485B-9764-EAC9E56C1D49}" type="datetimeFigureOut">
               <a:rPr lang="en-US" smtClean="0"/>
-              <a:t>19-Mar-19</a:t>
+              <a:t>4/2/19</a:t>
             </a:fld>
             <a:endParaRPr lang="en-US"/>
           </a:p>
@@ -1000,7 +1000,7 @@
           <a:p>
             <a:fld id="{78C97017-6FC3-485B-9764-EAC9E56C1D49}" type="datetimeFigureOut">
               <a:rPr lang="en-US" smtClean="0"/>
-              <a:t>19-Mar-19</a:t>
+              <a:t>4/2/19</a:t>
             </a:fld>
             <a:endParaRPr lang="en-US"/>
           </a:p>
@@ -1168,7 +1168,7 @@
           <a:p>
             <a:fld id="{78C97017-6FC3-485B-9764-EAC9E56C1D49}" type="datetimeFigureOut">
               <a:rPr lang="en-US" smtClean="0"/>
-              <a:t>19-Mar-19</a:t>
+              <a:t>4/2/19</a:t>
             </a:fld>
             <a:endParaRPr lang="en-US"/>
           </a:p>
@@ -1413,7 +1413,7 @@
           <a:p>
             <a:fld id="{78C97017-6FC3-485B-9764-EAC9E56C1D49}" type="datetimeFigureOut">
               <a:rPr lang="en-US" smtClean="0"/>
-              <a:t>19-Mar-19</a:t>
+              <a:t>4/2/19</a:t>
             </a:fld>
             <a:endParaRPr lang="en-US"/>
           </a:p>
@@ -1698,7 +1698,7 @@
           <a:p>
             <a:fld id="{78C97017-6FC3-485B-9764-EAC9E56C1D49}" type="datetimeFigureOut">
               <a:rPr lang="en-US" smtClean="0"/>
-              <a:t>19-Mar-19</a:t>
+              <a:t>4/2/19</a:t>
             </a:fld>
             <a:endParaRPr lang="en-US"/>
           </a:p>
@@ -2117,7 +2117,7 @@
           <a:p>
             <a:fld id="{78C97017-6FC3-485B-9764-EAC9E56C1D49}" type="datetimeFigureOut">
               <a:rPr lang="en-US" smtClean="0"/>
-              <a:t>19-Mar-19</a:t>
+              <a:t>4/2/19</a:t>
             </a:fld>
             <a:endParaRPr lang="en-US"/>
           </a:p>
@@ -2234,7 +2234,7 @@
           <a:p>
             <a:fld id="{78C97017-6FC3-485B-9764-EAC9E56C1D49}" type="datetimeFigureOut">
               <a:rPr lang="en-US" smtClean="0"/>
-              <a:t>19-Mar-19</a:t>
+              <a:t>4/2/19</a:t>
             </a:fld>
             <a:endParaRPr lang="en-US"/>
           </a:p>
@@ -2329,7 +2329,7 @@
           <a:p>
             <a:fld id="{78C97017-6FC3-485B-9764-EAC9E56C1D49}" type="datetimeFigureOut">
               <a:rPr lang="en-US" smtClean="0"/>
-              <a:t>19-Mar-19</a:t>
+              <a:t>4/2/19</a:t>
             </a:fld>
             <a:endParaRPr lang="en-US"/>
           </a:p>
@@ -2604,7 +2604,7 @@
           <a:p>
             <a:fld id="{78C97017-6FC3-485B-9764-EAC9E56C1D49}" type="datetimeFigureOut">
               <a:rPr lang="en-US" smtClean="0"/>
-              <a:t>19-Mar-19</a:t>
+              <a:t>4/2/19</a:t>
             </a:fld>
             <a:endParaRPr lang="en-US"/>
           </a:p>
@@ -2856,7 +2856,7 @@
           <a:p>
             <a:fld id="{78C97017-6FC3-485B-9764-EAC9E56C1D49}" type="datetimeFigureOut">
               <a:rPr lang="en-US" smtClean="0"/>
-              <a:t>19-Mar-19</a:t>
+              <a:t>4/2/19</a:t>
             </a:fld>
             <a:endParaRPr lang="en-US"/>
           </a:p>
@@ -3072,7 +3072,7 @@
           <a:p>
             <a:fld id="{78C97017-6FC3-485B-9764-EAC9E56C1D49}" type="datetimeFigureOut">
               <a:rPr lang="en-US" smtClean="0"/>
-              <a:t>19-Mar-19</a:t>
+              <a:t>4/2/19</a:t>
             </a:fld>
             <a:endParaRPr lang="en-US"/>
           </a:p>
@@ -3455,8 +3455,8 @@
         </p:nvSpPr>
         <p:spPr>
           <a:xfrm>
-            <a:off x="438374" y="1600200"/>
-            <a:ext cx="8456045" cy="3733800"/>
+            <a:off x="438374" y="1385900"/>
+            <a:ext cx="8456045" cy="4066180"/>
           </a:xfrm>
           <a:prstGeom prst="roundRect">
             <a:avLst>
@@ -4354,8 +4354,8 @@
         </p:nvSpPr>
         <p:spPr>
           <a:xfrm>
-            <a:off x="7260863" y="2236888"/>
-            <a:ext cx="708186" cy="285783"/>
+            <a:off x="7260863" y="1909449"/>
+            <a:ext cx="780320" cy="285783"/>
           </a:xfrm>
           <a:prstGeom prst="rect">
             <a:avLst/>
@@ -4461,8 +4461,8 @@
         </p:nvCxnSpPr>
         <p:spPr>
           <a:xfrm flipV="1">
-            <a:off x="6836848" y="2379780"/>
-            <a:ext cx="424015" cy="646157"/>
+            <a:off x="6836848" y="2052341"/>
+            <a:ext cx="424015" cy="973596"/>
           </a:xfrm>
           <a:prstGeom prst="bentConnector3">
             <a:avLst>
@@ -4501,8 +4501,8 @@
         </p:nvSpPr>
         <p:spPr>
           <a:xfrm>
-            <a:off x="7260863" y="2559866"/>
-            <a:ext cx="708186" cy="285783"/>
+            <a:off x="7260863" y="2232427"/>
+            <a:ext cx="780320" cy="285783"/>
           </a:xfrm>
           <a:prstGeom prst="rect">
             <a:avLst/>
@@ -4561,8 +4561,8 @@
         </p:nvCxnSpPr>
         <p:spPr>
           <a:xfrm flipV="1">
-            <a:off x="6836848" y="2702758"/>
-            <a:ext cx="424015" cy="323179"/>
+            <a:off x="6836848" y="2375319"/>
+            <a:ext cx="424015" cy="650618"/>
           </a:xfrm>
           <a:prstGeom prst="bentConnector3">
             <a:avLst>
@@ -4601,8 +4601,8 @@
         </p:nvSpPr>
         <p:spPr>
           <a:xfrm>
-            <a:off x="7260863" y="2882844"/>
-            <a:ext cx="708186" cy="285783"/>
+            <a:off x="7260863" y="2555405"/>
+            <a:ext cx="780320" cy="285783"/>
           </a:xfrm>
           <a:prstGeom prst="rect">
             <a:avLst/>
@@ -4661,8 +4661,8 @@
         </p:nvCxnSpPr>
         <p:spPr>
           <a:xfrm flipV="1">
-            <a:off x="6836848" y="3025736"/>
-            <a:ext cx="424015" cy="201"/>
+            <a:off x="6836848" y="2698297"/>
+            <a:ext cx="424015" cy="327640"/>
           </a:xfrm>
           <a:prstGeom prst="bentConnector3">
             <a:avLst/>
@@ -4699,8 +4699,8 @@
         </p:nvSpPr>
         <p:spPr>
           <a:xfrm>
-            <a:off x="7260863" y="3205821"/>
-            <a:ext cx="708186" cy="285783"/>
+            <a:off x="7260863" y="2878382"/>
+            <a:ext cx="780320" cy="285783"/>
           </a:xfrm>
           <a:prstGeom prst="rect">
             <a:avLst/>
@@ -4758,9 +4758,9 @@
           <p:nvPr/>
         </p:nvCxnSpPr>
         <p:spPr>
-          <a:xfrm>
-            <a:off x="6836848" y="3025937"/>
-            <a:ext cx="424015" cy="322776"/>
+          <a:xfrm flipV="1">
+            <a:off x="6836848" y="3021274"/>
+            <a:ext cx="424015" cy="4663"/>
           </a:xfrm>
           <a:prstGeom prst="bentConnector3">
             <a:avLst/>
@@ -5045,14 +5045,6 @@
               </a:rPr>
               <a:t>&lt;&lt;interface&gt;&gt;</a:t>
             </a:r>
-            <a:r>
-              <a:rPr lang="en-US" sz="1050">
-                <a:solidFill>
-                  <a:srgbClr val="7030A0"/>
-                </a:solidFill>
-              </a:rPr>
-              <a:t/>
-            </a:r>
             <a:br>
               <a:rPr lang="en-US" sz="1050">
                 <a:solidFill>
@@ -5243,7 +5235,7 @@
         </p:nvSpPr>
         <p:spPr>
           <a:xfrm>
-            <a:off x="1948700" y="3667737"/>
+            <a:off x="1905000" y="3707517"/>
             <a:ext cx="189257" cy="178683"/>
           </a:xfrm>
           <a:prstGeom prst="rect">
@@ -5318,7 +5310,7 @@
           <p:cNvPr id="52" name="Rectangle 8">
             <a:extLst>
               <a:ext uri="{FF2B5EF4-FFF2-40B4-BE49-F238E27FC236}">
-                <a16:creationId xmlns="" xmlns:a16="http://schemas.microsoft.com/office/drawing/2014/main" id="{ABDCDBD2-131A-4B66-A2F2-43BBEE82C773}"/>
+                <a16:creationId xmlns:a16="http://schemas.microsoft.com/office/drawing/2014/main" id="{ABDCDBD2-131A-4B66-A2F2-43BBEE82C773}"/>
               </a:ext>
             </a:extLst>
           </p:cNvPr>
@@ -5327,8 +5319,8 @@
         </p:nvSpPr>
         <p:spPr>
           <a:xfrm>
-            <a:off x="7260863" y="1913136"/>
-            <a:ext cx="708186" cy="285783"/>
+            <a:off x="7260863" y="1585697"/>
+            <a:ext cx="780320" cy="285783"/>
           </a:xfrm>
           <a:prstGeom prst="rect">
             <a:avLst/>
@@ -5380,7 +5372,7 @@
           <p:cNvPr id="53" name="Elbow Connector 78">
             <a:extLst>
               <a:ext uri="{FF2B5EF4-FFF2-40B4-BE49-F238E27FC236}">
-                <a16:creationId xmlns="" xmlns:a16="http://schemas.microsoft.com/office/drawing/2014/main" id="{B97967F8-618A-448B-81FD-CDFD4AF0EC64}"/>
+                <a16:creationId xmlns:a16="http://schemas.microsoft.com/office/drawing/2014/main" id="{B97967F8-618A-448B-81FD-CDFD4AF0EC64}"/>
               </a:ext>
             </a:extLst>
           </p:cNvPr>
@@ -5393,8 +5385,8 @@
         </p:nvCxnSpPr>
         <p:spPr>
           <a:xfrm flipV="1">
-            <a:off x="6836848" y="2056028"/>
-            <a:ext cx="424015" cy="969909"/>
+            <a:off x="6836848" y="1728589"/>
+            <a:ext cx="424015" cy="1297348"/>
           </a:xfrm>
           <a:prstGeom prst="bentConnector3">
             <a:avLst>
@@ -5430,7 +5422,7 @@
           <p:cNvPr id="50" name="TextBox 49">
             <a:extLst>
               <a:ext uri="{FF2B5EF4-FFF2-40B4-BE49-F238E27FC236}">
-                <a16:creationId xmlns="" xmlns:a16="http://schemas.microsoft.com/office/drawing/2014/main" id="{B3FA9D57-880F-49C4-AD0B-A64E30D6F403}"/>
+                <a16:creationId xmlns:a16="http://schemas.microsoft.com/office/drawing/2014/main" id="{B3FA9D57-880F-49C4-AD0B-A64E30D6F403}"/>
               </a:ext>
             </a:extLst>
           </p:cNvPr>
@@ -5439,7 +5431,7 @@
         </p:nvSpPr>
         <p:spPr>
           <a:xfrm>
-            <a:off x="7014708" y="1899577"/>
+            <a:off x="7014708" y="1572138"/>
             <a:ext cx="189257" cy="178683"/>
           </a:xfrm>
           <a:prstGeom prst="rect">
@@ -5669,7 +5661,7 @@
           <p:cNvPr id="57" name="Rectangle 8">
             <a:extLst>
               <a:ext uri="{FF2B5EF4-FFF2-40B4-BE49-F238E27FC236}">
-                <a16:creationId xmlns="" xmlns:a16="http://schemas.microsoft.com/office/drawing/2014/main" id="{6A42DA50-9012-4391-9EF3-285E4FA3FCD8}"/>
+                <a16:creationId xmlns:a16="http://schemas.microsoft.com/office/drawing/2014/main" id="{6A42DA50-9012-4391-9EF3-285E4FA3FCD8}"/>
               </a:ext>
             </a:extLst>
           </p:cNvPr>
@@ -5742,7 +5734,7 @@
           <p:cNvPr id="59" name="Isosceles Triangle 102">
             <a:extLst>
               <a:ext uri="{FF2B5EF4-FFF2-40B4-BE49-F238E27FC236}">
-                <a16:creationId xmlns="" xmlns:a16="http://schemas.microsoft.com/office/drawing/2014/main" id="{B263B2D7-6E76-465E-B40E-7E2A46254A84}"/>
+                <a16:creationId xmlns:a16="http://schemas.microsoft.com/office/drawing/2014/main" id="{B263B2D7-6E76-465E-B40E-7E2A46254A84}"/>
               </a:ext>
             </a:extLst>
           </p:cNvPr>
@@ -5800,7 +5792,7 @@
           <p:cNvPr id="67" name="Elbow Connector 63">
             <a:extLst>
               <a:ext uri="{FF2B5EF4-FFF2-40B4-BE49-F238E27FC236}">
-                <a16:creationId xmlns="" xmlns:a16="http://schemas.microsoft.com/office/drawing/2014/main" id="{BA3A25CD-7C1D-4B3B-B294-1B05ABCFECFD}"/>
+                <a16:creationId xmlns:a16="http://schemas.microsoft.com/office/drawing/2014/main" id="{BA3A25CD-7C1D-4B3B-B294-1B05ABCFECFD}"/>
               </a:ext>
             </a:extLst>
           </p:cNvPr>
@@ -5851,7 +5843,7 @@
           <p:cNvPr id="72" name="Rectangle 8">
             <a:extLst>
               <a:ext uri="{FF2B5EF4-FFF2-40B4-BE49-F238E27FC236}">
-                <a16:creationId xmlns="" xmlns:a16="http://schemas.microsoft.com/office/drawing/2014/main" id="{CBA319B1-DCBE-1E40-BEAB-513323C29798}"/>
+                <a16:creationId xmlns:a16="http://schemas.microsoft.com/office/drawing/2014/main" id="{CBA319B1-DCBE-1E40-BEAB-513323C29798}"/>
               </a:ext>
             </a:extLst>
           </p:cNvPr>
@@ -5861,7 +5853,7 @@
         <p:spPr>
           <a:xfrm>
             <a:off x="7249923" y="4170319"/>
-            <a:ext cx="708186" cy="285783"/>
+            <a:ext cx="780320" cy="285783"/>
           </a:xfrm>
           <a:prstGeom prst="rect">
             <a:avLst/>
@@ -5913,7 +5905,7 @@
           <p:cNvPr id="87" name="Elbow Connector 86">
             <a:extLst>
               <a:ext uri="{FF2B5EF4-FFF2-40B4-BE49-F238E27FC236}">
-                <a16:creationId xmlns="" xmlns:a16="http://schemas.microsoft.com/office/drawing/2014/main" id="{DCB3B358-F21C-6542-B737-DFE2F9B3FED6}"/>
+                <a16:creationId xmlns:a16="http://schemas.microsoft.com/office/drawing/2014/main" id="{DCB3B358-F21C-6542-B737-DFE2F9B3FED6}"/>
               </a:ext>
             </a:extLst>
           </p:cNvPr>
@@ -5963,7 +5955,7 @@
           <p:cNvPr id="105" name="TextBox 104">
             <a:extLst>
               <a:ext uri="{FF2B5EF4-FFF2-40B4-BE49-F238E27FC236}">
-                <a16:creationId xmlns="" xmlns:a16="http://schemas.microsoft.com/office/drawing/2014/main" id="{B11F9329-C652-DC42-A28F-B8F2C6189045}"/>
+                <a16:creationId xmlns:a16="http://schemas.microsoft.com/office/drawing/2014/main" id="{B11F9329-C652-DC42-A28F-B8F2C6189045}"/>
               </a:ext>
             </a:extLst>
           </p:cNvPr>
@@ -6008,7 +6000,7 @@
           <p:cNvPr id="106" name="Flowchart: Decision 96">
             <a:extLst>
               <a:ext uri="{FF2B5EF4-FFF2-40B4-BE49-F238E27FC236}">
-                <a16:creationId xmlns="" xmlns:a16="http://schemas.microsoft.com/office/drawing/2014/main" id="{6A47F553-9EB2-A745-8BD1-8CD1006461DE}"/>
+                <a16:creationId xmlns:a16="http://schemas.microsoft.com/office/drawing/2014/main" id="{6A47F553-9EB2-A745-8BD1-8CD1006461DE}"/>
               </a:ext>
             </a:extLst>
           </p:cNvPr>
@@ -6061,7 +6053,7 @@
           <p:cNvPr id="108" name="Rectangle 8">
             <a:extLst>
               <a:ext uri="{FF2B5EF4-FFF2-40B4-BE49-F238E27FC236}">
-                <a16:creationId xmlns="" xmlns:a16="http://schemas.microsoft.com/office/drawing/2014/main" id="{9A5AA0EE-9C67-7044-B8B0-9431DED41B4B}"/>
+                <a16:creationId xmlns:a16="http://schemas.microsoft.com/office/drawing/2014/main" id="{9A5AA0EE-9C67-7044-B8B0-9431DED41B4B}"/>
               </a:ext>
             </a:extLst>
           </p:cNvPr>
@@ -6123,7 +6115,7 @@
           <p:cNvPr id="109" name="Elbow Connector 108">
             <a:extLst>
               <a:ext uri="{FF2B5EF4-FFF2-40B4-BE49-F238E27FC236}">
-                <a16:creationId xmlns="" xmlns:a16="http://schemas.microsoft.com/office/drawing/2014/main" id="{053E592F-91B2-1C4A-AC78-61C49DB35AA2}"/>
+                <a16:creationId xmlns:a16="http://schemas.microsoft.com/office/drawing/2014/main" id="{053E592F-91B2-1C4A-AC78-61C49DB35AA2}"/>
               </a:ext>
             </a:extLst>
           </p:cNvPr>
@@ -6173,7 +6165,7 @@
           <p:cNvPr id="110" name="Rectangle 8">
             <a:extLst>
               <a:ext uri="{FF2B5EF4-FFF2-40B4-BE49-F238E27FC236}">
-                <a16:creationId xmlns="" xmlns:a16="http://schemas.microsoft.com/office/drawing/2014/main" id="{27E6A32F-AF1E-BA47-ABCC-14B6FA19AFAC}"/>
+                <a16:creationId xmlns:a16="http://schemas.microsoft.com/office/drawing/2014/main" id="{27E6A32F-AF1E-BA47-ABCC-14B6FA19AFAC}"/>
               </a:ext>
             </a:extLst>
           </p:cNvPr>
@@ -6235,7 +6227,7 @@
           <p:cNvPr id="111" name="Elbow Connector 110">
             <a:extLst>
               <a:ext uri="{FF2B5EF4-FFF2-40B4-BE49-F238E27FC236}">
-                <a16:creationId xmlns="" xmlns:a16="http://schemas.microsoft.com/office/drawing/2014/main" id="{42D108CE-FA23-0D49-95C6-B01522AA44C2}"/>
+                <a16:creationId xmlns:a16="http://schemas.microsoft.com/office/drawing/2014/main" id="{42D108CE-FA23-0D49-95C6-B01522AA44C2}"/>
               </a:ext>
             </a:extLst>
           </p:cNvPr>
@@ -6285,7 +6277,7 @@
           <p:cNvPr id="112" name="Rectangle 8">
             <a:extLst>
               <a:ext uri="{FF2B5EF4-FFF2-40B4-BE49-F238E27FC236}">
-                <a16:creationId xmlns="" xmlns:a16="http://schemas.microsoft.com/office/drawing/2014/main" id="{92E4AB15-C7FE-974E-AF5D-DFC9A72C0590}"/>
+                <a16:creationId xmlns:a16="http://schemas.microsoft.com/office/drawing/2014/main" id="{92E4AB15-C7FE-974E-AF5D-DFC9A72C0590}"/>
               </a:ext>
             </a:extLst>
           </p:cNvPr>
@@ -6294,7 +6286,7 @@
         </p:nvSpPr>
         <p:spPr>
           <a:xfrm>
-            <a:off x="6388705" y="4970088"/>
+            <a:off x="6388705" y="4953000"/>
             <a:ext cx="825664" cy="285783"/>
           </a:xfrm>
           <a:prstGeom prst="rect">
@@ -6347,7 +6339,7 @@
           <p:cNvPr id="113" name="Elbow Connector 112">
             <a:extLst>
               <a:ext uri="{FF2B5EF4-FFF2-40B4-BE49-F238E27FC236}">
-                <a16:creationId xmlns="" xmlns:a16="http://schemas.microsoft.com/office/drawing/2014/main" id="{001B057F-8022-F34D-948D-F8C8543722BD}"/>
+                <a16:creationId xmlns:a16="http://schemas.microsoft.com/office/drawing/2014/main" id="{001B057F-8022-F34D-948D-F8C8543722BD}"/>
               </a:ext>
             </a:extLst>
           </p:cNvPr>
@@ -6360,8 +6352,8 @@
         </p:nvCxnSpPr>
         <p:spPr>
           <a:xfrm rot="5400000">
-            <a:off x="7065100" y="4420232"/>
-            <a:ext cx="286294" cy="813419"/>
+            <a:off x="7073644" y="4411688"/>
+            <a:ext cx="269206" cy="813419"/>
           </a:xfrm>
           <a:prstGeom prst="bentConnector3">
             <a:avLst>
@@ -6400,8 +6392,8 @@
         </p:nvSpPr>
         <p:spPr>
           <a:xfrm>
-            <a:off x="7260863" y="3531257"/>
-            <a:ext cx="708186" cy="285783"/>
+            <a:off x="7260863" y="3203818"/>
+            <a:ext cx="780320" cy="285783"/>
           </a:xfrm>
           <a:prstGeom prst="rect">
             <a:avLst/>
@@ -6433,7 +6425,7 @@
           <a:p>
             <a:pPr algn="ctr"/>
             <a:r>
-              <a:rPr lang="en-US" sz="1050" dirty="0" err="1" smtClean="0">
+              <a:rPr lang="en-US" sz="1050" dirty="0" err="1">
                 <a:solidFill>
                   <a:srgbClr val="7030A0"/>
                 </a:solidFill>
@@ -6456,8 +6448,8 @@
         </p:nvSpPr>
         <p:spPr>
           <a:xfrm>
-            <a:off x="7254513" y="3851656"/>
-            <a:ext cx="708186" cy="285783"/>
+            <a:off x="7254513" y="3524217"/>
+            <a:ext cx="780320" cy="285783"/>
           </a:xfrm>
           <a:prstGeom prst="rect">
             <a:avLst/>
@@ -6489,12 +6481,27 @@
           <a:p>
             <a:pPr algn="ctr"/>
             <a:r>
-              <a:rPr lang="en-US" sz="1050" dirty="0" err="1" smtClean="0">
+              <a:rPr lang="en-US" sz="1050" dirty="0">
                 <a:solidFill>
                   <a:srgbClr val="7030A0"/>
                 </a:solidFill>
               </a:rPr>
-              <a:t>OpeningHours</a:t>
+              <a:t>Opening</a:t>
+            </a:r>
+            <a:br>
+              <a:rPr lang="en-US" sz="1050" dirty="0">
+                <a:solidFill>
+                  <a:srgbClr val="7030A0"/>
+                </a:solidFill>
+              </a:rPr>
+            </a:br>
+            <a:r>
+              <a:rPr lang="en-US" sz="1050" dirty="0">
+                <a:solidFill>
+                  <a:srgbClr val="7030A0"/>
+                </a:solidFill>
+              </a:rPr>
+              <a:t>Hours</a:t>
             </a:r>
             <a:endParaRPr lang="en-SG" sz="1050" dirty="0">
               <a:solidFill>
@@ -6517,7 +6524,7 @@
         <p:spPr>
           <a:xfrm>
             <a:off x="6836848" y="3025937"/>
-            <a:ext cx="424015" cy="648212"/>
+            <a:ext cx="424015" cy="320773"/>
           </a:xfrm>
           <a:prstGeom prst="bentConnector3">
             <a:avLst>
@@ -6561,7 +6568,119 @@
         <p:spPr>
           <a:xfrm>
             <a:off x="6836848" y="3025937"/>
-            <a:ext cx="417665" cy="968611"/>
+            <a:ext cx="417665" cy="641172"/>
+          </a:xfrm>
+          <a:prstGeom prst="bentConnector3">
+            <a:avLst>
+              <a:gd name="adj1" fmla="val 50000"/>
+            </a:avLst>
+          </a:prstGeom>
+          <a:ln w="19050">
+            <a:solidFill>
+              <a:srgbClr val="7030A0"/>
+            </a:solidFill>
+            <a:headEnd type="none" w="med" len="med"/>
+            <a:tailEnd type="arrow" w="med" len="med"/>
+          </a:ln>
+          <a:effectLst/>
+        </p:spPr>
+        <p:style>
+          <a:lnRef idx="1">
+            <a:schemeClr val="accent2"/>
+          </a:lnRef>
+          <a:fillRef idx="2">
+            <a:schemeClr val="accent2"/>
+          </a:fillRef>
+          <a:effectRef idx="1">
+            <a:schemeClr val="accent2"/>
+          </a:effectRef>
+          <a:fontRef idx="minor">
+            <a:schemeClr val="dk1"/>
+          </a:fontRef>
+        </p:style>
+      </p:cxnSp>
+      <p:sp>
+        <p:nvSpPr>
+          <p:cNvPr id="71" name="Rectangle 8">
+            <a:extLst>
+              <a:ext uri="{FF2B5EF4-FFF2-40B4-BE49-F238E27FC236}">
+                <a16:creationId xmlns:a16="http://schemas.microsoft.com/office/drawing/2014/main" id="{D4678D17-C3AC-554A-920D-BC8D248032C0}"/>
+              </a:ext>
+            </a:extLst>
+          </p:cNvPr>
+          <p:cNvSpPr/>
+          <p:nvPr/>
+        </p:nvSpPr>
+        <p:spPr>
+          <a:xfrm>
+            <a:off x="7251369" y="3851277"/>
+            <a:ext cx="780320" cy="285783"/>
+          </a:xfrm>
+          <a:prstGeom prst="rect">
+            <a:avLst/>
+          </a:prstGeom>
+          <a:ln w="19050">
+            <a:solidFill>
+              <a:srgbClr val="7030A0"/>
+            </a:solidFill>
+          </a:ln>
+          <a:effectLst/>
+        </p:spPr>
+        <p:style>
+          <a:lnRef idx="1">
+            <a:schemeClr val="accent4"/>
+          </a:lnRef>
+          <a:fillRef idx="2">
+            <a:schemeClr val="accent4"/>
+          </a:fillRef>
+          <a:effectRef idx="1">
+            <a:schemeClr val="accent4"/>
+          </a:effectRef>
+          <a:fontRef idx="minor">
+            <a:schemeClr val="dk1"/>
+          </a:fontRef>
+        </p:style>
+        <p:txBody>
+          <a:bodyPr rtlCol="0" anchor="ctr"/>
+          <a:lstStyle/>
+          <a:p>
+            <a:pPr algn="ctr"/>
+            <a:r>
+              <a:rPr lang="en-US" sz="1050" dirty="0" err="1">
+                <a:solidFill>
+                  <a:srgbClr val="7030A0"/>
+                </a:solidFill>
+              </a:rPr>
+              <a:t>RestaurantSummary</a:t>
+            </a:r>
+            <a:endParaRPr lang="en-SG" sz="1050" dirty="0">
+              <a:solidFill>
+                <a:srgbClr val="7030A0"/>
+              </a:solidFill>
+            </a:endParaRPr>
+          </a:p>
+        </p:txBody>
+      </p:sp>
+      <p:cxnSp>
+        <p:nvCxnSpPr>
+          <p:cNvPr id="88" name="Elbow Connector 87">
+            <a:extLst>
+              <a:ext uri="{FF2B5EF4-FFF2-40B4-BE49-F238E27FC236}">
+                <a16:creationId xmlns:a16="http://schemas.microsoft.com/office/drawing/2014/main" id="{7866AA63-1999-C64B-BA32-4266C4A96682}"/>
+              </a:ext>
+            </a:extLst>
+          </p:cNvPr>
+          <p:cNvCxnSpPr>
+            <a:cxnSpLocks/>
+            <a:stCxn id="78" idx="3"/>
+            <a:endCxn id="71" idx="1"/>
+          </p:cNvCxnSpPr>
+          <p:nvPr/>
+        </p:nvCxnSpPr>
+        <p:spPr>
+          <a:xfrm>
+            <a:off x="6836848" y="3025937"/>
+            <a:ext cx="414521" cy="968232"/>
           </a:xfrm>
           <a:prstGeom prst="bentConnector3">
             <a:avLst>
@@ -6602,13 +6721,6 @@
   <p:clrMapOvr>
     <a:masterClrMapping/>
   </p:clrMapOvr>
-  <p:timing>
-    <p:tnLst>
-      <p:par>
-        <p:cTn id="1" dur="indefinite" restart="never" nodeType="tmRoot"/>
-      </p:par>
-    </p:tnLst>
-  </p:timing>
 </p:sld>
 </file>
 

</xml_diff>

<commit_message>
Update Docs and include UML diagrams for select command, tweaks to RestaurantSummaryPanel
</commit_message>
<xml_diff>
--- a/docs/diagrams/ModelComponentClassDiagram.pptx
+++ b/docs/diagrams/ModelComponentClassDiagram.pptx
@@ -208,7 +208,7 @@
           <a:p>
             <a:fld id="{F5CC4B3F-88C1-4FFA-B1B6-F41C21DC6924}" type="datetimeFigureOut">
               <a:rPr lang="en-US" smtClean="0"/>
-              <a:t>4/2/19</a:t>
+              <a:t>4/5/19</a:t>
             </a:fld>
             <a:endParaRPr lang="en-US"/>
           </a:p>
@@ -654,7 +654,7 @@
           <a:p>
             <a:fld id="{78C97017-6FC3-485B-9764-EAC9E56C1D49}" type="datetimeFigureOut">
               <a:rPr lang="en-US" smtClean="0"/>
-              <a:t>4/2/19</a:t>
+              <a:t>4/5/19</a:t>
             </a:fld>
             <a:endParaRPr lang="en-US"/>
           </a:p>
@@ -822,7 +822,7 @@
           <a:p>
             <a:fld id="{78C97017-6FC3-485B-9764-EAC9E56C1D49}" type="datetimeFigureOut">
               <a:rPr lang="en-US" smtClean="0"/>
-              <a:t>4/2/19</a:t>
+              <a:t>4/5/19</a:t>
             </a:fld>
             <a:endParaRPr lang="en-US"/>
           </a:p>
@@ -1000,7 +1000,7 @@
           <a:p>
             <a:fld id="{78C97017-6FC3-485B-9764-EAC9E56C1D49}" type="datetimeFigureOut">
               <a:rPr lang="en-US" smtClean="0"/>
-              <a:t>4/2/19</a:t>
+              <a:t>4/5/19</a:t>
             </a:fld>
             <a:endParaRPr lang="en-US"/>
           </a:p>
@@ -1168,7 +1168,7 @@
           <a:p>
             <a:fld id="{78C97017-6FC3-485B-9764-EAC9E56C1D49}" type="datetimeFigureOut">
               <a:rPr lang="en-US" smtClean="0"/>
-              <a:t>4/2/19</a:t>
+              <a:t>4/5/19</a:t>
             </a:fld>
             <a:endParaRPr lang="en-US"/>
           </a:p>
@@ -1413,7 +1413,7 @@
           <a:p>
             <a:fld id="{78C97017-6FC3-485B-9764-EAC9E56C1D49}" type="datetimeFigureOut">
               <a:rPr lang="en-US" smtClean="0"/>
-              <a:t>4/2/19</a:t>
+              <a:t>4/5/19</a:t>
             </a:fld>
             <a:endParaRPr lang="en-US"/>
           </a:p>
@@ -1698,7 +1698,7 @@
           <a:p>
             <a:fld id="{78C97017-6FC3-485B-9764-EAC9E56C1D49}" type="datetimeFigureOut">
               <a:rPr lang="en-US" smtClean="0"/>
-              <a:t>4/2/19</a:t>
+              <a:t>4/5/19</a:t>
             </a:fld>
             <a:endParaRPr lang="en-US"/>
           </a:p>
@@ -2117,7 +2117,7 @@
           <a:p>
             <a:fld id="{78C97017-6FC3-485B-9764-EAC9E56C1D49}" type="datetimeFigureOut">
               <a:rPr lang="en-US" smtClean="0"/>
-              <a:t>4/2/19</a:t>
+              <a:t>4/5/19</a:t>
             </a:fld>
             <a:endParaRPr lang="en-US"/>
           </a:p>
@@ -2234,7 +2234,7 @@
           <a:p>
             <a:fld id="{78C97017-6FC3-485B-9764-EAC9E56C1D49}" type="datetimeFigureOut">
               <a:rPr lang="en-US" smtClean="0"/>
-              <a:t>4/2/19</a:t>
+              <a:t>4/5/19</a:t>
             </a:fld>
             <a:endParaRPr lang="en-US"/>
           </a:p>
@@ -2329,7 +2329,7 @@
           <a:p>
             <a:fld id="{78C97017-6FC3-485B-9764-EAC9E56C1D49}" type="datetimeFigureOut">
               <a:rPr lang="en-US" smtClean="0"/>
-              <a:t>4/2/19</a:t>
+              <a:t>4/5/19</a:t>
             </a:fld>
             <a:endParaRPr lang="en-US"/>
           </a:p>
@@ -2604,7 +2604,7 @@
           <a:p>
             <a:fld id="{78C97017-6FC3-485B-9764-EAC9E56C1D49}" type="datetimeFigureOut">
               <a:rPr lang="en-US" smtClean="0"/>
-              <a:t>4/2/19</a:t>
+              <a:t>4/5/19</a:t>
             </a:fld>
             <a:endParaRPr lang="en-US"/>
           </a:p>
@@ -2856,7 +2856,7 @@
           <a:p>
             <a:fld id="{78C97017-6FC3-485B-9764-EAC9E56C1D49}" type="datetimeFigureOut">
               <a:rPr lang="en-US" smtClean="0"/>
-              <a:t>4/2/19</a:t>
+              <a:t>4/5/19</a:t>
             </a:fld>
             <a:endParaRPr lang="en-US"/>
           </a:p>
@@ -3072,7 +3072,7 @@
           <a:p>
             <a:fld id="{78C97017-6FC3-485B-9764-EAC9E56C1D49}" type="datetimeFigureOut">
               <a:rPr lang="en-US" smtClean="0"/>
-              <a:t>4/2/19</a:t>
+              <a:t>4/5/19</a:t>
             </a:fld>
             <a:endParaRPr lang="en-US"/>
           </a:p>
@@ -6646,12 +6646,12 @@
           <a:p>
             <a:pPr algn="ctr"/>
             <a:r>
-              <a:rPr lang="en-US" sz="1050" dirty="0" err="1">
+              <a:rPr lang="en-US" sz="1050" dirty="0">
                 <a:solidFill>
                   <a:srgbClr val="7030A0"/>
                 </a:solidFill>
               </a:rPr>
-              <a:t>RestaurantSummary</a:t>
+              <a:t>Summary</a:t>
             </a:r>
             <a:endParaRPr lang="en-SG" sz="1050" dirty="0">
               <a:solidFill>

</xml_diff>

<commit_message>
Updated the model class diagram of developer guide
</commit_message>
<xml_diff>
--- a/docs/diagrams/ModelComponentClassDiagram.pptx
+++ b/docs/diagrams/ModelComponentClassDiagram.pptx
@@ -208,7 +208,7 @@
           <a:p>
             <a:fld id="{F5CC4B3F-88C1-4FFA-B1B6-F41C21DC6924}" type="datetimeFigureOut">
               <a:rPr lang="en-US" smtClean="0"/>
-              <a:t>4/1/2019</a:t>
+              <a:t>4/11/2019</a:t>
             </a:fld>
             <a:endParaRPr lang="en-US"/>
           </a:p>
@@ -654,7 +654,7 @@
           <a:p>
             <a:fld id="{78C97017-6FC3-485B-9764-EAC9E56C1D49}" type="datetimeFigureOut">
               <a:rPr lang="en-US" smtClean="0"/>
-              <a:t>4/1/2019</a:t>
+              <a:t>4/11/2019</a:t>
             </a:fld>
             <a:endParaRPr lang="en-US"/>
           </a:p>
@@ -822,7 +822,7 @@
           <a:p>
             <a:fld id="{78C97017-6FC3-485B-9764-EAC9E56C1D49}" type="datetimeFigureOut">
               <a:rPr lang="en-US" smtClean="0"/>
-              <a:t>4/1/2019</a:t>
+              <a:t>4/11/2019</a:t>
             </a:fld>
             <a:endParaRPr lang="en-US"/>
           </a:p>
@@ -1000,7 +1000,7 @@
           <a:p>
             <a:fld id="{78C97017-6FC3-485B-9764-EAC9E56C1D49}" type="datetimeFigureOut">
               <a:rPr lang="en-US" smtClean="0"/>
-              <a:t>4/1/2019</a:t>
+              <a:t>4/11/2019</a:t>
             </a:fld>
             <a:endParaRPr lang="en-US"/>
           </a:p>
@@ -1168,7 +1168,7 @@
           <a:p>
             <a:fld id="{78C97017-6FC3-485B-9764-EAC9E56C1D49}" type="datetimeFigureOut">
               <a:rPr lang="en-US" smtClean="0"/>
-              <a:t>4/1/2019</a:t>
+              <a:t>4/11/2019</a:t>
             </a:fld>
             <a:endParaRPr lang="en-US"/>
           </a:p>
@@ -1413,7 +1413,7 @@
           <a:p>
             <a:fld id="{78C97017-6FC3-485B-9764-EAC9E56C1D49}" type="datetimeFigureOut">
               <a:rPr lang="en-US" smtClean="0"/>
-              <a:t>4/1/2019</a:t>
+              <a:t>4/11/2019</a:t>
             </a:fld>
             <a:endParaRPr lang="en-US"/>
           </a:p>
@@ -1698,7 +1698,7 @@
           <a:p>
             <a:fld id="{78C97017-6FC3-485B-9764-EAC9E56C1D49}" type="datetimeFigureOut">
               <a:rPr lang="en-US" smtClean="0"/>
-              <a:t>4/1/2019</a:t>
+              <a:t>4/11/2019</a:t>
             </a:fld>
             <a:endParaRPr lang="en-US"/>
           </a:p>
@@ -2117,7 +2117,7 @@
           <a:p>
             <a:fld id="{78C97017-6FC3-485B-9764-EAC9E56C1D49}" type="datetimeFigureOut">
               <a:rPr lang="en-US" smtClean="0"/>
-              <a:t>4/1/2019</a:t>
+              <a:t>4/11/2019</a:t>
             </a:fld>
             <a:endParaRPr lang="en-US"/>
           </a:p>
@@ -2234,7 +2234,7 @@
           <a:p>
             <a:fld id="{78C97017-6FC3-485B-9764-EAC9E56C1D49}" type="datetimeFigureOut">
               <a:rPr lang="en-US" smtClean="0"/>
-              <a:t>4/1/2019</a:t>
+              <a:t>4/11/2019</a:t>
             </a:fld>
             <a:endParaRPr lang="en-US"/>
           </a:p>
@@ -2329,7 +2329,7 @@
           <a:p>
             <a:fld id="{78C97017-6FC3-485B-9764-EAC9E56C1D49}" type="datetimeFigureOut">
               <a:rPr lang="en-US" smtClean="0"/>
-              <a:t>4/1/2019</a:t>
+              <a:t>4/11/2019</a:t>
             </a:fld>
             <a:endParaRPr lang="en-US"/>
           </a:p>
@@ -2604,7 +2604,7 @@
           <a:p>
             <a:fld id="{78C97017-6FC3-485B-9764-EAC9E56C1D49}" type="datetimeFigureOut">
               <a:rPr lang="en-US" smtClean="0"/>
-              <a:t>4/1/2019</a:t>
+              <a:t>4/11/2019</a:t>
             </a:fld>
             <a:endParaRPr lang="en-US"/>
           </a:p>
@@ -2856,7 +2856,7 @@
           <a:p>
             <a:fld id="{78C97017-6FC3-485B-9764-EAC9E56C1D49}" type="datetimeFigureOut">
               <a:rPr lang="en-US" smtClean="0"/>
-              <a:t>4/1/2019</a:t>
+              <a:t>4/11/2019</a:t>
             </a:fld>
             <a:endParaRPr lang="en-US"/>
           </a:p>
@@ -3067,7 +3067,7 @@
           <a:p>
             <a:fld id="{78C97017-6FC3-485B-9764-EAC9E56C1D49}" type="datetimeFigureOut">
               <a:rPr lang="en-US" smtClean="0"/>
-              <a:t>4/1/2019</a:t>
+              <a:t>4/11/2019</a:t>
             </a:fld>
             <a:endParaRPr lang="en-US"/>
           </a:p>
@@ -3450,8 +3450,8 @@
         </p:nvSpPr>
         <p:spPr>
           <a:xfrm>
-            <a:off x="1119865" y="1600200"/>
-            <a:ext cx="7490735" cy="3124200"/>
+            <a:off x="910091" y="609600"/>
+            <a:ext cx="7700509" cy="4114800"/>
           </a:xfrm>
           <a:prstGeom prst="roundRect">
             <a:avLst>
@@ -4685,7 +4685,7 @@
         </p:nvSpPr>
         <p:spPr>
           <a:xfrm>
-            <a:off x="7712396" y="3533171"/>
+            <a:off x="6257955" y="1982253"/>
             <a:ext cx="812519" cy="285783"/>
           </a:xfrm>
           <a:prstGeom prst="rect">
@@ -4735,21 +4735,607 @@
       </p:sp>
       <p:cxnSp>
         <p:nvCxnSpPr>
-          <p:cNvPr id="86" name="Elbow Connector 85"/>
+          <p:cNvPr id="97" name="Elbow Connector 63"/>
+          <p:cNvCxnSpPr>
+            <a:cxnSpLocks/>
+            <a:stCxn id="99" idx="3"/>
+          </p:cNvCxnSpPr>
+          <p:nvPr/>
+        </p:nvCxnSpPr>
+        <p:spPr>
+          <a:xfrm rot="16200000" flipH="1">
+            <a:off x="3566454" y="2680653"/>
+            <a:ext cx="274076" cy="1"/>
+          </a:xfrm>
+          <a:prstGeom prst="bentConnector3">
+            <a:avLst>
+              <a:gd name="adj1" fmla="val 50000"/>
+            </a:avLst>
+          </a:prstGeom>
+          <a:ln w="19050">
+            <a:solidFill>
+              <a:srgbClr val="7030A0"/>
+            </a:solidFill>
+            <a:prstDash val="sysDot"/>
+            <a:headEnd type="none" w="med" len="med"/>
+            <a:tailEnd type="none" w="med" len="med"/>
+          </a:ln>
+          <a:effectLst/>
+        </p:spPr>
+        <p:style>
+          <a:lnRef idx="1">
+            <a:schemeClr val="accent2"/>
+          </a:lnRef>
+          <a:fillRef idx="2">
+            <a:schemeClr val="accent2"/>
+          </a:fillRef>
+          <a:effectRef idx="1">
+            <a:schemeClr val="accent2"/>
+          </a:effectRef>
+          <a:fontRef idx="minor">
+            <a:schemeClr val="dk1"/>
+          </a:fontRef>
+        </p:style>
+      </p:cxnSp>
+      <p:sp>
+        <p:nvSpPr>
+          <p:cNvPr id="99" name="Isosceles Triangle 102"/>
+          <p:cNvSpPr/>
+          <p:nvPr/>
+        </p:nvSpPr>
+        <p:spPr>
+          <a:xfrm rot="10800000" flipV="1">
+            <a:off x="3562299" y="2386554"/>
+            <a:ext cx="282387" cy="157062"/>
+          </a:xfrm>
+          <a:prstGeom prst="triangle">
+            <a:avLst/>
+          </a:prstGeom>
+          <a:solidFill>
+            <a:schemeClr val="accent4">
+              <a:lumMod val="20000"/>
+              <a:lumOff val="80000"/>
+            </a:schemeClr>
+          </a:solidFill>
+          <a:ln w="19050">
+            <a:solidFill>
+              <a:srgbClr val="7030A0"/>
+            </a:solidFill>
+          </a:ln>
+          <a:effectLst/>
+        </p:spPr>
+        <p:style>
+          <a:lnRef idx="1">
+            <a:schemeClr val="accent4"/>
+          </a:lnRef>
+          <a:fillRef idx="2">
+            <a:schemeClr val="accent4"/>
+          </a:fillRef>
+          <a:effectRef idx="1">
+            <a:schemeClr val="accent4"/>
+          </a:effectRef>
+          <a:fontRef idx="minor">
+            <a:schemeClr val="dk1"/>
+          </a:fontRef>
+        </p:style>
+        <p:txBody>
+          <a:bodyPr rtlCol="0" anchor="ctr"/>
+          <a:lstStyle/>
+          <a:p>
+            <a:pPr algn="ctr"/>
+            <a:endParaRPr lang="en-SG" sz="1050" b="1">
+              <a:solidFill>
+                <a:srgbClr val="92D050"/>
+              </a:solidFill>
+            </a:endParaRPr>
+          </a:p>
+        </p:txBody>
+      </p:sp>
+      <p:sp>
+        <p:nvSpPr>
+          <p:cNvPr id="100" name="Rectangle 8"/>
+          <p:cNvSpPr/>
+          <p:nvPr/>
+        </p:nvSpPr>
+        <p:spPr>
+          <a:xfrm>
+            <a:off x="1119866" y="1946417"/>
+            <a:ext cx="1584718" cy="416329"/>
+          </a:xfrm>
+          <a:prstGeom prst="rect">
+            <a:avLst/>
+          </a:prstGeom>
+          <a:ln w="19050">
+            <a:solidFill>
+              <a:srgbClr val="7030A0"/>
+            </a:solidFill>
+          </a:ln>
+          <a:effectLst/>
+        </p:spPr>
+        <p:style>
+          <a:lnRef idx="1">
+            <a:schemeClr val="accent4"/>
+          </a:lnRef>
+          <a:fillRef idx="2">
+            <a:schemeClr val="accent4"/>
+          </a:fillRef>
+          <a:effectRef idx="1">
+            <a:schemeClr val="accent4"/>
+          </a:effectRef>
+          <a:fontRef idx="minor">
+            <a:schemeClr val="dk1"/>
+          </a:fontRef>
+        </p:style>
+        <p:txBody>
+          <a:bodyPr rtlCol="0" anchor="ctr"/>
+          <a:lstStyle/>
+          <a:p>
+            <a:pPr algn="ctr"/>
+            <a:r>
+              <a:rPr lang="en-US" sz="1050" dirty="0">
+                <a:solidFill>
+                  <a:srgbClr val="7030A0"/>
+                </a:solidFill>
+              </a:rPr>
+              <a:t>&lt;&lt;interface&gt;&gt;</a:t>
+            </a:r>
+            <a:br>
+              <a:rPr lang="en-US" sz="1050" dirty="0">
+                <a:solidFill>
+                  <a:srgbClr val="7030A0"/>
+                </a:solidFill>
+              </a:rPr>
+            </a:br>
+            <a:r>
+              <a:rPr lang="en-US" sz="1050" dirty="0" err="1">
+                <a:solidFill>
+                  <a:srgbClr val="7030A0"/>
+                </a:solidFill>
+              </a:rPr>
+              <a:t>ReadOnlyFinanceTracker</a:t>
+            </a:r>
+            <a:endParaRPr lang="en-SG" sz="1050" dirty="0">
+              <a:solidFill>
+                <a:srgbClr val="7030A0"/>
+              </a:solidFill>
+            </a:endParaRPr>
+          </a:p>
+        </p:txBody>
+      </p:sp>
+      <p:sp>
+        <p:nvSpPr>
+          <p:cNvPr id="114" name="TextBox 113"/>
+          <p:cNvSpPr txBox="1"/>
+          <p:nvPr/>
+        </p:nvSpPr>
+        <p:spPr>
+          <a:xfrm rot="16200000">
+            <a:off x="6362886" y="3586305"/>
+            <a:ext cx="881018" cy="261610"/>
+          </a:xfrm>
+          <a:prstGeom prst="rect">
+            <a:avLst/>
+          </a:prstGeom>
+          <a:noFill/>
+        </p:spPr>
+        <p:txBody>
+          <a:bodyPr wrap="square" rtlCol="0">
+            <a:spAutoFit/>
+          </a:bodyPr>
+          <a:lstStyle/>
+          <a:p>
+            <a:pPr algn="r"/>
+            <a:r>
+              <a:rPr lang="en-US" sz="1100" dirty="0">
+                <a:solidFill>
+                  <a:srgbClr val="7030A0"/>
+                </a:solidFill>
+              </a:rPr>
+              <a:t>filtered list</a:t>
+            </a:r>
+            <a:endParaRPr lang="en-SG" sz="1100" dirty="0">
+              <a:solidFill>
+                <a:srgbClr val="7030A0"/>
+              </a:solidFill>
+            </a:endParaRPr>
+          </a:p>
+        </p:txBody>
+      </p:sp>
+      <p:sp>
+        <p:nvSpPr>
+          <p:cNvPr id="122" name="Rectangle 8"/>
+          <p:cNvSpPr/>
+          <p:nvPr/>
+        </p:nvSpPr>
+        <p:spPr>
+          <a:xfrm>
+            <a:off x="2057401" y="4239491"/>
+            <a:ext cx="1066800" cy="346760"/>
+          </a:xfrm>
+          <a:prstGeom prst="rect">
+            <a:avLst/>
+          </a:prstGeom>
+          <a:ln w="19050">
+            <a:solidFill>
+              <a:srgbClr val="7030A0"/>
+            </a:solidFill>
+          </a:ln>
+          <a:effectLst/>
+        </p:spPr>
+        <p:style>
+          <a:lnRef idx="1">
+            <a:schemeClr val="accent4"/>
+          </a:lnRef>
+          <a:fillRef idx="2">
+            <a:schemeClr val="accent4"/>
+          </a:fillRef>
+          <a:effectRef idx="1">
+            <a:schemeClr val="accent4"/>
+          </a:effectRef>
+          <a:fontRef idx="minor">
+            <a:schemeClr val="dk1"/>
+          </a:fontRef>
+        </p:style>
+        <p:txBody>
+          <a:bodyPr rtlCol="0" anchor="ctr"/>
+          <a:lstStyle/>
+          <a:p>
+            <a:pPr algn="ctr"/>
+            <a:r>
+              <a:rPr lang="en-US" sz="1050" dirty="0">
+                <a:solidFill>
+                  <a:srgbClr val="7030A0"/>
+                </a:solidFill>
+              </a:rPr>
+              <a:t>&lt;&lt;interface&gt;&gt;</a:t>
+            </a:r>
+            <a:br>
+              <a:rPr lang="en-US" sz="1050">
+                <a:solidFill>
+                  <a:srgbClr val="7030A0"/>
+                </a:solidFill>
+              </a:rPr>
+            </a:br>
+            <a:r>
+              <a:rPr lang="en-US" sz="1050" dirty="0" err="1">
+                <a:solidFill>
+                  <a:srgbClr val="7030A0"/>
+                </a:solidFill>
+              </a:rPr>
+              <a:t>ObservableList</a:t>
+            </a:r>
+            <a:endParaRPr lang="en-SG" sz="1050" dirty="0">
+              <a:solidFill>
+                <a:srgbClr val="7030A0"/>
+              </a:solidFill>
+            </a:endParaRPr>
+          </a:p>
+        </p:txBody>
+      </p:sp>
+      <p:cxnSp>
+        <p:nvCxnSpPr>
+          <p:cNvPr id="124" name="Elbow Connector 122"/>
+          <p:cNvCxnSpPr>
+            <a:stCxn id="119" idx="1"/>
+            <a:endCxn id="122" idx="1"/>
+          </p:cNvCxnSpPr>
+          <p:nvPr/>
+        </p:nvCxnSpPr>
+        <p:spPr>
+          <a:xfrm rot="16200000" flipH="1">
+            <a:off x="1364475" y="3719944"/>
+            <a:ext cx="831471" cy="554381"/>
+          </a:xfrm>
+          <a:prstGeom prst="bentConnector2">
+            <a:avLst/>
+          </a:prstGeom>
+          <a:ln w="19050">
+            <a:solidFill>
+              <a:srgbClr val="7030A0"/>
+            </a:solidFill>
+            <a:prstDash val="sysDot"/>
+            <a:headEnd type="none" w="med" len="med"/>
+            <a:tailEnd type="arrow" w="med" len="med"/>
+          </a:ln>
+          <a:effectLst/>
+        </p:spPr>
+        <p:style>
+          <a:lnRef idx="1">
+            <a:schemeClr val="accent2"/>
+          </a:lnRef>
+          <a:fillRef idx="2">
+            <a:schemeClr val="accent2"/>
+          </a:fillRef>
+          <a:effectRef idx="1">
+            <a:schemeClr val="accent2"/>
+          </a:effectRef>
+          <a:fontRef idx="minor">
+            <a:schemeClr val="dk1"/>
+          </a:fontRef>
+        </p:style>
+      </p:cxnSp>
+      <p:sp>
+        <p:nvSpPr>
+          <p:cNvPr id="54" name="TextBox 53"/>
+          <p:cNvSpPr txBox="1"/>
+          <p:nvPr/>
+        </p:nvSpPr>
+        <p:spPr>
+          <a:xfrm>
+            <a:off x="4429979" y="3111479"/>
+            <a:ext cx="189257" cy="178683"/>
+          </a:xfrm>
+          <a:prstGeom prst="rect">
+            <a:avLst/>
+          </a:prstGeom>
+          <a:noFill/>
+        </p:spPr>
+        <p:txBody>
+          <a:bodyPr wrap="square" lIns="0" tIns="0" rIns="0" bIns="0" rtlCol="0">
+            <a:noAutofit/>
+          </a:bodyPr>
+          <a:lstStyle/>
+          <a:p>
+            <a:pPr algn="ctr"/>
+            <a:r>
+              <a:rPr lang="en-US" sz="1100" dirty="0">
+                <a:solidFill>
+                  <a:srgbClr val="7030A0"/>
+                </a:solidFill>
+              </a:rPr>
+              <a:t>1</a:t>
+            </a:r>
+            <a:endParaRPr lang="en-SG" sz="1100" dirty="0">
+              <a:solidFill>
+                <a:srgbClr val="7030A0"/>
+              </a:solidFill>
+            </a:endParaRPr>
+          </a:p>
+        </p:txBody>
+      </p:sp>
+      <p:sp>
+        <p:nvSpPr>
+          <p:cNvPr id="61" name="TextBox 60"/>
+          <p:cNvSpPr txBox="1"/>
+          <p:nvPr/>
+        </p:nvSpPr>
+        <p:spPr>
+          <a:xfrm>
+            <a:off x="6135256" y="3097917"/>
+            <a:ext cx="189257" cy="178683"/>
+          </a:xfrm>
+          <a:prstGeom prst="rect">
+            <a:avLst/>
+          </a:prstGeom>
+          <a:noFill/>
+        </p:spPr>
+        <p:txBody>
+          <a:bodyPr wrap="square" lIns="0" tIns="0" rIns="0" bIns="0" rtlCol="0">
+            <a:noAutofit/>
+          </a:bodyPr>
+          <a:lstStyle/>
+          <a:p>
+            <a:pPr algn="ctr"/>
+            <a:r>
+              <a:rPr lang="en-US" sz="1100" dirty="0">
+                <a:solidFill>
+                  <a:srgbClr val="7030A0"/>
+                </a:solidFill>
+              </a:rPr>
+              <a:t>*</a:t>
+            </a:r>
+            <a:endParaRPr lang="en-SG" sz="1100" dirty="0">
+              <a:solidFill>
+                <a:srgbClr val="7030A0"/>
+              </a:solidFill>
+            </a:endParaRPr>
+          </a:p>
+        </p:txBody>
+      </p:sp>
+      <p:sp>
+        <p:nvSpPr>
+          <p:cNvPr id="65" name="TextBox 64"/>
+          <p:cNvSpPr txBox="1"/>
+          <p:nvPr/>
+        </p:nvSpPr>
+        <p:spPr>
+          <a:xfrm>
+            <a:off x="2573394" y="2756715"/>
+            <a:ext cx="170110" cy="137542"/>
+          </a:xfrm>
+          <a:prstGeom prst="rect">
+            <a:avLst/>
+          </a:prstGeom>
+          <a:noFill/>
+        </p:spPr>
+        <p:txBody>
+          <a:bodyPr wrap="square" lIns="0" tIns="0" rIns="0" bIns="0" rtlCol="0">
+            <a:noAutofit/>
+          </a:bodyPr>
+          <a:lstStyle/>
+          <a:p>
+            <a:pPr algn="ctr"/>
+            <a:r>
+              <a:rPr lang="en-US" sz="1100" dirty="0">
+                <a:solidFill>
+                  <a:srgbClr val="7030A0"/>
+                </a:solidFill>
+              </a:rPr>
+              <a:t>1</a:t>
+            </a:r>
+            <a:endParaRPr lang="en-SG" sz="1100" dirty="0">
+              <a:solidFill>
+                <a:srgbClr val="7030A0"/>
+              </a:solidFill>
+            </a:endParaRPr>
+          </a:p>
+        </p:txBody>
+      </p:sp>
+      <p:sp>
+        <p:nvSpPr>
+          <p:cNvPr id="66" name="TextBox 65"/>
+          <p:cNvSpPr txBox="1"/>
+          <p:nvPr/>
+        </p:nvSpPr>
+        <p:spPr>
+          <a:xfrm>
+            <a:off x="2630191" y="3667737"/>
+            <a:ext cx="189257" cy="178683"/>
+          </a:xfrm>
+          <a:prstGeom prst="rect">
+            <a:avLst/>
+          </a:prstGeom>
+          <a:noFill/>
+        </p:spPr>
+        <p:txBody>
+          <a:bodyPr wrap="square" lIns="0" tIns="0" rIns="0" bIns="0" rtlCol="0">
+            <a:noAutofit/>
+          </a:bodyPr>
+          <a:lstStyle/>
+          <a:p>
+            <a:pPr algn="ctr"/>
+            <a:r>
+              <a:rPr lang="en-US" sz="1100" dirty="0">
+                <a:solidFill>
+                  <a:srgbClr val="7030A0"/>
+                </a:solidFill>
+              </a:rPr>
+              <a:t>1</a:t>
+            </a:r>
+            <a:endParaRPr lang="en-SG" sz="1100" dirty="0">
+              <a:solidFill>
+                <a:srgbClr val="7030A0"/>
+              </a:solidFill>
+            </a:endParaRPr>
+          </a:p>
+        </p:txBody>
+      </p:sp>
+      <p:sp>
+        <p:nvSpPr>
+          <p:cNvPr id="70" name="TextBox 69"/>
+          <p:cNvSpPr txBox="1"/>
+          <p:nvPr/>
+        </p:nvSpPr>
+        <p:spPr>
+          <a:xfrm>
+            <a:off x="6449896" y="3204826"/>
+            <a:ext cx="189257" cy="178683"/>
+          </a:xfrm>
+          <a:prstGeom prst="rect">
+            <a:avLst/>
+          </a:prstGeom>
+          <a:noFill/>
+        </p:spPr>
+        <p:txBody>
+          <a:bodyPr wrap="square" lIns="0" tIns="0" rIns="0" bIns="0" rtlCol="0">
+            <a:noAutofit/>
+          </a:bodyPr>
+          <a:lstStyle/>
+          <a:p>
+            <a:pPr algn="ctr"/>
+            <a:r>
+              <a:rPr lang="en-US" sz="1100" dirty="0">
+                <a:solidFill>
+                  <a:srgbClr val="7030A0"/>
+                </a:solidFill>
+              </a:rPr>
+              <a:t>1</a:t>
+            </a:r>
+            <a:endParaRPr lang="en-SG" sz="1100" dirty="0">
+              <a:solidFill>
+                <a:srgbClr val="7030A0"/>
+              </a:solidFill>
+            </a:endParaRPr>
+          </a:p>
+        </p:txBody>
+      </p:sp>
+      <p:sp>
+        <p:nvSpPr>
+          <p:cNvPr id="52" name="Rectangle 8">
+            <a:extLst>
+              <a:ext uri="{FF2B5EF4-FFF2-40B4-BE49-F238E27FC236}">
+                <a16:creationId xmlns:a16="http://schemas.microsoft.com/office/drawing/2014/main" id="{ABDCDBD2-131A-4B66-A2F2-43BBEE82C773}"/>
+              </a:ext>
+            </a:extLst>
+          </p:cNvPr>
+          <p:cNvSpPr/>
+          <p:nvPr/>
+        </p:nvSpPr>
+        <p:spPr>
+          <a:xfrm>
+            <a:off x="7712397" y="2228817"/>
+            <a:ext cx="812516" cy="285783"/>
+          </a:xfrm>
+          <a:prstGeom prst="rect">
+            <a:avLst/>
+          </a:prstGeom>
+          <a:ln w="19050">
+            <a:solidFill>
+              <a:srgbClr val="7030A0"/>
+            </a:solidFill>
+          </a:ln>
+          <a:effectLst/>
+        </p:spPr>
+        <p:style>
+          <a:lnRef idx="1">
+            <a:schemeClr val="accent4"/>
+          </a:lnRef>
+          <a:fillRef idx="2">
+            <a:schemeClr val="accent4"/>
+          </a:fillRef>
+          <a:effectRef idx="1">
+            <a:schemeClr val="accent4"/>
+          </a:effectRef>
+          <a:fontRef idx="minor">
+            <a:schemeClr val="dk1"/>
+          </a:fontRef>
+        </p:style>
+        <p:txBody>
+          <a:bodyPr rtlCol="0" anchor="ctr"/>
+          <a:lstStyle/>
+          <a:p>
+            <a:pPr algn="ctr"/>
+            <a:r>
+              <a:rPr lang="en-US" sz="1050" dirty="0">
+                <a:solidFill>
+                  <a:srgbClr val="7030A0"/>
+                </a:solidFill>
+              </a:rPr>
+              <a:t>Name</a:t>
+            </a:r>
+            <a:endParaRPr lang="en-SG" sz="1050" dirty="0">
+              <a:solidFill>
+                <a:srgbClr val="7030A0"/>
+              </a:solidFill>
+            </a:endParaRPr>
+          </a:p>
+        </p:txBody>
+      </p:sp>
+      <p:cxnSp>
+        <p:nvCxnSpPr>
+          <p:cNvPr id="53" name="Elbow Connector 78">
+            <a:extLst>
+              <a:ext uri="{FF2B5EF4-FFF2-40B4-BE49-F238E27FC236}">
+                <a16:creationId xmlns:a16="http://schemas.microsoft.com/office/drawing/2014/main" id="{B97967F8-618A-448B-81FD-CDFD4AF0EC64}"/>
+              </a:ext>
+            </a:extLst>
+          </p:cNvPr>
           <p:cNvCxnSpPr>
             <a:cxnSpLocks/>
             <a:stCxn id="78" idx="3"/>
-            <a:endCxn id="85" idx="1"/>
+            <a:endCxn id="52" idx="1"/>
           </p:cNvCxnSpPr>
           <p:nvPr/>
         </p:nvCxnSpPr>
         <p:spPr>
-          <a:xfrm>
-            <a:off x="7277995" y="3034891"/>
-            <a:ext cx="434401" cy="641172"/>
+          <a:xfrm flipV="1">
+            <a:off x="7277995" y="2371709"/>
+            <a:ext cx="434402" cy="663182"/>
           </a:xfrm>
           <a:prstGeom prst="bentConnector3">
-            <a:avLst/>
+            <a:avLst>
+              <a:gd name="adj1" fmla="val 50000"/>
+            </a:avLst>
           </a:prstGeom>
           <a:ln w="19050">
             <a:solidFill>
@@ -4757,6 +5343,377 @@
             </a:solidFill>
             <a:headEnd type="none" w="med" len="med"/>
             <a:tailEnd type="arrow" w="med" len="med"/>
+          </a:ln>
+          <a:effectLst/>
+        </p:spPr>
+        <p:style>
+          <a:lnRef idx="1">
+            <a:schemeClr val="accent2"/>
+          </a:lnRef>
+          <a:fillRef idx="2">
+            <a:schemeClr val="accent2"/>
+          </a:fillRef>
+          <a:effectRef idx="1">
+            <a:schemeClr val="accent2"/>
+          </a:effectRef>
+          <a:fontRef idx="minor">
+            <a:schemeClr val="dk1"/>
+          </a:fontRef>
+        </p:style>
+      </p:cxnSp>
+      <p:sp>
+        <p:nvSpPr>
+          <p:cNvPr id="50" name="TextBox 49">
+            <a:extLst>
+              <a:ext uri="{FF2B5EF4-FFF2-40B4-BE49-F238E27FC236}">
+                <a16:creationId xmlns:a16="http://schemas.microsoft.com/office/drawing/2014/main" id="{B3FA9D57-880F-49C4-AD0B-A64E30D6F403}"/>
+              </a:ext>
+            </a:extLst>
+          </p:cNvPr>
+          <p:cNvSpPr txBox="1"/>
+          <p:nvPr/>
+        </p:nvSpPr>
+        <p:spPr>
+          <a:xfrm>
+            <a:off x="7466243" y="2255711"/>
+            <a:ext cx="189257" cy="178683"/>
+          </a:xfrm>
+          <a:prstGeom prst="rect">
+            <a:avLst/>
+          </a:prstGeom>
+          <a:noFill/>
+        </p:spPr>
+        <p:txBody>
+          <a:bodyPr wrap="square" lIns="0" tIns="0" rIns="0" bIns="0" rtlCol="0">
+            <a:noAutofit/>
+          </a:bodyPr>
+          <a:lstStyle/>
+          <a:p>
+            <a:pPr algn="ctr"/>
+            <a:endParaRPr lang="en-SG" sz="1100" dirty="0">
+              <a:solidFill>
+                <a:srgbClr val="7030A0"/>
+              </a:solidFill>
+            </a:endParaRPr>
+          </a:p>
+        </p:txBody>
+      </p:sp>
+      <p:sp>
+        <p:nvSpPr>
+          <p:cNvPr id="55" name="Rectangle 8"/>
+          <p:cNvSpPr/>
+          <p:nvPr/>
+        </p:nvSpPr>
+        <p:spPr>
+          <a:xfrm>
+            <a:off x="3170181" y="1998350"/>
+            <a:ext cx="1060683" cy="364396"/>
+          </a:xfrm>
+          <a:prstGeom prst="rect">
+            <a:avLst/>
+          </a:prstGeom>
+          <a:ln w="19050">
+            <a:solidFill>
+              <a:srgbClr val="7030A0"/>
+            </a:solidFill>
+          </a:ln>
+          <a:effectLst/>
+        </p:spPr>
+        <p:style>
+          <a:lnRef idx="1">
+            <a:schemeClr val="accent4"/>
+          </a:lnRef>
+          <a:fillRef idx="2">
+            <a:schemeClr val="accent4"/>
+          </a:fillRef>
+          <a:effectRef idx="1">
+            <a:schemeClr val="accent4"/>
+          </a:effectRef>
+          <a:fontRef idx="minor">
+            <a:schemeClr val="dk1"/>
+          </a:fontRef>
+        </p:style>
+        <p:txBody>
+          <a:bodyPr rtlCol="0" anchor="ctr"/>
+          <a:lstStyle/>
+          <a:p>
+            <a:pPr algn="ctr"/>
+            <a:r>
+              <a:rPr lang="en-US" sz="1050" dirty="0" err="1">
+                <a:solidFill>
+                  <a:srgbClr val="7030A0"/>
+                </a:solidFill>
+              </a:rPr>
+              <a:t>FinanceTracker</a:t>
+            </a:r>
+            <a:endParaRPr lang="en-SG" sz="1050" dirty="0">
+              <a:solidFill>
+                <a:srgbClr val="7030A0"/>
+              </a:solidFill>
+            </a:endParaRPr>
+          </a:p>
+        </p:txBody>
+      </p:sp>
+      <p:sp>
+        <p:nvSpPr>
+          <p:cNvPr id="68" name="Isosceles Triangle 102"/>
+          <p:cNvSpPr/>
+          <p:nvPr/>
+        </p:nvSpPr>
+        <p:spPr>
+          <a:xfrm rot="16200000">
+            <a:off x="2669073" y="2069158"/>
+            <a:ext cx="271014" cy="187417"/>
+          </a:xfrm>
+          <a:prstGeom prst="triangle">
+            <a:avLst>
+              <a:gd name="adj" fmla="val 44517"/>
+            </a:avLst>
+          </a:prstGeom>
+          <a:solidFill>
+            <a:schemeClr val="accent4">
+              <a:lumMod val="20000"/>
+              <a:lumOff val="80000"/>
+            </a:schemeClr>
+          </a:solidFill>
+          <a:ln w="19050">
+            <a:solidFill>
+              <a:srgbClr val="7030A0"/>
+            </a:solidFill>
+          </a:ln>
+          <a:effectLst/>
+        </p:spPr>
+        <p:style>
+          <a:lnRef idx="1">
+            <a:schemeClr val="accent6"/>
+          </a:lnRef>
+          <a:fillRef idx="2">
+            <a:schemeClr val="accent6"/>
+          </a:fillRef>
+          <a:effectRef idx="1">
+            <a:schemeClr val="accent6"/>
+          </a:effectRef>
+          <a:fontRef idx="minor">
+            <a:schemeClr val="dk1"/>
+          </a:fontRef>
+        </p:style>
+        <p:txBody>
+          <a:bodyPr rtlCol="0" anchor="ctr"/>
+          <a:lstStyle/>
+          <a:p>
+            <a:pPr algn="ctr"/>
+            <a:endParaRPr lang="en-SG" sz="1050"/>
+          </a:p>
+        </p:txBody>
+      </p:sp>
+      <p:cxnSp>
+        <p:nvCxnSpPr>
+          <p:cNvPr id="69" name="Elbow Connector 63"/>
+          <p:cNvCxnSpPr>
+            <a:stCxn id="68" idx="3"/>
+            <a:endCxn id="55" idx="1"/>
+          </p:cNvCxnSpPr>
+          <p:nvPr/>
+        </p:nvCxnSpPr>
+        <p:spPr>
+          <a:xfrm>
+            <a:off x="2898289" y="2177727"/>
+            <a:ext cx="271892" cy="2821"/>
+          </a:xfrm>
+          <a:prstGeom prst="bentConnector3">
+            <a:avLst>
+              <a:gd name="adj1" fmla="val 50000"/>
+            </a:avLst>
+          </a:prstGeom>
+          <a:ln w="19050">
+            <a:solidFill>
+              <a:srgbClr val="7030A0"/>
+            </a:solidFill>
+            <a:prstDash val="sysDot"/>
+            <a:headEnd type="none" w="med" len="med"/>
+            <a:tailEnd type="none" w="med" len="med"/>
+          </a:ln>
+          <a:effectLst/>
+        </p:spPr>
+        <p:style>
+          <a:lnRef idx="1">
+            <a:schemeClr val="accent2"/>
+          </a:lnRef>
+          <a:fillRef idx="2">
+            <a:schemeClr val="accent2"/>
+          </a:fillRef>
+          <a:effectRef idx="1">
+            <a:schemeClr val="accent2"/>
+          </a:effectRef>
+          <a:fontRef idx="minor">
+            <a:schemeClr val="dk1"/>
+          </a:fontRef>
+        </p:style>
+      </p:cxnSp>
+      <p:sp>
+        <p:nvSpPr>
+          <p:cNvPr id="57" name="Rectangle 8">
+            <a:extLst>
+              <a:ext uri="{FF2B5EF4-FFF2-40B4-BE49-F238E27FC236}">
+                <a16:creationId xmlns:a16="http://schemas.microsoft.com/office/drawing/2014/main" id="{6A42DA50-9012-4391-9EF3-285E4FA3FCD8}"/>
+              </a:ext>
+            </a:extLst>
+          </p:cNvPr>
+          <p:cNvSpPr/>
+          <p:nvPr/>
+        </p:nvSpPr>
+        <p:spPr>
+          <a:xfrm>
+            <a:off x="4238892" y="3460864"/>
+            <a:ext cx="1293486" cy="346760"/>
+          </a:xfrm>
+          <a:prstGeom prst="rect">
+            <a:avLst/>
+          </a:prstGeom>
+          <a:ln w="19050">
+            <a:solidFill>
+              <a:srgbClr val="7030A0"/>
+            </a:solidFill>
+          </a:ln>
+          <a:effectLst/>
+        </p:spPr>
+        <p:style>
+          <a:lnRef idx="1">
+            <a:schemeClr val="accent4"/>
+          </a:lnRef>
+          <a:fillRef idx="2">
+            <a:schemeClr val="accent4"/>
+          </a:fillRef>
+          <a:effectRef idx="1">
+            <a:schemeClr val="accent4"/>
+          </a:effectRef>
+          <a:fontRef idx="minor">
+            <a:schemeClr val="dk1"/>
+          </a:fontRef>
+        </p:style>
+        <p:txBody>
+          <a:bodyPr rtlCol="0" anchor="ctr"/>
+          <a:lstStyle/>
+          <a:p>
+            <a:pPr algn="ctr"/>
+            <a:r>
+              <a:rPr lang="en-US" sz="1050" dirty="0">
+                <a:solidFill>
+                  <a:srgbClr val="7030A0"/>
+                </a:solidFill>
+              </a:rPr>
+              <a:t>&lt;&lt;interface&gt;&gt;</a:t>
+            </a:r>
+          </a:p>
+          <a:p>
+            <a:pPr algn="ctr"/>
+            <a:r>
+              <a:rPr lang="en-US" sz="1050" dirty="0" err="1">
+                <a:solidFill>
+                  <a:srgbClr val="7030A0"/>
+                </a:solidFill>
+              </a:rPr>
+              <a:t>ReadOnlyUserPrefs</a:t>
+            </a:r>
+            <a:endParaRPr lang="en-SG" sz="1050" dirty="0">
+              <a:solidFill>
+                <a:srgbClr val="7030A0"/>
+              </a:solidFill>
+            </a:endParaRPr>
+          </a:p>
+        </p:txBody>
+      </p:sp>
+      <p:sp>
+        <p:nvSpPr>
+          <p:cNvPr id="59" name="Isosceles Triangle 102">
+            <a:extLst>
+              <a:ext uri="{FF2B5EF4-FFF2-40B4-BE49-F238E27FC236}">
+                <a16:creationId xmlns:a16="http://schemas.microsoft.com/office/drawing/2014/main" id="{B263B2D7-6E76-465E-B40E-7E2A46254A84}"/>
+              </a:ext>
+            </a:extLst>
+          </p:cNvPr>
+          <p:cNvSpPr/>
+          <p:nvPr/>
+        </p:nvSpPr>
+        <p:spPr>
+          <a:xfrm rot="5400000" flipH="1">
+            <a:off x="3992636" y="3514414"/>
+            <a:ext cx="271014" cy="221497"/>
+          </a:xfrm>
+          <a:prstGeom prst="triangle">
+            <a:avLst>
+              <a:gd name="adj" fmla="val 44517"/>
+            </a:avLst>
+          </a:prstGeom>
+          <a:solidFill>
+            <a:schemeClr val="accent4">
+              <a:lumMod val="20000"/>
+              <a:lumOff val="80000"/>
+            </a:schemeClr>
+          </a:solidFill>
+          <a:ln w="19050">
+            <a:solidFill>
+              <a:srgbClr val="7030A0"/>
+            </a:solidFill>
+          </a:ln>
+          <a:effectLst/>
+        </p:spPr>
+        <p:style>
+          <a:lnRef idx="1">
+            <a:schemeClr val="accent6"/>
+          </a:lnRef>
+          <a:fillRef idx="2">
+            <a:schemeClr val="accent6"/>
+          </a:fillRef>
+          <a:effectRef idx="1">
+            <a:schemeClr val="accent6"/>
+          </a:effectRef>
+          <a:fontRef idx="minor">
+            <a:schemeClr val="dk1"/>
+          </a:fontRef>
+        </p:style>
+        <p:txBody>
+          <a:bodyPr rtlCol="0" anchor="ctr"/>
+          <a:lstStyle/>
+          <a:p>
+            <a:pPr algn="ctr"/>
+            <a:endParaRPr lang="en-SG" sz="1050"/>
+          </a:p>
+        </p:txBody>
+      </p:sp>
+      <p:cxnSp>
+        <p:nvCxnSpPr>
+          <p:cNvPr id="67" name="Elbow Connector 63">
+            <a:extLst>
+              <a:ext uri="{FF2B5EF4-FFF2-40B4-BE49-F238E27FC236}">
+                <a16:creationId xmlns:a16="http://schemas.microsoft.com/office/drawing/2014/main" id="{BA3A25CD-7C1D-4B3B-B294-1B05ABCFECFD}"/>
+              </a:ext>
+            </a:extLst>
+          </p:cNvPr>
+          <p:cNvCxnSpPr>
+            <a:cxnSpLocks/>
+            <a:stCxn id="59" idx="3"/>
+            <a:endCxn id="2" idx="3"/>
+          </p:cNvCxnSpPr>
+          <p:nvPr/>
+        </p:nvCxnSpPr>
+        <p:spPr>
+          <a:xfrm rot="10800000">
+            <a:off x="3703491" y="3636621"/>
+            <a:ext cx="313904" cy="3403"/>
+          </a:xfrm>
+          <a:prstGeom prst="bentConnector3">
+            <a:avLst>
+              <a:gd name="adj1" fmla="val 50000"/>
+            </a:avLst>
+          </a:prstGeom>
+          <a:ln w="19050">
+            <a:solidFill>
+              <a:srgbClr val="7030A0"/>
+            </a:solidFill>
+            <a:prstDash val="sysDot"/>
+            <a:headEnd type="none" w="med" len="med"/>
+            <a:tailEnd type="none" w="med" len="med"/>
           </a:ln>
           <a:effectLst/>
         </p:spPr>
@@ -4777,30 +5734,30 @@
       </p:cxnSp>
       <p:cxnSp>
         <p:nvCxnSpPr>
-          <p:cNvPr id="97" name="Elbow Connector 63"/>
-          <p:cNvCxnSpPr>
-            <a:cxnSpLocks/>
-            <a:stCxn id="99" idx="3"/>
-          </p:cNvCxnSpPr>
+          <p:cNvPr id="56" name="Straight Arrow Connector 55">
+            <a:extLst>
+              <a:ext uri="{FF2B5EF4-FFF2-40B4-BE49-F238E27FC236}">
+                <a16:creationId xmlns:a16="http://schemas.microsoft.com/office/drawing/2014/main" id="{4A5DED9B-0D9C-441F-B8CC-467FFF3784E6}"/>
+              </a:ext>
+            </a:extLst>
+          </p:cNvPr>
+          <p:cNvCxnSpPr/>
           <p:nvPr/>
         </p:nvCxnSpPr>
         <p:spPr>
-          <a:xfrm rot="16200000" flipH="1">
-            <a:off x="3566454" y="2680653"/>
-            <a:ext cx="274076" cy="1"/>
-          </a:xfrm>
-          <a:prstGeom prst="bentConnector3">
-            <a:avLst>
-              <a:gd name="adj1" fmla="val 50000"/>
-            </a:avLst>
+          <a:xfrm>
+            <a:off x="4324972" y="3007222"/>
+            <a:ext cx="367678" cy="12320"/>
+          </a:xfrm>
+          <a:prstGeom prst="straightConnector1">
+            <a:avLst/>
           </a:prstGeom>
           <a:ln w="19050">
             <a:solidFill>
               <a:srgbClr val="7030A0"/>
             </a:solidFill>
-            <a:prstDash val="sysDot"/>
             <a:headEnd type="none" w="med" len="med"/>
-            <a:tailEnd type="none" w="med" len="med"/>
+            <a:tailEnd type="arrow" w="med" len="med"/>
           </a:ln>
           <a:effectLst/>
         </p:spPr>
@@ -4819,263 +5776,37 @@
           </a:fontRef>
         </p:style>
       </p:cxnSp>
-      <p:sp>
-        <p:nvSpPr>
-          <p:cNvPr id="99" name="Isosceles Triangle 102"/>
-          <p:cNvSpPr/>
+      <p:cxnSp>
+        <p:nvCxnSpPr>
+          <p:cNvPr id="72" name="Elbow Connector 106">
+            <a:extLst>
+              <a:ext uri="{FF2B5EF4-FFF2-40B4-BE49-F238E27FC236}">
+                <a16:creationId xmlns:a16="http://schemas.microsoft.com/office/drawing/2014/main" id="{462BC69C-89CC-4ADF-8FF7-E3ABDD7B82E5}"/>
+              </a:ext>
+            </a:extLst>
+          </p:cNvPr>
+          <p:cNvCxnSpPr>
+            <a:cxnSpLocks/>
+            <a:stCxn id="51" idx="0"/>
+            <a:endCxn id="73" idx="2"/>
+          </p:cNvCxnSpPr>
           <p:nvPr/>
-        </p:nvSpPr>
-        <p:spPr>
-          <a:xfrm rot="10800000" flipV="1">
-            <a:off x="3562299" y="2386554"/>
-            <a:ext cx="282387" cy="157062"/>
-          </a:xfrm>
-          <a:prstGeom prst="triangle">
-            <a:avLst/>
-          </a:prstGeom>
-          <a:solidFill>
-            <a:schemeClr val="accent4">
-              <a:lumMod val="20000"/>
-              <a:lumOff val="80000"/>
-            </a:schemeClr>
-          </a:solidFill>
+        </p:nvCxnSpPr>
+        <p:spPr>
+          <a:xfrm rot="5400000" flipH="1" flipV="1">
+            <a:off x="4473766" y="2322818"/>
+            <a:ext cx="566945" cy="628485"/>
+          </a:xfrm>
+          <a:prstGeom prst="bentConnector3">
+            <a:avLst>
+              <a:gd name="adj1" fmla="val 50000"/>
+            </a:avLst>
+          </a:prstGeom>
           <a:ln w="19050">
             <a:solidFill>
               <a:srgbClr val="7030A0"/>
             </a:solidFill>
-          </a:ln>
-          <a:effectLst/>
-        </p:spPr>
-        <p:style>
-          <a:lnRef idx="1">
-            <a:schemeClr val="accent4"/>
-          </a:lnRef>
-          <a:fillRef idx="2">
-            <a:schemeClr val="accent4"/>
-          </a:fillRef>
-          <a:effectRef idx="1">
-            <a:schemeClr val="accent4"/>
-          </a:effectRef>
-          <a:fontRef idx="minor">
-            <a:schemeClr val="dk1"/>
-          </a:fontRef>
-        </p:style>
-        <p:txBody>
-          <a:bodyPr rtlCol="0" anchor="ctr"/>
-          <a:lstStyle/>
-          <a:p>
-            <a:pPr algn="ctr"/>
-            <a:endParaRPr lang="en-SG" sz="1050" b="1">
-              <a:solidFill>
-                <a:srgbClr val="92D050"/>
-              </a:solidFill>
-            </a:endParaRPr>
-          </a:p>
-        </p:txBody>
-      </p:sp>
-      <p:sp>
-        <p:nvSpPr>
-          <p:cNvPr id="100" name="Rectangle 8"/>
-          <p:cNvSpPr/>
-          <p:nvPr/>
-        </p:nvSpPr>
-        <p:spPr>
-          <a:xfrm>
-            <a:off x="1119866" y="1946417"/>
-            <a:ext cx="1584718" cy="416329"/>
-          </a:xfrm>
-          <a:prstGeom prst="rect">
-            <a:avLst/>
-          </a:prstGeom>
-          <a:ln w="19050">
-            <a:solidFill>
-              <a:srgbClr val="7030A0"/>
-            </a:solidFill>
-          </a:ln>
-          <a:effectLst/>
-        </p:spPr>
-        <p:style>
-          <a:lnRef idx="1">
-            <a:schemeClr val="accent4"/>
-          </a:lnRef>
-          <a:fillRef idx="2">
-            <a:schemeClr val="accent4"/>
-          </a:fillRef>
-          <a:effectRef idx="1">
-            <a:schemeClr val="accent4"/>
-          </a:effectRef>
-          <a:fontRef idx="minor">
-            <a:schemeClr val="dk1"/>
-          </a:fontRef>
-        </p:style>
-        <p:txBody>
-          <a:bodyPr rtlCol="0" anchor="ctr"/>
-          <a:lstStyle/>
-          <a:p>
-            <a:pPr algn="ctr"/>
-            <a:r>
-              <a:rPr lang="en-US" sz="1050" dirty="0">
-                <a:solidFill>
-                  <a:srgbClr val="7030A0"/>
-                </a:solidFill>
-              </a:rPr>
-              <a:t>&lt;&lt;interface&gt;&gt;</a:t>
-            </a:r>
-            <a:br>
-              <a:rPr lang="en-US" sz="1050" dirty="0">
-                <a:solidFill>
-                  <a:srgbClr val="7030A0"/>
-                </a:solidFill>
-              </a:rPr>
-            </a:br>
-            <a:r>
-              <a:rPr lang="en-US" sz="1050" dirty="0" err="1">
-                <a:solidFill>
-                  <a:srgbClr val="7030A0"/>
-                </a:solidFill>
-              </a:rPr>
-              <a:t>ReadOnlyFinanceTracker</a:t>
-            </a:r>
-            <a:endParaRPr lang="en-SG" sz="1050" dirty="0">
-              <a:solidFill>
-                <a:srgbClr val="7030A0"/>
-              </a:solidFill>
-            </a:endParaRPr>
-          </a:p>
-        </p:txBody>
-      </p:sp>
-      <p:sp>
-        <p:nvSpPr>
-          <p:cNvPr id="114" name="TextBox 113"/>
-          <p:cNvSpPr txBox="1"/>
-          <p:nvPr/>
-        </p:nvSpPr>
-        <p:spPr>
-          <a:xfrm rot="16200000">
-            <a:off x="6362886" y="3586305"/>
-            <a:ext cx="881018" cy="261610"/>
-          </a:xfrm>
-          <a:prstGeom prst="rect">
-            <a:avLst/>
-          </a:prstGeom>
-          <a:noFill/>
-        </p:spPr>
-        <p:txBody>
-          <a:bodyPr wrap="square" rtlCol="0">
-            <a:spAutoFit/>
-          </a:bodyPr>
-          <a:lstStyle/>
-          <a:p>
-            <a:pPr algn="r"/>
-            <a:r>
-              <a:rPr lang="en-US" sz="1100" dirty="0">
-                <a:solidFill>
-                  <a:srgbClr val="7030A0"/>
-                </a:solidFill>
-              </a:rPr>
-              <a:t>filtered list</a:t>
-            </a:r>
-            <a:endParaRPr lang="en-SG" sz="1100" dirty="0">
-              <a:solidFill>
-                <a:srgbClr val="7030A0"/>
-              </a:solidFill>
-            </a:endParaRPr>
-          </a:p>
-        </p:txBody>
-      </p:sp>
-      <p:sp>
-        <p:nvSpPr>
-          <p:cNvPr id="122" name="Rectangle 8"/>
-          <p:cNvSpPr/>
-          <p:nvPr/>
-        </p:nvSpPr>
-        <p:spPr>
-          <a:xfrm>
-            <a:off x="2057401" y="4239491"/>
-            <a:ext cx="1066800" cy="346760"/>
-          </a:xfrm>
-          <a:prstGeom prst="rect">
-            <a:avLst/>
-          </a:prstGeom>
-          <a:ln w="19050">
-            <a:solidFill>
-              <a:srgbClr val="7030A0"/>
-            </a:solidFill>
-          </a:ln>
-          <a:effectLst/>
-        </p:spPr>
-        <p:style>
-          <a:lnRef idx="1">
-            <a:schemeClr val="accent4"/>
-          </a:lnRef>
-          <a:fillRef idx="2">
-            <a:schemeClr val="accent4"/>
-          </a:fillRef>
-          <a:effectRef idx="1">
-            <a:schemeClr val="accent4"/>
-          </a:effectRef>
-          <a:fontRef idx="minor">
-            <a:schemeClr val="dk1"/>
-          </a:fontRef>
-        </p:style>
-        <p:txBody>
-          <a:bodyPr rtlCol="0" anchor="ctr"/>
-          <a:lstStyle/>
-          <a:p>
-            <a:pPr algn="ctr"/>
-            <a:r>
-              <a:rPr lang="en-US" sz="1050" dirty="0">
-                <a:solidFill>
-                  <a:srgbClr val="7030A0"/>
-                </a:solidFill>
-              </a:rPr>
-              <a:t>&lt;&lt;interface&gt;&gt;</a:t>
-            </a:r>
-            <a:br>
-              <a:rPr lang="en-US" sz="1050">
-                <a:solidFill>
-                  <a:srgbClr val="7030A0"/>
-                </a:solidFill>
-              </a:rPr>
-            </a:br>
-            <a:r>
-              <a:rPr lang="en-US" sz="1050" dirty="0" err="1">
-                <a:solidFill>
-                  <a:srgbClr val="7030A0"/>
-                </a:solidFill>
-              </a:rPr>
-              <a:t>ObservableList</a:t>
-            </a:r>
-            <a:endParaRPr lang="en-SG" sz="1050" dirty="0">
-              <a:solidFill>
-                <a:srgbClr val="7030A0"/>
-              </a:solidFill>
-            </a:endParaRPr>
-          </a:p>
-        </p:txBody>
-      </p:sp>
-      <p:cxnSp>
-        <p:nvCxnSpPr>
-          <p:cNvPr id="124" name="Elbow Connector 122"/>
-          <p:cNvCxnSpPr>
-            <a:stCxn id="119" idx="1"/>
-            <a:endCxn id="122" idx="1"/>
-          </p:cNvCxnSpPr>
-          <p:nvPr/>
-        </p:nvCxnSpPr>
-        <p:spPr>
-          <a:xfrm rot="16200000" flipH="1">
-            <a:off x="1364475" y="3719944"/>
-            <a:ext cx="831471" cy="554381"/>
-          </a:xfrm>
-          <a:prstGeom prst="bentConnector2">
-            <a:avLst/>
-          </a:prstGeom>
-          <a:ln w="19050">
-            <a:solidFill>
-              <a:srgbClr val="7030A0"/>
-            </a:solidFill>
-            <a:prstDash val="sysDot"/>
+            <a:prstDash val="solid"/>
             <a:headEnd type="none" w="med" len="med"/>
             <a:tailEnd type="arrow" w="med" len="med"/>
           </a:ln>
@@ -5098,205 +5829,10 @@
       </p:cxnSp>
       <p:sp>
         <p:nvSpPr>
-          <p:cNvPr id="54" name="TextBox 53"/>
-          <p:cNvSpPr txBox="1"/>
-          <p:nvPr/>
-        </p:nvSpPr>
-        <p:spPr>
-          <a:xfrm>
-            <a:off x="4429979" y="3111479"/>
-            <a:ext cx="189257" cy="178683"/>
-          </a:xfrm>
-          <a:prstGeom prst="rect">
-            <a:avLst/>
-          </a:prstGeom>
-          <a:noFill/>
-        </p:spPr>
-        <p:txBody>
-          <a:bodyPr wrap="square" lIns="0" tIns="0" rIns="0" bIns="0" rtlCol="0">
-            <a:noAutofit/>
-          </a:bodyPr>
-          <a:lstStyle/>
-          <a:p>
-            <a:pPr algn="ctr"/>
-            <a:r>
-              <a:rPr lang="en-US" sz="1100" dirty="0">
-                <a:solidFill>
-                  <a:srgbClr val="7030A0"/>
-                </a:solidFill>
-              </a:rPr>
-              <a:t>1</a:t>
-            </a:r>
-            <a:endParaRPr lang="en-SG" sz="1100" dirty="0">
-              <a:solidFill>
-                <a:srgbClr val="7030A0"/>
-              </a:solidFill>
-            </a:endParaRPr>
-          </a:p>
-        </p:txBody>
-      </p:sp>
-      <p:sp>
-        <p:nvSpPr>
-          <p:cNvPr id="61" name="TextBox 60"/>
-          <p:cNvSpPr txBox="1"/>
-          <p:nvPr/>
-        </p:nvSpPr>
-        <p:spPr>
-          <a:xfrm>
-            <a:off x="6135256" y="3097917"/>
-            <a:ext cx="189257" cy="178683"/>
-          </a:xfrm>
-          <a:prstGeom prst="rect">
-            <a:avLst/>
-          </a:prstGeom>
-          <a:noFill/>
-        </p:spPr>
-        <p:txBody>
-          <a:bodyPr wrap="square" lIns="0" tIns="0" rIns="0" bIns="0" rtlCol="0">
-            <a:noAutofit/>
-          </a:bodyPr>
-          <a:lstStyle/>
-          <a:p>
-            <a:pPr algn="ctr"/>
-            <a:r>
-              <a:rPr lang="en-US" sz="1100" dirty="0">
-                <a:solidFill>
-                  <a:srgbClr val="7030A0"/>
-                </a:solidFill>
-              </a:rPr>
-              <a:t>*</a:t>
-            </a:r>
-            <a:endParaRPr lang="en-SG" sz="1100" dirty="0">
-              <a:solidFill>
-                <a:srgbClr val="7030A0"/>
-              </a:solidFill>
-            </a:endParaRPr>
-          </a:p>
-        </p:txBody>
-      </p:sp>
-      <p:sp>
-        <p:nvSpPr>
-          <p:cNvPr id="65" name="TextBox 64"/>
-          <p:cNvSpPr txBox="1"/>
-          <p:nvPr/>
-        </p:nvSpPr>
-        <p:spPr>
-          <a:xfrm>
-            <a:off x="2573394" y="2756715"/>
-            <a:ext cx="170110" cy="137542"/>
-          </a:xfrm>
-          <a:prstGeom prst="rect">
-            <a:avLst/>
-          </a:prstGeom>
-          <a:noFill/>
-        </p:spPr>
-        <p:txBody>
-          <a:bodyPr wrap="square" lIns="0" tIns="0" rIns="0" bIns="0" rtlCol="0">
-            <a:noAutofit/>
-          </a:bodyPr>
-          <a:lstStyle/>
-          <a:p>
-            <a:pPr algn="ctr"/>
-            <a:r>
-              <a:rPr lang="en-US" sz="1100" dirty="0">
-                <a:solidFill>
-                  <a:srgbClr val="7030A0"/>
-                </a:solidFill>
-              </a:rPr>
-              <a:t>1</a:t>
-            </a:r>
-            <a:endParaRPr lang="en-SG" sz="1100" dirty="0">
-              <a:solidFill>
-                <a:srgbClr val="7030A0"/>
-              </a:solidFill>
-            </a:endParaRPr>
-          </a:p>
-        </p:txBody>
-      </p:sp>
-      <p:sp>
-        <p:nvSpPr>
-          <p:cNvPr id="66" name="TextBox 65"/>
-          <p:cNvSpPr txBox="1"/>
-          <p:nvPr/>
-        </p:nvSpPr>
-        <p:spPr>
-          <a:xfrm>
-            <a:off x="2630191" y="3667737"/>
-            <a:ext cx="189257" cy="178683"/>
-          </a:xfrm>
-          <a:prstGeom prst="rect">
-            <a:avLst/>
-          </a:prstGeom>
-          <a:noFill/>
-        </p:spPr>
-        <p:txBody>
-          <a:bodyPr wrap="square" lIns="0" tIns="0" rIns="0" bIns="0" rtlCol="0">
-            <a:noAutofit/>
-          </a:bodyPr>
-          <a:lstStyle/>
-          <a:p>
-            <a:pPr algn="ctr"/>
-            <a:r>
-              <a:rPr lang="en-US" sz="1100" dirty="0">
-                <a:solidFill>
-                  <a:srgbClr val="7030A0"/>
-                </a:solidFill>
-              </a:rPr>
-              <a:t>1</a:t>
-            </a:r>
-            <a:endParaRPr lang="en-SG" sz="1100" dirty="0">
-              <a:solidFill>
-                <a:srgbClr val="7030A0"/>
-              </a:solidFill>
-            </a:endParaRPr>
-          </a:p>
-        </p:txBody>
-      </p:sp>
-      <p:sp>
-        <p:nvSpPr>
-          <p:cNvPr id="70" name="TextBox 69"/>
-          <p:cNvSpPr txBox="1"/>
-          <p:nvPr/>
-        </p:nvSpPr>
-        <p:spPr>
-          <a:xfrm>
-            <a:off x="6449896" y="3204826"/>
-            <a:ext cx="189257" cy="178683"/>
-          </a:xfrm>
-          <a:prstGeom prst="rect">
-            <a:avLst/>
-          </a:prstGeom>
-          <a:noFill/>
-        </p:spPr>
-        <p:txBody>
-          <a:bodyPr wrap="square" lIns="0" tIns="0" rIns="0" bIns="0" rtlCol="0">
-            <a:noAutofit/>
-          </a:bodyPr>
-          <a:lstStyle/>
-          <a:p>
-            <a:pPr algn="ctr"/>
-            <a:r>
-              <a:rPr lang="en-US" sz="1100" dirty="0">
-                <a:solidFill>
-                  <a:srgbClr val="7030A0"/>
-                </a:solidFill>
-              </a:rPr>
-              <a:t>1</a:t>
-            </a:r>
-            <a:endParaRPr lang="en-SG" sz="1100" dirty="0">
-              <a:solidFill>
-                <a:srgbClr val="7030A0"/>
-              </a:solidFill>
-            </a:endParaRPr>
-          </a:p>
-        </p:txBody>
-      </p:sp>
-      <p:sp>
-        <p:nvSpPr>
-          <p:cNvPr id="52" name="Rectangle 8">
+          <p:cNvPr id="73" name="Rectangle 8">
             <a:extLst>
               <a:ext uri="{FF2B5EF4-FFF2-40B4-BE49-F238E27FC236}">
-                <a16:creationId xmlns:a16="http://schemas.microsoft.com/office/drawing/2014/main" id="{ABDCDBD2-131A-4B66-A2F2-43BBEE82C773}"/>
+                <a16:creationId xmlns:a16="http://schemas.microsoft.com/office/drawing/2014/main" id="{D0865136-27AA-46B9-9D1E-A562EBABE3B5}"/>
               </a:ext>
             </a:extLst>
           </p:cNvPr>
@@ -5305,8 +5841,8 @@
         </p:nvSpPr>
         <p:spPr>
           <a:xfrm>
-            <a:off x="7712397" y="2228817"/>
-            <a:ext cx="812516" cy="285783"/>
+            <a:off x="4492996" y="2006827"/>
+            <a:ext cx="1156969" cy="346760"/>
           </a:xfrm>
           <a:prstGeom prst="rect">
             <a:avLst/>
@@ -5338,12 +5874,12 @@
           <a:p>
             <a:pPr algn="ctr"/>
             <a:r>
-              <a:rPr lang="en-US" sz="1050" dirty="0">
+              <a:rPr lang="en-US" sz="1050" dirty="0" err="1">
                 <a:solidFill>
                   <a:srgbClr val="7030A0"/>
                 </a:solidFill>
               </a:rPr>
-              <a:t>Name</a:t>
+              <a:t>TotalBudget</a:t>
             </a:r>
             <a:endParaRPr lang="en-SG" sz="1050" dirty="0">
               <a:solidFill>
@@ -5353,36 +5889,195 @@
           </a:p>
         </p:txBody>
       </p:sp>
+      <p:sp>
+        <p:nvSpPr>
+          <p:cNvPr id="74" name="TextBox 73">
+            <a:extLst>
+              <a:ext uri="{FF2B5EF4-FFF2-40B4-BE49-F238E27FC236}">
+                <a16:creationId xmlns:a16="http://schemas.microsoft.com/office/drawing/2014/main" id="{0AF665B4-AE9E-4CB1-BA32-75595166EEF1}"/>
+              </a:ext>
+            </a:extLst>
+          </p:cNvPr>
+          <p:cNvSpPr txBox="1"/>
+          <p:nvPr/>
+        </p:nvSpPr>
+        <p:spPr>
+          <a:xfrm>
+            <a:off x="4893731" y="2417149"/>
+            <a:ext cx="189257" cy="178683"/>
+          </a:xfrm>
+          <a:prstGeom prst="rect">
+            <a:avLst/>
+          </a:prstGeom>
+          <a:noFill/>
+        </p:spPr>
+        <p:txBody>
+          <a:bodyPr wrap="square" lIns="0" tIns="0" rIns="0" bIns="0" rtlCol="0">
+            <a:noAutofit/>
+          </a:bodyPr>
+          <a:lstStyle/>
+          <a:p>
+            <a:pPr algn="ctr"/>
+            <a:r>
+              <a:rPr lang="en-US" sz="1100" dirty="0">
+                <a:solidFill>
+                  <a:srgbClr val="7030A0"/>
+                </a:solidFill>
+              </a:rPr>
+              <a:t>1</a:t>
+            </a:r>
+            <a:endParaRPr lang="en-SG" sz="1100" dirty="0">
+              <a:solidFill>
+                <a:srgbClr val="7030A0"/>
+              </a:solidFill>
+            </a:endParaRPr>
+          </a:p>
+        </p:txBody>
+      </p:sp>
+      <p:sp>
+        <p:nvSpPr>
+          <p:cNvPr id="77" name="Flowchart: Decision 96">
+            <a:extLst>
+              <a:ext uri="{FF2B5EF4-FFF2-40B4-BE49-F238E27FC236}">
+                <a16:creationId xmlns:a16="http://schemas.microsoft.com/office/drawing/2014/main" id="{50FD01D9-FD04-4DEA-89DC-B401C5422152}"/>
+              </a:ext>
+            </a:extLst>
+          </p:cNvPr>
+          <p:cNvSpPr/>
+          <p:nvPr/>
+        </p:nvSpPr>
+        <p:spPr>
+          <a:xfrm>
+            <a:off x="5649965" y="2107753"/>
+            <a:ext cx="236048" cy="173380"/>
+          </a:xfrm>
+          <a:prstGeom prst="flowChartDecision">
+            <a:avLst/>
+          </a:prstGeom>
+          <a:solidFill>
+            <a:srgbClr val="7030A0"/>
+          </a:solidFill>
+          <a:ln w="19050">
+            <a:solidFill>
+              <a:srgbClr val="7030A0"/>
+            </a:solidFill>
+          </a:ln>
+          <a:effectLst/>
+        </p:spPr>
+        <p:style>
+          <a:lnRef idx="1">
+            <a:schemeClr val="accent6"/>
+          </a:lnRef>
+          <a:fillRef idx="2">
+            <a:schemeClr val="accent6"/>
+          </a:fillRef>
+          <a:effectRef idx="1">
+            <a:schemeClr val="accent6"/>
+          </a:effectRef>
+          <a:fontRef idx="minor">
+            <a:schemeClr val="dk1"/>
+          </a:fontRef>
+        </p:style>
+        <p:txBody>
+          <a:bodyPr rtlCol="0" anchor="ctr"/>
+          <a:lstStyle/>
+          <a:p>
+            <a:pPr algn="ctr"/>
+            <a:endParaRPr lang="en-US" sz="1050"/>
+          </a:p>
+        </p:txBody>
+      </p:sp>
+      <p:sp>
+        <p:nvSpPr>
+          <p:cNvPr id="88" name="Rectangle 8">
+            <a:extLst>
+              <a:ext uri="{FF2B5EF4-FFF2-40B4-BE49-F238E27FC236}">
+                <a16:creationId xmlns:a16="http://schemas.microsoft.com/office/drawing/2014/main" id="{7DAE10C0-6F74-42D9-956D-0E82BD23B362}"/>
+              </a:ext>
+            </a:extLst>
+          </p:cNvPr>
+          <p:cNvSpPr/>
+          <p:nvPr/>
+        </p:nvSpPr>
+        <p:spPr>
+          <a:xfrm>
+            <a:off x="6094799" y="1162462"/>
+            <a:ext cx="1156969" cy="346760"/>
+          </a:xfrm>
+          <a:prstGeom prst="rect">
+            <a:avLst/>
+          </a:prstGeom>
+          <a:ln w="19050">
+            <a:solidFill>
+              <a:srgbClr val="7030A0"/>
+            </a:solidFill>
+          </a:ln>
+          <a:effectLst/>
+        </p:spPr>
+        <p:style>
+          <a:lnRef idx="1">
+            <a:schemeClr val="accent4"/>
+          </a:lnRef>
+          <a:fillRef idx="2">
+            <a:schemeClr val="accent4"/>
+          </a:fillRef>
+          <a:effectRef idx="1">
+            <a:schemeClr val="accent4"/>
+          </a:effectRef>
+          <a:fontRef idx="minor">
+            <a:schemeClr val="dk1"/>
+          </a:fontRef>
+        </p:style>
+        <p:txBody>
+          <a:bodyPr rtlCol="0" anchor="ctr"/>
+          <a:lstStyle/>
+          <a:p>
+            <a:pPr algn="ctr"/>
+            <a:r>
+              <a:rPr lang="en-US" sz="1050" dirty="0" err="1">
+                <a:solidFill>
+                  <a:srgbClr val="7030A0"/>
+                </a:solidFill>
+              </a:rPr>
+              <a:t>CategoryBudget</a:t>
+            </a:r>
+            <a:endParaRPr lang="en-SG" sz="1050" dirty="0">
+              <a:solidFill>
+                <a:srgbClr val="7030A0"/>
+              </a:solidFill>
+            </a:endParaRPr>
+          </a:p>
+        </p:txBody>
+      </p:sp>
       <p:cxnSp>
         <p:nvCxnSpPr>
-          <p:cNvPr id="53" name="Elbow Connector 78">
+          <p:cNvPr id="90" name="Elbow Connector 106">
             <a:extLst>
               <a:ext uri="{FF2B5EF4-FFF2-40B4-BE49-F238E27FC236}">
-                <a16:creationId xmlns:a16="http://schemas.microsoft.com/office/drawing/2014/main" id="{B97967F8-618A-448B-81FD-CDFD4AF0EC64}"/>
+                <a16:creationId xmlns:a16="http://schemas.microsoft.com/office/drawing/2014/main" id="{7B494536-6821-4F73-9B07-70AB71675F47}"/>
               </a:ext>
             </a:extLst>
           </p:cNvPr>
           <p:cNvCxnSpPr>
             <a:cxnSpLocks/>
-            <a:stCxn id="78" idx="3"/>
-            <a:endCxn id="52" idx="1"/>
+            <a:stCxn id="77" idx="0"/>
+            <a:endCxn id="88" idx="1"/>
           </p:cNvCxnSpPr>
           <p:nvPr/>
         </p:nvCxnSpPr>
         <p:spPr>
-          <a:xfrm flipV="1">
-            <a:off x="7277995" y="2371709"/>
-            <a:ext cx="434402" cy="663182"/>
-          </a:xfrm>
-          <a:prstGeom prst="bentConnector3">
-            <a:avLst>
-              <a:gd name="adj1" fmla="val 50000"/>
-            </a:avLst>
+          <a:xfrm rot="5400000" flipH="1" flipV="1">
+            <a:off x="5545439" y="1558393"/>
+            <a:ext cx="771911" cy="326810"/>
+          </a:xfrm>
+          <a:prstGeom prst="bentConnector2">
+            <a:avLst/>
           </a:prstGeom>
           <a:ln w="19050">
             <a:solidFill>
               <a:srgbClr val="7030A0"/>
             </a:solidFill>
+            <a:prstDash val="solid"/>
             <a:headEnd type="none" w="med" len="med"/>
             <a:tailEnd type="arrow" w="med" len="med"/>
           </a:ln>
@@ -5405,10 +6100,10 @@
       </p:cxnSp>
       <p:sp>
         <p:nvSpPr>
-          <p:cNvPr id="50" name="TextBox 49">
+          <p:cNvPr id="91" name="TextBox 90">
             <a:extLst>
               <a:ext uri="{FF2B5EF4-FFF2-40B4-BE49-F238E27FC236}">
-                <a16:creationId xmlns:a16="http://schemas.microsoft.com/office/drawing/2014/main" id="{B3FA9D57-880F-49C4-AD0B-A64E30D6F403}"/>
+                <a16:creationId xmlns:a16="http://schemas.microsoft.com/office/drawing/2014/main" id="{0FDD5B0C-E0BF-4892-8847-696CC55FF448}"/>
               </a:ext>
             </a:extLst>
           </p:cNvPr>
@@ -5417,8 +6112,8 @@
         </p:nvSpPr>
         <p:spPr>
           <a:xfrm>
-            <a:off x="7466243" y="2255711"/>
-            <a:ext cx="189257" cy="178683"/>
+            <a:off x="5835356" y="1162463"/>
+            <a:ext cx="236048" cy="217918"/>
           </a:xfrm>
           <a:prstGeom prst="rect">
             <a:avLst/>
@@ -5432,6 +6127,14 @@
           <a:lstStyle/>
           <a:p>
             <a:pPr algn="ctr"/>
+            <a:r>
+              <a:rPr lang="en-US" sz="1100" dirty="0">
+                <a:solidFill>
+                  <a:srgbClr val="7030A0"/>
+                </a:solidFill>
+              </a:rPr>
+              <a:t>*</a:t>
+            </a:r>
             <a:endParaRPr lang="en-SG" sz="1100" dirty="0">
               <a:solidFill>
                 <a:srgbClr val="7030A0"/>
@@ -5442,18 +6145,25 @@
       </p:sp>
       <p:sp>
         <p:nvSpPr>
-          <p:cNvPr id="55" name="Rectangle 8"/>
+          <p:cNvPr id="92" name="Flowchart: Decision 96">
+            <a:extLst>
+              <a:ext uri="{FF2B5EF4-FFF2-40B4-BE49-F238E27FC236}">
+                <a16:creationId xmlns:a16="http://schemas.microsoft.com/office/drawing/2014/main" id="{3C1D4C87-AFEA-4E15-82B4-6421BE046631}"/>
+              </a:ext>
+            </a:extLst>
+          </p:cNvPr>
           <p:cNvSpPr/>
           <p:nvPr/>
         </p:nvSpPr>
         <p:spPr>
-          <a:xfrm>
-            <a:off x="3170181" y="1998350"/>
-            <a:ext cx="1060683" cy="364396"/>
-          </a:xfrm>
-          <a:prstGeom prst="rect">
+          <a:xfrm rot="16200000">
+            <a:off x="6538629" y="2639735"/>
+            <a:ext cx="236048" cy="173380"/>
+          </a:xfrm>
+          <a:prstGeom prst="flowChartDecision">
             <a:avLst/>
           </a:prstGeom>
+          <a:noFill/>
           <a:ln w="19050">
             <a:solidFill>
               <a:srgbClr val="7030A0"/>
@@ -5463,13 +6173,13 @@
         </p:spPr>
         <p:style>
           <a:lnRef idx="1">
-            <a:schemeClr val="accent4"/>
+            <a:schemeClr val="accent6"/>
           </a:lnRef>
           <a:fillRef idx="2">
-            <a:schemeClr val="accent4"/>
+            <a:schemeClr val="accent6"/>
           </a:fillRef>
           <a:effectRef idx="1">
-            <a:schemeClr val="accent4"/>
+            <a:schemeClr val="accent6"/>
           </a:effectRef>
           <a:fontRef idx="minor">
             <a:schemeClr val="dk1"/>
@@ -5480,15 +6190,48 @@
           <a:lstStyle/>
           <a:p>
             <a:pPr algn="ctr"/>
-            <a:r>
-              <a:rPr lang="en-US" sz="1050" dirty="0" err="1">
+            <a:endParaRPr lang="en-US" sz="1050"/>
+          </a:p>
+        </p:txBody>
+      </p:sp>
+      <p:sp>
+        <p:nvSpPr>
+          <p:cNvPr id="95" name="TextBox 94">
+            <a:extLst>
+              <a:ext uri="{FF2B5EF4-FFF2-40B4-BE49-F238E27FC236}">
+                <a16:creationId xmlns:a16="http://schemas.microsoft.com/office/drawing/2014/main" id="{D775EC04-5CBF-4F45-BBE9-6DF8653792CA}"/>
+              </a:ext>
+            </a:extLst>
+          </p:cNvPr>
+          <p:cNvSpPr txBox="1"/>
+          <p:nvPr/>
+        </p:nvSpPr>
+        <p:spPr>
+          <a:xfrm>
+            <a:off x="6444001" y="2256337"/>
+            <a:ext cx="189257" cy="178683"/>
+          </a:xfrm>
+          <a:prstGeom prst="rect">
+            <a:avLst/>
+          </a:prstGeom>
+          <a:noFill/>
+        </p:spPr>
+        <p:txBody>
+          <a:bodyPr wrap="square" lIns="0" tIns="0" rIns="0" bIns="0" rtlCol="0">
+            <a:noAutofit/>
+          </a:bodyPr>
+          <a:lstStyle/>
+          <a:p>
+            <a:pPr algn="ctr"/>
+            <a:r>
+              <a:rPr lang="en-US" sz="1100" dirty="0">
                 <a:solidFill>
                   <a:srgbClr val="7030A0"/>
                 </a:solidFill>
               </a:rPr>
-              <a:t>FinanceTracker</a:t>
-            </a:r>
-            <a:endParaRPr lang="en-SG" sz="1050" dirty="0">
+              <a:t>1</a:t>
+            </a:r>
+            <a:endParaRPr lang="en-SG" sz="1100" dirty="0">
               <a:solidFill>
                 <a:srgbClr val="7030A0"/>
               </a:solidFill>
@@ -5496,19 +6239,75 @@
           </a:p>
         </p:txBody>
       </p:sp>
+      <p:sp>
+        <p:nvSpPr>
+          <p:cNvPr id="102" name="Flowchart: Decision 96">
+            <a:extLst>
+              <a:ext uri="{FF2B5EF4-FFF2-40B4-BE49-F238E27FC236}">
+                <a16:creationId xmlns:a16="http://schemas.microsoft.com/office/drawing/2014/main" id="{F62BB88D-CD3A-4B7E-BD0C-6318CA20BD9A}"/>
+              </a:ext>
+            </a:extLst>
+          </p:cNvPr>
+          <p:cNvSpPr/>
+          <p:nvPr/>
+        </p:nvSpPr>
+        <p:spPr>
+          <a:xfrm rot="16200000">
+            <a:off x="6539349" y="1558319"/>
+            <a:ext cx="236048" cy="173380"/>
+          </a:xfrm>
+          <a:prstGeom prst="flowChartDecision">
+            <a:avLst/>
+          </a:prstGeom>
+          <a:noFill/>
+          <a:ln w="19050">
+            <a:solidFill>
+              <a:srgbClr val="7030A0"/>
+            </a:solidFill>
+          </a:ln>
+          <a:effectLst/>
+        </p:spPr>
+        <p:style>
+          <a:lnRef idx="1">
+            <a:schemeClr val="accent6"/>
+          </a:lnRef>
+          <a:fillRef idx="2">
+            <a:schemeClr val="accent6"/>
+          </a:fillRef>
+          <a:effectRef idx="1">
+            <a:schemeClr val="accent6"/>
+          </a:effectRef>
+          <a:fontRef idx="minor">
+            <a:schemeClr val="dk1"/>
+          </a:fontRef>
+        </p:style>
+        <p:txBody>
+          <a:bodyPr rtlCol="0" anchor="ctr"/>
+          <a:lstStyle/>
+          <a:p>
+            <a:pPr algn="ctr"/>
+            <a:endParaRPr lang="en-US" sz="1050"/>
+          </a:p>
+        </p:txBody>
+      </p:sp>
       <p:cxnSp>
         <p:nvCxnSpPr>
-          <p:cNvPr id="60" name="Straight Arrow Connector 59"/>
+          <p:cNvPr id="103" name="Straight Arrow Connector 102">
+            <a:extLst>
+              <a:ext uri="{FF2B5EF4-FFF2-40B4-BE49-F238E27FC236}">
+                <a16:creationId xmlns:a16="http://schemas.microsoft.com/office/drawing/2014/main" id="{086B0C84-58C3-4B6C-8595-A564D051E46F}"/>
+              </a:ext>
+            </a:extLst>
+          </p:cNvPr>
           <p:cNvCxnSpPr>
-            <a:stCxn id="51" idx="1"/>
-            <a:endCxn id="49" idx="1"/>
+            <a:cxnSpLocks/>
           </p:cNvCxnSpPr>
           <p:nvPr/>
         </p:nvCxnSpPr>
         <p:spPr>
-          <a:xfrm>
-            <a:off x="4324972" y="3007222"/>
-            <a:ext cx="367678" cy="12320"/>
+          <a:xfrm flipH="1" flipV="1">
+            <a:off x="6649061" y="2268037"/>
+            <a:ext cx="7592" cy="340364"/>
           </a:xfrm>
           <a:prstGeom prst="straightConnector1">
             <a:avLst/>
@@ -5537,84 +6336,36 @@
           </a:fontRef>
         </p:style>
       </p:cxnSp>
-      <p:sp>
-        <p:nvSpPr>
-          <p:cNvPr id="68" name="Isosceles Triangle 102"/>
-          <p:cNvSpPr/>
+      <p:cxnSp>
+        <p:nvCxnSpPr>
+          <p:cNvPr id="104" name="Straight Arrow Connector 103">
+            <a:extLst>
+              <a:ext uri="{FF2B5EF4-FFF2-40B4-BE49-F238E27FC236}">
+                <a16:creationId xmlns:a16="http://schemas.microsoft.com/office/drawing/2014/main" id="{F8B5B2C9-7A07-4402-9439-653B3CDE84B0}"/>
+              </a:ext>
+            </a:extLst>
+          </p:cNvPr>
+          <p:cNvCxnSpPr>
+            <a:cxnSpLocks/>
+            <a:stCxn id="102" idx="1"/>
+            <a:endCxn id="85" idx="0"/>
+          </p:cNvCxnSpPr>
           <p:nvPr/>
-        </p:nvSpPr>
-        <p:spPr>
-          <a:xfrm rot="16200000">
-            <a:off x="2669073" y="2069158"/>
-            <a:ext cx="271014" cy="187417"/>
-          </a:xfrm>
-          <a:prstGeom prst="triangle">
-            <a:avLst>
-              <a:gd name="adj" fmla="val 44517"/>
-            </a:avLst>
-          </a:prstGeom>
-          <a:solidFill>
-            <a:schemeClr val="accent4">
-              <a:lumMod val="20000"/>
-              <a:lumOff val="80000"/>
-            </a:schemeClr>
-          </a:solidFill>
+        </p:nvCxnSpPr>
+        <p:spPr>
+          <a:xfrm>
+            <a:off x="6657373" y="1763033"/>
+            <a:ext cx="6842" cy="219220"/>
+          </a:xfrm>
+          <a:prstGeom prst="straightConnector1">
+            <a:avLst/>
+          </a:prstGeom>
           <a:ln w="19050">
             <a:solidFill>
               <a:srgbClr val="7030A0"/>
             </a:solidFill>
-          </a:ln>
-          <a:effectLst/>
-        </p:spPr>
-        <p:style>
-          <a:lnRef idx="1">
-            <a:schemeClr val="accent6"/>
-          </a:lnRef>
-          <a:fillRef idx="2">
-            <a:schemeClr val="accent6"/>
-          </a:fillRef>
-          <a:effectRef idx="1">
-            <a:schemeClr val="accent6"/>
-          </a:effectRef>
-          <a:fontRef idx="minor">
-            <a:schemeClr val="dk1"/>
-          </a:fontRef>
-        </p:style>
-        <p:txBody>
-          <a:bodyPr rtlCol="0" anchor="ctr"/>
-          <a:lstStyle/>
-          <a:p>
-            <a:pPr algn="ctr"/>
-            <a:endParaRPr lang="en-SG" sz="1050"/>
-          </a:p>
-        </p:txBody>
-      </p:sp>
-      <p:cxnSp>
-        <p:nvCxnSpPr>
-          <p:cNvPr id="69" name="Elbow Connector 63"/>
-          <p:cNvCxnSpPr>
-            <a:stCxn id="68" idx="3"/>
-            <a:endCxn id="55" idx="1"/>
-          </p:cNvCxnSpPr>
-          <p:nvPr/>
-        </p:nvCxnSpPr>
-        <p:spPr>
-          <a:xfrm>
-            <a:off x="2898289" y="2177727"/>
-            <a:ext cx="271892" cy="2821"/>
-          </a:xfrm>
-          <a:prstGeom prst="bentConnector3">
-            <a:avLst>
-              <a:gd name="adj1" fmla="val 50000"/>
-            </a:avLst>
-          </a:prstGeom>
-          <a:ln w="19050">
-            <a:solidFill>
-              <a:srgbClr val="7030A0"/>
-            </a:solidFill>
-            <a:prstDash val="sysDot"/>
             <a:headEnd type="none" w="med" len="med"/>
-            <a:tailEnd type="none" w="med" len="med"/>
+            <a:tailEnd type="arrow" w="med" len="med"/>
           </a:ln>
           <a:effectLst/>
         </p:spPr>
@@ -5635,10 +6386,55 @@
       </p:cxnSp>
       <p:sp>
         <p:nvSpPr>
-          <p:cNvPr id="57" name="Rectangle 8">
+          <p:cNvPr id="105" name="TextBox 104">
             <a:extLst>
               <a:ext uri="{FF2B5EF4-FFF2-40B4-BE49-F238E27FC236}">
-                <a16:creationId xmlns:a16="http://schemas.microsoft.com/office/drawing/2014/main" id="{6A42DA50-9012-4391-9EF3-285E4FA3FCD8}"/>
+                <a16:creationId xmlns:a16="http://schemas.microsoft.com/office/drawing/2014/main" id="{A34F2AFF-3A1C-4CE4-8FEC-A48F57002925}"/>
+              </a:ext>
+            </a:extLst>
+          </p:cNvPr>
+          <p:cNvSpPr txBox="1"/>
+          <p:nvPr/>
+        </p:nvSpPr>
+        <p:spPr>
+          <a:xfrm>
+            <a:off x="6465797" y="1770237"/>
+            <a:ext cx="189257" cy="178683"/>
+          </a:xfrm>
+          <a:prstGeom prst="rect">
+            <a:avLst/>
+          </a:prstGeom>
+          <a:noFill/>
+        </p:spPr>
+        <p:txBody>
+          <a:bodyPr wrap="square" lIns="0" tIns="0" rIns="0" bIns="0" rtlCol="0">
+            <a:noAutofit/>
+          </a:bodyPr>
+          <a:lstStyle/>
+          <a:p>
+            <a:pPr algn="ctr"/>
+            <a:r>
+              <a:rPr lang="en-US" sz="1100" dirty="0">
+                <a:solidFill>
+                  <a:srgbClr val="7030A0"/>
+                </a:solidFill>
+              </a:rPr>
+              <a:t>1</a:t>
+            </a:r>
+            <a:endParaRPr lang="en-SG" sz="1100" dirty="0">
+              <a:solidFill>
+                <a:srgbClr val="7030A0"/>
+              </a:solidFill>
+            </a:endParaRPr>
+          </a:p>
+        </p:txBody>
+      </p:sp>
+      <p:sp>
+        <p:nvSpPr>
+          <p:cNvPr id="106" name="Isosceles Triangle 102">
+            <a:extLst>
+              <a:ext uri="{FF2B5EF4-FFF2-40B4-BE49-F238E27FC236}">
+                <a16:creationId xmlns:a16="http://schemas.microsoft.com/office/drawing/2014/main" id="{95F1E6B0-F380-4E3D-8222-1449C8256855}"/>
               </a:ext>
             </a:extLst>
           </p:cNvPr>
@@ -5646,13 +6442,19 @@
           <p:nvPr/>
         </p:nvSpPr>
         <p:spPr>
-          <a:xfrm>
-            <a:off x="4238892" y="3460864"/>
-            <a:ext cx="1293486" cy="346760"/>
-          </a:xfrm>
-          <a:prstGeom prst="rect">
+          <a:xfrm rot="10800000" flipV="1">
+            <a:off x="4930286" y="1547749"/>
+            <a:ext cx="282387" cy="157062"/>
+          </a:xfrm>
+          <a:prstGeom prst="triangle">
             <a:avLst/>
           </a:prstGeom>
+          <a:solidFill>
+            <a:schemeClr val="accent4">
+              <a:lumMod val="20000"/>
+              <a:lumOff val="80000"/>
+            </a:schemeClr>
+          </a:solidFill>
           <a:ln w="19050">
             <a:solidFill>
               <a:srgbClr val="7030A0"/>
@@ -5679,111 +6481,32 @@
           <a:lstStyle/>
           <a:p>
             <a:pPr algn="ctr"/>
-            <a:r>
-              <a:rPr lang="en-US" sz="1050" dirty="0">
-                <a:solidFill>
-                  <a:srgbClr val="7030A0"/>
-                </a:solidFill>
-              </a:rPr>
-              <a:t>&lt;&lt;interface&gt;&gt;</a:t>
-            </a:r>
-          </a:p>
-          <a:p>
-            <a:pPr algn="ctr"/>
-            <a:r>
-              <a:rPr lang="en-US" sz="1050" dirty="0" err="1">
-                <a:solidFill>
-                  <a:srgbClr val="7030A0"/>
-                </a:solidFill>
-              </a:rPr>
-              <a:t>ReadOnlyUserPrefs</a:t>
-            </a:r>
-            <a:endParaRPr lang="en-SG" sz="1050" dirty="0">
+            <a:endParaRPr lang="en-SG" sz="1050" b="1">
               <a:solidFill>
-                <a:srgbClr val="7030A0"/>
+                <a:srgbClr val="92D050"/>
               </a:solidFill>
             </a:endParaRPr>
           </a:p>
         </p:txBody>
       </p:sp>
-      <p:sp>
-        <p:nvSpPr>
-          <p:cNvPr id="59" name="Isosceles Triangle 102">
+      <p:cxnSp>
+        <p:nvCxnSpPr>
+          <p:cNvPr id="108" name="Elbow Connector 63">
             <a:extLst>
               <a:ext uri="{FF2B5EF4-FFF2-40B4-BE49-F238E27FC236}">
-                <a16:creationId xmlns:a16="http://schemas.microsoft.com/office/drawing/2014/main" id="{B263B2D7-6E76-465E-B40E-7E2A46254A84}"/>
-              </a:ext>
-            </a:extLst>
-          </p:cNvPr>
-          <p:cNvSpPr/>
-          <p:nvPr/>
-        </p:nvSpPr>
-        <p:spPr>
-          <a:xfrm rot="5400000" flipH="1">
-            <a:off x="3992636" y="3514414"/>
-            <a:ext cx="271014" cy="221497"/>
-          </a:xfrm>
-          <a:prstGeom prst="triangle">
-            <a:avLst>
-              <a:gd name="adj" fmla="val 44517"/>
-            </a:avLst>
-          </a:prstGeom>
-          <a:solidFill>
-            <a:schemeClr val="accent4">
-              <a:lumMod val="20000"/>
-              <a:lumOff val="80000"/>
-            </a:schemeClr>
-          </a:solidFill>
-          <a:ln w="19050">
-            <a:solidFill>
-              <a:srgbClr val="7030A0"/>
-            </a:solidFill>
-          </a:ln>
-          <a:effectLst/>
-        </p:spPr>
-        <p:style>
-          <a:lnRef idx="1">
-            <a:schemeClr val="accent6"/>
-          </a:lnRef>
-          <a:fillRef idx="2">
-            <a:schemeClr val="accent6"/>
-          </a:fillRef>
-          <a:effectRef idx="1">
-            <a:schemeClr val="accent6"/>
-          </a:effectRef>
-          <a:fontRef idx="minor">
-            <a:schemeClr val="dk1"/>
-          </a:fontRef>
-        </p:style>
-        <p:txBody>
-          <a:bodyPr rtlCol="0" anchor="ctr"/>
-          <a:lstStyle/>
-          <a:p>
-            <a:pPr algn="ctr"/>
-            <a:endParaRPr lang="en-SG" sz="1050"/>
-          </a:p>
-        </p:txBody>
-      </p:sp>
-      <p:cxnSp>
-        <p:nvCxnSpPr>
-          <p:cNvPr id="67" name="Elbow Connector 63">
-            <a:extLst>
-              <a:ext uri="{FF2B5EF4-FFF2-40B4-BE49-F238E27FC236}">
-                <a16:creationId xmlns:a16="http://schemas.microsoft.com/office/drawing/2014/main" id="{BA3A25CD-7C1D-4B3B-B294-1B05ABCFECFD}"/>
+                <a16:creationId xmlns:a16="http://schemas.microsoft.com/office/drawing/2014/main" id="{6E660294-63F8-423C-B004-550EF8B38174}"/>
               </a:ext>
             </a:extLst>
           </p:cNvPr>
           <p:cNvCxnSpPr>
             <a:cxnSpLocks/>
-            <a:stCxn id="59" idx="3"/>
-            <a:endCxn id="2" idx="3"/>
           </p:cNvCxnSpPr>
           <p:nvPr/>
         </p:nvCxnSpPr>
         <p:spPr>
-          <a:xfrm rot="10800000">
-            <a:off x="3703491" y="3636621"/>
-            <a:ext cx="313904" cy="3403"/>
+          <a:xfrm rot="16200000" flipH="1">
+            <a:off x="4937282" y="1863472"/>
+            <a:ext cx="274076" cy="1"/>
           </a:xfrm>
           <a:prstGeom prst="bentConnector3">
             <a:avLst>
@@ -5815,6 +6538,179 @@
           </a:fontRef>
         </p:style>
       </p:cxnSp>
+      <p:sp>
+        <p:nvSpPr>
+          <p:cNvPr id="109" name="Rectangle 8">
+            <a:extLst>
+              <a:ext uri="{FF2B5EF4-FFF2-40B4-BE49-F238E27FC236}">
+                <a16:creationId xmlns:a16="http://schemas.microsoft.com/office/drawing/2014/main" id="{BFD0F71B-2289-451A-B167-F0E461A6A795}"/>
+              </a:ext>
+            </a:extLst>
+          </p:cNvPr>
+          <p:cNvSpPr/>
+          <p:nvPr/>
+        </p:nvSpPr>
+        <p:spPr>
+          <a:xfrm>
+            <a:off x="4503776" y="1175494"/>
+            <a:ext cx="1060683" cy="364396"/>
+          </a:xfrm>
+          <a:prstGeom prst="rect">
+            <a:avLst/>
+          </a:prstGeom>
+          <a:ln w="19050">
+            <a:solidFill>
+              <a:srgbClr val="7030A0"/>
+            </a:solidFill>
+          </a:ln>
+          <a:effectLst/>
+        </p:spPr>
+        <p:style>
+          <a:lnRef idx="1">
+            <a:schemeClr val="accent4"/>
+          </a:lnRef>
+          <a:fillRef idx="2">
+            <a:schemeClr val="accent4"/>
+          </a:fillRef>
+          <a:effectRef idx="1">
+            <a:schemeClr val="accent4"/>
+          </a:effectRef>
+          <a:fontRef idx="minor">
+            <a:schemeClr val="dk1"/>
+          </a:fontRef>
+        </p:style>
+        <p:txBody>
+          <a:bodyPr rtlCol="0" anchor="ctr"/>
+          <a:lstStyle/>
+          <a:p>
+            <a:pPr algn="ctr"/>
+            <a:r>
+              <a:rPr lang="en-US" sz="1050" dirty="0">
+                <a:solidFill>
+                  <a:srgbClr val="7030A0"/>
+                </a:solidFill>
+              </a:rPr>
+              <a:t>Budget</a:t>
+            </a:r>
+            <a:endParaRPr lang="en-SG" sz="1050" dirty="0">
+              <a:solidFill>
+                <a:srgbClr val="7030A0"/>
+              </a:solidFill>
+            </a:endParaRPr>
+          </a:p>
+        </p:txBody>
+      </p:sp>
+      <p:cxnSp>
+        <p:nvCxnSpPr>
+          <p:cNvPr id="110" name="Elbow Connector 63">
+            <a:extLst>
+              <a:ext uri="{FF2B5EF4-FFF2-40B4-BE49-F238E27FC236}">
+                <a16:creationId xmlns:a16="http://schemas.microsoft.com/office/drawing/2014/main" id="{F18DD4F0-3E59-49B2-BDE1-F925415CB53D}"/>
+              </a:ext>
+            </a:extLst>
+          </p:cNvPr>
+          <p:cNvCxnSpPr>
+            <a:cxnSpLocks/>
+            <a:stCxn id="111" idx="3"/>
+            <a:endCxn id="88" idx="0"/>
+          </p:cNvCxnSpPr>
+          <p:nvPr/>
+        </p:nvCxnSpPr>
+        <p:spPr>
+          <a:xfrm rot="16200000" flipH="1">
+            <a:off x="5771946" y="261124"/>
+            <a:ext cx="183150" cy="1619526"/>
+          </a:xfrm>
+          <a:prstGeom prst="bentConnector3">
+            <a:avLst>
+              <a:gd name="adj1" fmla="val -124816"/>
+            </a:avLst>
+          </a:prstGeom>
+          <a:ln w="19050">
+            <a:solidFill>
+              <a:srgbClr val="7030A0"/>
+            </a:solidFill>
+            <a:prstDash val="sysDot"/>
+            <a:headEnd type="none" w="med" len="med"/>
+            <a:tailEnd type="none" w="med" len="med"/>
+          </a:ln>
+          <a:effectLst/>
+        </p:spPr>
+        <p:style>
+          <a:lnRef idx="1">
+            <a:schemeClr val="accent2"/>
+          </a:lnRef>
+          <a:fillRef idx="2">
+            <a:schemeClr val="accent2"/>
+          </a:fillRef>
+          <a:effectRef idx="1">
+            <a:schemeClr val="accent2"/>
+          </a:effectRef>
+          <a:fontRef idx="minor">
+            <a:schemeClr val="dk1"/>
+          </a:fontRef>
+        </p:style>
+      </p:cxnSp>
+      <p:sp>
+        <p:nvSpPr>
+          <p:cNvPr id="111" name="Isosceles Triangle 102">
+            <a:extLst>
+              <a:ext uri="{FF2B5EF4-FFF2-40B4-BE49-F238E27FC236}">
+                <a16:creationId xmlns:a16="http://schemas.microsoft.com/office/drawing/2014/main" id="{140C1446-EAE8-46A3-B5F4-A817A1F76125}"/>
+              </a:ext>
+            </a:extLst>
+          </p:cNvPr>
+          <p:cNvSpPr/>
+          <p:nvPr/>
+        </p:nvSpPr>
+        <p:spPr>
+          <a:xfrm flipV="1">
+            <a:off x="4912564" y="979312"/>
+            <a:ext cx="282387" cy="157062"/>
+          </a:xfrm>
+          <a:prstGeom prst="triangle">
+            <a:avLst/>
+          </a:prstGeom>
+          <a:solidFill>
+            <a:schemeClr val="accent4">
+              <a:lumMod val="20000"/>
+              <a:lumOff val="80000"/>
+            </a:schemeClr>
+          </a:solidFill>
+          <a:ln w="19050">
+            <a:solidFill>
+              <a:srgbClr val="7030A0"/>
+            </a:solidFill>
+          </a:ln>
+          <a:effectLst/>
+        </p:spPr>
+        <p:style>
+          <a:lnRef idx="1">
+            <a:schemeClr val="accent4"/>
+          </a:lnRef>
+          <a:fillRef idx="2">
+            <a:schemeClr val="accent4"/>
+          </a:fillRef>
+          <a:effectRef idx="1">
+            <a:schemeClr val="accent4"/>
+          </a:effectRef>
+          <a:fontRef idx="minor">
+            <a:schemeClr val="dk1"/>
+          </a:fontRef>
+        </p:style>
+        <p:txBody>
+          <a:bodyPr rtlCol="0" anchor="ctr"/>
+          <a:lstStyle/>
+          <a:p>
+            <a:pPr algn="ctr"/>
+            <a:endParaRPr lang="en-SG" sz="1050" b="1">
+              <a:solidFill>
+                <a:srgbClr val="92D050"/>
+              </a:solidFill>
+            </a:endParaRPr>
+          </a:p>
+        </p:txBody>
+      </p:sp>
     </p:spTree>
     <p:extLst>
       <p:ext uri="{BB962C8B-B14F-4D97-AF65-F5344CB8AC3E}">

</xml_diff>

<commit_message>
Updated the storage class diagram of developer guide
</commit_message>
<xml_diff>
--- a/docs/diagrams/ModelComponentClassDiagram.pptx
+++ b/docs/diagrams/ModelComponentClassDiagram.pptx
@@ -6513,11 +6513,11 @@
               <a:gd name="adj1" fmla="val 50000"/>
             </a:avLst>
           </a:prstGeom>
-          <a:ln w="19050">
+          <a:ln w="19050" cmpd="sng">
             <a:solidFill>
               <a:srgbClr val="7030A0"/>
             </a:solidFill>
-            <a:prstDash val="sysDot"/>
+            <a:prstDash val="solid"/>
             <a:headEnd type="none" w="med" len="med"/>
             <a:tailEnd type="none" w="med" len="med"/>
           </a:ln>
@@ -6626,11 +6626,11 @@
               <a:gd name="adj1" fmla="val -124816"/>
             </a:avLst>
           </a:prstGeom>
-          <a:ln w="19050">
+          <a:ln w="19050" cmpd="sng">
             <a:solidFill>
               <a:srgbClr val="7030A0"/>
             </a:solidFill>
-            <a:prstDash val="sysDot"/>
+            <a:prstDash val="solid"/>
             <a:headEnd type="none" w="med" len="med"/>
             <a:tailEnd type="none" w="med" len="med"/>
           </a:ln>

</xml_diff>

<commit_message>
Update diagrams, UG, DG and PPP
</commit_message>
<xml_diff>
--- a/docs/diagrams/ModelComponentClassDiagram.pptx
+++ b/docs/diagrams/ModelComponentClassDiagram.pptx
@@ -5,7 +5,7 @@
     <p:sldMasterId id="2147483648" r:id="rId1"/>
   </p:sldMasterIdLst>
   <p:notesMasterIdLst>
-    <p:notesMasterId r:id="rId7"/>
+    <p:notesMasterId r:id="rId8"/>
   </p:notesMasterIdLst>
   <p:sldIdLst>
     <p:sldId id="263" r:id="rId2"/>
@@ -13,6 +13,7 @@
     <p:sldId id="265" r:id="rId4"/>
     <p:sldId id="266" r:id="rId5"/>
     <p:sldId id="267" r:id="rId6"/>
+    <p:sldId id="268" r:id="rId7"/>
   </p:sldIdLst>
   <p:sldSz cx="9144000" cy="6858000" type="screen4x3"/>
   <p:notesSz cx="6858000" cy="9144000"/>
@@ -212,7 +213,7 @@
           <a:p>
             <a:fld id="{F5CC4B3F-88C1-4FFA-B1B6-F41C21DC6924}" type="datetimeFigureOut">
               <a:rPr lang="en-US" smtClean="0"/>
-              <a:t>4/11/19</a:t>
+              <a:t>4/15/19</a:t>
             </a:fld>
             <a:endParaRPr lang="en-US"/>
           </a:p>
@@ -751,6 +752,98 @@
 </p:notes>
 </file>
 
+<file path=ppt/notesSlides/notesSlide4.xml><?xml version="1.0" encoding="utf-8"?>
+<p:notes xmlns:a="http://schemas.openxmlformats.org/drawingml/2006/main" xmlns:r="http://schemas.openxmlformats.org/officeDocument/2006/relationships" xmlns:p="http://schemas.openxmlformats.org/presentationml/2006/main">
+  <p:cSld>
+    <p:spTree>
+      <p:nvGrpSpPr>
+        <p:cNvPr id="1" name=""/>
+        <p:cNvGrpSpPr/>
+        <p:nvPr/>
+      </p:nvGrpSpPr>
+      <p:grpSpPr>
+        <a:xfrm>
+          <a:off x="0" y="0"/>
+          <a:ext cx="0" cy="0"/>
+          <a:chOff x="0" y="0"/>
+          <a:chExt cx="0" cy="0"/>
+        </a:xfrm>
+      </p:grpSpPr>
+      <p:sp>
+        <p:nvSpPr>
+          <p:cNvPr id="2" name="Slide Image Placeholder 1"/>
+          <p:cNvSpPr>
+            <a:spLocks noGrp="1" noRot="1" noChangeAspect="1"/>
+          </p:cNvSpPr>
+          <p:nvPr>
+            <p:ph type="sldImg"/>
+          </p:nvPr>
+        </p:nvSpPr>
+        <p:spPr/>
+      </p:sp>
+      <p:sp>
+        <p:nvSpPr>
+          <p:cNvPr id="3" name="Notes Placeholder 2"/>
+          <p:cNvSpPr>
+            <a:spLocks noGrp="1"/>
+          </p:cNvSpPr>
+          <p:nvPr>
+            <p:ph type="body" idx="1"/>
+          </p:nvPr>
+        </p:nvSpPr>
+        <p:spPr/>
+        <p:txBody>
+          <a:bodyPr/>
+          <a:lstStyle/>
+          <a:p>
+            <a:r>
+              <a:rPr lang="en-US" dirty="0" smtClean="0"/>
+              <a:t>Without filtered</a:t>
+            </a:r>
+            <a:r>
+              <a:rPr lang="en-US" baseline="0" dirty="0" smtClean="0"/>
+              <a:t> list</a:t>
+            </a:r>
+            <a:endParaRPr lang="en-US" dirty="0"/>
+          </a:p>
+        </p:txBody>
+      </p:sp>
+      <p:sp>
+        <p:nvSpPr>
+          <p:cNvPr id="4" name="Slide Number Placeholder 3"/>
+          <p:cNvSpPr>
+            <a:spLocks noGrp="1"/>
+          </p:cNvSpPr>
+          <p:nvPr>
+            <p:ph type="sldNum" sz="quarter" idx="10"/>
+          </p:nvPr>
+        </p:nvSpPr>
+        <p:spPr/>
+        <p:txBody>
+          <a:bodyPr/>
+          <a:lstStyle/>
+          <a:p>
+            <a:fld id="{5A7AB025-77E3-4BD1-A2FD-B3183DBA47A3}" type="slidenum">
+              <a:rPr lang="en-US" smtClean="0"/>
+              <a:t>6</a:t>
+            </a:fld>
+            <a:endParaRPr lang="en-US"/>
+          </a:p>
+        </p:txBody>
+      </p:sp>
+    </p:spTree>
+    <p:extLst>
+      <p:ext uri="{BB962C8B-B14F-4D97-AF65-F5344CB8AC3E}">
+        <p14:creationId xmlns:p14="http://schemas.microsoft.com/office/powerpoint/2010/main" val="1588687795"/>
+      </p:ext>
+    </p:extLst>
+  </p:cSld>
+  <p:clrMapOvr>
+    <a:masterClrMapping/>
+  </p:clrMapOvr>
+</p:notes>
+</file>
+
 <file path=ppt/slideLayouts/slideLayout1.xml><?xml version="1.0" encoding="utf-8"?>
 <p:sldLayout xmlns:a="http://schemas.openxmlformats.org/drawingml/2006/main" xmlns:r="http://schemas.openxmlformats.org/officeDocument/2006/relationships" xmlns:p="http://schemas.openxmlformats.org/presentationml/2006/main" type="title" preserve="1">
   <p:cSld name="Title Slide">
@@ -930,7 +1023,7 @@
           <a:p>
             <a:fld id="{78C97017-6FC3-485B-9764-EAC9E56C1D49}" type="datetimeFigureOut">
               <a:rPr lang="en-US" smtClean="0"/>
-              <a:t>4/11/19</a:t>
+              <a:t>4/15/19</a:t>
             </a:fld>
             <a:endParaRPr lang="en-US"/>
           </a:p>
@@ -1098,7 +1191,7 @@
           <a:p>
             <a:fld id="{78C97017-6FC3-485B-9764-EAC9E56C1D49}" type="datetimeFigureOut">
               <a:rPr lang="en-US" smtClean="0"/>
-              <a:t>4/11/19</a:t>
+              <a:t>4/15/19</a:t>
             </a:fld>
             <a:endParaRPr lang="en-US"/>
           </a:p>
@@ -1276,7 +1369,7 @@
           <a:p>
             <a:fld id="{78C97017-6FC3-485B-9764-EAC9E56C1D49}" type="datetimeFigureOut">
               <a:rPr lang="en-US" smtClean="0"/>
-              <a:t>4/11/19</a:t>
+              <a:t>4/15/19</a:t>
             </a:fld>
             <a:endParaRPr lang="en-US"/>
           </a:p>
@@ -1444,7 +1537,7 @@
           <a:p>
             <a:fld id="{78C97017-6FC3-485B-9764-EAC9E56C1D49}" type="datetimeFigureOut">
               <a:rPr lang="en-US" smtClean="0"/>
-              <a:t>4/11/19</a:t>
+              <a:t>4/15/19</a:t>
             </a:fld>
             <a:endParaRPr lang="en-US"/>
           </a:p>
@@ -1689,7 +1782,7 @@
           <a:p>
             <a:fld id="{78C97017-6FC3-485B-9764-EAC9E56C1D49}" type="datetimeFigureOut">
               <a:rPr lang="en-US" smtClean="0"/>
-              <a:t>4/11/19</a:t>
+              <a:t>4/15/19</a:t>
             </a:fld>
             <a:endParaRPr lang="en-US"/>
           </a:p>
@@ -1974,7 +2067,7 @@
           <a:p>
             <a:fld id="{78C97017-6FC3-485B-9764-EAC9E56C1D49}" type="datetimeFigureOut">
               <a:rPr lang="en-US" smtClean="0"/>
-              <a:t>4/11/19</a:t>
+              <a:t>4/15/19</a:t>
             </a:fld>
             <a:endParaRPr lang="en-US"/>
           </a:p>
@@ -2393,7 +2486,7 @@
           <a:p>
             <a:fld id="{78C97017-6FC3-485B-9764-EAC9E56C1D49}" type="datetimeFigureOut">
               <a:rPr lang="en-US" smtClean="0"/>
-              <a:t>4/11/19</a:t>
+              <a:t>4/15/19</a:t>
             </a:fld>
             <a:endParaRPr lang="en-US"/>
           </a:p>
@@ -2510,7 +2603,7 @@
           <a:p>
             <a:fld id="{78C97017-6FC3-485B-9764-EAC9E56C1D49}" type="datetimeFigureOut">
               <a:rPr lang="en-US" smtClean="0"/>
-              <a:t>4/11/19</a:t>
+              <a:t>4/15/19</a:t>
             </a:fld>
             <a:endParaRPr lang="en-US"/>
           </a:p>
@@ -2605,7 +2698,7 @@
           <a:p>
             <a:fld id="{78C97017-6FC3-485B-9764-EAC9E56C1D49}" type="datetimeFigureOut">
               <a:rPr lang="en-US" smtClean="0"/>
-              <a:t>4/11/19</a:t>
+              <a:t>4/15/19</a:t>
             </a:fld>
             <a:endParaRPr lang="en-US"/>
           </a:p>
@@ -2880,7 +2973,7 @@
           <a:p>
             <a:fld id="{78C97017-6FC3-485B-9764-EAC9E56C1D49}" type="datetimeFigureOut">
               <a:rPr lang="en-US" smtClean="0"/>
-              <a:t>4/11/19</a:t>
+              <a:t>4/15/19</a:t>
             </a:fld>
             <a:endParaRPr lang="en-US"/>
           </a:p>
@@ -3132,7 +3225,7 @@
           <a:p>
             <a:fld id="{78C97017-6FC3-485B-9764-EAC9E56C1D49}" type="datetimeFigureOut">
               <a:rPr lang="en-US" smtClean="0"/>
-              <a:t>4/11/19</a:t>
+              <a:t>4/15/19</a:t>
             </a:fld>
             <a:endParaRPr lang="en-US"/>
           </a:p>
@@ -3343,7 +3436,7 @@
           <a:p>
             <a:fld id="{78C97017-6FC3-485B-9764-EAC9E56C1D49}" type="datetimeFigureOut">
               <a:rPr lang="en-US" smtClean="0"/>
-              <a:t>4/11/19</a:t>
+              <a:t>4/15/19</a:t>
             </a:fld>
             <a:endParaRPr lang="en-US"/>
           </a:p>
@@ -22155,7 +22248,7 @@
         <p:spPr>
           <a:xfrm>
             <a:off x="381000" y="956310"/>
-            <a:ext cx="10744200" cy="5596890"/>
+            <a:ext cx="11125200" cy="5596890"/>
           </a:xfrm>
           <a:prstGeom prst="roundRect">
             <a:avLst>
@@ -24973,7 +25066,7 @@
         </p:nvSpPr>
         <p:spPr>
           <a:xfrm>
-            <a:off x="8597606" y="2076029"/>
+            <a:off x="9094161" y="2087831"/>
             <a:ext cx="1003594" cy="340035"/>
           </a:xfrm>
           <a:prstGeom prst="rect">
@@ -25024,13 +25117,16 @@
       <p:cxnSp>
         <p:nvCxnSpPr>
           <p:cNvPr id="117" name="Elbow Connector 116"/>
-          <p:cNvCxnSpPr/>
+          <p:cNvCxnSpPr>
+            <a:stCxn id="115" idx="3"/>
+            <a:endCxn id="116" idx="1"/>
+          </p:cNvCxnSpPr>
           <p:nvPr/>
         </p:nvCxnSpPr>
         <p:spPr>
-          <a:xfrm flipV="1">
-            <a:off x="8163204" y="2248636"/>
-            <a:ext cx="434402" cy="4783"/>
+          <a:xfrm>
+            <a:off x="8163204" y="2253419"/>
+            <a:ext cx="930957" cy="4430"/>
           </a:xfrm>
           <a:prstGeom prst="bentConnector3">
             <a:avLst/>
@@ -25073,7 +25169,7 @@
         </p:nvSpPr>
         <p:spPr>
           <a:xfrm>
-            <a:off x="8619106" y="1569205"/>
+            <a:off x="9109854" y="1643737"/>
             <a:ext cx="982094" cy="293849"/>
           </a:xfrm>
           <a:prstGeom prst="rect">
@@ -25139,8 +25235,8 @@
         </p:nvCxnSpPr>
         <p:spPr>
           <a:xfrm rot="5400000" flipH="1" flipV="1">
-            <a:off x="8106844" y="1654467"/>
-            <a:ext cx="450599" cy="573926"/>
+            <a:off x="8389484" y="1446359"/>
+            <a:ext cx="376067" cy="1064674"/>
           </a:xfrm>
           <a:prstGeom prst="bentConnector2">
             <a:avLst/>
@@ -25592,8 +25688,8 @@
         </p:nvCxnSpPr>
         <p:spPr>
           <a:xfrm flipV="1">
-            <a:off x="8185567" y="2416064"/>
-            <a:ext cx="913836" cy="433756"/>
+            <a:off x="8185567" y="2427866"/>
+            <a:ext cx="1410391" cy="421954"/>
           </a:xfrm>
           <a:prstGeom prst="bentConnector2">
             <a:avLst/>
@@ -25988,7 +26084,7 @@
         </p:nvSpPr>
         <p:spPr>
           <a:xfrm>
-            <a:off x="8745310" y="3709191"/>
+            <a:off x="8634367" y="3850388"/>
             <a:ext cx="708186" cy="285783"/>
           </a:xfrm>
           <a:prstGeom prst="rect">
@@ -26096,7 +26192,7 @@
         <p:spPr>
           <a:xfrm>
             <a:off x="8180038" y="3459058"/>
-            <a:ext cx="565272" cy="393025"/>
+            <a:ext cx="454329" cy="534222"/>
           </a:xfrm>
           <a:prstGeom prst="bentConnector3">
             <a:avLst/>
@@ -26133,7 +26229,7 @@
         </p:nvSpPr>
         <p:spPr>
           <a:xfrm>
-            <a:off x="8745310" y="4091365"/>
+            <a:off x="8634367" y="4232562"/>
             <a:ext cx="708186" cy="285783"/>
           </a:xfrm>
           <a:prstGeom prst="rect">
@@ -26193,7 +26289,7 @@
         <p:spPr>
           <a:xfrm>
             <a:off x="8180038" y="3459058"/>
-            <a:ext cx="565272" cy="775199"/>
+            <a:ext cx="454329" cy="916396"/>
           </a:xfrm>
           <a:prstGeom prst="bentConnector3">
             <a:avLst/>
@@ -26236,7 +26332,7 @@
         </p:nvSpPr>
         <p:spPr>
           <a:xfrm>
-            <a:off x="8745310" y="3313851"/>
+            <a:off x="8634367" y="3455048"/>
             <a:ext cx="708186" cy="285783"/>
           </a:xfrm>
           <a:prstGeom prst="rect">
@@ -26301,9 +26397,9 @@
           <p:nvPr/>
         </p:nvCxnSpPr>
         <p:spPr>
-          <a:xfrm flipV="1">
-            <a:off x="8180038" y="3456743"/>
-            <a:ext cx="565272" cy="2315"/>
+          <a:xfrm>
+            <a:off x="8180038" y="3459058"/>
+            <a:ext cx="454329" cy="138882"/>
           </a:xfrm>
           <a:prstGeom prst="bentConnector3">
             <a:avLst>
@@ -26346,17 +26442,19 @@
           <p:cNvCxnSpPr>
             <a:cxnSpLocks/>
             <a:stCxn id="133" idx="3"/>
-            <a:endCxn id="148" idx="0"/>
+            <a:endCxn id="148" idx="3"/>
           </p:cNvCxnSpPr>
           <p:nvPr/>
         </p:nvCxnSpPr>
         <p:spPr>
           <a:xfrm>
             <a:off x="8185567" y="2849820"/>
-            <a:ext cx="913836" cy="464031"/>
-          </a:xfrm>
-          <a:prstGeom prst="bentConnector2">
-            <a:avLst/>
+            <a:ext cx="1156986" cy="748120"/>
+          </a:xfrm>
+          <a:prstGeom prst="bentConnector3">
+            <a:avLst>
+              <a:gd name="adj1" fmla="val 121894"/>
+            </a:avLst>
           </a:prstGeom>
           <a:ln w="19050">
             <a:solidFill>
@@ -27441,19 +27539,20 @@
         </p:nvCxnSpPr>
         <p:spPr>
           <a:xfrm flipH="1" flipV="1">
-            <a:off x="9601200" y="2246047"/>
-            <a:ext cx="768346" cy="2533877"/>
+            <a:off x="10097755" y="2257849"/>
+            <a:ext cx="271791" cy="2522075"/>
           </a:xfrm>
           <a:prstGeom prst="bentConnector3">
             <a:avLst>
-              <a:gd name="adj1" fmla="val -53036"/>
+              <a:gd name="adj1" fmla="val -338708"/>
             </a:avLst>
           </a:prstGeom>
           <a:ln w="19050">
             <a:solidFill>
               <a:srgbClr val="7030A0"/>
             </a:solidFill>
-            <a:tailEnd type="triangle"/>
+            <a:headEnd type="none" w="med" len="med"/>
+            <a:tailEnd type="arrow" w="med" len="med"/>
           </a:ln>
         </p:spPr>
         <p:style>
@@ -27526,7 +27625,7 @@
         </p:nvSpPr>
         <p:spPr>
           <a:xfrm>
-            <a:off x="9521701" y="2671080"/>
+            <a:off x="9908965" y="2663557"/>
             <a:ext cx="1124392" cy="346760"/>
           </a:xfrm>
           <a:prstGeom prst="rect">
@@ -27593,12 +27692,12 @@
         </p:nvCxnSpPr>
         <p:spPr>
           <a:xfrm flipV="1">
-            <a:off x="8185567" y="2844460"/>
-            <a:ext cx="1336134" cy="5360"/>
+            <a:off x="8185567" y="2836937"/>
+            <a:ext cx="1723398" cy="12883"/>
           </a:xfrm>
           <a:prstGeom prst="bentConnector3">
             <a:avLst>
-              <a:gd name="adj1" fmla="val 96131"/>
+              <a:gd name="adj1" fmla="val 50000"/>
             </a:avLst>
           </a:prstGeom>
           <a:ln w="19050">
@@ -28381,7 +28480,7 @@
         </p:nvSpPr>
         <p:spPr>
           <a:xfrm>
-            <a:off x="8423898" y="1447800"/>
+            <a:off x="8878543" y="1573917"/>
             <a:ext cx="189257" cy="178683"/>
           </a:xfrm>
           <a:prstGeom prst="rect">
@@ -28420,7 +28519,7 @@
         </p:nvSpPr>
         <p:spPr>
           <a:xfrm>
-            <a:off x="8435611" y="2023046"/>
+            <a:off x="8915400" y="2023046"/>
             <a:ext cx="189257" cy="178683"/>
           </a:xfrm>
           <a:prstGeom prst="rect">
@@ -28459,7 +28558,7 @@
         </p:nvSpPr>
         <p:spPr>
           <a:xfrm>
-            <a:off x="9102882" y="2431229"/>
+            <a:off x="9372600" y="2431229"/>
             <a:ext cx="189257" cy="178683"/>
           </a:xfrm>
           <a:prstGeom prst="rect">
@@ -28498,7 +28597,7 @@
         </p:nvSpPr>
         <p:spPr>
           <a:xfrm>
-            <a:off x="9352041" y="2590800"/>
+            <a:off x="10116474" y="2034296"/>
             <a:ext cx="189257" cy="178683"/>
           </a:xfrm>
           <a:prstGeom prst="rect">
@@ -28537,7 +28636,7 @@
         </p:nvSpPr>
         <p:spPr>
           <a:xfrm>
-            <a:off x="9121294" y="3097376"/>
+            <a:off x="9333257" y="3370920"/>
             <a:ext cx="189257" cy="178683"/>
           </a:xfrm>
           <a:prstGeom prst="rect">
@@ -28576,7 +28675,7 @@
         </p:nvSpPr>
         <p:spPr>
           <a:xfrm>
-            <a:off x="8581519" y="3211603"/>
+            <a:off x="8470576" y="3352800"/>
             <a:ext cx="189257" cy="178683"/>
           </a:xfrm>
           <a:prstGeom prst="rect">
@@ -28615,7 +28714,7 @@
         </p:nvSpPr>
         <p:spPr>
           <a:xfrm>
-            <a:off x="8582234" y="3614625"/>
+            <a:off x="8471291" y="3755822"/>
             <a:ext cx="189257" cy="178683"/>
           </a:xfrm>
           <a:prstGeom prst="rect">
@@ -28654,7 +28753,7 @@
         </p:nvSpPr>
         <p:spPr>
           <a:xfrm>
-            <a:off x="8569143" y="4000198"/>
+            <a:off x="8458200" y="4141395"/>
             <a:ext cx="189257" cy="178683"/>
           </a:xfrm>
           <a:prstGeom prst="rect">
@@ -28693,7 +28792,7 @@
         </p:nvSpPr>
         <p:spPr>
           <a:xfrm>
-            <a:off x="9633039" y="2020874"/>
+            <a:off x="9731888" y="2613955"/>
             <a:ext cx="189257" cy="178683"/>
           </a:xfrm>
           <a:prstGeom prst="rect">
@@ -29279,10 +29378,1800 @@
           </a:p>
         </p:txBody>
       </p:sp>
+      <p:cxnSp>
+        <p:nvCxnSpPr>
+          <p:cNvPr id="175" name="Elbow Connector 78">
+            <a:extLst>
+              <a:ext uri="{FF2B5EF4-FFF2-40B4-BE49-F238E27FC236}">
+                <a16:creationId xmlns:a16="http://schemas.microsoft.com/office/drawing/2014/main" xmlns="" id="{B97967F8-618A-448B-81FD-CDFD4AF0EC64}"/>
+              </a:ext>
+            </a:extLst>
+          </p:cNvPr>
+          <p:cNvCxnSpPr>
+            <a:cxnSpLocks/>
+            <a:stCxn id="133" idx="3"/>
+            <a:endCxn id="143" idx="3"/>
+          </p:cNvCxnSpPr>
+          <p:nvPr/>
+        </p:nvCxnSpPr>
+        <p:spPr>
+          <a:xfrm>
+            <a:off x="8185567" y="2849820"/>
+            <a:ext cx="1156986" cy="1143460"/>
+          </a:xfrm>
+          <a:prstGeom prst="bentConnector3">
+            <a:avLst>
+              <a:gd name="adj1" fmla="val 121894"/>
+            </a:avLst>
+          </a:prstGeom>
+          <a:ln w="19050">
+            <a:solidFill>
+              <a:srgbClr val="7030A0"/>
+            </a:solidFill>
+            <a:headEnd type="none" w="med" len="med"/>
+            <a:tailEnd type="arrow" w="med" len="med"/>
+          </a:ln>
+          <a:effectLst/>
+        </p:spPr>
+        <p:style>
+          <a:lnRef idx="1">
+            <a:schemeClr val="accent2"/>
+          </a:lnRef>
+          <a:fillRef idx="2">
+            <a:schemeClr val="accent2"/>
+          </a:fillRef>
+          <a:effectRef idx="1">
+            <a:schemeClr val="accent2"/>
+          </a:effectRef>
+          <a:fontRef idx="minor">
+            <a:schemeClr val="dk1"/>
+          </a:fontRef>
+        </p:style>
+      </p:cxnSp>
+      <p:sp>
+        <p:nvSpPr>
+          <p:cNvPr id="177" name="TextBox 176"/>
+          <p:cNvSpPr txBox="1"/>
+          <p:nvPr/>
+        </p:nvSpPr>
+        <p:spPr>
+          <a:xfrm>
+            <a:off x="9335743" y="3733800"/>
+            <a:ext cx="189257" cy="178683"/>
+          </a:xfrm>
+          <a:prstGeom prst="rect">
+            <a:avLst/>
+          </a:prstGeom>
+          <a:noFill/>
+        </p:spPr>
+        <p:txBody>
+          <a:bodyPr wrap="square" lIns="0" tIns="0" rIns="0" bIns="0" rtlCol="0">
+            <a:noAutofit/>
+          </a:bodyPr>
+          <a:lstStyle/>
+          <a:p>
+            <a:pPr algn="ctr"/>
+            <a:r>
+              <a:rPr lang="en-US" sz="1100" dirty="0">
+                <a:solidFill>
+                  <a:srgbClr val="7030A0"/>
+                </a:solidFill>
+              </a:rPr>
+              <a:t>1</a:t>
+            </a:r>
+            <a:endParaRPr lang="en-SG" sz="1100" dirty="0">
+              <a:solidFill>
+                <a:srgbClr val="7030A0"/>
+              </a:solidFill>
+            </a:endParaRPr>
+          </a:p>
+        </p:txBody>
+      </p:sp>
     </p:spTree>
     <p:extLst>
       <p:ext uri="{BB962C8B-B14F-4D97-AF65-F5344CB8AC3E}">
         <p14:creationId xmlns:p14="http://schemas.microsoft.com/office/powerpoint/2010/main" val="343203020"/>
+      </p:ext>
+    </p:extLst>
+  </p:cSld>
+  <p:clrMapOvr>
+    <a:masterClrMapping/>
+  </p:clrMapOvr>
+</p:sld>
+</file>
+
+<file path=ppt/slides/slide6.xml><?xml version="1.0" encoding="utf-8"?>
+<p:sld xmlns:a="http://schemas.openxmlformats.org/drawingml/2006/main" xmlns:r="http://schemas.openxmlformats.org/officeDocument/2006/relationships" xmlns:p="http://schemas.openxmlformats.org/presentationml/2006/main">
+  <p:cSld>
+    <p:spTree>
+      <p:nvGrpSpPr>
+        <p:cNvPr id="1" name=""/>
+        <p:cNvGrpSpPr/>
+        <p:nvPr/>
+      </p:nvGrpSpPr>
+      <p:grpSpPr>
+        <a:xfrm>
+          <a:off x="0" y="0"/>
+          <a:ext cx="0" cy="0"/>
+          <a:chOff x="0" y="0"/>
+          <a:chExt cx="0" cy="0"/>
+        </a:xfrm>
+      </p:grpSpPr>
+      <p:sp>
+        <p:nvSpPr>
+          <p:cNvPr id="118" name="Rectangle 65"/>
+          <p:cNvSpPr/>
+          <p:nvPr/>
+        </p:nvSpPr>
+        <p:spPr>
+          <a:xfrm>
+            <a:off x="1219200" y="956310"/>
+            <a:ext cx="8991600" cy="2320290"/>
+          </a:xfrm>
+          <a:prstGeom prst="roundRect">
+            <a:avLst>
+              <a:gd name="adj" fmla="val 3484"/>
+            </a:avLst>
+          </a:prstGeom>
+          <a:solidFill>
+            <a:schemeClr val="accent4">
+              <a:lumMod val="20000"/>
+              <a:lumOff val="80000"/>
+            </a:schemeClr>
+          </a:solidFill>
+          <a:ln w="19050">
+            <a:noFill/>
+          </a:ln>
+          <a:effectLst/>
+        </p:spPr>
+        <p:style>
+          <a:lnRef idx="1">
+            <a:schemeClr val="accent2"/>
+          </a:lnRef>
+          <a:fillRef idx="2">
+            <a:schemeClr val="accent2"/>
+          </a:fillRef>
+          <a:effectRef idx="1">
+            <a:schemeClr val="accent2"/>
+          </a:effectRef>
+          <a:fontRef idx="minor">
+            <a:schemeClr val="dk1"/>
+          </a:fontRef>
+        </p:style>
+        <p:txBody>
+          <a:bodyPr rtlCol="0" anchor="t"/>
+          <a:lstStyle/>
+          <a:p>
+            <a:r>
+              <a:rPr lang="en-US" sz="1200" b="1" dirty="0">
+                <a:solidFill>
+                  <a:srgbClr val="7030A0"/>
+                </a:solidFill>
+              </a:rPr>
+              <a:t>Model</a:t>
+            </a:r>
+            <a:endParaRPr lang="en-SG" sz="1200" b="1" dirty="0">
+              <a:solidFill>
+                <a:srgbClr val="7030A0"/>
+              </a:solidFill>
+            </a:endParaRPr>
+          </a:p>
+        </p:txBody>
+      </p:sp>
+      <p:sp>
+        <p:nvSpPr>
+          <p:cNvPr id="46" name="Rectangle 8"/>
+          <p:cNvSpPr/>
+          <p:nvPr/>
+        </p:nvSpPr>
+        <p:spPr>
+          <a:xfrm>
+            <a:off x="2095030" y="2081208"/>
+            <a:ext cx="1170020" cy="334856"/>
+          </a:xfrm>
+          <a:prstGeom prst="rect">
+            <a:avLst/>
+          </a:prstGeom>
+          <a:ln w="19050">
+            <a:solidFill>
+              <a:srgbClr val="7030A0"/>
+            </a:solidFill>
+          </a:ln>
+          <a:effectLst/>
+        </p:spPr>
+        <p:style>
+          <a:lnRef idx="1">
+            <a:schemeClr val="accent4"/>
+          </a:lnRef>
+          <a:fillRef idx="2">
+            <a:schemeClr val="accent4"/>
+          </a:fillRef>
+          <a:effectRef idx="1">
+            <a:schemeClr val="accent4"/>
+          </a:effectRef>
+          <a:fontRef idx="minor">
+            <a:schemeClr val="dk1"/>
+          </a:fontRef>
+        </p:style>
+        <p:txBody>
+          <a:bodyPr rtlCol="0" anchor="ctr"/>
+          <a:lstStyle/>
+          <a:p>
+            <a:pPr algn="ctr"/>
+            <a:r>
+              <a:rPr lang="en-US" sz="1050" dirty="0" smtClean="0">
+                <a:solidFill>
+                  <a:srgbClr val="7030A0"/>
+                </a:solidFill>
+              </a:rPr>
+              <a:t>RestOrRant</a:t>
+            </a:r>
+            <a:endParaRPr lang="en-SG" sz="1050" dirty="0">
+              <a:solidFill>
+                <a:srgbClr val="7030A0"/>
+              </a:solidFill>
+            </a:endParaRPr>
+          </a:p>
+        </p:txBody>
+      </p:sp>
+      <p:sp>
+        <p:nvSpPr>
+          <p:cNvPr id="49" name="Rectangle 8"/>
+          <p:cNvSpPr/>
+          <p:nvPr/>
+        </p:nvSpPr>
+        <p:spPr>
+          <a:xfrm>
+            <a:off x="5215398" y="2076029"/>
+            <a:ext cx="1369229" cy="346760"/>
+          </a:xfrm>
+          <a:prstGeom prst="rect">
+            <a:avLst/>
+          </a:prstGeom>
+          <a:ln w="19050">
+            <a:solidFill>
+              <a:srgbClr val="7030A0"/>
+            </a:solidFill>
+          </a:ln>
+          <a:effectLst/>
+        </p:spPr>
+        <p:style>
+          <a:lnRef idx="1">
+            <a:schemeClr val="accent4"/>
+          </a:lnRef>
+          <a:fillRef idx="2">
+            <a:schemeClr val="accent4"/>
+          </a:fillRef>
+          <a:effectRef idx="1">
+            <a:schemeClr val="accent4"/>
+          </a:effectRef>
+          <a:fontRef idx="minor">
+            <a:schemeClr val="dk1"/>
+          </a:fontRef>
+        </p:style>
+        <p:txBody>
+          <a:bodyPr rtlCol="0" anchor="ctr"/>
+          <a:lstStyle/>
+          <a:p>
+            <a:pPr algn="ctr"/>
+            <a:r>
+              <a:rPr lang="en-US" sz="1050" dirty="0" smtClean="0">
+                <a:solidFill>
+                  <a:srgbClr val="7030A0"/>
+                </a:solidFill>
+              </a:rPr>
+              <a:t>UniqueOrderItemList</a:t>
+            </a:r>
+            <a:endParaRPr lang="en-SG" sz="1050" dirty="0">
+              <a:solidFill>
+                <a:srgbClr val="7030A0"/>
+              </a:solidFill>
+            </a:endParaRPr>
+          </a:p>
+        </p:txBody>
+      </p:sp>
+      <p:sp>
+        <p:nvSpPr>
+          <p:cNvPr id="51" name="Flowchart: Decision 96"/>
+          <p:cNvSpPr/>
+          <p:nvPr/>
+        </p:nvSpPr>
+        <p:spPr>
+          <a:xfrm>
+            <a:off x="4847720" y="2150399"/>
+            <a:ext cx="236048" cy="173380"/>
+          </a:xfrm>
+          <a:prstGeom prst="flowChartDecision">
+            <a:avLst/>
+          </a:prstGeom>
+          <a:solidFill>
+            <a:srgbClr val="7030A0"/>
+          </a:solidFill>
+          <a:ln w="19050">
+            <a:solidFill>
+              <a:srgbClr val="7030A0"/>
+            </a:solidFill>
+          </a:ln>
+          <a:effectLst/>
+        </p:spPr>
+        <p:style>
+          <a:lnRef idx="1">
+            <a:schemeClr val="accent6"/>
+          </a:lnRef>
+          <a:fillRef idx="2">
+            <a:schemeClr val="accent6"/>
+          </a:fillRef>
+          <a:effectRef idx="1">
+            <a:schemeClr val="accent6"/>
+          </a:effectRef>
+          <a:fontRef idx="minor">
+            <a:schemeClr val="dk1"/>
+          </a:fontRef>
+        </p:style>
+        <p:txBody>
+          <a:bodyPr rtlCol="0" anchor="ctr"/>
+          <a:lstStyle/>
+          <a:p>
+            <a:pPr algn="ctr"/>
+            <a:endParaRPr lang="en-US" sz="1050"/>
+          </a:p>
+        </p:txBody>
+      </p:sp>
+      <p:cxnSp>
+        <p:nvCxnSpPr>
+          <p:cNvPr id="97" name="Elbow Connector 63"/>
+          <p:cNvCxnSpPr>
+            <a:cxnSpLocks/>
+            <a:stCxn id="99" idx="3"/>
+            <a:endCxn id="46" idx="0"/>
+          </p:cNvCxnSpPr>
+          <p:nvPr/>
+        </p:nvCxnSpPr>
+        <p:spPr>
+          <a:xfrm rot="16200000" flipH="1">
+            <a:off x="2507227" y="1908394"/>
+            <a:ext cx="341199" cy="4428"/>
+          </a:xfrm>
+          <a:prstGeom prst="bentConnector3">
+            <a:avLst>
+              <a:gd name="adj1" fmla="val 50000"/>
+            </a:avLst>
+          </a:prstGeom>
+          <a:ln w="19050">
+            <a:solidFill>
+              <a:srgbClr val="7030A0"/>
+            </a:solidFill>
+            <a:prstDash val="sysDot"/>
+            <a:headEnd type="none" w="med" len="med"/>
+            <a:tailEnd type="none" w="med" len="med"/>
+          </a:ln>
+          <a:effectLst/>
+        </p:spPr>
+        <p:style>
+          <a:lnRef idx="1">
+            <a:schemeClr val="accent2"/>
+          </a:lnRef>
+          <a:fillRef idx="2">
+            <a:schemeClr val="accent2"/>
+          </a:fillRef>
+          <a:effectRef idx="1">
+            <a:schemeClr val="accent2"/>
+          </a:effectRef>
+          <a:fontRef idx="minor">
+            <a:schemeClr val="dk1"/>
+          </a:fontRef>
+        </p:style>
+      </p:cxnSp>
+      <p:sp>
+        <p:nvSpPr>
+          <p:cNvPr id="99" name="Isosceles Triangle 102"/>
+          <p:cNvSpPr/>
+          <p:nvPr/>
+        </p:nvSpPr>
+        <p:spPr>
+          <a:xfrm rot="10800000" flipV="1">
+            <a:off x="2534419" y="1582947"/>
+            <a:ext cx="282387" cy="157062"/>
+          </a:xfrm>
+          <a:prstGeom prst="triangle">
+            <a:avLst/>
+          </a:prstGeom>
+          <a:solidFill>
+            <a:schemeClr val="accent4">
+              <a:lumMod val="20000"/>
+              <a:lumOff val="80000"/>
+            </a:schemeClr>
+          </a:solidFill>
+          <a:ln w="19050">
+            <a:solidFill>
+              <a:srgbClr val="7030A0"/>
+            </a:solidFill>
+          </a:ln>
+          <a:effectLst/>
+        </p:spPr>
+        <p:style>
+          <a:lnRef idx="1">
+            <a:schemeClr val="accent4"/>
+          </a:lnRef>
+          <a:fillRef idx="2">
+            <a:schemeClr val="accent4"/>
+          </a:fillRef>
+          <a:effectRef idx="1">
+            <a:schemeClr val="accent4"/>
+          </a:effectRef>
+          <a:fontRef idx="minor">
+            <a:schemeClr val="dk1"/>
+          </a:fontRef>
+        </p:style>
+        <p:txBody>
+          <a:bodyPr rtlCol="0" anchor="ctr"/>
+          <a:lstStyle/>
+          <a:p>
+            <a:pPr algn="ctr"/>
+            <a:endParaRPr lang="en-SG" sz="1050" b="1">
+              <a:solidFill>
+                <a:srgbClr val="92D050"/>
+              </a:solidFill>
+            </a:endParaRPr>
+          </a:p>
+        </p:txBody>
+      </p:sp>
+      <p:sp>
+        <p:nvSpPr>
+          <p:cNvPr id="54" name="TextBox 53"/>
+          <p:cNvSpPr txBox="1"/>
+          <p:nvPr/>
+        </p:nvSpPr>
+        <p:spPr>
+          <a:xfrm>
+            <a:off x="5046054" y="2018570"/>
+            <a:ext cx="189257" cy="178683"/>
+          </a:xfrm>
+          <a:prstGeom prst="rect">
+            <a:avLst/>
+          </a:prstGeom>
+          <a:noFill/>
+        </p:spPr>
+        <p:txBody>
+          <a:bodyPr wrap="square" lIns="0" tIns="0" rIns="0" bIns="0" rtlCol="0">
+            <a:noAutofit/>
+          </a:bodyPr>
+          <a:lstStyle/>
+          <a:p>
+            <a:pPr algn="ctr"/>
+            <a:r>
+              <a:rPr lang="en-US" sz="1100" dirty="0">
+                <a:solidFill>
+                  <a:srgbClr val="7030A0"/>
+                </a:solidFill>
+              </a:rPr>
+              <a:t>1</a:t>
+            </a:r>
+            <a:endParaRPr lang="en-SG" sz="1100" dirty="0">
+              <a:solidFill>
+                <a:srgbClr val="7030A0"/>
+              </a:solidFill>
+            </a:endParaRPr>
+          </a:p>
+        </p:txBody>
+      </p:sp>
+      <p:sp>
+        <p:nvSpPr>
+          <p:cNvPr id="55" name="Rectangle 8"/>
+          <p:cNvSpPr/>
+          <p:nvPr/>
+        </p:nvSpPr>
+        <p:spPr>
+          <a:xfrm>
+            <a:off x="1894111" y="1209587"/>
+            <a:ext cx="1458689" cy="364396"/>
+          </a:xfrm>
+          <a:prstGeom prst="rect">
+            <a:avLst/>
+          </a:prstGeom>
+          <a:ln w="19050">
+            <a:solidFill>
+              <a:srgbClr val="7030A0"/>
+            </a:solidFill>
+          </a:ln>
+          <a:effectLst/>
+        </p:spPr>
+        <p:style>
+          <a:lnRef idx="1">
+            <a:schemeClr val="accent4"/>
+          </a:lnRef>
+          <a:fillRef idx="2">
+            <a:schemeClr val="accent4"/>
+          </a:fillRef>
+          <a:effectRef idx="1">
+            <a:schemeClr val="accent4"/>
+          </a:effectRef>
+          <a:fontRef idx="minor">
+            <a:schemeClr val="dk1"/>
+          </a:fontRef>
+        </p:style>
+        <p:txBody>
+          <a:bodyPr rtlCol="0" anchor="ctr"/>
+          <a:lstStyle/>
+          <a:p>
+            <a:pPr algn="ctr"/>
+            <a:r>
+              <a:rPr lang="en-US" sz="1050" dirty="0">
+                <a:solidFill>
+                  <a:srgbClr val="7030A0"/>
+                </a:solidFill>
+              </a:rPr>
+              <a:t>&lt;&lt;interface&gt;&gt;</a:t>
+            </a:r>
+            <a:br>
+              <a:rPr lang="en-US" sz="1050" dirty="0">
+                <a:solidFill>
+                  <a:srgbClr val="7030A0"/>
+                </a:solidFill>
+              </a:rPr>
+            </a:br>
+            <a:r>
+              <a:rPr lang="en-US" sz="1050" dirty="0" smtClean="0">
+                <a:solidFill>
+                  <a:srgbClr val="7030A0"/>
+                </a:solidFill>
+              </a:rPr>
+              <a:t>ReadOnlyRestOrRant</a:t>
+            </a:r>
+            <a:endParaRPr lang="en-SG" sz="1050" dirty="0">
+              <a:solidFill>
+                <a:srgbClr val="7030A0"/>
+              </a:solidFill>
+            </a:endParaRPr>
+          </a:p>
+        </p:txBody>
+      </p:sp>
+      <p:cxnSp>
+        <p:nvCxnSpPr>
+          <p:cNvPr id="60" name="Straight Arrow Connector 59"/>
+          <p:cNvCxnSpPr>
+            <a:stCxn id="51" idx="1"/>
+            <a:endCxn id="49" idx="1"/>
+          </p:cNvCxnSpPr>
+          <p:nvPr/>
+        </p:nvCxnSpPr>
+        <p:spPr>
+          <a:xfrm>
+            <a:off x="4847720" y="2237089"/>
+            <a:ext cx="367678" cy="12320"/>
+          </a:xfrm>
+          <a:prstGeom prst="straightConnector1">
+            <a:avLst/>
+          </a:prstGeom>
+          <a:ln w="19050">
+            <a:solidFill>
+              <a:srgbClr val="7030A0"/>
+            </a:solidFill>
+            <a:headEnd type="none" w="med" len="med"/>
+            <a:tailEnd type="arrow" w="med" len="med"/>
+          </a:ln>
+          <a:effectLst/>
+        </p:spPr>
+        <p:style>
+          <a:lnRef idx="1">
+            <a:schemeClr val="accent2"/>
+          </a:lnRef>
+          <a:fillRef idx="2">
+            <a:schemeClr val="accent2"/>
+          </a:fillRef>
+          <a:effectRef idx="1">
+            <a:schemeClr val="accent2"/>
+          </a:effectRef>
+          <a:fontRef idx="minor">
+            <a:schemeClr val="dk1"/>
+          </a:fontRef>
+        </p:style>
+      </p:cxnSp>
+      <p:sp>
+        <p:nvSpPr>
+          <p:cNvPr id="71" name="Rectangle 8"/>
+          <p:cNvSpPr/>
+          <p:nvPr/>
+        </p:nvSpPr>
+        <p:spPr>
+          <a:xfrm>
+            <a:off x="3833761" y="2076029"/>
+            <a:ext cx="991799" cy="346760"/>
+          </a:xfrm>
+          <a:prstGeom prst="rect">
+            <a:avLst/>
+          </a:prstGeom>
+          <a:ln w="19050">
+            <a:solidFill>
+              <a:srgbClr val="7030A0"/>
+            </a:solidFill>
+          </a:ln>
+          <a:effectLst/>
+        </p:spPr>
+        <p:style>
+          <a:lnRef idx="1">
+            <a:schemeClr val="accent4"/>
+          </a:lnRef>
+          <a:fillRef idx="2">
+            <a:schemeClr val="accent4"/>
+          </a:fillRef>
+          <a:effectRef idx="1">
+            <a:schemeClr val="accent4"/>
+          </a:effectRef>
+          <a:fontRef idx="minor">
+            <a:schemeClr val="dk1"/>
+          </a:fontRef>
+        </p:style>
+        <p:txBody>
+          <a:bodyPr rtlCol="0" anchor="ctr"/>
+          <a:lstStyle/>
+          <a:p>
+            <a:pPr algn="ctr"/>
+            <a:r>
+              <a:rPr lang="en-US" sz="1050" dirty="0" smtClean="0">
+                <a:solidFill>
+                  <a:srgbClr val="7030A0"/>
+                </a:solidFill>
+              </a:rPr>
+              <a:t>Orders</a:t>
+            </a:r>
+            <a:endParaRPr lang="en-SG" sz="1050" dirty="0">
+              <a:solidFill>
+                <a:srgbClr val="7030A0"/>
+              </a:solidFill>
+            </a:endParaRPr>
+          </a:p>
+        </p:txBody>
+      </p:sp>
+      <p:sp>
+        <p:nvSpPr>
+          <p:cNvPr id="72" name="Flowchart: Decision 96"/>
+          <p:cNvSpPr/>
+          <p:nvPr/>
+        </p:nvSpPr>
+        <p:spPr>
+          <a:xfrm>
+            <a:off x="3288723" y="2150399"/>
+            <a:ext cx="236048" cy="173380"/>
+          </a:xfrm>
+          <a:prstGeom prst="flowChartDecision">
+            <a:avLst/>
+          </a:prstGeom>
+          <a:solidFill>
+            <a:srgbClr val="7030A0"/>
+          </a:solidFill>
+          <a:ln w="19050">
+            <a:solidFill>
+              <a:srgbClr val="7030A0"/>
+            </a:solidFill>
+          </a:ln>
+          <a:effectLst/>
+        </p:spPr>
+        <p:style>
+          <a:lnRef idx="1">
+            <a:schemeClr val="accent6"/>
+          </a:lnRef>
+          <a:fillRef idx="2">
+            <a:schemeClr val="accent6"/>
+          </a:fillRef>
+          <a:effectRef idx="1">
+            <a:schemeClr val="accent6"/>
+          </a:effectRef>
+          <a:fontRef idx="minor">
+            <a:schemeClr val="dk1"/>
+          </a:fontRef>
+        </p:style>
+        <p:txBody>
+          <a:bodyPr rtlCol="0" anchor="ctr"/>
+          <a:lstStyle/>
+          <a:p>
+            <a:pPr algn="ctr"/>
+            <a:endParaRPr lang="en-US" sz="1050"/>
+          </a:p>
+        </p:txBody>
+      </p:sp>
+      <p:sp>
+        <p:nvSpPr>
+          <p:cNvPr id="73" name="TextBox 72"/>
+          <p:cNvSpPr txBox="1"/>
+          <p:nvPr/>
+        </p:nvSpPr>
+        <p:spPr>
+          <a:xfrm>
+            <a:off x="3657600" y="1993911"/>
+            <a:ext cx="154714" cy="219068"/>
+          </a:xfrm>
+          <a:prstGeom prst="rect">
+            <a:avLst/>
+          </a:prstGeom>
+          <a:noFill/>
+        </p:spPr>
+        <p:txBody>
+          <a:bodyPr wrap="square" lIns="0" tIns="0" rIns="0" bIns="0" rtlCol="0">
+            <a:noAutofit/>
+          </a:bodyPr>
+          <a:lstStyle/>
+          <a:p>
+            <a:pPr algn="ctr"/>
+            <a:r>
+              <a:rPr lang="en-US" sz="1100" dirty="0">
+                <a:solidFill>
+                  <a:srgbClr val="7030A0"/>
+                </a:solidFill>
+              </a:rPr>
+              <a:t>1</a:t>
+            </a:r>
+            <a:endParaRPr lang="en-SG" sz="1100" dirty="0">
+              <a:solidFill>
+                <a:srgbClr val="7030A0"/>
+              </a:solidFill>
+            </a:endParaRPr>
+          </a:p>
+        </p:txBody>
+      </p:sp>
+      <p:cxnSp>
+        <p:nvCxnSpPr>
+          <p:cNvPr id="74" name="Straight Arrow Connector 73"/>
+          <p:cNvCxnSpPr>
+            <a:endCxn id="71" idx="1"/>
+          </p:cNvCxnSpPr>
+          <p:nvPr/>
+        </p:nvCxnSpPr>
+        <p:spPr>
+          <a:xfrm>
+            <a:off x="3288723" y="2237089"/>
+            <a:ext cx="545038" cy="12320"/>
+          </a:xfrm>
+          <a:prstGeom prst="straightConnector1">
+            <a:avLst/>
+          </a:prstGeom>
+          <a:ln w="19050">
+            <a:solidFill>
+              <a:srgbClr val="7030A0"/>
+            </a:solidFill>
+            <a:headEnd type="none" w="med" len="med"/>
+            <a:tailEnd type="arrow" w="med" len="med"/>
+          </a:ln>
+          <a:effectLst/>
+        </p:spPr>
+        <p:style>
+          <a:lnRef idx="1">
+            <a:schemeClr val="accent2"/>
+          </a:lnRef>
+          <a:fillRef idx="2">
+            <a:schemeClr val="accent2"/>
+          </a:fillRef>
+          <a:effectRef idx="1">
+            <a:schemeClr val="accent2"/>
+          </a:effectRef>
+          <a:fontRef idx="minor">
+            <a:schemeClr val="dk1"/>
+          </a:fontRef>
+        </p:style>
+      </p:cxnSp>
+      <p:cxnSp>
+        <p:nvCxnSpPr>
+          <p:cNvPr id="91" name="Elbow Connector 63"/>
+          <p:cNvCxnSpPr>
+            <a:cxnSpLocks/>
+            <a:stCxn id="92" idx="3"/>
+            <a:endCxn id="71" idx="0"/>
+          </p:cNvCxnSpPr>
+          <p:nvPr/>
+        </p:nvCxnSpPr>
+        <p:spPr>
+          <a:xfrm rot="5400000">
+            <a:off x="4169213" y="1913048"/>
+            <a:ext cx="323429" cy="2532"/>
+          </a:xfrm>
+          <a:prstGeom prst="bentConnector3">
+            <a:avLst>
+              <a:gd name="adj1" fmla="val 50000"/>
+            </a:avLst>
+          </a:prstGeom>
+          <a:ln w="19050">
+            <a:solidFill>
+              <a:srgbClr val="7030A0"/>
+            </a:solidFill>
+            <a:prstDash val="sysDot"/>
+            <a:headEnd type="none" w="med" len="med"/>
+            <a:tailEnd type="none" w="med" len="med"/>
+          </a:ln>
+          <a:effectLst/>
+        </p:spPr>
+        <p:style>
+          <a:lnRef idx="1">
+            <a:schemeClr val="accent2"/>
+          </a:lnRef>
+          <a:fillRef idx="2">
+            <a:schemeClr val="accent2"/>
+          </a:fillRef>
+          <a:effectRef idx="1">
+            <a:schemeClr val="accent2"/>
+          </a:effectRef>
+          <a:fontRef idx="minor">
+            <a:schemeClr val="dk1"/>
+          </a:fontRef>
+        </p:style>
+      </p:cxnSp>
+      <p:sp>
+        <p:nvSpPr>
+          <p:cNvPr id="92" name="Isosceles Triangle 102"/>
+          <p:cNvSpPr/>
+          <p:nvPr/>
+        </p:nvSpPr>
+        <p:spPr>
+          <a:xfrm rot="10800000" flipV="1">
+            <a:off x="4191000" y="1595538"/>
+            <a:ext cx="282387" cy="157062"/>
+          </a:xfrm>
+          <a:prstGeom prst="triangle">
+            <a:avLst/>
+          </a:prstGeom>
+          <a:solidFill>
+            <a:schemeClr val="accent4">
+              <a:lumMod val="20000"/>
+              <a:lumOff val="80000"/>
+            </a:schemeClr>
+          </a:solidFill>
+          <a:ln w="19050">
+            <a:solidFill>
+              <a:srgbClr val="7030A0"/>
+            </a:solidFill>
+          </a:ln>
+          <a:effectLst/>
+        </p:spPr>
+        <p:style>
+          <a:lnRef idx="1">
+            <a:schemeClr val="accent4"/>
+          </a:lnRef>
+          <a:fillRef idx="2">
+            <a:schemeClr val="accent4"/>
+          </a:fillRef>
+          <a:effectRef idx="1">
+            <a:schemeClr val="accent4"/>
+          </a:effectRef>
+          <a:fontRef idx="minor">
+            <a:schemeClr val="dk1"/>
+          </a:fontRef>
+        </p:style>
+        <p:txBody>
+          <a:bodyPr rtlCol="0" anchor="ctr"/>
+          <a:lstStyle/>
+          <a:p>
+            <a:pPr algn="ctr"/>
+            <a:endParaRPr lang="en-SG" sz="1050" b="1">
+              <a:solidFill>
+                <a:srgbClr val="92D050"/>
+              </a:solidFill>
+            </a:endParaRPr>
+          </a:p>
+        </p:txBody>
+      </p:sp>
+      <p:sp>
+        <p:nvSpPr>
+          <p:cNvPr id="93" name="Rectangle 8"/>
+          <p:cNvSpPr/>
+          <p:nvPr/>
+        </p:nvSpPr>
+        <p:spPr>
+          <a:xfrm>
+            <a:off x="3719340" y="1204809"/>
+            <a:ext cx="1230893" cy="364396"/>
+          </a:xfrm>
+          <a:prstGeom prst="rect">
+            <a:avLst/>
+          </a:prstGeom>
+          <a:ln w="19050">
+            <a:solidFill>
+              <a:srgbClr val="7030A0"/>
+            </a:solidFill>
+          </a:ln>
+          <a:effectLst/>
+        </p:spPr>
+        <p:style>
+          <a:lnRef idx="1">
+            <a:schemeClr val="accent4"/>
+          </a:lnRef>
+          <a:fillRef idx="2">
+            <a:schemeClr val="accent4"/>
+          </a:fillRef>
+          <a:effectRef idx="1">
+            <a:schemeClr val="accent4"/>
+          </a:effectRef>
+          <a:fontRef idx="minor">
+            <a:schemeClr val="dk1"/>
+          </a:fontRef>
+        </p:style>
+        <p:txBody>
+          <a:bodyPr rtlCol="0" anchor="ctr"/>
+          <a:lstStyle/>
+          <a:p>
+            <a:pPr algn="ctr"/>
+            <a:r>
+              <a:rPr lang="en-US" sz="1050" dirty="0">
+                <a:solidFill>
+                  <a:srgbClr val="7030A0"/>
+                </a:solidFill>
+              </a:rPr>
+              <a:t>&lt;&lt;interface&gt;&gt;</a:t>
+            </a:r>
+            <a:br>
+              <a:rPr lang="en-US" sz="1050" dirty="0">
+                <a:solidFill>
+                  <a:srgbClr val="7030A0"/>
+                </a:solidFill>
+              </a:rPr>
+            </a:br>
+            <a:r>
+              <a:rPr lang="en-US" sz="1050" dirty="0" smtClean="0">
+                <a:solidFill>
+                  <a:srgbClr val="7030A0"/>
+                </a:solidFill>
+              </a:rPr>
+              <a:t>ReadOnlyOrders</a:t>
+            </a:r>
+            <a:endParaRPr lang="en-SG" sz="1050" dirty="0">
+              <a:solidFill>
+                <a:srgbClr val="7030A0"/>
+              </a:solidFill>
+            </a:endParaRPr>
+          </a:p>
+        </p:txBody>
+      </p:sp>
+      <p:sp>
+        <p:nvSpPr>
+          <p:cNvPr id="110" name="Rectangle 8"/>
+          <p:cNvSpPr/>
+          <p:nvPr/>
+        </p:nvSpPr>
+        <p:spPr>
+          <a:xfrm>
+            <a:off x="7039369" y="2084469"/>
+            <a:ext cx="875258" cy="346760"/>
+          </a:xfrm>
+          <a:prstGeom prst="rect">
+            <a:avLst/>
+          </a:prstGeom>
+          <a:ln w="19050">
+            <a:solidFill>
+              <a:srgbClr val="7030A0"/>
+            </a:solidFill>
+          </a:ln>
+          <a:effectLst/>
+        </p:spPr>
+        <p:style>
+          <a:lnRef idx="1">
+            <a:schemeClr val="accent4"/>
+          </a:lnRef>
+          <a:fillRef idx="2">
+            <a:schemeClr val="accent4"/>
+          </a:fillRef>
+          <a:effectRef idx="1">
+            <a:schemeClr val="accent4"/>
+          </a:effectRef>
+          <a:fontRef idx="minor">
+            <a:schemeClr val="dk1"/>
+          </a:fontRef>
+        </p:style>
+        <p:txBody>
+          <a:bodyPr rtlCol="0" anchor="ctr"/>
+          <a:lstStyle/>
+          <a:p>
+            <a:pPr algn="ctr"/>
+            <a:r>
+              <a:rPr lang="en-US" sz="1050" dirty="0" smtClean="0">
+                <a:solidFill>
+                  <a:srgbClr val="7030A0"/>
+                </a:solidFill>
+              </a:rPr>
+              <a:t>OrderItem</a:t>
+            </a:r>
+            <a:endParaRPr lang="en-SG" sz="1050" dirty="0">
+              <a:solidFill>
+                <a:srgbClr val="7030A0"/>
+              </a:solidFill>
+            </a:endParaRPr>
+          </a:p>
+        </p:txBody>
+      </p:sp>
+      <p:sp>
+        <p:nvSpPr>
+          <p:cNvPr id="111" name="Flowchart: Decision 96"/>
+          <p:cNvSpPr/>
+          <p:nvPr/>
+        </p:nvSpPr>
+        <p:spPr>
+          <a:xfrm>
+            <a:off x="6584443" y="2168079"/>
+            <a:ext cx="236048" cy="173380"/>
+          </a:xfrm>
+          <a:prstGeom prst="flowChartDecision">
+            <a:avLst/>
+          </a:prstGeom>
+          <a:noFill/>
+          <a:ln w="19050">
+            <a:solidFill>
+              <a:srgbClr val="7030A0"/>
+            </a:solidFill>
+          </a:ln>
+          <a:effectLst/>
+        </p:spPr>
+        <p:style>
+          <a:lnRef idx="1">
+            <a:schemeClr val="accent6"/>
+          </a:lnRef>
+          <a:fillRef idx="2">
+            <a:schemeClr val="accent6"/>
+          </a:fillRef>
+          <a:effectRef idx="1">
+            <a:schemeClr val="accent6"/>
+          </a:effectRef>
+          <a:fontRef idx="minor">
+            <a:schemeClr val="dk1"/>
+          </a:fontRef>
+        </p:style>
+        <p:txBody>
+          <a:bodyPr rtlCol="0" anchor="ctr"/>
+          <a:lstStyle/>
+          <a:p>
+            <a:pPr algn="ctr"/>
+            <a:endParaRPr lang="en-US" sz="1050"/>
+          </a:p>
+        </p:txBody>
+      </p:sp>
+      <p:cxnSp>
+        <p:nvCxnSpPr>
+          <p:cNvPr id="112" name="Elbow Connector 111"/>
+          <p:cNvCxnSpPr/>
+          <p:nvPr/>
+        </p:nvCxnSpPr>
+        <p:spPr>
+          <a:xfrm>
+            <a:off x="6820491" y="2254769"/>
+            <a:ext cx="218878" cy="3080"/>
+          </a:xfrm>
+          <a:prstGeom prst="bentConnector3">
+            <a:avLst/>
+          </a:prstGeom>
+          <a:ln w="19050">
+            <a:solidFill>
+              <a:srgbClr val="7030A0"/>
+            </a:solidFill>
+            <a:headEnd type="none" w="med" len="med"/>
+            <a:tailEnd type="arrow" w="med" len="med"/>
+          </a:ln>
+          <a:effectLst/>
+        </p:spPr>
+        <p:style>
+          <a:lnRef idx="1">
+            <a:schemeClr val="accent2"/>
+          </a:lnRef>
+          <a:fillRef idx="2">
+            <a:schemeClr val="accent2"/>
+          </a:fillRef>
+          <a:effectRef idx="1">
+            <a:schemeClr val="accent2"/>
+          </a:effectRef>
+          <a:fontRef idx="minor">
+            <a:schemeClr val="dk1"/>
+          </a:fontRef>
+        </p:style>
+      </p:cxnSp>
+      <p:sp>
+        <p:nvSpPr>
+          <p:cNvPr id="113" name="TextBox 112"/>
+          <p:cNvSpPr txBox="1"/>
+          <p:nvPr/>
+        </p:nvSpPr>
+        <p:spPr>
+          <a:xfrm>
+            <a:off x="6862641" y="2076737"/>
+            <a:ext cx="189257" cy="178683"/>
+          </a:xfrm>
+          <a:prstGeom prst="rect">
+            <a:avLst/>
+          </a:prstGeom>
+          <a:noFill/>
+        </p:spPr>
+        <p:txBody>
+          <a:bodyPr wrap="square" lIns="0" tIns="0" rIns="0" bIns="0" rtlCol="0">
+            <a:noAutofit/>
+          </a:bodyPr>
+          <a:lstStyle/>
+          <a:p>
+            <a:pPr algn="ctr"/>
+            <a:r>
+              <a:rPr lang="en-US" sz="1100" dirty="0">
+                <a:solidFill>
+                  <a:srgbClr val="7030A0"/>
+                </a:solidFill>
+              </a:rPr>
+              <a:t>*</a:t>
+            </a:r>
+            <a:endParaRPr lang="en-SG" sz="1100" dirty="0">
+              <a:solidFill>
+                <a:srgbClr val="7030A0"/>
+              </a:solidFill>
+            </a:endParaRPr>
+          </a:p>
+        </p:txBody>
+      </p:sp>
+      <p:sp>
+        <p:nvSpPr>
+          <p:cNvPr id="115" name="Flowchart: Decision 96"/>
+          <p:cNvSpPr/>
+          <p:nvPr/>
+        </p:nvSpPr>
+        <p:spPr>
+          <a:xfrm>
+            <a:off x="7927156" y="2166729"/>
+            <a:ext cx="236048" cy="173380"/>
+          </a:xfrm>
+          <a:prstGeom prst="flowChartDecision">
+            <a:avLst/>
+          </a:prstGeom>
+          <a:solidFill>
+            <a:srgbClr val="7030A0"/>
+          </a:solidFill>
+          <a:ln w="19050">
+            <a:solidFill>
+              <a:srgbClr val="7030A0"/>
+            </a:solidFill>
+          </a:ln>
+          <a:effectLst/>
+        </p:spPr>
+        <p:style>
+          <a:lnRef idx="1">
+            <a:schemeClr val="accent6"/>
+          </a:lnRef>
+          <a:fillRef idx="2">
+            <a:schemeClr val="accent6"/>
+          </a:fillRef>
+          <a:effectRef idx="1">
+            <a:schemeClr val="accent6"/>
+          </a:effectRef>
+          <a:fontRef idx="minor">
+            <a:schemeClr val="dk1"/>
+          </a:fontRef>
+        </p:style>
+        <p:txBody>
+          <a:bodyPr rtlCol="0" anchor="ctr"/>
+          <a:lstStyle/>
+          <a:p>
+            <a:pPr algn="ctr"/>
+            <a:endParaRPr lang="en-US" sz="1050"/>
+          </a:p>
+        </p:txBody>
+      </p:sp>
+      <p:sp>
+        <p:nvSpPr>
+          <p:cNvPr id="116" name="Rectangle 8"/>
+          <p:cNvSpPr/>
+          <p:nvPr/>
+        </p:nvSpPr>
+        <p:spPr>
+          <a:xfrm>
+            <a:off x="8619106" y="1878565"/>
+            <a:ext cx="1224690" cy="340035"/>
+          </a:xfrm>
+          <a:prstGeom prst="rect">
+            <a:avLst/>
+          </a:prstGeom>
+          <a:ln w="19050">
+            <a:solidFill>
+              <a:srgbClr val="7030A0"/>
+            </a:solidFill>
+          </a:ln>
+          <a:effectLst/>
+        </p:spPr>
+        <p:style>
+          <a:lnRef idx="1">
+            <a:schemeClr val="accent4"/>
+          </a:lnRef>
+          <a:fillRef idx="2">
+            <a:schemeClr val="accent4"/>
+          </a:fillRef>
+          <a:effectRef idx="1">
+            <a:schemeClr val="accent4"/>
+          </a:effectRef>
+          <a:fontRef idx="minor">
+            <a:schemeClr val="dk1"/>
+          </a:fontRef>
+        </p:style>
+        <p:txBody>
+          <a:bodyPr rtlCol="0" anchor="ctr"/>
+          <a:lstStyle/>
+          <a:p>
+            <a:pPr algn="ctr"/>
+            <a:r>
+              <a:rPr lang="en-US" sz="1050" smtClean="0">
+                <a:solidFill>
+                  <a:srgbClr val="7030A0"/>
+                </a:solidFill>
+              </a:rPr>
+              <a:t>OrderItemStatus</a:t>
+            </a:r>
+            <a:endParaRPr lang="en-SG" sz="1050" dirty="0">
+              <a:solidFill>
+                <a:srgbClr val="7030A0"/>
+              </a:solidFill>
+            </a:endParaRPr>
+          </a:p>
+        </p:txBody>
+      </p:sp>
+      <p:cxnSp>
+        <p:nvCxnSpPr>
+          <p:cNvPr id="117" name="Elbow Connector 116"/>
+          <p:cNvCxnSpPr>
+            <a:stCxn id="115" idx="3"/>
+            <a:endCxn id="116" idx="1"/>
+          </p:cNvCxnSpPr>
+          <p:nvPr/>
+        </p:nvCxnSpPr>
+        <p:spPr>
+          <a:xfrm flipV="1">
+            <a:off x="8163204" y="2048583"/>
+            <a:ext cx="455902" cy="204836"/>
+          </a:xfrm>
+          <a:prstGeom prst="bentConnector3">
+            <a:avLst>
+              <a:gd name="adj1" fmla="val 50000"/>
+            </a:avLst>
+          </a:prstGeom>
+          <a:ln w="19050">
+            <a:solidFill>
+              <a:srgbClr val="7030A0"/>
+            </a:solidFill>
+            <a:headEnd type="none" w="med" len="med"/>
+            <a:tailEnd type="arrow" w="med" len="med"/>
+          </a:ln>
+          <a:effectLst/>
+        </p:spPr>
+        <p:style>
+          <a:lnRef idx="1">
+            <a:schemeClr val="accent2"/>
+          </a:lnRef>
+          <a:fillRef idx="2">
+            <a:schemeClr val="accent2"/>
+          </a:fillRef>
+          <a:effectRef idx="1">
+            <a:schemeClr val="accent2"/>
+          </a:effectRef>
+          <a:fontRef idx="minor">
+            <a:schemeClr val="dk1"/>
+          </a:fontRef>
+        </p:style>
+      </p:cxnSp>
+      <p:sp>
+        <p:nvSpPr>
+          <p:cNvPr id="121" name="Rectangle 8">
+            <a:extLst>
+              <a:ext uri="{FF2B5EF4-FFF2-40B4-BE49-F238E27FC236}">
+                <a16:creationId xmlns:a16="http://schemas.microsoft.com/office/drawing/2014/main" xmlns="" id="{ABDCDBD2-131A-4B66-A2F2-43BBEE82C773}"/>
+              </a:ext>
+            </a:extLst>
+          </p:cNvPr>
+          <p:cNvSpPr/>
+          <p:nvPr/>
+        </p:nvSpPr>
+        <p:spPr>
+          <a:xfrm>
+            <a:off x="8619106" y="1492560"/>
+            <a:ext cx="982094" cy="293849"/>
+          </a:xfrm>
+          <a:prstGeom prst="rect">
+            <a:avLst/>
+          </a:prstGeom>
+          <a:ln w="19050">
+            <a:solidFill>
+              <a:srgbClr val="7030A0"/>
+            </a:solidFill>
+          </a:ln>
+          <a:effectLst/>
+        </p:spPr>
+        <p:style>
+          <a:lnRef idx="1">
+            <a:schemeClr val="accent4"/>
+          </a:lnRef>
+          <a:fillRef idx="2">
+            <a:schemeClr val="accent4"/>
+          </a:fillRef>
+          <a:effectRef idx="1">
+            <a:schemeClr val="accent4"/>
+          </a:effectRef>
+          <a:fontRef idx="minor">
+            <a:schemeClr val="dk1"/>
+          </a:fontRef>
+        </p:style>
+        <p:txBody>
+          <a:bodyPr rtlCol="0" anchor="ctr"/>
+          <a:lstStyle/>
+          <a:p>
+            <a:pPr algn="ctr"/>
+            <a:r>
+              <a:rPr lang="en-US" sz="1050" dirty="0" smtClean="0">
+                <a:solidFill>
+                  <a:srgbClr val="7030A0"/>
+                </a:solidFill>
+              </a:rPr>
+              <a:t>TableNumber</a:t>
+            </a:r>
+            <a:endParaRPr lang="en-SG" sz="1050" dirty="0">
+              <a:solidFill>
+                <a:srgbClr val="7030A0"/>
+              </a:solidFill>
+            </a:endParaRPr>
+          </a:p>
+        </p:txBody>
+      </p:sp>
+      <p:cxnSp>
+        <p:nvCxnSpPr>
+          <p:cNvPr id="123" name="Elbow Connector 78">
+            <a:extLst>
+              <a:ext uri="{FF2B5EF4-FFF2-40B4-BE49-F238E27FC236}">
+                <a16:creationId xmlns:a16="http://schemas.microsoft.com/office/drawing/2014/main" xmlns="" id="{B97967F8-618A-448B-81FD-CDFD4AF0EC64}"/>
+              </a:ext>
+            </a:extLst>
+          </p:cNvPr>
+          <p:cNvCxnSpPr>
+            <a:cxnSpLocks/>
+            <a:stCxn id="115" idx="3"/>
+            <a:endCxn id="121" idx="1"/>
+          </p:cNvCxnSpPr>
+          <p:nvPr/>
+        </p:nvCxnSpPr>
+        <p:spPr>
+          <a:xfrm flipV="1">
+            <a:off x="8163204" y="1639485"/>
+            <a:ext cx="455902" cy="613934"/>
+          </a:xfrm>
+          <a:prstGeom prst="bentConnector3">
+            <a:avLst>
+              <a:gd name="adj1" fmla="val 50000"/>
+            </a:avLst>
+          </a:prstGeom>
+          <a:ln w="19050">
+            <a:solidFill>
+              <a:srgbClr val="7030A0"/>
+            </a:solidFill>
+            <a:headEnd type="none" w="med" len="med"/>
+            <a:tailEnd type="arrow" w="med" len="med"/>
+          </a:ln>
+          <a:effectLst/>
+        </p:spPr>
+        <p:style>
+          <a:lnRef idx="1">
+            <a:schemeClr val="accent2"/>
+          </a:lnRef>
+          <a:fillRef idx="2">
+            <a:schemeClr val="accent2"/>
+          </a:fillRef>
+          <a:effectRef idx="1">
+            <a:schemeClr val="accent2"/>
+          </a:effectRef>
+          <a:fontRef idx="minor">
+            <a:schemeClr val="dk1"/>
+          </a:fontRef>
+        </p:style>
+      </p:cxnSp>
+      <p:sp>
+        <p:nvSpPr>
+          <p:cNvPr id="143" name="Rectangle 8"/>
+          <p:cNvSpPr/>
+          <p:nvPr/>
+        </p:nvSpPr>
+        <p:spPr>
+          <a:xfrm>
+            <a:off x="8597606" y="2741764"/>
+            <a:ext cx="708186" cy="285783"/>
+          </a:xfrm>
+          <a:prstGeom prst="rect">
+            <a:avLst/>
+          </a:prstGeom>
+          <a:ln w="19050">
+            <a:solidFill>
+              <a:srgbClr val="7030A0"/>
+            </a:solidFill>
+          </a:ln>
+          <a:effectLst/>
+        </p:spPr>
+        <p:style>
+          <a:lnRef idx="1">
+            <a:schemeClr val="accent4"/>
+          </a:lnRef>
+          <a:fillRef idx="2">
+            <a:schemeClr val="accent4"/>
+          </a:fillRef>
+          <a:effectRef idx="1">
+            <a:schemeClr val="accent4"/>
+          </a:effectRef>
+          <a:fontRef idx="minor">
+            <a:schemeClr val="dk1"/>
+          </a:fontRef>
+        </p:style>
+        <p:txBody>
+          <a:bodyPr rtlCol="0" anchor="ctr"/>
+          <a:lstStyle/>
+          <a:p>
+            <a:pPr algn="ctr"/>
+            <a:r>
+              <a:rPr lang="en-US" sz="1050" dirty="0">
+                <a:solidFill>
+                  <a:srgbClr val="7030A0"/>
+                </a:solidFill>
+              </a:rPr>
+              <a:t>Name</a:t>
+            </a:r>
+            <a:endParaRPr lang="en-SG" sz="1050" dirty="0">
+              <a:solidFill>
+                <a:srgbClr val="7030A0"/>
+              </a:solidFill>
+            </a:endParaRPr>
+          </a:p>
+        </p:txBody>
+      </p:sp>
+      <p:cxnSp>
+        <p:nvCxnSpPr>
+          <p:cNvPr id="145" name="Elbow Connector 144"/>
+          <p:cNvCxnSpPr>
+            <a:cxnSpLocks/>
+            <a:stCxn id="115" idx="3"/>
+            <a:endCxn id="143" idx="1"/>
+          </p:cNvCxnSpPr>
+          <p:nvPr/>
+        </p:nvCxnSpPr>
+        <p:spPr>
+          <a:xfrm>
+            <a:off x="8163204" y="2253419"/>
+            <a:ext cx="434402" cy="631237"/>
+          </a:xfrm>
+          <a:prstGeom prst="bentConnector3">
+            <a:avLst>
+              <a:gd name="adj1" fmla="val 50000"/>
+            </a:avLst>
+          </a:prstGeom>
+          <a:ln w="19050">
+            <a:solidFill>
+              <a:srgbClr val="7030A0"/>
+            </a:solidFill>
+            <a:headEnd type="none" w="med" len="med"/>
+            <a:tailEnd type="arrow" w="med" len="med"/>
+          </a:ln>
+          <a:effectLst/>
+        </p:spPr>
+        <p:style>
+          <a:lnRef idx="1">
+            <a:schemeClr val="accent2"/>
+          </a:lnRef>
+          <a:fillRef idx="2">
+            <a:schemeClr val="accent2"/>
+          </a:fillRef>
+          <a:effectRef idx="1">
+            <a:schemeClr val="accent2"/>
+          </a:effectRef>
+          <a:fontRef idx="minor">
+            <a:schemeClr val="dk1"/>
+          </a:fontRef>
+        </p:style>
+      </p:cxnSp>
+      <p:sp>
+        <p:nvSpPr>
+          <p:cNvPr id="148" name="Rectangle 8">
+            <a:extLst>
+              <a:ext uri="{FF2B5EF4-FFF2-40B4-BE49-F238E27FC236}">
+                <a16:creationId xmlns:a16="http://schemas.microsoft.com/office/drawing/2014/main" xmlns="" id="{ABDCDBD2-131A-4B66-A2F2-43BBEE82C773}"/>
+              </a:ext>
+            </a:extLst>
+          </p:cNvPr>
+          <p:cNvSpPr/>
+          <p:nvPr/>
+        </p:nvSpPr>
+        <p:spPr>
+          <a:xfrm>
+            <a:off x="8611117" y="2336747"/>
+            <a:ext cx="708186" cy="285783"/>
+          </a:xfrm>
+          <a:prstGeom prst="rect">
+            <a:avLst/>
+          </a:prstGeom>
+          <a:ln w="19050">
+            <a:solidFill>
+              <a:srgbClr val="7030A0"/>
+            </a:solidFill>
+          </a:ln>
+          <a:effectLst/>
+        </p:spPr>
+        <p:style>
+          <a:lnRef idx="1">
+            <a:schemeClr val="accent4"/>
+          </a:lnRef>
+          <a:fillRef idx="2">
+            <a:schemeClr val="accent4"/>
+          </a:fillRef>
+          <a:effectRef idx="1">
+            <a:schemeClr val="accent4"/>
+          </a:effectRef>
+          <a:fontRef idx="minor">
+            <a:schemeClr val="dk1"/>
+          </a:fontRef>
+        </p:style>
+        <p:txBody>
+          <a:bodyPr rtlCol="0" anchor="ctr"/>
+          <a:lstStyle/>
+          <a:p>
+            <a:pPr algn="ctr"/>
+            <a:r>
+              <a:rPr lang="en-US" sz="1050" dirty="0" smtClean="0">
+                <a:solidFill>
+                  <a:srgbClr val="7030A0"/>
+                </a:solidFill>
+              </a:rPr>
+              <a:t>Code</a:t>
+            </a:r>
+            <a:endParaRPr lang="en-SG" sz="1050" dirty="0">
+              <a:solidFill>
+                <a:srgbClr val="7030A0"/>
+              </a:solidFill>
+            </a:endParaRPr>
+          </a:p>
+        </p:txBody>
+      </p:sp>
+      <p:cxnSp>
+        <p:nvCxnSpPr>
+          <p:cNvPr id="149" name="Elbow Connector 78">
+            <a:extLst>
+              <a:ext uri="{FF2B5EF4-FFF2-40B4-BE49-F238E27FC236}">
+                <a16:creationId xmlns:a16="http://schemas.microsoft.com/office/drawing/2014/main" xmlns="" id="{B97967F8-618A-448B-81FD-CDFD4AF0EC64}"/>
+              </a:ext>
+            </a:extLst>
+          </p:cNvPr>
+          <p:cNvCxnSpPr>
+            <a:cxnSpLocks/>
+            <a:stCxn id="115" idx="3"/>
+            <a:endCxn id="148" idx="1"/>
+          </p:cNvCxnSpPr>
+          <p:nvPr/>
+        </p:nvCxnSpPr>
+        <p:spPr>
+          <a:xfrm>
+            <a:off x="8163204" y="2253419"/>
+            <a:ext cx="447913" cy="226220"/>
+          </a:xfrm>
+          <a:prstGeom prst="bentConnector3">
+            <a:avLst>
+              <a:gd name="adj1" fmla="val 50001"/>
+            </a:avLst>
+          </a:prstGeom>
+          <a:ln w="19050">
+            <a:solidFill>
+              <a:srgbClr val="7030A0"/>
+            </a:solidFill>
+            <a:headEnd type="none" w="med" len="med"/>
+            <a:tailEnd type="arrow" w="med" len="med"/>
+          </a:ln>
+          <a:effectLst/>
+        </p:spPr>
+        <p:style>
+          <a:lnRef idx="1">
+            <a:schemeClr val="accent2"/>
+          </a:lnRef>
+          <a:fillRef idx="2">
+            <a:schemeClr val="accent2"/>
+          </a:fillRef>
+          <a:effectRef idx="1">
+            <a:schemeClr val="accent2"/>
+          </a:effectRef>
+          <a:fontRef idx="minor">
+            <a:schemeClr val="dk1"/>
+          </a:fontRef>
+        </p:style>
+      </p:cxnSp>
+      <p:sp>
+        <p:nvSpPr>
+          <p:cNvPr id="286" name="TextBox 285"/>
+          <p:cNvSpPr txBox="1"/>
+          <p:nvPr/>
+        </p:nvSpPr>
+        <p:spPr>
+          <a:xfrm>
+            <a:off x="8423898" y="1371155"/>
+            <a:ext cx="189257" cy="178683"/>
+          </a:xfrm>
+          <a:prstGeom prst="rect">
+            <a:avLst/>
+          </a:prstGeom>
+          <a:noFill/>
+        </p:spPr>
+        <p:txBody>
+          <a:bodyPr wrap="square" lIns="0" tIns="0" rIns="0" bIns="0" rtlCol="0">
+            <a:noAutofit/>
+          </a:bodyPr>
+          <a:lstStyle/>
+          <a:p>
+            <a:pPr algn="ctr"/>
+            <a:r>
+              <a:rPr lang="en-US" sz="1100" dirty="0">
+                <a:solidFill>
+                  <a:srgbClr val="7030A0"/>
+                </a:solidFill>
+              </a:rPr>
+              <a:t>1</a:t>
+            </a:r>
+            <a:endParaRPr lang="en-SG" sz="1100" dirty="0">
+              <a:solidFill>
+                <a:srgbClr val="7030A0"/>
+              </a:solidFill>
+            </a:endParaRPr>
+          </a:p>
+        </p:txBody>
+      </p:sp>
+      <p:sp>
+        <p:nvSpPr>
+          <p:cNvPr id="287" name="TextBox 286"/>
+          <p:cNvSpPr txBox="1"/>
+          <p:nvPr/>
+        </p:nvSpPr>
+        <p:spPr>
+          <a:xfrm>
+            <a:off x="8491367" y="1809305"/>
+            <a:ext cx="106239" cy="196668"/>
+          </a:xfrm>
+          <a:prstGeom prst="rect">
+            <a:avLst/>
+          </a:prstGeom>
+          <a:noFill/>
+        </p:spPr>
+        <p:txBody>
+          <a:bodyPr wrap="square" lIns="0" tIns="0" rIns="0" bIns="0" rtlCol="0">
+            <a:noAutofit/>
+          </a:bodyPr>
+          <a:lstStyle/>
+          <a:p>
+            <a:pPr algn="ctr"/>
+            <a:r>
+              <a:rPr lang="en-US" sz="1100" dirty="0">
+                <a:solidFill>
+                  <a:srgbClr val="7030A0"/>
+                </a:solidFill>
+              </a:rPr>
+              <a:t>1</a:t>
+            </a:r>
+            <a:endParaRPr lang="en-SG" sz="1100" dirty="0">
+              <a:solidFill>
+                <a:srgbClr val="7030A0"/>
+              </a:solidFill>
+            </a:endParaRPr>
+          </a:p>
+        </p:txBody>
+      </p:sp>
+      <p:sp>
+        <p:nvSpPr>
+          <p:cNvPr id="290" name="TextBox 289"/>
+          <p:cNvSpPr txBox="1"/>
+          <p:nvPr/>
+        </p:nvSpPr>
+        <p:spPr>
+          <a:xfrm>
+            <a:off x="8426026" y="2257298"/>
+            <a:ext cx="189257" cy="178683"/>
+          </a:xfrm>
+          <a:prstGeom prst="rect">
+            <a:avLst/>
+          </a:prstGeom>
+          <a:noFill/>
+        </p:spPr>
+        <p:txBody>
+          <a:bodyPr wrap="square" lIns="0" tIns="0" rIns="0" bIns="0" rtlCol="0">
+            <a:noAutofit/>
+          </a:bodyPr>
+          <a:lstStyle/>
+          <a:p>
+            <a:pPr algn="ctr"/>
+            <a:r>
+              <a:rPr lang="en-US" sz="1100" dirty="0">
+                <a:solidFill>
+                  <a:srgbClr val="7030A0"/>
+                </a:solidFill>
+              </a:rPr>
+              <a:t>1</a:t>
+            </a:r>
+            <a:endParaRPr lang="en-SG" sz="1100" dirty="0">
+              <a:solidFill>
+                <a:srgbClr val="7030A0"/>
+              </a:solidFill>
+            </a:endParaRPr>
+          </a:p>
+        </p:txBody>
+      </p:sp>
+      <p:sp>
+        <p:nvSpPr>
+          <p:cNvPr id="291" name="TextBox 290"/>
+          <p:cNvSpPr txBox="1"/>
+          <p:nvPr/>
+        </p:nvSpPr>
+        <p:spPr>
+          <a:xfrm>
+            <a:off x="8422100" y="2653563"/>
+            <a:ext cx="189257" cy="178683"/>
+          </a:xfrm>
+          <a:prstGeom prst="rect">
+            <a:avLst/>
+          </a:prstGeom>
+          <a:noFill/>
+        </p:spPr>
+        <p:txBody>
+          <a:bodyPr wrap="square" lIns="0" tIns="0" rIns="0" bIns="0" rtlCol="0">
+            <a:noAutofit/>
+          </a:bodyPr>
+          <a:lstStyle/>
+          <a:p>
+            <a:pPr algn="ctr"/>
+            <a:r>
+              <a:rPr lang="en-US" sz="1100" dirty="0">
+                <a:solidFill>
+                  <a:srgbClr val="7030A0"/>
+                </a:solidFill>
+              </a:rPr>
+              <a:t>1</a:t>
+            </a:r>
+            <a:endParaRPr lang="en-SG" sz="1100" dirty="0">
+              <a:solidFill>
+                <a:srgbClr val="7030A0"/>
+              </a:solidFill>
+            </a:endParaRPr>
+          </a:p>
+        </p:txBody>
+      </p:sp>
+      <p:cxnSp>
+        <p:nvCxnSpPr>
+          <p:cNvPr id="175" name="Elbow Connector 122"/>
+          <p:cNvCxnSpPr>
+            <a:endCxn id="46" idx="1"/>
+          </p:cNvCxnSpPr>
+          <p:nvPr/>
+        </p:nvCxnSpPr>
+        <p:spPr>
+          <a:xfrm>
+            <a:off x="951061" y="2248636"/>
+            <a:ext cx="1143969" cy="0"/>
+          </a:xfrm>
+          <a:prstGeom prst="bentConnector3">
+            <a:avLst>
+              <a:gd name="adj1" fmla="val 50000"/>
+            </a:avLst>
+          </a:prstGeom>
+          <a:ln w="19050">
+            <a:solidFill>
+              <a:schemeClr val="bg1">
+                <a:lumMod val="75000"/>
+              </a:schemeClr>
+            </a:solidFill>
+            <a:prstDash val="sysDot"/>
+            <a:headEnd type="none" w="med" len="med"/>
+            <a:tailEnd type="arrow" w="med" len="med"/>
+          </a:ln>
+          <a:effectLst/>
+        </p:spPr>
+        <p:style>
+          <a:lnRef idx="1">
+            <a:schemeClr val="accent2"/>
+          </a:lnRef>
+          <a:fillRef idx="2">
+            <a:schemeClr val="accent2"/>
+          </a:fillRef>
+          <a:effectRef idx="1">
+            <a:schemeClr val="accent2"/>
+          </a:effectRef>
+          <a:fontRef idx="minor">
+            <a:schemeClr val="dk1"/>
+          </a:fontRef>
+        </p:style>
+      </p:cxnSp>
+    </p:spTree>
+    <p:extLst>
+      <p:ext uri="{BB962C8B-B14F-4D97-AF65-F5344CB8AC3E}">
+        <p14:creationId xmlns:p14="http://schemas.microsoft.com/office/powerpoint/2010/main" val="1426426408"/>
       </p:ext>
     </p:extLst>
   </p:cSld>

</xml_diff>

<commit_message>
ModelComponentClassDiagram contains a new slide with Menu feature classes
</commit_message>
<xml_diff>
--- a/docs/diagrams/ModelComponentClassDiagram.pptx
+++ b/docs/diagrams/ModelComponentClassDiagram.pptx
@@ -5,7 +5,7 @@
     <p:sldMasterId id="2147483648" r:id="rId1"/>
   </p:sldMasterIdLst>
   <p:notesMasterIdLst>
-    <p:notesMasterId r:id="rId8"/>
+    <p:notesMasterId r:id="rId9"/>
   </p:notesMasterIdLst>
   <p:sldIdLst>
     <p:sldId id="263" r:id="rId2"/>
@@ -13,7 +13,8 @@
     <p:sldId id="265" r:id="rId4"/>
     <p:sldId id="266" r:id="rId5"/>
     <p:sldId id="267" r:id="rId6"/>
-    <p:sldId id="268" r:id="rId7"/>
+    <p:sldId id="269" r:id="rId7"/>
+    <p:sldId id="268" r:id="rId8"/>
   </p:sldIdLst>
   <p:sldSz cx="9144000" cy="6858000" type="screen4x3"/>
   <p:notesSz cx="6858000" cy="9144000"/>
@@ -213,7 +214,7 @@
           <a:p>
             <a:fld id="{F5CC4B3F-88C1-4FFA-B1B6-F41C21DC6924}" type="datetimeFigureOut">
               <a:rPr lang="en-US" smtClean="0"/>
-              <a:t>4/15/19</a:t>
+              <a:t>4/15/2019</a:t>
             </a:fld>
             <a:endParaRPr lang="en-US"/>
           </a:p>
@@ -525,10 +526,9 @@
           <a:lstStyle/>
           <a:p>
             <a:r>
-              <a:rPr lang="en-US" smtClean="0"/>
+              <a:rPr lang="en-US"/>
               <a:t>With filtered list</a:t>
             </a:r>
-            <a:endParaRPr lang="en-US"/>
           </a:p>
         </p:txBody>
       </p:sp>
@@ -613,11 +613,11 @@
           <a:lstStyle/>
           <a:p>
             <a:r>
-              <a:rPr lang="en-US" dirty="0" smtClean="0"/>
+              <a:rPr lang="en-US" dirty="0"/>
               <a:t>Without filtered</a:t>
             </a:r>
             <a:r>
-              <a:rPr lang="en-US" baseline="0" dirty="0" smtClean="0"/>
+              <a:rPr lang="en-US" baseline="0" dirty="0"/>
               <a:t> list</a:t>
             </a:r>
             <a:endParaRPr lang="en-US" dirty="0"/>
@@ -705,11 +705,11 @@
           <a:lstStyle/>
           <a:p>
             <a:r>
-              <a:rPr lang="en-US" dirty="0" smtClean="0"/>
+              <a:rPr lang="en-US" dirty="0"/>
               <a:t>Without filtered</a:t>
             </a:r>
             <a:r>
-              <a:rPr lang="en-US" baseline="0" dirty="0" smtClean="0"/>
+              <a:rPr lang="en-US" baseline="0" dirty="0"/>
               <a:t> list</a:t>
             </a:r>
             <a:endParaRPr lang="en-US" dirty="0"/>
@@ -797,11 +797,11 @@
           <a:lstStyle/>
           <a:p>
             <a:r>
-              <a:rPr lang="en-US" dirty="0" smtClean="0"/>
+              <a:rPr lang="en-US" dirty="0"/>
               <a:t>Without filtered</a:t>
             </a:r>
             <a:r>
-              <a:rPr lang="en-US" baseline="0" dirty="0" smtClean="0"/>
+              <a:rPr lang="en-US" baseline="0" dirty="0"/>
               <a:t> list</a:t>
             </a:r>
             <a:endParaRPr lang="en-US" dirty="0"/>
@@ -826,6 +826,98 @@
             <a:fld id="{5A7AB025-77E3-4BD1-A2FD-B3183DBA47A3}" type="slidenum">
               <a:rPr lang="en-US" smtClean="0"/>
               <a:t>6</a:t>
+            </a:fld>
+            <a:endParaRPr lang="en-US"/>
+          </a:p>
+        </p:txBody>
+      </p:sp>
+    </p:spTree>
+    <p:extLst>
+      <p:ext uri="{BB962C8B-B14F-4D97-AF65-F5344CB8AC3E}">
+        <p14:creationId xmlns:p14="http://schemas.microsoft.com/office/powerpoint/2010/main" val="3386153091"/>
+      </p:ext>
+    </p:extLst>
+  </p:cSld>
+  <p:clrMapOvr>
+    <a:masterClrMapping/>
+  </p:clrMapOvr>
+</p:notes>
+</file>
+
+<file path=ppt/notesSlides/notesSlide5.xml><?xml version="1.0" encoding="utf-8"?>
+<p:notes xmlns:a="http://schemas.openxmlformats.org/drawingml/2006/main" xmlns:r="http://schemas.openxmlformats.org/officeDocument/2006/relationships" xmlns:p="http://schemas.openxmlformats.org/presentationml/2006/main">
+  <p:cSld>
+    <p:spTree>
+      <p:nvGrpSpPr>
+        <p:cNvPr id="1" name=""/>
+        <p:cNvGrpSpPr/>
+        <p:nvPr/>
+      </p:nvGrpSpPr>
+      <p:grpSpPr>
+        <a:xfrm>
+          <a:off x="0" y="0"/>
+          <a:ext cx="0" cy="0"/>
+          <a:chOff x="0" y="0"/>
+          <a:chExt cx="0" cy="0"/>
+        </a:xfrm>
+      </p:grpSpPr>
+      <p:sp>
+        <p:nvSpPr>
+          <p:cNvPr id="2" name="Slide Image Placeholder 1"/>
+          <p:cNvSpPr>
+            <a:spLocks noGrp="1" noRot="1" noChangeAspect="1"/>
+          </p:cNvSpPr>
+          <p:nvPr>
+            <p:ph type="sldImg"/>
+          </p:nvPr>
+        </p:nvSpPr>
+        <p:spPr/>
+      </p:sp>
+      <p:sp>
+        <p:nvSpPr>
+          <p:cNvPr id="3" name="Notes Placeholder 2"/>
+          <p:cNvSpPr>
+            <a:spLocks noGrp="1"/>
+          </p:cNvSpPr>
+          <p:nvPr>
+            <p:ph type="body" idx="1"/>
+          </p:nvPr>
+        </p:nvSpPr>
+        <p:spPr/>
+        <p:txBody>
+          <a:bodyPr/>
+          <a:lstStyle/>
+          <a:p>
+            <a:r>
+              <a:rPr lang="en-US" dirty="0"/>
+              <a:t>Without filtered</a:t>
+            </a:r>
+            <a:r>
+              <a:rPr lang="en-US" baseline="0" dirty="0"/>
+              <a:t> list</a:t>
+            </a:r>
+            <a:endParaRPr lang="en-US" dirty="0"/>
+          </a:p>
+        </p:txBody>
+      </p:sp>
+      <p:sp>
+        <p:nvSpPr>
+          <p:cNvPr id="4" name="Slide Number Placeholder 3"/>
+          <p:cNvSpPr>
+            <a:spLocks noGrp="1"/>
+          </p:cNvSpPr>
+          <p:nvPr>
+            <p:ph type="sldNum" sz="quarter" idx="10"/>
+          </p:nvPr>
+        </p:nvSpPr>
+        <p:spPr/>
+        <p:txBody>
+          <a:bodyPr/>
+          <a:lstStyle/>
+          <a:p>
+            <a:fld id="{5A7AB025-77E3-4BD1-A2FD-B3183DBA47A3}" type="slidenum">
+              <a:rPr lang="en-US" smtClean="0"/>
+              <a:t>7</a:t>
             </a:fld>
             <a:endParaRPr lang="en-US"/>
           </a:p>
@@ -1023,7 +1115,7 @@
           <a:p>
             <a:fld id="{78C97017-6FC3-485B-9764-EAC9E56C1D49}" type="datetimeFigureOut">
               <a:rPr lang="en-US" smtClean="0"/>
-              <a:t>4/15/19</a:t>
+              <a:t>4/15/2019</a:t>
             </a:fld>
             <a:endParaRPr lang="en-US"/>
           </a:p>
@@ -1191,7 +1283,7 @@
           <a:p>
             <a:fld id="{78C97017-6FC3-485B-9764-EAC9E56C1D49}" type="datetimeFigureOut">
               <a:rPr lang="en-US" smtClean="0"/>
-              <a:t>4/15/19</a:t>
+              <a:t>4/15/2019</a:t>
             </a:fld>
             <a:endParaRPr lang="en-US"/>
           </a:p>
@@ -1369,7 +1461,7 @@
           <a:p>
             <a:fld id="{78C97017-6FC3-485B-9764-EAC9E56C1D49}" type="datetimeFigureOut">
               <a:rPr lang="en-US" smtClean="0"/>
-              <a:t>4/15/19</a:t>
+              <a:t>4/15/2019</a:t>
             </a:fld>
             <a:endParaRPr lang="en-US"/>
           </a:p>
@@ -1537,7 +1629,7 @@
           <a:p>
             <a:fld id="{78C97017-6FC3-485B-9764-EAC9E56C1D49}" type="datetimeFigureOut">
               <a:rPr lang="en-US" smtClean="0"/>
-              <a:t>4/15/19</a:t>
+              <a:t>4/15/2019</a:t>
             </a:fld>
             <a:endParaRPr lang="en-US"/>
           </a:p>
@@ -1782,7 +1874,7 @@
           <a:p>
             <a:fld id="{78C97017-6FC3-485B-9764-EAC9E56C1D49}" type="datetimeFigureOut">
               <a:rPr lang="en-US" smtClean="0"/>
-              <a:t>4/15/19</a:t>
+              <a:t>4/15/2019</a:t>
             </a:fld>
             <a:endParaRPr lang="en-US"/>
           </a:p>
@@ -2067,7 +2159,7 @@
           <a:p>
             <a:fld id="{78C97017-6FC3-485B-9764-EAC9E56C1D49}" type="datetimeFigureOut">
               <a:rPr lang="en-US" smtClean="0"/>
-              <a:t>4/15/19</a:t>
+              <a:t>4/15/2019</a:t>
             </a:fld>
             <a:endParaRPr lang="en-US"/>
           </a:p>
@@ -2486,7 +2578,7 @@
           <a:p>
             <a:fld id="{78C97017-6FC3-485B-9764-EAC9E56C1D49}" type="datetimeFigureOut">
               <a:rPr lang="en-US" smtClean="0"/>
-              <a:t>4/15/19</a:t>
+              <a:t>4/15/2019</a:t>
             </a:fld>
             <a:endParaRPr lang="en-US"/>
           </a:p>
@@ -2603,7 +2695,7 @@
           <a:p>
             <a:fld id="{78C97017-6FC3-485B-9764-EAC9E56C1D49}" type="datetimeFigureOut">
               <a:rPr lang="en-US" smtClean="0"/>
-              <a:t>4/15/19</a:t>
+              <a:t>4/15/2019</a:t>
             </a:fld>
             <a:endParaRPr lang="en-US"/>
           </a:p>
@@ -2698,7 +2790,7 @@
           <a:p>
             <a:fld id="{78C97017-6FC3-485B-9764-EAC9E56C1D49}" type="datetimeFigureOut">
               <a:rPr lang="en-US" smtClean="0"/>
-              <a:t>4/15/19</a:t>
+              <a:t>4/15/2019</a:t>
             </a:fld>
             <a:endParaRPr lang="en-US"/>
           </a:p>
@@ -2973,7 +3065,7 @@
           <a:p>
             <a:fld id="{78C97017-6FC3-485B-9764-EAC9E56C1D49}" type="datetimeFigureOut">
               <a:rPr lang="en-US" smtClean="0"/>
-              <a:t>4/15/19</a:t>
+              <a:t>4/15/2019</a:t>
             </a:fld>
             <a:endParaRPr lang="en-US"/>
           </a:p>
@@ -3225,7 +3317,7 @@
           <a:p>
             <a:fld id="{78C97017-6FC3-485B-9764-EAC9E56C1D49}" type="datetimeFigureOut">
               <a:rPr lang="en-US" smtClean="0"/>
-              <a:t>4/15/19</a:t>
+              <a:t>4/15/2019</a:t>
             </a:fld>
             <a:endParaRPr lang="en-US"/>
           </a:p>
@@ -3436,7 +3528,7 @@
           <a:p>
             <a:fld id="{78C97017-6FC3-485B-9764-EAC9E56C1D49}" type="datetimeFigureOut">
               <a:rPr lang="en-US" smtClean="0"/>
-              <a:t>4/15/19</a:t>
+              <a:t>4/15/2019</a:t>
             </a:fld>
             <a:endParaRPr lang="en-US"/>
           </a:p>
@@ -5396,14 +5488,6 @@
               </a:rPr>
               <a:t>&lt;&lt;interface&gt;&gt;</a:t>
             </a:r>
-            <a:r>
-              <a:rPr lang="en-US" sz="1050">
-                <a:solidFill>
-                  <a:srgbClr val="7030A0"/>
-                </a:solidFill>
-              </a:rPr>
-              <a:t/>
-            </a:r>
             <a:br>
               <a:rPr lang="en-US" sz="1050">
                 <a:solidFill>
@@ -5669,7 +5753,7 @@
           <p:cNvPr id="52" name="Rectangle 8">
             <a:extLst>
               <a:ext uri="{FF2B5EF4-FFF2-40B4-BE49-F238E27FC236}">
-                <a16:creationId xmlns:a16="http://schemas.microsoft.com/office/drawing/2014/main" xmlns="" id="{ABDCDBD2-131A-4B66-A2F2-43BBEE82C773}"/>
+                <a16:creationId xmlns:a16="http://schemas.microsoft.com/office/drawing/2014/main" id="{ABDCDBD2-131A-4B66-A2F2-43BBEE82C773}"/>
               </a:ext>
             </a:extLst>
           </p:cNvPr>
@@ -5731,7 +5815,7 @@
           <p:cNvPr id="53" name="Elbow Connector 78">
             <a:extLst>
               <a:ext uri="{FF2B5EF4-FFF2-40B4-BE49-F238E27FC236}">
-                <a16:creationId xmlns:a16="http://schemas.microsoft.com/office/drawing/2014/main" xmlns="" id="{B97967F8-618A-448B-81FD-CDFD4AF0EC64}"/>
+                <a16:creationId xmlns:a16="http://schemas.microsoft.com/office/drawing/2014/main" id="{B97967F8-618A-448B-81FD-CDFD4AF0EC64}"/>
               </a:ext>
             </a:extLst>
           </p:cNvPr>
@@ -5781,7 +5865,7 @@
           <p:cNvPr id="50" name="TextBox 49">
             <a:extLst>
               <a:ext uri="{FF2B5EF4-FFF2-40B4-BE49-F238E27FC236}">
-                <a16:creationId xmlns:a16="http://schemas.microsoft.com/office/drawing/2014/main" xmlns="" id="{B3FA9D57-880F-49C4-AD0B-A64E30D6F403}"/>
+                <a16:creationId xmlns:a16="http://schemas.microsoft.com/office/drawing/2014/main" id="{B3FA9D57-880F-49C4-AD0B-A64E30D6F403}"/>
               </a:ext>
             </a:extLst>
           </p:cNvPr>
@@ -6019,7 +6103,7 @@
           <p:cNvPr id="57" name="Rectangle 8">
             <a:extLst>
               <a:ext uri="{FF2B5EF4-FFF2-40B4-BE49-F238E27FC236}">
-                <a16:creationId xmlns:a16="http://schemas.microsoft.com/office/drawing/2014/main" xmlns="" id="{6A42DA50-9012-4391-9EF3-285E4FA3FCD8}"/>
+                <a16:creationId xmlns:a16="http://schemas.microsoft.com/office/drawing/2014/main" id="{6A42DA50-9012-4391-9EF3-285E4FA3FCD8}"/>
               </a:ext>
             </a:extLst>
           </p:cNvPr>
@@ -6092,7 +6176,7 @@
           <p:cNvPr id="59" name="Isosceles Triangle 102">
             <a:extLst>
               <a:ext uri="{FF2B5EF4-FFF2-40B4-BE49-F238E27FC236}">
-                <a16:creationId xmlns:a16="http://schemas.microsoft.com/office/drawing/2014/main" xmlns="" id="{B263B2D7-6E76-465E-B40E-7E2A46254A84}"/>
+                <a16:creationId xmlns:a16="http://schemas.microsoft.com/office/drawing/2014/main" id="{B263B2D7-6E76-465E-B40E-7E2A46254A84}"/>
               </a:ext>
             </a:extLst>
           </p:cNvPr>
@@ -6150,7 +6234,7 @@
           <p:cNvPr id="67" name="Elbow Connector 63">
             <a:extLst>
               <a:ext uri="{FF2B5EF4-FFF2-40B4-BE49-F238E27FC236}">
-                <a16:creationId xmlns:a16="http://schemas.microsoft.com/office/drawing/2014/main" xmlns="" id="{BA3A25CD-7C1D-4B3B-B294-1B05ABCFECFD}"/>
+                <a16:creationId xmlns:a16="http://schemas.microsoft.com/office/drawing/2014/main" id="{BA3A25CD-7C1D-4B3B-B294-1B05ABCFECFD}"/>
               </a:ext>
             </a:extLst>
           </p:cNvPr>
@@ -7812,14 +7896,6 @@
               </a:rPr>
               <a:t>&lt;&lt;interface&gt;&gt;</a:t>
             </a:r>
-            <a:r>
-              <a:rPr lang="en-US" sz="1050">
-                <a:solidFill>
-                  <a:srgbClr val="7030A0"/>
-                </a:solidFill>
-              </a:rPr>
-              <a:t/>
-            </a:r>
             <a:br>
               <a:rPr lang="en-US" sz="1050">
                 <a:solidFill>
@@ -8085,7 +8161,7 @@
           <p:cNvPr id="52" name="Rectangle 8">
             <a:extLst>
               <a:ext uri="{FF2B5EF4-FFF2-40B4-BE49-F238E27FC236}">
-                <a16:creationId xmlns:a16="http://schemas.microsoft.com/office/drawing/2014/main" xmlns="" id="{ABDCDBD2-131A-4B66-A2F2-43BBEE82C773}"/>
+                <a16:creationId xmlns:a16="http://schemas.microsoft.com/office/drawing/2014/main" id="{ABDCDBD2-131A-4B66-A2F2-43BBEE82C773}"/>
               </a:ext>
             </a:extLst>
           </p:cNvPr>
@@ -8147,7 +8223,7 @@
           <p:cNvPr id="53" name="Elbow Connector 78">
             <a:extLst>
               <a:ext uri="{FF2B5EF4-FFF2-40B4-BE49-F238E27FC236}">
-                <a16:creationId xmlns:a16="http://schemas.microsoft.com/office/drawing/2014/main" xmlns="" id="{B97967F8-618A-448B-81FD-CDFD4AF0EC64}"/>
+                <a16:creationId xmlns:a16="http://schemas.microsoft.com/office/drawing/2014/main" id="{B97967F8-618A-448B-81FD-CDFD4AF0EC64}"/>
               </a:ext>
             </a:extLst>
           </p:cNvPr>
@@ -8197,7 +8273,7 @@
           <p:cNvPr id="50" name="TextBox 49">
             <a:extLst>
               <a:ext uri="{FF2B5EF4-FFF2-40B4-BE49-F238E27FC236}">
-                <a16:creationId xmlns:a16="http://schemas.microsoft.com/office/drawing/2014/main" xmlns="" id="{B3FA9D57-880F-49C4-AD0B-A64E30D6F403}"/>
+                <a16:creationId xmlns:a16="http://schemas.microsoft.com/office/drawing/2014/main" id="{B3FA9D57-880F-49C4-AD0B-A64E30D6F403}"/>
               </a:ext>
             </a:extLst>
           </p:cNvPr>
@@ -8435,7 +8511,7 @@
           <p:cNvPr id="57" name="Rectangle 8">
             <a:extLst>
               <a:ext uri="{FF2B5EF4-FFF2-40B4-BE49-F238E27FC236}">
-                <a16:creationId xmlns:a16="http://schemas.microsoft.com/office/drawing/2014/main" xmlns="" id="{6A42DA50-9012-4391-9EF3-285E4FA3FCD8}"/>
+                <a16:creationId xmlns:a16="http://schemas.microsoft.com/office/drawing/2014/main" id="{6A42DA50-9012-4391-9EF3-285E4FA3FCD8}"/>
               </a:ext>
             </a:extLst>
           </p:cNvPr>
@@ -8508,7 +8584,7 @@
           <p:cNvPr id="59" name="Isosceles Triangle 102">
             <a:extLst>
               <a:ext uri="{FF2B5EF4-FFF2-40B4-BE49-F238E27FC236}">
-                <a16:creationId xmlns:a16="http://schemas.microsoft.com/office/drawing/2014/main" xmlns="" id="{B263B2D7-6E76-465E-B40E-7E2A46254A84}"/>
+                <a16:creationId xmlns:a16="http://schemas.microsoft.com/office/drawing/2014/main" id="{B263B2D7-6E76-465E-B40E-7E2A46254A84}"/>
               </a:ext>
             </a:extLst>
           </p:cNvPr>
@@ -8566,7 +8642,7 @@
           <p:cNvPr id="67" name="Elbow Connector 63">
             <a:extLst>
               <a:ext uri="{FF2B5EF4-FFF2-40B4-BE49-F238E27FC236}">
-                <a16:creationId xmlns:a16="http://schemas.microsoft.com/office/drawing/2014/main" xmlns="" id="{BA3A25CD-7C1D-4B3B-B294-1B05ABCFECFD}"/>
+                <a16:creationId xmlns:a16="http://schemas.microsoft.com/office/drawing/2014/main" id="{BA3A25CD-7C1D-4B3B-B294-1B05ABCFECFD}"/>
               </a:ext>
             </a:extLst>
           </p:cNvPr>
@@ -9115,7 +9191,7 @@
           <a:p>
             <a:pPr algn="ctr"/>
             <a:r>
-              <a:rPr lang="en-US" sz="1050" dirty="0" smtClean="0">
+              <a:rPr lang="en-US" sz="1050" dirty="0">
                 <a:solidFill>
                   <a:srgbClr val="7030A0"/>
                 </a:solidFill>
@@ -9257,7 +9333,7 @@
           <a:p>
             <a:pPr algn="ctr"/>
             <a:r>
-              <a:rPr lang="en-US" sz="1050" dirty="0" smtClean="0">
+              <a:rPr lang="en-US" sz="1050" dirty="0">
                 <a:solidFill>
                   <a:srgbClr val="7030A0"/>
                 </a:solidFill>
@@ -9360,7 +9436,7 @@
           <a:p>
             <a:pPr algn="ctr"/>
             <a:r>
-              <a:rPr lang="en-US" sz="1050" dirty="0" smtClean="0">
+              <a:rPr lang="en-US" sz="1050" dirty="0">
                 <a:solidFill>
                   <a:srgbClr val="7030A0"/>
                 </a:solidFill>
@@ -9502,7 +9578,7 @@
           <a:p>
             <a:pPr algn="ctr"/>
             <a:r>
-              <a:rPr lang="en-US" sz="1050" dirty="0" smtClean="0">
+              <a:rPr lang="en-US" sz="1050" dirty="0">
                 <a:solidFill>
                   <a:srgbClr val="7030A0"/>
                 </a:solidFill>
@@ -9605,7 +9681,7 @@
           <a:p>
             <a:pPr algn="ctr"/>
             <a:r>
-              <a:rPr lang="en-US" sz="1050" dirty="0" smtClean="0">
+              <a:rPr lang="en-US" sz="1050" dirty="0">
                 <a:solidFill>
                   <a:srgbClr val="7030A0"/>
                 </a:solidFill>
@@ -9699,7 +9775,7 @@
           <a:p>
             <a:pPr algn="ctr"/>
             <a:r>
-              <a:rPr lang="en-US" sz="1050" dirty="0" smtClean="0">
+              <a:rPr lang="en-US" sz="1050" dirty="0">
                 <a:solidFill>
                   <a:srgbClr val="7030A0"/>
                 </a:solidFill>
@@ -9867,7 +9943,7 @@
               </a:rPr>
             </a:br>
             <a:r>
-              <a:rPr lang="en-US" sz="1050" dirty="0" smtClean="0">
+              <a:rPr lang="en-US" sz="1050" dirty="0">
                 <a:solidFill>
                   <a:srgbClr val="7030A0"/>
                 </a:solidFill>
@@ -10192,7 +10268,7 @@
           <p:cNvPr id="117" name="Rectangle 8">
             <a:extLst>
               <a:ext uri="{FF2B5EF4-FFF2-40B4-BE49-F238E27FC236}">
-                <a16:creationId xmlns="" xmlns:a16="http://schemas.microsoft.com/office/drawing/2014/main" id="{ABDCDBD2-131A-4B66-A2F2-43BBEE82C773}"/>
+                <a16:creationId xmlns:a16="http://schemas.microsoft.com/office/drawing/2014/main" id="{ABDCDBD2-131A-4B66-A2F2-43BBEE82C773}"/>
               </a:ext>
             </a:extLst>
           </p:cNvPr>
@@ -10234,7 +10310,7 @@
           <a:p>
             <a:pPr algn="ctr"/>
             <a:r>
-              <a:rPr lang="en-US" sz="1050" dirty="0" smtClean="0">
+              <a:rPr lang="en-US" sz="1050" dirty="0">
                 <a:solidFill>
                   <a:srgbClr val="7030A0"/>
                 </a:solidFill>
@@ -10254,7 +10330,7 @@
           <p:cNvPr id="121" name="Elbow Connector 78">
             <a:extLst>
               <a:ext uri="{FF2B5EF4-FFF2-40B4-BE49-F238E27FC236}">
-                <a16:creationId xmlns="" xmlns:a16="http://schemas.microsoft.com/office/drawing/2014/main" id="{B97967F8-618A-448B-81FD-CDFD4AF0EC64}"/>
+                <a16:creationId xmlns:a16="http://schemas.microsoft.com/office/drawing/2014/main" id="{B97967F8-618A-448B-81FD-CDFD4AF0EC64}"/>
               </a:ext>
             </a:extLst>
           </p:cNvPr>
@@ -10344,7 +10420,7 @@
           <p:cNvPr id="125" name="Rectangle 8">
             <a:extLst>
               <a:ext uri="{FF2B5EF4-FFF2-40B4-BE49-F238E27FC236}">
-                <a16:creationId xmlns="" xmlns:a16="http://schemas.microsoft.com/office/drawing/2014/main" id="{6A42DA50-9012-4391-9EF3-285E4FA3FCD8}"/>
+                <a16:creationId xmlns:a16="http://schemas.microsoft.com/office/drawing/2014/main" id="{6A42DA50-9012-4391-9EF3-285E4FA3FCD8}"/>
               </a:ext>
             </a:extLst>
           </p:cNvPr>
@@ -10417,7 +10493,7 @@
           <p:cNvPr id="126" name="Isosceles Triangle 102">
             <a:extLst>
               <a:ext uri="{FF2B5EF4-FFF2-40B4-BE49-F238E27FC236}">
-                <a16:creationId xmlns="" xmlns:a16="http://schemas.microsoft.com/office/drawing/2014/main" id="{B263B2D7-6E76-465E-B40E-7E2A46254A84}"/>
+                <a16:creationId xmlns:a16="http://schemas.microsoft.com/office/drawing/2014/main" id="{B263B2D7-6E76-465E-B40E-7E2A46254A84}"/>
               </a:ext>
             </a:extLst>
           </p:cNvPr>
@@ -10475,7 +10551,7 @@
           <p:cNvPr id="127" name="Elbow Connector 63">
             <a:extLst>
               <a:ext uri="{FF2B5EF4-FFF2-40B4-BE49-F238E27FC236}">
-                <a16:creationId xmlns="" xmlns:a16="http://schemas.microsoft.com/office/drawing/2014/main" id="{BA3A25CD-7C1D-4B3B-B294-1B05ABCFECFD}"/>
+                <a16:creationId xmlns:a16="http://schemas.microsoft.com/office/drawing/2014/main" id="{BA3A25CD-7C1D-4B3B-B294-1B05ABCFECFD}"/>
               </a:ext>
             </a:extLst>
           </p:cNvPr>
@@ -10560,7 +10636,7 @@
           <a:p>
             <a:pPr algn="ctr"/>
             <a:r>
-              <a:rPr lang="en-US" sz="1050" dirty="0" smtClean="0">
+              <a:rPr lang="en-US" sz="1050" dirty="0">
                 <a:solidFill>
                   <a:srgbClr val="7030A0"/>
                 </a:solidFill>
@@ -10695,7 +10771,7 @@
           <a:p>
             <a:pPr algn="ctr"/>
             <a:r>
-              <a:rPr lang="en-US" sz="1050" dirty="0" smtClean="0">
+              <a:rPr lang="en-US" sz="1050" dirty="0">
                 <a:solidFill>
                   <a:srgbClr val="7030A0"/>
                 </a:solidFill>
@@ -11000,7 +11076,7 @@
           <a:p>
             <a:pPr algn="ctr"/>
             <a:r>
-              <a:rPr lang="en-US" sz="1050" dirty="0" smtClean="0">
+              <a:rPr lang="en-US" sz="1050" dirty="0">
                 <a:solidFill>
                   <a:srgbClr val="7030A0"/>
                 </a:solidFill>
@@ -11296,7 +11372,7 @@
           <a:p>
             <a:pPr algn="ctr"/>
             <a:r>
-              <a:rPr lang="en-US" sz="1050" dirty="0" smtClean="0">
+              <a:rPr lang="en-US" sz="1050" dirty="0">
                 <a:solidFill>
                   <a:srgbClr val="7030A0"/>
                 </a:solidFill>
@@ -11561,7 +11637,7 @@
           <a:p>
             <a:pPr algn="ctr"/>
             <a:r>
-              <a:rPr lang="en-US" sz="1050" smtClean="0">
+              <a:rPr lang="en-US" sz="1050">
                 <a:solidFill>
                   <a:srgbClr val="7030A0"/>
                 </a:solidFill>
@@ -11617,7 +11693,7 @@
           <a:p>
             <a:pPr algn="ctr"/>
             <a:r>
-              <a:rPr lang="en-US" sz="1050" dirty="0" smtClean="0">
+              <a:rPr lang="en-US" sz="1050" dirty="0">
                 <a:solidFill>
                   <a:srgbClr val="7030A0"/>
                 </a:solidFill>
@@ -11831,7 +11907,7 @@
           <a:p>
             <a:pPr algn="ctr"/>
             <a:r>
-              <a:rPr lang="en-US" sz="1050" smtClean="0">
+              <a:rPr lang="en-US" sz="1050">
                 <a:solidFill>
                   <a:srgbClr val="7030A0"/>
                 </a:solidFill>
@@ -12544,7 +12620,7 @@
           <a:p>
             <a:pPr algn="ctr"/>
             <a:r>
-              <a:rPr lang="en-US" sz="1050" dirty="0" smtClean="0">
+              <a:rPr lang="en-US" sz="1050" dirty="0">
                 <a:solidFill>
                   <a:srgbClr val="7030A0"/>
                 </a:solidFill>
@@ -12686,7 +12762,7 @@
           <a:p>
             <a:pPr algn="ctr"/>
             <a:r>
-              <a:rPr lang="en-US" sz="1050" smtClean="0">
+              <a:rPr lang="en-US" sz="1050">
                 <a:solidFill>
                   <a:srgbClr val="7030A0"/>
                 </a:solidFill>
@@ -12933,14 +13009,6 @@
               </a:rPr>
               <a:t>&lt;&lt;interface&gt;&gt;</a:t>
             </a:r>
-            <a:r>
-              <a:rPr lang="en-US" sz="1050">
-                <a:solidFill>
-                  <a:srgbClr val="7030A0"/>
-                </a:solidFill>
-              </a:rPr>
-              <a:t/>
-            </a:r>
             <a:br>
               <a:rPr lang="en-US" sz="1050">
                 <a:solidFill>
@@ -13179,7 +13247,7 @@
               </a:rPr>
             </a:br>
             <a:r>
-              <a:rPr lang="en-US" sz="1050" dirty="0" smtClean="0">
+              <a:rPr lang="en-US" sz="1050" dirty="0">
                 <a:solidFill>
                   <a:srgbClr val="7030A0"/>
                 </a:solidFill>
@@ -13240,7 +13308,7 @@
           <p:cNvPr id="57" name="Rectangle 8">
             <a:extLst>
               <a:ext uri="{FF2B5EF4-FFF2-40B4-BE49-F238E27FC236}">
-                <a16:creationId xmlns:a16="http://schemas.microsoft.com/office/drawing/2014/main" xmlns="" id="{6A42DA50-9012-4391-9EF3-285E4FA3FCD8}"/>
+                <a16:creationId xmlns:a16="http://schemas.microsoft.com/office/drawing/2014/main" id="{6A42DA50-9012-4391-9EF3-285E4FA3FCD8}"/>
               </a:ext>
             </a:extLst>
           </p:cNvPr>
@@ -13313,7 +13381,7 @@
           <p:cNvPr id="59" name="Isosceles Triangle 102">
             <a:extLst>
               <a:ext uri="{FF2B5EF4-FFF2-40B4-BE49-F238E27FC236}">
-                <a16:creationId xmlns:a16="http://schemas.microsoft.com/office/drawing/2014/main" xmlns="" id="{B263B2D7-6E76-465E-B40E-7E2A46254A84}"/>
+                <a16:creationId xmlns:a16="http://schemas.microsoft.com/office/drawing/2014/main" id="{B263B2D7-6E76-465E-B40E-7E2A46254A84}"/>
               </a:ext>
             </a:extLst>
           </p:cNvPr>
@@ -13371,7 +13439,7 @@
           <p:cNvPr id="67" name="Elbow Connector 63">
             <a:extLst>
               <a:ext uri="{FF2B5EF4-FFF2-40B4-BE49-F238E27FC236}">
-                <a16:creationId xmlns:a16="http://schemas.microsoft.com/office/drawing/2014/main" xmlns="" id="{BA3A25CD-7C1D-4B3B-B294-1B05ABCFECFD}"/>
+                <a16:creationId xmlns:a16="http://schemas.microsoft.com/office/drawing/2014/main" id="{BA3A25CD-7C1D-4B3B-B294-1B05ABCFECFD}"/>
               </a:ext>
             </a:extLst>
           </p:cNvPr>
@@ -13458,7 +13526,7 @@
           <a:p>
             <a:pPr algn="ctr"/>
             <a:r>
-              <a:rPr lang="en-US" sz="1050" smtClean="0">
+              <a:rPr lang="en-US" sz="1050">
                 <a:solidFill>
                   <a:srgbClr val="7030A0"/>
                 </a:solidFill>
@@ -13640,7 +13708,7 @@
           <a:p>
             <a:pPr algn="ctr"/>
             <a:r>
-              <a:rPr lang="en-US" sz="1050" dirty="0" smtClean="0">
+              <a:rPr lang="en-US" sz="1050" dirty="0">
                 <a:solidFill>
                   <a:srgbClr val="7030A0"/>
                 </a:solidFill>
@@ -13696,7 +13764,7 @@
           <a:p>
             <a:pPr algn="ctr"/>
             <a:r>
-              <a:rPr lang="en-US" sz="1050" dirty="0" smtClean="0">
+              <a:rPr lang="en-US" sz="1050" dirty="0">
                 <a:solidFill>
                   <a:srgbClr val="7030A0"/>
                 </a:solidFill>
@@ -13752,7 +13820,7 @@
           <a:p>
             <a:pPr algn="ctr"/>
             <a:r>
-              <a:rPr lang="en-US" sz="1050" dirty="0" smtClean="0">
+              <a:rPr lang="en-US" sz="1050" dirty="0">
                 <a:solidFill>
                   <a:srgbClr val="7030A0"/>
                 </a:solidFill>
@@ -13920,7 +13988,7 @@
               </a:rPr>
             </a:br>
             <a:r>
-              <a:rPr lang="en-US" sz="1050" dirty="0" err="1" smtClean="0">
+              <a:rPr lang="en-US" sz="1050" dirty="0" err="1">
                 <a:solidFill>
                   <a:srgbClr val="7030A0"/>
                 </a:solidFill>
@@ -13991,7 +14059,7 @@
               </a:rPr>
             </a:br>
             <a:r>
-              <a:rPr lang="en-US" sz="1050" dirty="0" smtClean="0">
+              <a:rPr lang="en-US" sz="1050" dirty="0">
                 <a:solidFill>
                   <a:srgbClr val="7030A0"/>
                 </a:solidFill>
@@ -14397,7 +14465,7 @@
               </a:rPr>
             </a:br>
             <a:r>
-              <a:rPr lang="en-US" sz="1050" dirty="0" smtClean="0">
+              <a:rPr lang="en-US" sz="1050" dirty="0">
                 <a:solidFill>
                   <a:srgbClr val="7030A0"/>
                 </a:solidFill>
@@ -14565,7 +14633,7 @@
               </a:rPr>
             </a:br>
             <a:r>
-              <a:rPr lang="en-US" sz="1050" dirty="0" smtClean="0">
+              <a:rPr lang="en-US" sz="1050" dirty="0">
                 <a:solidFill>
                   <a:srgbClr val="7030A0"/>
                 </a:solidFill>
@@ -14718,7 +14786,7 @@
           <a:p>
             <a:pPr algn="ctr"/>
             <a:r>
-              <a:rPr lang="en-US" sz="1050" dirty="0" smtClean="0">
+              <a:rPr lang="en-US" sz="1050" dirty="0">
                 <a:solidFill>
                   <a:srgbClr val="7030A0"/>
                 </a:solidFill>
@@ -14943,7 +15011,7 @@
           <a:p>
             <a:pPr algn="ctr"/>
             <a:r>
-              <a:rPr lang="en-US" sz="1050" dirty="0" smtClean="0">
+              <a:rPr lang="en-US" sz="1050" dirty="0">
                 <a:solidFill>
                   <a:srgbClr val="7030A0"/>
                 </a:solidFill>
@@ -15001,7 +15069,7 @@
           <p:cNvPr id="121" name="Rectangle 8">
             <a:extLst>
               <a:ext uri="{FF2B5EF4-FFF2-40B4-BE49-F238E27FC236}">
-                <a16:creationId xmlns:a16="http://schemas.microsoft.com/office/drawing/2014/main" xmlns="" id="{ABDCDBD2-131A-4B66-A2F2-43BBEE82C773}"/>
+                <a16:creationId xmlns:a16="http://schemas.microsoft.com/office/drawing/2014/main" id="{ABDCDBD2-131A-4B66-A2F2-43BBEE82C773}"/>
               </a:ext>
             </a:extLst>
           </p:cNvPr>
@@ -15043,7 +15111,7 @@
           <a:p>
             <a:pPr algn="ctr"/>
             <a:r>
-              <a:rPr lang="en-US" sz="1050" smtClean="0">
+              <a:rPr lang="en-US" sz="1050">
                 <a:solidFill>
                   <a:srgbClr val="7030A0"/>
                 </a:solidFill>
@@ -15063,7 +15131,7 @@
           <p:cNvPr id="123" name="Elbow Connector 78">
             <a:extLst>
               <a:ext uri="{FF2B5EF4-FFF2-40B4-BE49-F238E27FC236}">
-                <a16:creationId xmlns:a16="http://schemas.microsoft.com/office/drawing/2014/main" xmlns="" id="{B97967F8-618A-448B-81FD-CDFD4AF0EC64}"/>
+                <a16:creationId xmlns:a16="http://schemas.microsoft.com/office/drawing/2014/main" id="{B97967F8-618A-448B-81FD-CDFD4AF0EC64}"/>
               </a:ext>
             </a:extLst>
           </p:cNvPr>
@@ -15147,7 +15215,7 @@
           <a:p>
             <a:pPr algn="ctr"/>
             <a:r>
-              <a:rPr lang="en-US" sz="1050" dirty="0" smtClean="0">
+              <a:rPr lang="en-US" sz="1050" dirty="0">
                 <a:solidFill>
                   <a:srgbClr val="7030A0"/>
                 </a:solidFill>
@@ -15327,7 +15395,7 @@
           <a:p>
             <a:pPr algn="ctr"/>
             <a:r>
-              <a:rPr lang="en-US" sz="1050" smtClean="0">
+              <a:rPr lang="en-US" sz="1050">
                 <a:solidFill>
                   <a:srgbClr val="7030A0"/>
                 </a:solidFill>
@@ -15516,7 +15584,7 @@
           <p:cNvPr id="134" name="Elbow Connector 78">
             <a:extLst>
               <a:ext uri="{FF2B5EF4-FFF2-40B4-BE49-F238E27FC236}">
-                <a16:creationId xmlns:a16="http://schemas.microsoft.com/office/drawing/2014/main" xmlns="" id="{B97967F8-618A-448B-81FD-CDFD4AF0EC64}"/>
+                <a16:creationId xmlns:a16="http://schemas.microsoft.com/office/drawing/2014/main" id="{B97967F8-618A-448B-81FD-CDFD4AF0EC64}"/>
               </a:ext>
             </a:extLst>
           </p:cNvPr>
@@ -15600,7 +15668,7 @@
           <a:p>
             <a:pPr algn="ctr"/>
             <a:r>
-              <a:rPr lang="en-US" sz="1050" dirty="0" smtClean="0">
+              <a:rPr lang="en-US" sz="1050" dirty="0">
                 <a:solidFill>
                   <a:srgbClr val="7030A0"/>
                 </a:solidFill>
@@ -15780,7 +15848,7 @@
           <a:p>
             <a:pPr algn="ctr"/>
             <a:r>
-              <a:rPr lang="en-US" sz="1050" dirty="0" smtClean="0">
+              <a:rPr lang="en-US" sz="1050" dirty="0">
                 <a:solidFill>
                   <a:srgbClr val="7030A0"/>
                 </a:solidFill>
@@ -16103,7 +16171,7 @@
           <a:p>
             <a:pPr algn="ctr"/>
             <a:r>
-              <a:rPr lang="en-US" sz="1050" dirty="0" smtClean="0">
+              <a:rPr lang="en-US" sz="1050" dirty="0">
                 <a:solidFill>
                   <a:srgbClr val="7030A0"/>
                 </a:solidFill>
@@ -16164,7 +16232,7 @@
           <p:cNvPr id="148" name="Rectangle 8">
             <a:extLst>
               <a:ext uri="{FF2B5EF4-FFF2-40B4-BE49-F238E27FC236}">
-                <a16:creationId xmlns:a16="http://schemas.microsoft.com/office/drawing/2014/main" xmlns="" id="{ABDCDBD2-131A-4B66-A2F2-43BBEE82C773}"/>
+                <a16:creationId xmlns:a16="http://schemas.microsoft.com/office/drawing/2014/main" id="{ABDCDBD2-131A-4B66-A2F2-43BBEE82C773}"/>
               </a:ext>
             </a:extLst>
           </p:cNvPr>
@@ -16206,7 +16274,7 @@
           <a:p>
             <a:pPr algn="ctr"/>
             <a:r>
-              <a:rPr lang="en-US" sz="1050" dirty="0" smtClean="0">
+              <a:rPr lang="en-US" sz="1050" dirty="0">
                 <a:solidFill>
                   <a:srgbClr val="7030A0"/>
                 </a:solidFill>
@@ -16226,7 +16294,7 @@
           <p:cNvPr id="149" name="Elbow Connector 78">
             <a:extLst>
               <a:ext uri="{FF2B5EF4-FFF2-40B4-BE49-F238E27FC236}">
-                <a16:creationId xmlns:a16="http://schemas.microsoft.com/office/drawing/2014/main" xmlns="" id="{B97967F8-618A-448B-81FD-CDFD4AF0EC64}"/>
+                <a16:creationId xmlns:a16="http://schemas.microsoft.com/office/drawing/2014/main" id="{B97967F8-618A-448B-81FD-CDFD4AF0EC64}"/>
               </a:ext>
             </a:extLst>
           </p:cNvPr>
@@ -16276,7 +16344,7 @@
           <p:cNvPr id="151" name="Elbow Connector 78">
             <a:extLst>
               <a:ext uri="{FF2B5EF4-FFF2-40B4-BE49-F238E27FC236}">
-                <a16:creationId xmlns:a16="http://schemas.microsoft.com/office/drawing/2014/main" xmlns="" id="{B97967F8-618A-448B-81FD-CDFD4AF0EC64}"/>
+                <a16:creationId xmlns:a16="http://schemas.microsoft.com/office/drawing/2014/main" id="{B97967F8-618A-448B-81FD-CDFD4AF0EC64}"/>
               </a:ext>
             </a:extLst>
           </p:cNvPr>
@@ -16360,7 +16428,7 @@
           <a:p>
             <a:pPr algn="ctr"/>
             <a:r>
-              <a:rPr lang="en-US" sz="1050" dirty="0" smtClean="0">
+              <a:rPr lang="en-US" sz="1050" dirty="0">
                 <a:solidFill>
                   <a:srgbClr val="7030A0"/>
                 </a:solidFill>
@@ -16540,7 +16608,7 @@
           <a:p>
             <a:pPr algn="ctr"/>
             <a:r>
-              <a:rPr lang="en-US" sz="1050" dirty="0" smtClean="0">
+              <a:rPr lang="en-US" sz="1050" dirty="0">
                 <a:solidFill>
                   <a:srgbClr val="7030A0"/>
                 </a:solidFill>
@@ -16718,7 +16786,7 @@
           <a:p>
             <a:pPr algn="ctr"/>
             <a:r>
-              <a:rPr lang="en-US" sz="1050" dirty="0" smtClean="0">
+              <a:rPr lang="en-US" sz="1050" dirty="0">
                 <a:solidFill>
                   <a:srgbClr val="7030A0"/>
                 </a:solidFill>
@@ -16865,7 +16933,7 @@
           <a:p>
             <a:pPr algn="ctr"/>
             <a:r>
-              <a:rPr lang="en-US" sz="1050" dirty="0" smtClean="0">
+              <a:rPr lang="en-US" sz="1050" dirty="0">
                 <a:solidFill>
                   <a:srgbClr val="7030A0"/>
                 </a:solidFill>
@@ -16926,7 +16994,7 @@
           <p:cNvPr id="167" name="Rectangle 8">
             <a:extLst>
               <a:ext uri="{FF2B5EF4-FFF2-40B4-BE49-F238E27FC236}">
-                <a16:creationId xmlns:a16="http://schemas.microsoft.com/office/drawing/2014/main" xmlns="" id="{ABDCDBD2-131A-4B66-A2F2-43BBEE82C773}"/>
+                <a16:creationId xmlns:a16="http://schemas.microsoft.com/office/drawing/2014/main" id="{ABDCDBD2-131A-4B66-A2F2-43BBEE82C773}"/>
               </a:ext>
             </a:extLst>
           </p:cNvPr>
@@ -16968,7 +17036,7 @@
           <a:p>
             <a:pPr algn="ctr"/>
             <a:r>
-              <a:rPr lang="en-US" sz="1050" dirty="0" smtClean="0">
+              <a:rPr lang="en-US" sz="1050" dirty="0">
                 <a:solidFill>
                   <a:srgbClr val="7030A0"/>
                 </a:solidFill>
@@ -16988,7 +17056,7 @@
           <p:cNvPr id="168" name="Elbow Connector 78">
             <a:extLst>
               <a:ext uri="{FF2B5EF4-FFF2-40B4-BE49-F238E27FC236}">
-                <a16:creationId xmlns:a16="http://schemas.microsoft.com/office/drawing/2014/main" xmlns="" id="{B97967F8-618A-448B-81FD-CDFD4AF0EC64}"/>
+                <a16:creationId xmlns:a16="http://schemas.microsoft.com/office/drawing/2014/main" id="{B97967F8-618A-448B-81FD-CDFD4AF0EC64}"/>
               </a:ext>
             </a:extLst>
           </p:cNvPr>
@@ -17038,7 +17106,7 @@
           <p:cNvPr id="178" name="Elbow Connector 78">
             <a:extLst>
               <a:ext uri="{FF2B5EF4-FFF2-40B4-BE49-F238E27FC236}">
-                <a16:creationId xmlns:a16="http://schemas.microsoft.com/office/drawing/2014/main" xmlns="" id="{B97967F8-618A-448B-81FD-CDFD4AF0EC64}"/>
+                <a16:creationId xmlns:a16="http://schemas.microsoft.com/office/drawing/2014/main" id="{B97967F8-618A-448B-81FD-CDFD4AF0EC64}"/>
               </a:ext>
             </a:extLst>
           </p:cNvPr>
@@ -17085,7 +17153,7 @@
           <p:cNvPr id="186" name="Elbow Connector 78">
             <a:extLst>
               <a:ext uri="{FF2B5EF4-FFF2-40B4-BE49-F238E27FC236}">
-                <a16:creationId xmlns:a16="http://schemas.microsoft.com/office/drawing/2014/main" xmlns="" id="{B97967F8-618A-448B-81FD-CDFD4AF0EC64}"/>
+                <a16:creationId xmlns:a16="http://schemas.microsoft.com/office/drawing/2014/main" id="{B97967F8-618A-448B-81FD-CDFD4AF0EC64}"/>
               </a:ext>
             </a:extLst>
           </p:cNvPr>
@@ -17133,7 +17201,7 @@
           <p:cNvPr id="191" name="Elbow Connector 78">
             <a:extLst>
               <a:ext uri="{FF2B5EF4-FFF2-40B4-BE49-F238E27FC236}">
-                <a16:creationId xmlns:a16="http://schemas.microsoft.com/office/drawing/2014/main" xmlns="" id="{B97967F8-618A-448B-81FD-CDFD4AF0EC64}"/>
+                <a16:creationId xmlns:a16="http://schemas.microsoft.com/office/drawing/2014/main" id="{B97967F8-618A-448B-81FD-CDFD4AF0EC64}"/>
               </a:ext>
             </a:extLst>
           </p:cNvPr>
@@ -17181,7 +17249,7 @@
           <p:cNvPr id="194" name="Elbow Connector 78">
             <a:extLst>
               <a:ext uri="{FF2B5EF4-FFF2-40B4-BE49-F238E27FC236}">
-                <a16:creationId xmlns:a16="http://schemas.microsoft.com/office/drawing/2014/main" xmlns="" id="{B97967F8-618A-448B-81FD-CDFD4AF0EC64}"/>
+                <a16:creationId xmlns:a16="http://schemas.microsoft.com/office/drawing/2014/main" id="{B97967F8-618A-448B-81FD-CDFD4AF0EC64}"/>
               </a:ext>
             </a:extLst>
           </p:cNvPr>
@@ -17759,7 +17827,7 @@
           <a:p>
             <a:pPr algn="ctr"/>
             <a:r>
-              <a:rPr lang="en-US" sz="1050" dirty="0" smtClean="0">
+              <a:rPr lang="en-US" sz="1050" dirty="0">
                 <a:solidFill>
                   <a:srgbClr val="7030A0"/>
                 </a:solidFill>
@@ -17901,7 +17969,7 @@
           <a:p>
             <a:pPr algn="ctr"/>
             <a:r>
-              <a:rPr lang="en-US" sz="1050" smtClean="0">
+              <a:rPr lang="en-US" sz="1050">
                 <a:solidFill>
                   <a:srgbClr val="7030A0"/>
                 </a:solidFill>
@@ -18109,14 +18177,6 @@
               </a:rPr>
               <a:t>&lt;&lt;interface&gt;&gt;</a:t>
             </a:r>
-            <a:r>
-              <a:rPr lang="en-US" sz="1050">
-                <a:solidFill>
-                  <a:srgbClr val="7030A0"/>
-                </a:solidFill>
-              </a:rPr>
-              <a:t/>
-            </a:r>
             <a:br>
               <a:rPr lang="en-US" sz="1050">
                 <a:solidFill>
@@ -18355,7 +18415,7 @@
               </a:rPr>
             </a:br>
             <a:r>
-              <a:rPr lang="en-US" sz="1050" dirty="0" smtClean="0">
+              <a:rPr lang="en-US" sz="1050" dirty="0">
                 <a:solidFill>
                   <a:srgbClr val="7030A0"/>
                 </a:solidFill>
@@ -18416,7 +18476,7 @@
           <p:cNvPr id="57" name="Rectangle 8">
             <a:extLst>
               <a:ext uri="{FF2B5EF4-FFF2-40B4-BE49-F238E27FC236}">
-                <a16:creationId xmlns:a16="http://schemas.microsoft.com/office/drawing/2014/main" xmlns="" id="{6A42DA50-9012-4391-9EF3-285E4FA3FCD8}"/>
+                <a16:creationId xmlns:a16="http://schemas.microsoft.com/office/drawing/2014/main" id="{6A42DA50-9012-4391-9EF3-285E4FA3FCD8}"/>
               </a:ext>
             </a:extLst>
           </p:cNvPr>
@@ -18489,7 +18549,7 @@
           <p:cNvPr id="59" name="Isosceles Triangle 102">
             <a:extLst>
               <a:ext uri="{FF2B5EF4-FFF2-40B4-BE49-F238E27FC236}">
-                <a16:creationId xmlns:a16="http://schemas.microsoft.com/office/drawing/2014/main" xmlns="" id="{B263B2D7-6E76-465E-B40E-7E2A46254A84}"/>
+                <a16:creationId xmlns:a16="http://schemas.microsoft.com/office/drawing/2014/main" id="{B263B2D7-6E76-465E-B40E-7E2A46254A84}"/>
               </a:ext>
             </a:extLst>
           </p:cNvPr>
@@ -18547,7 +18607,7 @@
           <p:cNvPr id="67" name="Elbow Connector 63">
             <a:extLst>
               <a:ext uri="{FF2B5EF4-FFF2-40B4-BE49-F238E27FC236}">
-                <a16:creationId xmlns:a16="http://schemas.microsoft.com/office/drawing/2014/main" xmlns="" id="{BA3A25CD-7C1D-4B3B-B294-1B05ABCFECFD}"/>
+                <a16:creationId xmlns:a16="http://schemas.microsoft.com/office/drawing/2014/main" id="{BA3A25CD-7C1D-4B3B-B294-1B05ABCFECFD}"/>
               </a:ext>
             </a:extLst>
           </p:cNvPr>
@@ -18634,7 +18694,7 @@
           <a:p>
             <a:pPr algn="ctr"/>
             <a:r>
-              <a:rPr lang="en-US" sz="1050" smtClean="0">
+              <a:rPr lang="en-US" sz="1050">
                 <a:solidFill>
                   <a:srgbClr val="7030A0"/>
                 </a:solidFill>
@@ -18816,7 +18876,7 @@
           <a:p>
             <a:pPr algn="ctr"/>
             <a:r>
-              <a:rPr lang="en-US" sz="1050" dirty="0" smtClean="0">
+              <a:rPr lang="en-US" sz="1050" dirty="0">
                 <a:solidFill>
                   <a:srgbClr val="7030A0"/>
                 </a:solidFill>
@@ -18872,7 +18932,7 @@
           <a:p>
             <a:pPr algn="ctr"/>
             <a:r>
-              <a:rPr lang="en-US" sz="1050" dirty="0" smtClean="0">
+              <a:rPr lang="en-US" sz="1050" dirty="0">
                 <a:solidFill>
                   <a:srgbClr val="7030A0"/>
                 </a:solidFill>
@@ -18928,7 +18988,7 @@
           <a:p>
             <a:pPr algn="ctr"/>
             <a:r>
-              <a:rPr lang="en-US" sz="1050" dirty="0" smtClean="0">
+              <a:rPr lang="en-US" sz="1050" dirty="0">
                 <a:solidFill>
                   <a:srgbClr val="7030A0"/>
                 </a:solidFill>
@@ -19096,7 +19156,7 @@
               </a:rPr>
             </a:br>
             <a:r>
-              <a:rPr lang="en-US" sz="1050" dirty="0" err="1" smtClean="0">
+              <a:rPr lang="en-US" sz="1050" dirty="0" err="1">
                 <a:solidFill>
                   <a:srgbClr val="7030A0"/>
                 </a:solidFill>
@@ -19167,7 +19227,7 @@
               </a:rPr>
             </a:br>
             <a:r>
-              <a:rPr lang="en-US" sz="1050" dirty="0" smtClean="0">
+              <a:rPr lang="en-US" sz="1050" dirty="0">
                 <a:solidFill>
                   <a:srgbClr val="7030A0"/>
                 </a:solidFill>
@@ -19573,7 +19633,7 @@
               </a:rPr>
             </a:br>
             <a:r>
-              <a:rPr lang="en-US" sz="1050" dirty="0" smtClean="0">
+              <a:rPr lang="en-US" sz="1050" dirty="0">
                 <a:solidFill>
                   <a:srgbClr val="7030A0"/>
                 </a:solidFill>
@@ -19741,7 +19801,7 @@
               </a:rPr>
             </a:br>
             <a:r>
-              <a:rPr lang="en-US" sz="1050" dirty="0" smtClean="0">
+              <a:rPr lang="en-US" sz="1050" dirty="0">
                 <a:solidFill>
                   <a:srgbClr val="7030A0"/>
                 </a:solidFill>
@@ -19894,7 +19954,7 @@
           <a:p>
             <a:pPr algn="ctr"/>
             <a:r>
-              <a:rPr lang="en-US" sz="1050" dirty="0" smtClean="0">
+              <a:rPr lang="en-US" sz="1050" dirty="0">
                 <a:solidFill>
                   <a:srgbClr val="7030A0"/>
                 </a:solidFill>
@@ -20119,7 +20179,7 @@
           <a:p>
             <a:pPr algn="ctr"/>
             <a:r>
-              <a:rPr lang="en-US" sz="1050" dirty="0" smtClean="0">
+              <a:rPr lang="en-US" sz="1050" dirty="0">
                 <a:solidFill>
                   <a:srgbClr val="7030A0"/>
                 </a:solidFill>
@@ -20177,7 +20237,7 @@
           <p:cNvPr id="121" name="Rectangle 8">
             <a:extLst>
               <a:ext uri="{FF2B5EF4-FFF2-40B4-BE49-F238E27FC236}">
-                <a16:creationId xmlns:a16="http://schemas.microsoft.com/office/drawing/2014/main" xmlns="" id="{ABDCDBD2-131A-4B66-A2F2-43BBEE82C773}"/>
+                <a16:creationId xmlns:a16="http://schemas.microsoft.com/office/drawing/2014/main" id="{ABDCDBD2-131A-4B66-A2F2-43BBEE82C773}"/>
               </a:ext>
             </a:extLst>
           </p:cNvPr>
@@ -20219,7 +20279,7 @@
           <a:p>
             <a:pPr algn="ctr"/>
             <a:r>
-              <a:rPr lang="en-US" sz="1050" smtClean="0">
+              <a:rPr lang="en-US" sz="1050">
                 <a:solidFill>
                   <a:srgbClr val="7030A0"/>
                 </a:solidFill>
@@ -20239,7 +20299,7 @@
           <p:cNvPr id="123" name="Elbow Connector 78">
             <a:extLst>
               <a:ext uri="{FF2B5EF4-FFF2-40B4-BE49-F238E27FC236}">
-                <a16:creationId xmlns:a16="http://schemas.microsoft.com/office/drawing/2014/main" xmlns="" id="{B97967F8-618A-448B-81FD-CDFD4AF0EC64}"/>
+                <a16:creationId xmlns:a16="http://schemas.microsoft.com/office/drawing/2014/main" id="{B97967F8-618A-448B-81FD-CDFD4AF0EC64}"/>
               </a:ext>
             </a:extLst>
           </p:cNvPr>
@@ -20323,7 +20383,7 @@
           <a:p>
             <a:pPr algn="ctr"/>
             <a:r>
-              <a:rPr lang="en-US" sz="1050" dirty="0" smtClean="0">
+              <a:rPr lang="en-US" sz="1050" dirty="0">
                 <a:solidFill>
                   <a:srgbClr val="7030A0"/>
                 </a:solidFill>
@@ -20503,7 +20563,7 @@
           <a:p>
             <a:pPr algn="ctr"/>
             <a:r>
-              <a:rPr lang="en-US" sz="1050" smtClean="0">
+              <a:rPr lang="en-US" sz="1050">
                 <a:solidFill>
                   <a:srgbClr val="7030A0"/>
                 </a:solidFill>
@@ -20692,7 +20752,7 @@
           <p:cNvPr id="134" name="Elbow Connector 78">
             <a:extLst>
               <a:ext uri="{FF2B5EF4-FFF2-40B4-BE49-F238E27FC236}">
-                <a16:creationId xmlns:a16="http://schemas.microsoft.com/office/drawing/2014/main" xmlns="" id="{B97967F8-618A-448B-81FD-CDFD4AF0EC64}"/>
+                <a16:creationId xmlns:a16="http://schemas.microsoft.com/office/drawing/2014/main" id="{B97967F8-618A-448B-81FD-CDFD4AF0EC64}"/>
               </a:ext>
             </a:extLst>
           </p:cNvPr>
@@ -20776,7 +20836,7 @@
           <a:p>
             <a:pPr algn="ctr"/>
             <a:r>
-              <a:rPr lang="en-US" sz="1050" dirty="0" smtClean="0">
+              <a:rPr lang="en-US" sz="1050" dirty="0">
                 <a:solidFill>
                   <a:srgbClr val="7030A0"/>
                 </a:solidFill>
@@ -20956,7 +21016,7 @@
           <a:p>
             <a:pPr algn="ctr"/>
             <a:r>
-              <a:rPr lang="en-US" sz="1050" dirty="0" smtClean="0">
+              <a:rPr lang="en-US" sz="1050" dirty="0">
                 <a:solidFill>
                   <a:srgbClr val="7030A0"/>
                 </a:solidFill>
@@ -21279,7 +21339,7 @@
           <a:p>
             <a:pPr algn="ctr"/>
             <a:r>
-              <a:rPr lang="en-US" sz="1050" dirty="0" smtClean="0">
+              <a:rPr lang="en-US" sz="1050" dirty="0">
                 <a:solidFill>
                   <a:srgbClr val="7030A0"/>
                 </a:solidFill>
@@ -21340,7 +21400,7 @@
           <p:cNvPr id="148" name="Rectangle 8">
             <a:extLst>
               <a:ext uri="{FF2B5EF4-FFF2-40B4-BE49-F238E27FC236}">
-                <a16:creationId xmlns:a16="http://schemas.microsoft.com/office/drawing/2014/main" xmlns="" id="{ABDCDBD2-131A-4B66-A2F2-43BBEE82C773}"/>
+                <a16:creationId xmlns:a16="http://schemas.microsoft.com/office/drawing/2014/main" id="{ABDCDBD2-131A-4B66-A2F2-43BBEE82C773}"/>
               </a:ext>
             </a:extLst>
           </p:cNvPr>
@@ -21382,7 +21442,7 @@
           <a:p>
             <a:pPr algn="ctr"/>
             <a:r>
-              <a:rPr lang="en-US" sz="1050" dirty="0" smtClean="0">
+              <a:rPr lang="en-US" sz="1050" dirty="0">
                 <a:solidFill>
                   <a:srgbClr val="7030A0"/>
                 </a:solidFill>
@@ -21402,7 +21462,7 @@
           <p:cNvPr id="149" name="Elbow Connector 78">
             <a:extLst>
               <a:ext uri="{FF2B5EF4-FFF2-40B4-BE49-F238E27FC236}">
-                <a16:creationId xmlns:a16="http://schemas.microsoft.com/office/drawing/2014/main" xmlns="" id="{B97967F8-618A-448B-81FD-CDFD4AF0EC64}"/>
+                <a16:creationId xmlns:a16="http://schemas.microsoft.com/office/drawing/2014/main" id="{B97967F8-618A-448B-81FD-CDFD4AF0EC64}"/>
               </a:ext>
             </a:extLst>
           </p:cNvPr>
@@ -21452,7 +21512,7 @@
           <p:cNvPr id="151" name="Elbow Connector 78">
             <a:extLst>
               <a:ext uri="{FF2B5EF4-FFF2-40B4-BE49-F238E27FC236}">
-                <a16:creationId xmlns:a16="http://schemas.microsoft.com/office/drawing/2014/main" xmlns="" id="{B97967F8-618A-448B-81FD-CDFD4AF0EC64}"/>
+                <a16:creationId xmlns:a16="http://schemas.microsoft.com/office/drawing/2014/main" id="{B97967F8-618A-448B-81FD-CDFD4AF0EC64}"/>
               </a:ext>
             </a:extLst>
           </p:cNvPr>
@@ -21536,7 +21596,7 @@
           <a:p>
             <a:pPr algn="ctr"/>
             <a:r>
-              <a:rPr lang="en-US" sz="1050" dirty="0" smtClean="0">
+              <a:rPr lang="en-US" sz="1050" dirty="0">
                 <a:solidFill>
                   <a:srgbClr val="7030A0"/>
                 </a:solidFill>
@@ -21716,7 +21776,7 @@
           <a:p>
             <a:pPr algn="ctr"/>
             <a:r>
-              <a:rPr lang="en-US" sz="1050" dirty="0" smtClean="0">
+              <a:rPr lang="en-US" sz="1050" dirty="0">
                 <a:solidFill>
                   <a:srgbClr val="7030A0"/>
                 </a:solidFill>
@@ -21894,7 +21954,7 @@
           <a:p>
             <a:pPr algn="ctr"/>
             <a:r>
-              <a:rPr lang="en-US" sz="1050" dirty="0" smtClean="0">
+              <a:rPr lang="en-US" sz="1050" dirty="0">
                 <a:solidFill>
                   <a:srgbClr val="7030A0"/>
                 </a:solidFill>
@@ -22041,7 +22101,7 @@
           <a:p>
             <a:pPr algn="ctr"/>
             <a:r>
-              <a:rPr lang="en-US" sz="1050" dirty="0" smtClean="0">
+              <a:rPr lang="en-US" sz="1050" dirty="0">
                 <a:solidFill>
                   <a:srgbClr val="7030A0"/>
                 </a:solidFill>
@@ -22102,7 +22162,7 @@
           <p:cNvPr id="167" name="Rectangle 8">
             <a:extLst>
               <a:ext uri="{FF2B5EF4-FFF2-40B4-BE49-F238E27FC236}">
-                <a16:creationId xmlns:a16="http://schemas.microsoft.com/office/drawing/2014/main" xmlns="" id="{ABDCDBD2-131A-4B66-A2F2-43BBEE82C773}"/>
+                <a16:creationId xmlns:a16="http://schemas.microsoft.com/office/drawing/2014/main" id="{ABDCDBD2-131A-4B66-A2F2-43BBEE82C773}"/>
               </a:ext>
             </a:extLst>
           </p:cNvPr>
@@ -22144,7 +22204,7 @@
           <a:p>
             <a:pPr algn="ctr"/>
             <a:r>
-              <a:rPr lang="en-US" sz="1050" dirty="0" smtClean="0">
+              <a:rPr lang="en-US" sz="1050" dirty="0">
                 <a:solidFill>
                   <a:srgbClr val="7030A0"/>
                 </a:solidFill>
@@ -22164,7 +22224,7 @@
           <p:cNvPr id="168" name="Elbow Connector 78">
             <a:extLst>
               <a:ext uri="{FF2B5EF4-FFF2-40B4-BE49-F238E27FC236}">
-                <a16:creationId xmlns:a16="http://schemas.microsoft.com/office/drawing/2014/main" xmlns="" id="{B97967F8-618A-448B-81FD-CDFD4AF0EC64}"/>
+                <a16:creationId xmlns:a16="http://schemas.microsoft.com/office/drawing/2014/main" id="{B97967F8-618A-448B-81FD-CDFD4AF0EC64}"/>
               </a:ext>
             </a:extLst>
           </p:cNvPr>
@@ -22744,7 +22804,7 @@
           <a:p>
             <a:pPr algn="ctr"/>
             <a:r>
-              <a:rPr lang="en-US" sz="1050" dirty="0" smtClean="0">
+              <a:rPr lang="en-US" sz="1050" dirty="0">
                 <a:solidFill>
                   <a:srgbClr val="7030A0"/>
                 </a:solidFill>
@@ -22886,7 +22946,7 @@
           <a:p>
             <a:pPr algn="ctr"/>
             <a:r>
-              <a:rPr lang="en-US" sz="1050" smtClean="0">
+              <a:rPr lang="en-US" sz="1050">
                 <a:solidFill>
                   <a:srgbClr val="7030A0"/>
                 </a:solidFill>
@@ -23333,7 +23393,7 @@
               </a:rPr>
             </a:br>
             <a:r>
-              <a:rPr lang="en-US" sz="1050" dirty="0" smtClean="0">
+              <a:rPr lang="en-US" sz="1050" dirty="0">
                 <a:solidFill>
                   <a:srgbClr val="7030A0"/>
                 </a:solidFill>
@@ -23394,7 +23454,7 @@
           <p:cNvPr id="57" name="Rectangle 8">
             <a:extLst>
               <a:ext uri="{FF2B5EF4-FFF2-40B4-BE49-F238E27FC236}">
-                <a16:creationId xmlns:a16="http://schemas.microsoft.com/office/drawing/2014/main" xmlns="" id="{6A42DA50-9012-4391-9EF3-285E4FA3FCD8}"/>
+                <a16:creationId xmlns:a16="http://schemas.microsoft.com/office/drawing/2014/main" id="{6A42DA50-9012-4391-9EF3-285E4FA3FCD8}"/>
               </a:ext>
             </a:extLst>
           </p:cNvPr>
@@ -23467,7 +23527,7 @@
           <p:cNvPr id="59" name="Isosceles Triangle 102">
             <a:extLst>
               <a:ext uri="{FF2B5EF4-FFF2-40B4-BE49-F238E27FC236}">
-                <a16:creationId xmlns:a16="http://schemas.microsoft.com/office/drawing/2014/main" xmlns="" id="{B263B2D7-6E76-465E-B40E-7E2A46254A84}"/>
+                <a16:creationId xmlns:a16="http://schemas.microsoft.com/office/drawing/2014/main" id="{B263B2D7-6E76-465E-B40E-7E2A46254A84}"/>
               </a:ext>
             </a:extLst>
           </p:cNvPr>
@@ -23525,7 +23585,7 @@
           <p:cNvPr id="67" name="Elbow Connector 63">
             <a:extLst>
               <a:ext uri="{FF2B5EF4-FFF2-40B4-BE49-F238E27FC236}">
-                <a16:creationId xmlns:a16="http://schemas.microsoft.com/office/drawing/2014/main" xmlns="" id="{BA3A25CD-7C1D-4B3B-B294-1B05ABCFECFD}"/>
+                <a16:creationId xmlns:a16="http://schemas.microsoft.com/office/drawing/2014/main" id="{BA3A25CD-7C1D-4B3B-B294-1B05ABCFECFD}"/>
               </a:ext>
             </a:extLst>
           </p:cNvPr>
@@ -23612,7 +23672,7 @@
           <a:p>
             <a:pPr algn="ctr"/>
             <a:r>
-              <a:rPr lang="en-US" sz="1050" smtClean="0">
+              <a:rPr lang="en-US" sz="1050">
                 <a:solidFill>
                   <a:srgbClr val="7030A0"/>
                 </a:solidFill>
@@ -23794,7 +23854,7 @@
           <a:p>
             <a:pPr algn="ctr"/>
             <a:r>
-              <a:rPr lang="en-US" sz="1050" dirty="0" smtClean="0">
+              <a:rPr lang="en-US" sz="1050" dirty="0">
                 <a:solidFill>
                   <a:srgbClr val="7030A0"/>
                 </a:solidFill>
@@ -23850,7 +23910,7 @@
           <a:p>
             <a:pPr algn="ctr"/>
             <a:r>
-              <a:rPr lang="en-US" sz="1050" dirty="0" smtClean="0">
+              <a:rPr lang="en-US" sz="1050" dirty="0">
                 <a:solidFill>
                   <a:srgbClr val="7030A0"/>
                 </a:solidFill>
@@ -23906,7 +23966,7 @@
           <a:p>
             <a:pPr algn="ctr"/>
             <a:r>
-              <a:rPr lang="en-US" sz="1050" dirty="0" smtClean="0">
+              <a:rPr lang="en-US" sz="1050" dirty="0">
                 <a:solidFill>
                   <a:srgbClr val="7030A0"/>
                 </a:solidFill>
@@ -24076,7 +24136,7 @@
               </a:rPr>
             </a:br>
             <a:r>
-              <a:rPr lang="en-US" sz="1050" dirty="0" smtClean="0">
+              <a:rPr lang="en-US" sz="1050" dirty="0">
                 <a:solidFill>
                   <a:srgbClr val="7030A0"/>
                 </a:solidFill>
@@ -24147,7 +24207,7 @@
               </a:rPr>
             </a:br>
             <a:r>
-              <a:rPr lang="en-US" sz="1050" dirty="0" smtClean="0">
+              <a:rPr lang="en-US" sz="1050" dirty="0">
                 <a:solidFill>
                   <a:srgbClr val="7030A0"/>
                 </a:solidFill>
@@ -24553,7 +24613,7 @@
               </a:rPr>
             </a:br>
             <a:r>
-              <a:rPr lang="en-US" sz="1050" dirty="0" smtClean="0">
+              <a:rPr lang="en-US" sz="1050" dirty="0">
                 <a:solidFill>
                   <a:srgbClr val="7030A0"/>
                 </a:solidFill>
@@ -24721,7 +24781,7 @@
               </a:rPr>
             </a:br>
             <a:r>
-              <a:rPr lang="en-US" sz="1050" dirty="0" smtClean="0">
+              <a:rPr lang="en-US" sz="1050" dirty="0">
                 <a:solidFill>
                   <a:srgbClr val="7030A0"/>
                 </a:solidFill>
@@ -24874,7 +24934,7 @@
           <a:p>
             <a:pPr algn="ctr"/>
             <a:r>
-              <a:rPr lang="en-US" sz="1050" dirty="0" smtClean="0">
+              <a:rPr lang="en-US" sz="1050" dirty="0">
                 <a:solidFill>
                   <a:srgbClr val="7030A0"/>
                 </a:solidFill>
@@ -25099,7 +25159,7 @@
           <a:p>
             <a:pPr algn="ctr"/>
             <a:r>
-              <a:rPr lang="en-US" sz="1050" dirty="0" smtClean="0">
+              <a:rPr lang="en-US" sz="1050" dirty="0">
                 <a:solidFill>
                   <a:srgbClr val="7030A0"/>
                 </a:solidFill>
@@ -25160,7 +25220,7 @@
           <p:cNvPr id="121" name="Rectangle 8">
             <a:extLst>
               <a:ext uri="{FF2B5EF4-FFF2-40B4-BE49-F238E27FC236}">
-                <a16:creationId xmlns:a16="http://schemas.microsoft.com/office/drawing/2014/main" xmlns="" id="{ABDCDBD2-131A-4B66-A2F2-43BBEE82C773}"/>
+                <a16:creationId xmlns:a16="http://schemas.microsoft.com/office/drawing/2014/main" id="{ABDCDBD2-131A-4B66-A2F2-43BBEE82C773}"/>
               </a:ext>
             </a:extLst>
           </p:cNvPr>
@@ -25202,7 +25262,7 @@
           <a:p>
             <a:pPr algn="ctr"/>
             <a:r>
-              <a:rPr lang="en-US" sz="1050" smtClean="0">
+              <a:rPr lang="en-US" sz="1050">
                 <a:solidFill>
                   <a:srgbClr val="7030A0"/>
                 </a:solidFill>
@@ -25222,7 +25282,7 @@
           <p:cNvPr id="123" name="Elbow Connector 78">
             <a:extLst>
               <a:ext uri="{FF2B5EF4-FFF2-40B4-BE49-F238E27FC236}">
-                <a16:creationId xmlns:a16="http://schemas.microsoft.com/office/drawing/2014/main" xmlns="" id="{B97967F8-618A-448B-81FD-CDFD4AF0EC64}"/>
+                <a16:creationId xmlns:a16="http://schemas.microsoft.com/office/drawing/2014/main" id="{B97967F8-618A-448B-81FD-CDFD4AF0EC64}"/>
               </a:ext>
             </a:extLst>
           </p:cNvPr>
@@ -25306,7 +25366,7 @@
           <a:p>
             <a:pPr algn="ctr"/>
             <a:r>
-              <a:rPr lang="en-US" sz="1050" dirty="0" smtClean="0">
+              <a:rPr lang="en-US" sz="1050" dirty="0">
                 <a:solidFill>
                   <a:srgbClr val="7030A0"/>
                 </a:solidFill>
@@ -25486,7 +25546,7 @@
           <a:p>
             <a:pPr algn="ctr"/>
             <a:r>
-              <a:rPr lang="en-US" sz="1050" smtClean="0">
+              <a:rPr lang="en-US" sz="1050">
                 <a:solidFill>
                   <a:srgbClr val="7030A0"/>
                 </a:solidFill>
@@ -25675,7 +25735,7 @@
           <p:cNvPr id="134" name="Elbow Connector 78">
             <a:extLst>
               <a:ext uri="{FF2B5EF4-FFF2-40B4-BE49-F238E27FC236}">
-                <a16:creationId xmlns:a16="http://schemas.microsoft.com/office/drawing/2014/main" xmlns="" id="{B97967F8-618A-448B-81FD-CDFD4AF0EC64}"/>
+                <a16:creationId xmlns:a16="http://schemas.microsoft.com/office/drawing/2014/main" id="{B97967F8-618A-448B-81FD-CDFD4AF0EC64}"/>
               </a:ext>
             </a:extLst>
           </p:cNvPr>
@@ -25759,7 +25819,7 @@
           <a:p>
             <a:pPr algn="ctr"/>
             <a:r>
-              <a:rPr lang="en-US" sz="1050" dirty="0" smtClean="0">
+              <a:rPr lang="en-US" sz="1050" dirty="0">
                 <a:solidFill>
                   <a:srgbClr val="7030A0"/>
                 </a:solidFill>
@@ -25939,7 +25999,7 @@
           <a:p>
             <a:pPr algn="ctr"/>
             <a:r>
-              <a:rPr lang="en-US" sz="1050" dirty="0" smtClean="0">
+              <a:rPr lang="en-US" sz="1050" dirty="0">
                 <a:solidFill>
                   <a:srgbClr val="7030A0"/>
                 </a:solidFill>
@@ -26262,7 +26322,7 @@
           <a:p>
             <a:pPr algn="ctr"/>
             <a:r>
-              <a:rPr lang="en-US" sz="1050" dirty="0" smtClean="0">
+              <a:rPr lang="en-US" sz="1050" dirty="0">
                 <a:solidFill>
                   <a:srgbClr val="7030A0"/>
                 </a:solidFill>
@@ -26323,7 +26383,7 @@
           <p:cNvPr id="148" name="Rectangle 8">
             <a:extLst>
               <a:ext uri="{FF2B5EF4-FFF2-40B4-BE49-F238E27FC236}">
-                <a16:creationId xmlns:a16="http://schemas.microsoft.com/office/drawing/2014/main" xmlns="" id="{ABDCDBD2-131A-4B66-A2F2-43BBEE82C773}"/>
+                <a16:creationId xmlns:a16="http://schemas.microsoft.com/office/drawing/2014/main" id="{ABDCDBD2-131A-4B66-A2F2-43BBEE82C773}"/>
               </a:ext>
             </a:extLst>
           </p:cNvPr>
@@ -26365,7 +26425,7 @@
           <a:p>
             <a:pPr algn="ctr"/>
             <a:r>
-              <a:rPr lang="en-US" sz="1050" dirty="0" smtClean="0">
+              <a:rPr lang="en-US" sz="1050" dirty="0">
                 <a:solidFill>
                   <a:srgbClr val="7030A0"/>
                 </a:solidFill>
@@ -26385,7 +26445,7 @@
           <p:cNvPr id="149" name="Elbow Connector 78">
             <a:extLst>
               <a:ext uri="{FF2B5EF4-FFF2-40B4-BE49-F238E27FC236}">
-                <a16:creationId xmlns:a16="http://schemas.microsoft.com/office/drawing/2014/main" xmlns="" id="{B97967F8-618A-448B-81FD-CDFD4AF0EC64}"/>
+                <a16:creationId xmlns:a16="http://schemas.microsoft.com/office/drawing/2014/main" id="{B97967F8-618A-448B-81FD-CDFD4AF0EC64}"/>
               </a:ext>
             </a:extLst>
           </p:cNvPr>
@@ -26435,7 +26495,7 @@
           <p:cNvPr id="151" name="Elbow Connector 78">
             <a:extLst>
               <a:ext uri="{FF2B5EF4-FFF2-40B4-BE49-F238E27FC236}">
-                <a16:creationId xmlns:a16="http://schemas.microsoft.com/office/drawing/2014/main" xmlns="" id="{B97967F8-618A-448B-81FD-CDFD4AF0EC64}"/>
+                <a16:creationId xmlns:a16="http://schemas.microsoft.com/office/drawing/2014/main" id="{B97967F8-618A-448B-81FD-CDFD4AF0EC64}"/>
               </a:ext>
             </a:extLst>
           </p:cNvPr>
@@ -26521,7 +26581,7 @@
           <a:p>
             <a:pPr algn="ctr"/>
             <a:r>
-              <a:rPr lang="en-US" sz="1050" smtClean="0">
+              <a:rPr lang="en-US" sz="1050">
                 <a:solidFill>
                   <a:srgbClr val="7030A0"/>
                 </a:solidFill>
@@ -26701,7 +26761,7 @@
           <a:p>
             <a:pPr algn="ctr"/>
             <a:r>
-              <a:rPr lang="en-US" sz="1050" smtClean="0">
+              <a:rPr lang="en-US" sz="1050">
                 <a:solidFill>
                   <a:srgbClr val="7030A0"/>
                 </a:solidFill>
@@ -26879,7 +26939,7 @@
           <a:p>
             <a:pPr algn="ctr"/>
             <a:r>
-              <a:rPr lang="en-US" sz="1050" dirty="0" smtClean="0">
+              <a:rPr lang="en-US" sz="1050" dirty="0">
                 <a:solidFill>
                   <a:srgbClr val="7030A0"/>
                 </a:solidFill>
@@ -27024,7 +27084,7 @@
           <a:p>
             <a:pPr algn="ctr"/>
             <a:r>
-              <a:rPr lang="en-US" sz="1050" dirty="0" smtClean="0">
+              <a:rPr lang="en-US" sz="1050" dirty="0">
                 <a:solidFill>
                   <a:srgbClr val="7030A0"/>
                 </a:solidFill>
@@ -27085,7 +27145,7 @@
           <p:cNvPr id="167" name="Rectangle 8">
             <a:extLst>
               <a:ext uri="{FF2B5EF4-FFF2-40B4-BE49-F238E27FC236}">
-                <a16:creationId xmlns:a16="http://schemas.microsoft.com/office/drawing/2014/main" xmlns="" id="{ABDCDBD2-131A-4B66-A2F2-43BBEE82C773}"/>
+                <a16:creationId xmlns:a16="http://schemas.microsoft.com/office/drawing/2014/main" id="{ABDCDBD2-131A-4B66-A2F2-43BBEE82C773}"/>
               </a:ext>
             </a:extLst>
           </p:cNvPr>
@@ -27127,7 +27187,7 @@
           <a:p>
             <a:pPr algn="ctr"/>
             <a:r>
-              <a:rPr lang="en-US" sz="1050" dirty="0" smtClean="0">
+              <a:rPr lang="en-US" sz="1050" dirty="0">
                 <a:solidFill>
                   <a:srgbClr val="7030A0"/>
                 </a:solidFill>
@@ -27147,7 +27207,7 @@
           <p:cNvPr id="168" name="Elbow Connector 78">
             <a:extLst>
               <a:ext uri="{FF2B5EF4-FFF2-40B4-BE49-F238E27FC236}">
-                <a16:creationId xmlns:a16="http://schemas.microsoft.com/office/drawing/2014/main" xmlns="" id="{B97967F8-618A-448B-81FD-CDFD4AF0EC64}"/>
+                <a16:creationId xmlns:a16="http://schemas.microsoft.com/office/drawing/2014/main" id="{B97967F8-618A-448B-81FD-CDFD4AF0EC64}"/>
               </a:ext>
             </a:extLst>
           </p:cNvPr>
@@ -27234,7 +27294,7 @@
           <p:cNvPr id="114" name="Elbow Connector 78">
             <a:extLst>
               <a:ext uri="{FF2B5EF4-FFF2-40B4-BE49-F238E27FC236}">
-                <a16:creationId xmlns:a16="http://schemas.microsoft.com/office/drawing/2014/main" xmlns="" id="{B97967F8-618A-448B-81FD-CDFD4AF0EC64}"/>
+                <a16:creationId xmlns:a16="http://schemas.microsoft.com/office/drawing/2014/main" id="{B97967F8-618A-448B-81FD-CDFD4AF0EC64}"/>
               </a:ext>
             </a:extLst>
           </p:cNvPr>
@@ -27280,7 +27340,7 @@
           <p:cNvPr id="150" name="Elbow Connector 78">
             <a:extLst>
               <a:ext uri="{FF2B5EF4-FFF2-40B4-BE49-F238E27FC236}">
-                <a16:creationId xmlns:a16="http://schemas.microsoft.com/office/drawing/2014/main" xmlns="" id="{B97967F8-618A-448B-81FD-CDFD4AF0EC64}"/>
+                <a16:creationId xmlns:a16="http://schemas.microsoft.com/office/drawing/2014/main" id="{B97967F8-618A-448B-81FD-CDFD4AF0EC64}"/>
               </a:ext>
             </a:extLst>
           </p:cNvPr>
@@ -27328,7 +27388,7 @@
           <p:cNvPr id="152" name="Elbow Connector 78">
             <a:extLst>
               <a:ext uri="{FF2B5EF4-FFF2-40B4-BE49-F238E27FC236}">
-                <a16:creationId xmlns:a16="http://schemas.microsoft.com/office/drawing/2014/main" xmlns="" id="{B97967F8-618A-448B-81FD-CDFD4AF0EC64}"/>
+                <a16:creationId xmlns:a16="http://schemas.microsoft.com/office/drawing/2014/main" id="{B97967F8-618A-448B-81FD-CDFD4AF0EC64}"/>
               </a:ext>
             </a:extLst>
           </p:cNvPr>
@@ -27376,7 +27436,7 @@
           <p:cNvPr id="153" name="Elbow Connector 78">
             <a:extLst>
               <a:ext uri="{FF2B5EF4-FFF2-40B4-BE49-F238E27FC236}">
-                <a16:creationId xmlns:a16="http://schemas.microsoft.com/office/drawing/2014/main" xmlns="" id="{B97967F8-618A-448B-81FD-CDFD4AF0EC64}"/>
+                <a16:creationId xmlns:a16="http://schemas.microsoft.com/office/drawing/2014/main" id="{B97967F8-618A-448B-81FD-CDFD4AF0EC64}"/>
               </a:ext>
             </a:extLst>
           </p:cNvPr>
@@ -27424,7 +27484,7 @@
           <p:cNvPr id="169" name="Rectangle 8">
             <a:extLst>
               <a:ext uri="{FF2B5EF4-FFF2-40B4-BE49-F238E27FC236}">
-                <a16:creationId xmlns:a16="http://schemas.microsoft.com/office/drawing/2014/main" xmlns="" id="{ABDCDBD2-131A-4B66-A2F2-43BBEE82C773}"/>
+                <a16:creationId xmlns:a16="http://schemas.microsoft.com/office/drawing/2014/main" id="{ABDCDBD2-131A-4B66-A2F2-43BBEE82C773}"/>
               </a:ext>
             </a:extLst>
           </p:cNvPr>
@@ -27466,7 +27526,7 @@
           <a:p>
             <a:pPr algn="ctr"/>
             <a:r>
-              <a:rPr lang="en-US" sz="1050" smtClean="0">
+              <a:rPr lang="en-US" sz="1050">
                 <a:solidFill>
                   <a:srgbClr val="7030A0"/>
                 </a:solidFill>
@@ -27658,7 +27718,7 @@
           <a:p>
             <a:pPr algn="ctr"/>
             <a:r>
-              <a:rPr lang="en-US" sz="1050" dirty="0" smtClean="0">
+              <a:rPr lang="en-US" sz="1050" dirty="0">
                 <a:solidFill>
                   <a:srgbClr val="7030A0"/>
                 </a:solidFill>
@@ -27666,18 +27726,13 @@
               <a:t>OrderItem</a:t>
             </a:r>
             <a:r>
-              <a:rPr lang="en-SG" sz="1050" dirty="0" smtClean="0">
+              <a:rPr lang="en-SG" sz="1050" dirty="0">
                 <a:solidFill>
                   <a:srgbClr val="7030A0"/>
                 </a:solidFill>
               </a:rPr>
               <a:t>Status</a:t>
             </a:r>
-            <a:endParaRPr lang="en-SG" sz="1050" dirty="0">
-              <a:solidFill>
-                <a:srgbClr val="7030A0"/>
-              </a:solidFill>
-            </a:endParaRPr>
           </a:p>
         </p:txBody>
       </p:sp>
@@ -27729,7 +27784,7 @@
           <p:cNvPr id="174" name="Rectangle 8">
             <a:extLst>
               <a:ext uri="{FF2B5EF4-FFF2-40B4-BE49-F238E27FC236}">
-                <a16:creationId xmlns:a16="http://schemas.microsoft.com/office/drawing/2014/main" xmlns="" id="{ABDCDBD2-131A-4B66-A2F2-43BBEE82C773}"/>
+                <a16:creationId xmlns:a16="http://schemas.microsoft.com/office/drawing/2014/main" id="{ABDCDBD2-131A-4B66-A2F2-43BBEE82C773}"/>
               </a:ext>
             </a:extLst>
           </p:cNvPr>
@@ -27771,7 +27826,7 @@
           <a:p>
             <a:pPr algn="ctr"/>
             <a:r>
-              <a:rPr lang="en-US" sz="1050" dirty="0" smtClean="0">
+              <a:rPr lang="en-US" sz="1050" dirty="0">
                 <a:solidFill>
                   <a:srgbClr val="7030A0"/>
                 </a:solidFill>
@@ -27838,7 +27893,7 @@
           <p:cNvPr id="178" name="Elbow Connector 78">
             <a:extLst>
               <a:ext uri="{FF2B5EF4-FFF2-40B4-BE49-F238E27FC236}">
-                <a16:creationId xmlns:a16="http://schemas.microsoft.com/office/drawing/2014/main" xmlns="" id="{B97967F8-618A-448B-81FD-CDFD4AF0EC64}"/>
+                <a16:creationId xmlns:a16="http://schemas.microsoft.com/office/drawing/2014/main" id="{B97967F8-618A-448B-81FD-CDFD4AF0EC64}"/>
               </a:ext>
             </a:extLst>
           </p:cNvPr>
@@ -27886,7 +27941,7 @@
           <p:cNvPr id="179" name="Elbow Connector 78">
             <a:extLst>
               <a:ext uri="{FF2B5EF4-FFF2-40B4-BE49-F238E27FC236}">
-                <a16:creationId xmlns:a16="http://schemas.microsoft.com/office/drawing/2014/main" xmlns="" id="{B97967F8-618A-448B-81FD-CDFD4AF0EC64}"/>
+                <a16:creationId xmlns:a16="http://schemas.microsoft.com/office/drawing/2014/main" id="{B97967F8-618A-448B-81FD-CDFD4AF0EC64}"/>
               </a:ext>
             </a:extLst>
           </p:cNvPr>
@@ -27934,7 +27989,7 @@
           <p:cNvPr id="180" name="Elbow Connector 78">
             <a:extLst>
               <a:ext uri="{FF2B5EF4-FFF2-40B4-BE49-F238E27FC236}">
-                <a16:creationId xmlns:a16="http://schemas.microsoft.com/office/drawing/2014/main" xmlns="" id="{B97967F8-618A-448B-81FD-CDFD4AF0EC64}"/>
+                <a16:creationId xmlns:a16="http://schemas.microsoft.com/office/drawing/2014/main" id="{B97967F8-618A-448B-81FD-CDFD4AF0EC64}"/>
               </a:ext>
             </a:extLst>
           </p:cNvPr>
@@ -28201,7 +28256,7 @@
           <a:p>
             <a:pPr algn="ctr"/>
             <a:r>
-              <a:rPr lang="en-US" sz="1050" dirty="0" smtClean="0">
+              <a:rPr lang="en-US" sz="1050" dirty="0">
                 <a:solidFill>
                   <a:srgbClr val="7030A0"/>
                 </a:solidFill>
@@ -28257,7 +28312,7 @@
           <a:p>
             <a:pPr algn="ctr"/>
             <a:r>
-              <a:rPr lang="en-US" sz="1050" dirty="0" smtClean="0">
+              <a:rPr lang="en-US" sz="1050" dirty="0">
                 <a:solidFill>
                   <a:srgbClr val="7030A0"/>
                 </a:solidFill>
@@ -28313,7 +28368,7 @@
           <a:p>
             <a:pPr algn="ctr"/>
             <a:r>
-              <a:rPr lang="en-US" sz="1050" dirty="0" smtClean="0">
+              <a:rPr lang="en-US" sz="1050" dirty="0">
                 <a:solidFill>
                   <a:srgbClr val="7030A0"/>
                 </a:solidFill>
@@ -28333,7 +28388,7 @@
           <p:cNvPr id="254" name="Elbow Connector 78">
             <a:extLst>
               <a:ext uri="{FF2B5EF4-FFF2-40B4-BE49-F238E27FC236}">
-                <a16:creationId xmlns:a16="http://schemas.microsoft.com/office/drawing/2014/main" xmlns="" id="{B97967F8-618A-448B-81FD-CDFD4AF0EC64}"/>
+                <a16:creationId xmlns:a16="http://schemas.microsoft.com/office/drawing/2014/main" id="{B97967F8-618A-448B-81FD-CDFD4AF0EC64}"/>
               </a:ext>
             </a:extLst>
           </p:cNvPr>
@@ -28381,7 +28436,7 @@
           <p:cNvPr id="257" name="Elbow Connector 78">
             <a:extLst>
               <a:ext uri="{FF2B5EF4-FFF2-40B4-BE49-F238E27FC236}">
-                <a16:creationId xmlns:a16="http://schemas.microsoft.com/office/drawing/2014/main" xmlns="" id="{B97967F8-618A-448B-81FD-CDFD4AF0EC64}"/>
+                <a16:creationId xmlns:a16="http://schemas.microsoft.com/office/drawing/2014/main" id="{B97967F8-618A-448B-81FD-CDFD4AF0EC64}"/>
               </a:ext>
             </a:extLst>
           </p:cNvPr>
@@ -28429,7 +28484,7 @@
           <p:cNvPr id="261" name="Elbow Connector 78">
             <a:extLst>
               <a:ext uri="{FF2B5EF4-FFF2-40B4-BE49-F238E27FC236}">
-                <a16:creationId xmlns:a16="http://schemas.microsoft.com/office/drawing/2014/main" xmlns="" id="{B97967F8-618A-448B-81FD-CDFD4AF0EC64}"/>
+                <a16:creationId xmlns:a16="http://schemas.microsoft.com/office/drawing/2014/main" id="{B97967F8-618A-448B-81FD-CDFD4AF0EC64}"/>
               </a:ext>
             </a:extLst>
           </p:cNvPr>
@@ -28847,7 +28902,7 @@
           <a:p>
             <a:pPr algn="ctr"/>
             <a:r>
-              <a:rPr lang="en-US" sz="1100" smtClean="0">
+              <a:rPr lang="en-US" sz="1100">
                 <a:solidFill>
                   <a:srgbClr val="7030A0"/>
                 </a:solidFill>
@@ -28886,7 +28941,7 @@
           <a:p>
             <a:pPr algn="ctr"/>
             <a:r>
-              <a:rPr lang="en-US" sz="1100" smtClean="0">
+              <a:rPr lang="en-US" sz="1100">
                 <a:solidFill>
                   <a:srgbClr val="7030A0"/>
                 </a:solidFill>
@@ -28925,7 +28980,7 @@
           <a:p>
             <a:pPr algn="ctr"/>
             <a:r>
-              <a:rPr lang="en-US" sz="1100" smtClean="0">
+              <a:rPr lang="en-US" sz="1100">
                 <a:solidFill>
                   <a:srgbClr val="7030A0"/>
                 </a:solidFill>
@@ -29179,7 +29234,7 @@
           <p:cNvPr id="304" name="Elbow Connector 78">
             <a:extLst>
               <a:ext uri="{FF2B5EF4-FFF2-40B4-BE49-F238E27FC236}">
-                <a16:creationId xmlns:a16="http://schemas.microsoft.com/office/drawing/2014/main" xmlns="" id="{B97967F8-618A-448B-81FD-CDFD4AF0EC64}"/>
+                <a16:creationId xmlns:a16="http://schemas.microsoft.com/office/drawing/2014/main" id="{B97967F8-618A-448B-81FD-CDFD4AF0EC64}"/>
               </a:ext>
             </a:extLst>
           </p:cNvPr>
@@ -29383,7 +29438,7 @@
           <p:cNvPr id="175" name="Elbow Connector 78">
             <a:extLst>
               <a:ext uri="{FF2B5EF4-FFF2-40B4-BE49-F238E27FC236}">
-                <a16:creationId xmlns:a16="http://schemas.microsoft.com/office/drawing/2014/main" xmlns="" id="{B97967F8-618A-448B-81FD-CDFD4AF0EC64}"/>
+                <a16:creationId xmlns:a16="http://schemas.microsoft.com/office/drawing/2014/main" id="{B97967F8-618A-448B-81FD-CDFD4AF0EC64}"/>
               </a:ext>
             </a:extLst>
           </p:cNvPr>
@@ -29497,6 +29552,1612 @@
           <a:chExt cx="0" cy="0"/>
         </a:xfrm>
       </p:grpSpPr>
+      <p:grpSp>
+        <p:nvGrpSpPr>
+          <p:cNvPr id="238" name="Group 237">
+            <a:extLst>
+              <a:ext uri="{FF2B5EF4-FFF2-40B4-BE49-F238E27FC236}">
+                <a16:creationId xmlns:a16="http://schemas.microsoft.com/office/drawing/2014/main" id="{9A173995-8F65-47E5-B4EF-5ACEC75E78F0}"/>
+              </a:ext>
+            </a:extLst>
+          </p:cNvPr>
+          <p:cNvGrpSpPr/>
+          <p:nvPr/>
+        </p:nvGrpSpPr>
+        <p:grpSpPr>
+          <a:xfrm>
+            <a:off x="152400" y="762000"/>
+            <a:ext cx="8539075" cy="2819400"/>
+            <a:chOff x="152400" y="762000"/>
+            <a:chExt cx="8539075" cy="2819400"/>
+          </a:xfrm>
+        </p:grpSpPr>
+        <p:sp>
+          <p:nvSpPr>
+            <p:cNvPr id="118" name="Rectangle 65"/>
+            <p:cNvSpPr/>
+            <p:nvPr/>
+          </p:nvSpPr>
+          <p:spPr>
+            <a:xfrm>
+              <a:off x="152400" y="762000"/>
+              <a:ext cx="8539075" cy="2819400"/>
+            </a:xfrm>
+            <a:prstGeom prst="roundRect">
+              <a:avLst>
+                <a:gd name="adj" fmla="val 3484"/>
+              </a:avLst>
+            </a:prstGeom>
+            <a:solidFill>
+              <a:schemeClr val="accent4">
+                <a:lumMod val="20000"/>
+                <a:lumOff val="80000"/>
+              </a:schemeClr>
+            </a:solidFill>
+            <a:ln w="19050">
+              <a:noFill/>
+            </a:ln>
+            <a:effectLst/>
+          </p:spPr>
+          <p:style>
+            <a:lnRef idx="1">
+              <a:schemeClr val="accent2"/>
+            </a:lnRef>
+            <a:fillRef idx="2">
+              <a:schemeClr val="accent2"/>
+            </a:fillRef>
+            <a:effectRef idx="1">
+              <a:schemeClr val="accent2"/>
+            </a:effectRef>
+            <a:fontRef idx="minor">
+              <a:schemeClr val="dk1"/>
+            </a:fontRef>
+          </p:style>
+          <p:txBody>
+            <a:bodyPr rtlCol="0" anchor="t"/>
+            <a:lstStyle/>
+            <a:p>
+              <a:r>
+                <a:rPr lang="en-US" sz="1200" b="1" dirty="0">
+                  <a:solidFill>
+                    <a:srgbClr val="7030A0"/>
+                  </a:solidFill>
+                </a:rPr>
+                <a:t>Model</a:t>
+              </a:r>
+              <a:endParaRPr lang="en-SG" sz="1200" b="1" dirty="0">
+                <a:solidFill>
+                  <a:srgbClr val="7030A0"/>
+                </a:solidFill>
+              </a:endParaRPr>
+            </a:p>
+          </p:txBody>
+        </p:sp>
+        <p:cxnSp>
+          <p:nvCxnSpPr>
+            <p:cNvPr id="75" name="Elbow Connector 122"/>
+            <p:cNvCxnSpPr>
+              <a:cxnSpLocks/>
+            </p:cNvCxnSpPr>
+            <p:nvPr/>
+          </p:nvCxnSpPr>
+          <p:spPr>
+            <a:xfrm>
+              <a:off x="452525" y="2248636"/>
+              <a:ext cx="624865" cy="1"/>
+            </a:xfrm>
+            <a:prstGeom prst="bentConnector3">
+              <a:avLst>
+                <a:gd name="adj1" fmla="val 50000"/>
+              </a:avLst>
+            </a:prstGeom>
+            <a:ln w="19050">
+              <a:solidFill>
+                <a:schemeClr val="bg1">
+                  <a:lumMod val="75000"/>
+                </a:schemeClr>
+              </a:solidFill>
+              <a:prstDash val="sysDot"/>
+              <a:headEnd type="none" w="med" len="med"/>
+              <a:tailEnd type="arrow" w="med" len="med"/>
+            </a:ln>
+            <a:effectLst/>
+          </p:spPr>
+          <p:style>
+            <a:lnRef idx="1">
+              <a:schemeClr val="accent2"/>
+            </a:lnRef>
+            <a:fillRef idx="2">
+              <a:schemeClr val="accent2"/>
+            </a:fillRef>
+            <a:effectRef idx="1">
+              <a:schemeClr val="accent2"/>
+            </a:effectRef>
+            <a:fontRef idx="minor">
+              <a:schemeClr val="dk1"/>
+            </a:fontRef>
+          </p:style>
+        </p:cxnSp>
+        <p:sp>
+          <p:nvSpPr>
+            <p:cNvPr id="46" name="Rectangle 8"/>
+            <p:cNvSpPr/>
+            <p:nvPr/>
+          </p:nvSpPr>
+          <p:spPr>
+            <a:xfrm>
+              <a:off x="1085509" y="2081208"/>
+              <a:ext cx="1170020" cy="334856"/>
+            </a:xfrm>
+            <a:prstGeom prst="rect">
+              <a:avLst/>
+            </a:prstGeom>
+            <a:ln w="19050">
+              <a:solidFill>
+                <a:srgbClr val="7030A0"/>
+              </a:solidFill>
+            </a:ln>
+            <a:effectLst/>
+          </p:spPr>
+          <p:style>
+            <a:lnRef idx="1">
+              <a:schemeClr val="accent4"/>
+            </a:lnRef>
+            <a:fillRef idx="2">
+              <a:schemeClr val="accent4"/>
+            </a:fillRef>
+            <a:effectRef idx="1">
+              <a:schemeClr val="accent4"/>
+            </a:effectRef>
+            <a:fontRef idx="minor">
+              <a:schemeClr val="dk1"/>
+            </a:fontRef>
+          </p:style>
+          <p:txBody>
+            <a:bodyPr rtlCol="0" anchor="ctr"/>
+            <a:lstStyle/>
+            <a:p>
+              <a:pPr algn="ctr"/>
+              <a:r>
+                <a:rPr lang="en-US" sz="1050" dirty="0">
+                  <a:solidFill>
+                    <a:srgbClr val="7030A0"/>
+                  </a:solidFill>
+                </a:rPr>
+                <a:t>RestOrRant</a:t>
+              </a:r>
+              <a:endParaRPr lang="en-SG" sz="1050" dirty="0">
+                <a:solidFill>
+                  <a:srgbClr val="7030A0"/>
+                </a:solidFill>
+              </a:endParaRPr>
+            </a:p>
+          </p:txBody>
+        </p:sp>
+        <p:sp>
+          <p:nvSpPr>
+            <p:cNvPr id="49" name="Rectangle 8"/>
+            <p:cNvSpPr/>
+            <p:nvPr/>
+          </p:nvSpPr>
+          <p:spPr>
+            <a:xfrm>
+              <a:off x="4205877" y="2076029"/>
+              <a:ext cx="1369229" cy="346760"/>
+            </a:xfrm>
+            <a:prstGeom prst="rect">
+              <a:avLst/>
+            </a:prstGeom>
+            <a:ln w="19050">
+              <a:solidFill>
+                <a:srgbClr val="7030A0"/>
+              </a:solidFill>
+            </a:ln>
+            <a:effectLst/>
+          </p:spPr>
+          <p:style>
+            <a:lnRef idx="1">
+              <a:schemeClr val="accent4"/>
+            </a:lnRef>
+            <a:fillRef idx="2">
+              <a:schemeClr val="accent4"/>
+            </a:fillRef>
+            <a:effectRef idx="1">
+              <a:schemeClr val="accent4"/>
+            </a:effectRef>
+            <a:fontRef idx="minor">
+              <a:schemeClr val="dk1"/>
+            </a:fontRef>
+          </p:style>
+          <p:txBody>
+            <a:bodyPr rtlCol="0" anchor="ctr"/>
+            <a:lstStyle/>
+            <a:p>
+              <a:pPr algn="ctr"/>
+              <a:r>
+                <a:rPr lang="en-US" sz="1050" dirty="0" err="1">
+                  <a:solidFill>
+                    <a:srgbClr val="7030A0"/>
+                  </a:solidFill>
+                </a:rPr>
+                <a:t>UniqueMenuItemList</a:t>
+              </a:r>
+              <a:endParaRPr lang="en-SG" sz="1050" dirty="0">
+                <a:solidFill>
+                  <a:srgbClr val="7030A0"/>
+                </a:solidFill>
+              </a:endParaRPr>
+            </a:p>
+          </p:txBody>
+        </p:sp>
+        <p:sp>
+          <p:nvSpPr>
+            <p:cNvPr id="51" name="Flowchart: Decision 96"/>
+            <p:cNvSpPr/>
+            <p:nvPr/>
+          </p:nvSpPr>
+          <p:spPr>
+            <a:xfrm>
+              <a:off x="3838199" y="2150399"/>
+              <a:ext cx="236048" cy="173380"/>
+            </a:xfrm>
+            <a:prstGeom prst="flowChartDecision">
+              <a:avLst/>
+            </a:prstGeom>
+            <a:solidFill>
+              <a:srgbClr val="7030A0"/>
+            </a:solidFill>
+            <a:ln w="19050">
+              <a:solidFill>
+                <a:srgbClr val="7030A0"/>
+              </a:solidFill>
+            </a:ln>
+            <a:effectLst/>
+          </p:spPr>
+          <p:style>
+            <a:lnRef idx="1">
+              <a:schemeClr val="accent6"/>
+            </a:lnRef>
+            <a:fillRef idx="2">
+              <a:schemeClr val="accent6"/>
+            </a:fillRef>
+            <a:effectRef idx="1">
+              <a:schemeClr val="accent6"/>
+            </a:effectRef>
+            <a:fontRef idx="minor">
+              <a:schemeClr val="dk1"/>
+            </a:fontRef>
+          </p:style>
+          <p:txBody>
+            <a:bodyPr rtlCol="0" anchor="ctr"/>
+            <a:lstStyle/>
+            <a:p>
+              <a:pPr algn="ctr"/>
+              <a:endParaRPr lang="en-US" sz="1050"/>
+            </a:p>
+          </p:txBody>
+        </p:sp>
+        <p:cxnSp>
+          <p:nvCxnSpPr>
+            <p:cNvPr id="97" name="Elbow Connector 63"/>
+            <p:cNvCxnSpPr>
+              <a:cxnSpLocks/>
+              <a:stCxn id="99" idx="3"/>
+              <a:endCxn id="46" idx="0"/>
+            </p:cNvCxnSpPr>
+            <p:nvPr/>
+          </p:nvCxnSpPr>
+          <p:spPr>
+            <a:xfrm rot="16200000" flipH="1">
+              <a:off x="1497706" y="1908394"/>
+              <a:ext cx="341199" cy="4428"/>
+            </a:xfrm>
+            <a:prstGeom prst="bentConnector3">
+              <a:avLst>
+                <a:gd name="adj1" fmla="val 50000"/>
+              </a:avLst>
+            </a:prstGeom>
+            <a:ln w="19050">
+              <a:solidFill>
+                <a:srgbClr val="7030A0"/>
+              </a:solidFill>
+              <a:prstDash val="sysDot"/>
+              <a:headEnd type="none" w="med" len="med"/>
+              <a:tailEnd type="none" w="med" len="med"/>
+            </a:ln>
+            <a:effectLst/>
+          </p:spPr>
+          <p:style>
+            <a:lnRef idx="1">
+              <a:schemeClr val="accent2"/>
+            </a:lnRef>
+            <a:fillRef idx="2">
+              <a:schemeClr val="accent2"/>
+            </a:fillRef>
+            <a:effectRef idx="1">
+              <a:schemeClr val="accent2"/>
+            </a:effectRef>
+            <a:fontRef idx="minor">
+              <a:schemeClr val="dk1"/>
+            </a:fontRef>
+          </p:style>
+        </p:cxnSp>
+        <p:sp>
+          <p:nvSpPr>
+            <p:cNvPr id="99" name="Isosceles Triangle 102"/>
+            <p:cNvSpPr/>
+            <p:nvPr/>
+          </p:nvSpPr>
+          <p:spPr>
+            <a:xfrm rot="10800000" flipV="1">
+              <a:off x="1524898" y="1582947"/>
+              <a:ext cx="282387" cy="157062"/>
+            </a:xfrm>
+            <a:prstGeom prst="triangle">
+              <a:avLst/>
+            </a:prstGeom>
+            <a:solidFill>
+              <a:schemeClr val="accent4">
+                <a:lumMod val="20000"/>
+                <a:lumOff val="80000"/>
+              </a:schemeClr>
+            </a:solidFill>
+            <a:ln w="19050">
+              <a:solidFill>
+                <a:srgbClr val="7030A0"/>
+              </a:solidFill>
+            </a:ln>
+            <a:effectLst/>
+          </p:spPr>
+          <p:style>
+            <a:lnRef idx="1">
+              <a:schemeClr val="accent4"/>
+            </a:lnRef>
+            <a:fillRef idx="2">
+              <a:schemeClr val="accent4"/>
+            </a:fillRef>
+            <a:effectRef idx="1">
+              <a:schemeClr val="accent4"/>
+            </a:effectRef>
+            <a:fontRef idx="minor">
+              <a:schemeClr val="dk1"/>
+            </a:fontRef>
+          </p:style>
+          <p:txBody>
+            <a:bodyPr rtlCol="0" anchor="ctr"/>
+            <a:lstStyle/>
+            <a:p>
+              <a:pPr algn="ctr"/>
+              <a:endParaRPr lang="en-SG" sz="1050" b="1">
+                <a:solidFill>
+                  <a:srgbClr val="92D050"/>
+                </a:solidFill>
+              </a:endParaRPr>
+            </a:p>
+          </p:txBody>
+        </p:sp>
+        <p:sp>
+          <p:nvSpPr>
+            <p:cNvPr id="54" name="TextBox 53"/>
+            <p:cNvSpPr txBox="1"/>
+            <p:nvPr/>
+          </p:nvSpPr>
+          <p:spPr>
+            <a:xfrm>
+              <a:off x="4036533" y="2018570"/>
+              <a:ext cx="189257" cy="178683"/>
+            </a:xfrm>
+            <a:prstGeom prst="rect">
+              <a:avLst/>
+            </a:prstGeom>
+            <a:noFill/>
+          </p:spPr>
+          <p:txBody>
+            <a:bodyPr wrap="square" lIns="0" tIns="0" rIns="0" bIns="0" rtlCol="0">
+              <a:noAutofit/>
+            </a:bodyPr>
+            <a:lstStyle/>
+            <a:p>
+              <a:pPr algn="ctr"/>
+              <a:r>
+                <a:rPr lang="en-US" sz="1100" dirty="0">
+                  <a:solidFill>
+                    <a:srgbClr val="7030A0"/>
+                  </a:solidFill>
+                </a:rPr>
+                <a:t>1</a:t>
+              </a:r>
+              <a:endParaRPr lang="en-SG" sz="1100" dirty="0">
+                <a:solidFill>
+                  <a:srgbClr val="7030A0"/>
+                </a:solidFill>
+              </a:endParaRPr>
+            </a:p>
+          </p:txBody>
+        </p:sp>
+        <p:sp>
+          <p:nvSpPr>
+            <p:cNvPr id="55" name="Rectangle 8"/>
+            <p:cNvSpPr/>
+            <p:nvPr/>
+          </p:nvSpPr>
+          <p:spPr>
+            <a:xfrm>
+              <a:off x="884590" y="1209587"/>
+              <a:ext cx="1458689" cy="364396"/>
+            </a:xfrm>
+            <a:prstGeom prst="rect">
+              <a:avLst/>
+            </a:prstGeom>
+            <a:ln w="19050">
+              <a:solidFill>
+                <a:srgbClr val="7030A0"/>
+              </a:solidFill>
+            </a:ln>
+            <a:effectLst/>
+          </p:spPr>
+          <p:style>
+            <a:lnRef idx="1">
+              <a:schemeClr val="accent4"/>
+            </a:lnRef>
+            <a:fillRef idx="2">
+              <a:schemeClr val="accent4"/>
+            </a:fillRef>
+            <a:effectRef idx="1">
+              <a:schemeClr val="accent4"/>
+            </a:effectRef>
+            <a:fontRef idx="minor">
+              <a:schemeClr val="dk1"/>
+            </a:fontRef>
+          </p:style>
+          <p:txBody>
+            <a:bodyPr rtlCol="0" anchor="ctr"/>
+            <a:lstStyle/>
+            <a:p>
+              <a:pPr algn="ctr"/>
+              <a:r>
+                <a:rPr lang="en-US" sz="1050" dirty="0">
+                  <a:solidFill>
+                    <a:srgbClr val="7030A0"/>
+                  </a:solidFill>
+                </a:rPr>
+                <a:t>&lt;&lt;interface&gt;&gt;</a:t>
+              </a:r>
+              <a:br>
+                <a:rPr lang="en-US" sz="1050" dirty="0">
+                  <a:solidFill>
+                    <a:srgbClr val="7030A0"/>
+                  </a:solidFill>
+                </a:rPr>
+              </a:br>
+              <a:r>
+                <a:rPr lang="en-US" sz="1050" dirty="0">
+                  <a:solidFill>
+                    <a:srgbClr val="7030A0"/>
+                  </a:solidFill>
+                </a:rPr>
+                <a:t>ReadOnlyRestOrRant</a:t>
+              </a:r>
+              <a:endParaRPr lang="en-SG" sz="1050" dirty="0">
+                <a:solidFill>
+                  <a:srgbClr val="7030A0"/>
+                </a:solidFill>
+              </a:endParaRPr>
+            </a:p>
+          </p:txBody>
+        </p:sp>
+        <p:cxnSp>
+          <p:nvCxnSpPr>
+            <p:cNvPr id="60" name="Straight Arrow Connector 59"/>
+            <p:cNvCxnSpPr>
+              <a:stCxn id="51" idx="1"/>
+              <a:endCxn id="49" idx="1"/>
+            </p:cNvCxnSpPr>
+            <p:nvPr/>
+          </p:nvCxnSpPr>
+          <p:spPr>
+            <a:xfrm>
+              <a:off x="3838199" y="2237089"/>
+              <a:ext cx="367678" cy="12320"/>
+            </a:xfrm>
+            <a:prstGeom prst="straightConnector1">
+              <a:avLst/>
+            </a:prstGeom>
+            <a:ln w="19050">
+              <a:solidFill>
+                <a:srgbClr val="7030A0"/>
+              </a:solidFill>
+              <a:headEnd type="none" w="med" len="med"/>
+              <a:tailEnd type="arrow" w="med" len="med"/>
+            </a:ln>
+            <a:effectLst/>
+          </p:spPr>
+          <p:style>
+            <a:lnRef idx="1">
+              <a:schemeClr val="accent2"/>
+            </a:lnRef>
+            <a:fillRef idx="2">
+              <a:schemeClr val="accent2"/>
+            </a:fillRef>
+            <a:effectRef idx="1">
+              <a:schemeClr val="accent2"/>
+            </a:effectRef>
+            <a:fontRef idx="minor">
+              <a:schemeClr val="dk1"/>
+            </a:fontRef>
+          </p:style>
+        </p:cxnSp>
+        <p:sp>
+          <p:nvSpPr>
+            <p:cNvPr id="71" name="Rectangle 8"/>
+            <p:cNvSpPr/>
+            <p:nvPr/>
+          </p:nvSpPr>
+          <p:spPr>
+            <a:xfrm>
+              <a:off x="2824240" y="2076029"/>
+              <a:ext cx="991799" cy="346760"/>
+            </a:xfrm>
+            <a:prstGeom prst="rect">
+              <a:avLst/>
+            </a:prstGeom>
+            <a:ln w="19050">
+              <a:solidFill>
+                <a:srgbClr val="7030A0"/>
+              </a:solidFill>
+            </a:ln>
+            <a:effectLst/>
+          </p:spPr>
+          <p:style>
+            <a:lnRef idx="1">
+              <a:schemeClr val="accent4"/>
+            </a:lnRef>
+            <a:fillRef idx="2">
+              <a:schemeClr val="accent4"/>
+            </a:fillRef>
+            <a:effectRef idx="1">
+              <a:schemeClr val="accent4"/>
+            </a:effectRef>
+            <a:fontRef idx="minor">
+              <a:schemeClr val="dk1"/>
+            </a:fontRef>
+          </p:style>
+          <p:txBody>
+            <a:bodyPr rtlCol="0" anchor="ctr"/>
+            <a:lstStyle/>
+            <a:p>
+              <a:pPr algn="ctr"/>
+              <a:r>
+                <a:rPr lang="en-US" sz="1050" dirty="0">
+                  <a:solidFill>
+                    <a:srgbClr val="7030A0"/>
+                  </a:solidFill>
+                </a:rPr>
+                <a:t>Menu</a:t>
+              </a:r>
+              <a:endParaRPr lang="en-SG" sz="1050" dirty="0">
+                <a:solidFill>
+                  <a:srgbClr val="7030A0"/>
+                </a:solidFill>
+              </a:endParaRPr>
+            </a:p>
+          </p:txBody>
+        </p:sp>
+        <p:sp>
+          <p:nvSpPr>
+            <p:cNvPr id="72" name="Flowchart: Decision 96"/>
+            <p:cNvSpPr/>
+            <p:nvPr/>
+          </p:nvSpPr>
+          <p:spPr>
+            <a:xfrm>
+              <a:off x="2279202" y="2150399"/>
+              <a:ext cx="236048" cy="173380"/>
+            </a:xfrm>
+            <a:prstGeom prst="flowChartDecision">
+              <a:avLst/>
+            </a:prstGeom>
+            <a:solidFill>
+              <a:srgbClr val="7030A0"/>
+            </a:solidFill>
+            <a:ln w="19050">
+              <a:solidFill>
+                <a:srgbClr val="7030A0"/>
+              </a:solidFill>
+            </a:ln>
+            <a:effectLst/>
+          </p:spPr>
+          <p:style>
+            <a:lnRef idx="1">
+              <a:schemeClr val="accent6"/>
+            </a:lnRef>
+            <a:fillRef idx="2">
+              <a:schemeClr val="accent6"/>
+            </a:fillRef>
+            <a:effectRef idx="1">
+              <a:schemeClr val="accent6"/>
+            </a:effectRef>
+            <a:fontRef idx="minor">
+              <a:schemeClr val="dk1"/>
+            </a:fontRef>
+          </p:style>
+          <p:txBody>
+            <a:bodyPr rtlCol="0" anchor="ctr"/>
+            <a:lstStyle/>
+            <a:p>
+              <a:pPr algn="ctr"/>
+              <a:endParaRPr lang="en-US" sz="1050"/>
+            </a:p>
+          </p:txBody>
+        </p:sp>
+        <p:sp>
+          <p:nvSpPr>
+            <p:cNvPr id="73" name="TextBox 72"/>
+            <p:cNvSpPr txBox="1"/>
+            <p:nvPr/>
+          </p:nvSpPr>
+          <p:spPr>
+            <a:xfrm>
+              <a:off x="2648079" y="1993911"/>
+              <a:ext cx="154714" cy="219068"/>
+            </a:xfrm>
+            <a:prstGeom prst="rect">
+              <a:avLst/>
+            </a:prstGeom>
+            <a:noFill/>
+          </p:spPr>
+          <p:txBody>
+            <a:bodyPr wrap="square" lIns="0" tIns="0" rIns="0" bIns="0" rtlCol="0">
+              <a:noAutofit/>
+            </a:bodyPr>
+            <a:lstStyle/>
+            <a:p>
+              <a:pPr algn="ctr"/>
+              <a:r>
+                <a:rPr lang="en-US" sz="1100" dirty="0">
+                  <a:solidFill>
+                    <a:srgbClr val="7030A0"/>
+                  </a:solidFill>
+                </a:rPr>
+                <a:t>1</a:t>
+              </a:r>
+              <a:endParaRPr lang="en-SG" sz="1100" dirty="0">
+                <a:solidFill>
+                  <a:srgbClr val="7030A0"/>
+                </a:solidFill>
+              </a:endParaRPr>
+            </a:p>
+          </p:txBody>
+        </p:sp>
+        <p:cxnSp>
+          <p:nvCxnSpPr>
+            <p:cNvPr id="74" name="Straight Arrow Connector 73"/>
+            <p:cNvCxnSpPr>
+              <a:endCxn id="71" idx="1"/>
+            </p:cNvCxnSpPr>
+            <p:nvPr/>
+          </p:nvCxnSpPr>
+          <p:spPr>
+            <a:xfrm>
+              <a:off x="2279202" y="2237089"/>
+              <a:ext cx="545038" cy="12320"/>
+            </a:xfrm>
+            <a:prstGeom prst="straightConnector1">
+              <a:avLst/>
+            </a:prstGeom>
+            <a:ln w="19050">
+              <a:solidFill>
+                <a:srgbClr val="7030A0"/>
+              </a:solidFill>
+              <a:headEnd type="none" w="med" len="med"/>
+              <a:tailEnd type="arrow" w="med" len="med"/>
+            </a:ln>
+            <a:effectLst/>
+          </p:spPr>
+          <p:style>
+            <a:lnRef idx="1">
+              <a:schemeClr val="accent2"/>
+            </a:lnRef>
+            <a:fillRef idx="2">
+              <a:schemeClr val="accent2"/>
+            </a:fillRef>
+            <a:effectRef idx="1">
+              <a:schemeClr val="accent2"/>
+            </a:effectRef>
+            <a:fontRef idx="minor">
+              <a:schemeClr val="dk1"/>
+            </a:fontRef>
+          </p:style>
+        </p:cxnSp>
+        <p:cxnSp>
+          <p:nvCxnSpPr>
+            <p:cNvPr id="91" name="Elbow Connector 63"/>
+            <p:cNvCxnSpPr>
+              <a:cxnSpLocks/>
+              <a:stCxn id="92" idx="3"/>
+              <a:endCxn id="71" idx="0"/>
+            </p:cNvCxnSpPr>
+            <p:nvPr/>
+          </p:nvCxnSpPr>
+          <p:spPr>
+            <a:xfrm rot="5400000">
+              <a:off x="3159692" y="1913048"/>
+              <a:ext cx="323429" cy="2532"/>
+            </a:xfrm>
+            <a:prstGeom prst="bentConnector3">
+              <a:avLst>
+                <a:gd name="adj1" fmla="val 50000"/>
+              </a:avLst>
+            </a:prstGeom>
+            <a:ln w="19050">
+              <a:solidFill>
+                <a:srgbClr val="7030A0"/>
+              </a:solidFill>
+              <a:prstDash val="sysDot"/>
+              <a:headEnd type="none" w="med" len="med"/>
+              <a:tailEnd type="none" w="med" len="med"/>
+            </a:ln>
+            <a:effectLst/>
+          </p:spPr>
+          <p:style>
+            <a:lnRef idx="1">
+              <a:schemeClr val="accent2"/>
+            </a:lnRef>
+            <a:fillRef idx="2">
+              <a:schemeClr val="accent2"/>
+            </a:fillRef>
+            <a:effectRef idx="1">
+              <a:schemeClr val="accent2"/>
+            </a:effectRef>
+            <a:fontRef idx="minor">
+              <a:schemeClr val="dk1"/>
+            </a:fontRef>
+          </p:style>
+        </p:cxnSp>
+        <p:sp>
+          <p:nvSpPr>
+            <p:cNvPr id="92" name="Isosceles Triangle 102"/>
+            <p:cNvSpPr/>
+            <p:nvPr/>
+          </p:nvSpPr>
+          <p:spPr>
+            <a:xfrm rot="10800000" flipV="1">
+              <a:off x="3181479" y="1595538"/>
+              <a:ext cx="282387" cy="157062"/>
+            </a:xfrm>
+            <a:prstGeom prst="triangle">
+              <a:avLst/>
+            </a:prstGeom>
+            <a:solidFill>
+              <a:schemeClr val="accent4">
+                <a:lumMod val="20000"/>
+                <a:lumOff val="80000"/>
+              </a:schemeClr>
+            </a:solidFill>
+            <a:ln w="19050">
+              <a:solidFill>
+                <a:srgbClr val="7030A0"/>
+              </a:solidFill>
+            </a:ln>
+            <a:effectLst/>
+          </p:spPr>
+          <p:style>
+            <a:lnRef idx="1">
+              <a:schemeClr val="accent4"/>
+            </a:lnRef>
+            <a:fillRef idx="2">
+              <a:schemeClr val="accent4"/>
+            </a:fillRef>
+            <a:effectRef idx="1">
+              <a:schemeClr val="accent4"/>
+            </a:effectRef>
+            <a:fontRef idx="minor">
+              <a:schemeClr val="dk1"/>
+            </a:fontRef>
+          </p:style>
+          <p:txBody>
+            <a:bodyPr rtlCol="0" anchor="ctr"/>
+            <a:lstStyle/>
+            <a:p>
+              <a:pPr algn="ctr"/>
+              <a:endParaRPr lang="en-SG" sz="1050" b="1">
+                <a:solidFill>
+                  <a:srgbClr val="92D050"/>
+                </a:solidFill>
+              </a:endParaRPr>
+            </a:p>
+          </p:txBody>
+        </p:sp>
+        <p:sp>
+          <p:nvSpPr>
+            <p:cNvPr id="93" name="Rectangle 8"/>
+            <p:cNvSpPr/>
+            <p:nvPr/>
+          </p:nvSpPr>
+          <p:spPr>
+            <a:xfrm>
+              <a:off x="2709819" y="1204809"/>
+              <a:ext cx="1230893" cy="364396"/>
+            </a:xfrm>
+            <a:prstGeom prst="rect">
+              <a:avLst/>
+            </a:prstGeom>
+            <a:ln w="19050">
+              <a:solidFill>
+                <a:srgbClr val="7030A0"/>
+              </a:solidFill>
+            </a:ln>
+            <a:effectLst/>
+          </p:spPr>
+          <p:style>
+            <a:lnRef idx="1">
+              <a:schemeClr val="accent4"/>
+            </a:lnRef>
+            <a:fillRef idx="2">
+              <a:schemeClr val="accent4"/>
+            </a:fillRef>
+            <a:effectRef idx="1">
+              <a:schemeClr val="accent4"/>
+            </a:effectRef>
+            <a:fontRef idx="minor">
+              <a:schemeClr val="dk1"/>
+            </a:fontRef>
+          </p:style>
+          <p:txBody>
+            <a:bodyPr rtlCol="0" anchor="ctr"/>
+            <a:lstStyle/>
+            <a:p>
+              <a:pPr algn="ctr"/>
+              <a:r>
+                <a:rPr lang="en-US" sz="1050" dirty="0">
+                  <a:solidFill>
+                    <a:srgbClr val="7030A0"/>
+                  </a:solidFill>
+                </a:rPr>
+                <a:t>&lt;&lt;interface&gt;&gt;</a:t>
+              </a:r>
+              <a:br>
+                <a:rPr lang="en-US" sz="1050" dirty="0">
+                  <a:solidFill>
+                    <a:srgbClr val="7030A0"/>
+                  </a:solidFill>
+                </a:rPr>
+              </a:br>
+              <a:r>
+                <a:rPr lang="en-US" sz="1050" dirty="0" err="1">
+                  <a:solidFill>
+                    <a:srgbClr val="7030A0"/>
+                  </a:solidFill>
+                </a:rPr>
+                <a:t>ReadOnlyMenu</a:t>
+              </a:r>
+              <a:endParaRPr lang="en-SG" sz="1050" dirty="0">
+                <a:solidFill>
+                  <a:srgbClr val="7030A0"/>
+                </a:solidFill>
+              </a:endParaRPr>
+            </a:p>
+          </p:txBody>
+        </p:sp>
+        <p:sp>
+          <p:nvSpPr>
+            <p:cNvPr id="139" name="Rectangle 8"/>
+            <p:cNvSpPr/>
+            <p:nvPr/>
+          </p:nvSpPr>
+          <p:spPr>
+            <a:xfrm>
+              <a:off x="6011790" y="2082253"/>
+              <a:ext cx="887788" cy="346760"/>
+            </a:xfrm>
+            <a:prstGeom prst="rect">
+              <a:avLst/>
+            </a:prstGeom>
+            <a:ln w="19050">
+              <a:solidFill>
+                <a:srgbClr val="7030A0"/>
+              </a:solidFill>
+            </a:ln>
+            <a:effectLst/>
+          </p:spPr>
+          <p:style>
+            <a:lnRef idx="1">
+              <a:schemeClr val="accent4"/>
+            </a:lnRef>
+            <a:fillRef idx="2">
+              <a:schemeClr val="accent4"/>
+            </a:fillRef>
+            <a:effectRef idx="1">
+              <a:schemeClr val="accent4"/>
+            </a:effectRef>
+            <a:fontRef idx="minor">
+              <a:schemeClr val="dk1"/>
+            </a:fontRef>
+          </p:style>
+          <p:txBody>
+            <a:bodyPr rtlCol="0" anchor="ctr"/>
+            <a:lstStyle/>
+            <a:p>
+              <a:pPr algn="ctr"/>
+              <a:r>
+                <a:rPr lang="en-US" sz="1050" dirty="0">
+                  <a:solidFill>
+                    <a:srgbClr val="7030A0"/>
+                  </a:solidFill>
+                </a:rPr>
+                <a:t>MenuItem</a:t>
+              </a:r>
+              <a:endParaRPr lang="en-SG" sz="1050" dirty="0">
+                <a:solidFill>
+                  <a:srgbClr val="7030A0"/>
+                </a:solidFill>
+              </a:endParaRPr>
+            </a:p>
+          </p:txBody>
+        </p:sp>
+        <p:sp>
+          <p:nvSpPr>
+            <p:cNvPr id="140" name="Flowchart: Decision 96"/>
+            <p:cNvSpPr/>
+            <p:nvPr/>
+          </p:nvSpPr>
+          <p:spPr>
+            <a:xfrm>
+              <a:off x="5567517" y="2161946"/>
+              <a:ext cx="236048" cy="173380"/>
+            </a:xfrm>
+            <a:prstGeom prst="flowChartDecision">
+              <a:avLst/>
+            </a:prstGeom>
+            <a:noFill/>
+            <a:ln w="19050">
+              <a:solidFill>
+                <a:srgbClr val="7030A0"/>
+              </a:solidFill>
+            </a:ln>
+            <a:effectLst/>
+          </p:spPr>
+          <p:style>
+            <a:lnRef idx="1">
+              <a:schemeClr val="accent6"/>
+            </a:lnRef>
+            <a:fillRef idx="2">
+              <a:schemeClr val="accent6"/>
+            </a:fillRef>
+            <a:effectRef idx="1">
+              <a:schemeClr val="accent6"/>
+            </a:effectRef>
+            <a:fontRef idx="minor">
+              <a:schemeClr val="dk1"/>
+            </a:fontRef>
+          </p:style>
+          <p:txBody>
+            <a:bodyPr rtlCol="0" anchor="ctr"/>
+            <a:lstStyle/>
+            <a:p>
+              <a:pPr algn="ctr"/>
+              <a:endParaRPr lang="en-US" sz="1050"/>
+            </a:p>
+          </p:txBody>
+        </p:sp>
+        <p:cxnSp>
+          <p:nvCxnSpPr>
+            <p:cNvPr id="141" name="Elbow Connector 140"/>
+            <p:cNvCxnSpPr/>
+            <p:nvPr/>
+          </p:nvCxnSpPr>
+          <p:spPr>
+            <a:xfrm>
+              <a:off x="5792913" y="2252553"/>
+              <a:ext cx="218878" cy="3080"/>
+            </a:xfrm>
+            <a:prstGeom prst="bentConnector3">
+              <a:avLst/>
+            </a:prstGeom>
+            <a:ln w="19050">
+              <a:solidFill>
+                <a:srgbClr val="7030A0"/>
+              </a:solidFill>
+              <a:headEnd type="none" w="med" len="med"/>
+              <a:tailEnd type="arrow" w="med" len="med"/>
+            </a:ln>
+            <a:effectLst/>
+          </p:spPr>
+          <p:style>
+            <a:lnRef idx="1">
+              <a:schemeClr val="accent2"/>
+            </a:lnRef>
+            <a:fillRef idx="2">
+              <a:schemeClr val="accent2"/>
+            </a:fillRef>
+            <a:effectRef idx="1">
+              <a:schemeClr val="accent2"/>
+            </a:effectRef>
+            <a:fontRef idx="minor">
+              <a:schemeClr val="dk1"/>
+            </a:fontRef>
+          </p:style>
+        </p:cxnSp>
+        <p:sp>
+          <p:nvSpPr>
+            <p:cNvPr id="142" name="TextBox 141"/>
+            <p:cNvSpPr txBox="1"/>
+            <p:nvPr/>
+          </p:nvSpPr>
+          <p:spPr>
+            <a:xfrm>
+              <a:off x="5835063" y="2074521"/>
+              <a:ext cx="189257" cy="178683"/>
+            </a:xfrm>
+            <a:prstGeom prst="rect">
+              <a:avLst/>
+            </a:prstGeom>
+            <a:noFill/>
+          </p:spPr>
+          <p:txBody>
+            <a:bodyPr wrap="square" lIns="0" tIns="0" rIns="0" bIns="0" rtlCol="0">
+              <a:noAutofit/>
+            </a:bodyPr>
+            <a:lstStyle/>
+            <a:p>
+              <a:pPr algn="ctr"/>
+              <a:r>
+                <a:rPr lang="en-US" sz="1100" dirty="0">
+                  <a:solidFill>
+                    <a:srgbClr val="7030A0"/>
+                  </a:solidFill>
+                </a:rPr>
+                <a:t>*</a:t>
+              </a:r>
+              <a:endParaRPr lang="en-SG" sz="1100" dirty="0">
+                <a:solidFill>
+                  <a:srgbClr val="7030A0"/>
+                </a:solidFill>
+              </a:endParaRPr>
+            </a:p>
+          </p:txBody>
+        </p:sp>
+        <p:sp>
+          <p:nvSpPr>
+            <p:cNvPr id="143" name="Rectangle 8"/>
+            <p:cNvSpPr/>
+            <p:nvPr/>
+          </p:nvSpPr>
+          <p:spPr>
+            <a:xfrm>
+              <a:off x="7614194" y="2119400"/>
+              <a:ext cx="708186" cy="285783"/>
+            </a:xfrm>
+            <a:prstGeom prst="rect">
+              <a:avLst/>
+            </a:prstGeom>
+            <a:ln w="19050">
+              <a:solidFill>
+                <a:srgbClr val="7030A0"/>
+              </a:solidFill>
+            </a:ln>
+            <a:effectLst/>
+          </p:spPr>
+          <p:style>
+            <a:lnRef idx="1">
+              <a:schemeClr val="accent4"/>
+            </a:lnRef>
+            <a:fillRef idx="2">
+              <a:schemeClr val="accent4"/>
+            </a:fillRef>
+            <a:effectRef idx="1">
+              <a:schemeClr val="accent4"/>
+            </a:effectRef>
+            <a:fontRef idx="minor">
+              <a:schemeClr val="dk1"/>
+            </a:fontRef>
+          </p:style>
+          <p:txBody>
+            <a:bodyPr rtlCol="0" anchor="ctr"/>
+            <a:lstStyle/>
+            <a:p>
+              <a:pPr algn="ctr"/>
+              <a:r>
+                <a:rPr lang="en-US" sz="1050" dirty="0">
+                  <a:solidFill>
+                    <a:srgbClr val="7030A0"/>
+                  </a:solidFill>
+                </a:rPr>
+                <a:t>Name</a:t>
+              </a:r>
+              <a:endParaRPr lang="en-SG" sz="1050" dirty="0">
+                <a:solidFill>
+                  <a:srgbClr val="7030A0"/>
+                </a:solidFill>
+              </a:endParaRPr>
+            </a:p>
+          </p:txBody>
+        </p:sp>
+        <p:sp>
+          <p:nvSpPr>
+            <p:cNvPr id="144" name="Flowchart: Decision 96"/>
+            <p:cNvSpPr/>
+            <p:nvPr/>
+          </p:nvSpPr>
+          <p:spPr>
+            <a:xfrm>
+              <a:off x="6923817" y="2177119"/>
+              <a:ext cx="236048" cy="173380"/>
+            </a:xfrm>
+            <a:prstGeom prst="flowChartDecision">
+              <a:avLst/>
+            </a:prstGeom>
+            <a:solidFill>
+              <a:srgbClr val="7030A0"/>
+            </a:solidFill>
+            <a:ln w="19050">
+              <a:solidFill>
+                <a:srgbClr val="7030A0"/>
+              </a:solidFill>
+            </a:ln>
+            <a:effectLst/>
+          </p:spPr>
+          <p:style>
+            <a:lnRef idx="1">
+              <a:schemeClr val="accent6"/>
+            </a:lnRef>
+            <a:fillRef idx="2">
+              <a:schemeClr val="accent6"/>
+            </a:fillRef>
+            <a:effectRef idx="1">
+              <a:schemeClr val="accent6"/>
+            </a:effectRef>
+            <a:fontRef idx="minor">
+              <a:schemeClr val="dk1"/>
+            </a:fontRef>
+          </p:style>
+          <p:txBody>
+            <a:bodyPr rtlCol="0" anchor="ctr"/>
+            <a:lstStyle/>
+            <a:p>
+              <a:pPr algn="ctr"/>
+              <a:endParaRPr lang="en-US" sz="1050"/>
+            </a:p>
+          </p:txBody>
+        </p:sp>
+        <p:cxnSp>
+          <p:nvCxnSpPr>
+            <p:cNvPr id="145" name="Elbow Connector 144"/>
+            <p:cNvCxnSpPr>
+              <a:cxnSpLocks/>
+              <a:stCxn id="144" idx="3"/>
+              <a:endCxn id="143" idx="1"/>
+            </p:cNvCxnSpPr>
+            <p:nvPr/>
+          </p:nvCxnSpPr>
+          <p:spPr>
+            <a:xfrm flipV="1">
+              <a:off x="7159865" y="2262292"/>
+              <a:ext cx="454329" cy="1517"/>
+            </a:xfrm>
+            <a:prstGeom prst="bentConnector3">
+              <a:avLst/>
+            </a:prstGeom>
+            <a:ln w="19050">
+              <a:solidFill>
+                <a:srgbClr val="7030A0"/>
+              </a:solidFill>
+              <a:headEnd type="none" w="med" len="med"/>
+              <a:tailEnd type="arrow" w="med" len="med"/>
+            </a:ln>
+            <a:effectLst/>
+          </p:spPr>
+          <p:style>
+            <a:lnRef idx="1">
+              <a:schemeClr val="accent2"/>
+            </a:lnRef>
+            <a:fillRef idx="2">
+              <a:schemeClr val="accent2"/>
+            </a:fillRef>
+            <a:effectRef idx="1">
+              <a:schemeClr val="accent2"/>
+            </a:effectRef>
+            <a:fontRef idx="minor">
+              <a:schemeClr val="dk1"/>
+            </a:fontRef>
+          </p:style>
+        </p:cxnSp>
+        <p:sp>
+          <p:nvSpPr>
+            <p:cNvPr id="146" name="Rectangle 8"/>
+            <p:cNvSpPr/>
+            <p:nvPr/>
+          </p:nvSpPr>
+          <p:spPr>
+            <a:xfrm>
+              <a:off x="7614194" y="2463958"/>
+              <a:ext cx="708186" cy="285783"/>
+            </a:xfrm>
+            <a:prstGeom prst="rect">
+              <a:avLst/>
+            </a:prstGeom>
+            <a:ln w="19050">
+              <a:solidFill>
+                <a:srgbClr val="7030A0"/>
+              </a:solidFill>
+            </a:ln>
+            <a:effectLst/>
+          </p:spPr>
+          <p:style>
+            <a:lnRef idx="1">
+              <a:schemeClr val="accent4"/>
+            </a:lnRef>
+            <a:fillRef idx="2">
+              <a:schemeClr val="accent4"/>
+            </a:fillRef>
+            <a:effectRef idx="1">
+              <a:schemeClr val="accent4"/>
+            </a:effectRef>
+            <a:fontRef idx="minor">
+              <a:schemeClr val="dk1"/>
+            </a:fontRef>
+          </p:style>
+          <p:txBody>
+            <a:bodyPr rtlCol="0" anchor="ctr"/>
+            <a:lstStyle/>
+            <a:p>
+              <a:pPr algn="ctr"/>
+              <a:r>
+                <a:rPr lang="en-US" sz="1050" dirty="0">
+                  <a:solidFill>
+                    <a:srgbClr val="7030A0"/>
+                  </a:solidFill>
+                </a:rPr>
+                <a:t>Price</a:t>
+              </a:r>
+              <a:endParaRPr lang="en-SG" sz="1050" dirty="0">
+                <a:solidFill>
+                  <a:srgbClr val="7030A0"/>
+                </a:solidFill>
+              </a:endParaRPr>
+            </a:p>
+          </p:txBody>
+        </p:sp>
+        <p:cxnSp>
+          <p:nvCxnSpPr>
+            <p:cNvPr id="147" name="Elbow Connector 146"/>
+            <p:cNvCxnSpPr>
+              <a:stCxn id="144" idx="3"/>
+              <a:endCxn id="146" idx="1"/>
+            </p:cNvCxnSpPr>
+            <p:nvPr/>
+          </p:nvCxnSpPr>
+          <p:spPr>
+            <a:xfrm>
+              <a:off x="7159865" y="2263809"/>
+              <a:ext cx="454329" cy="343041"/>
+            </a:xfrm>
+            <a:prstGeom prst="bentConnector3">
+              <a:avLst/>
+            </a:prstGeom>
+            <a:ln w="19050">
+              <a:solidFill>
+                <a:srgbClr val="7030A0"/>
+              </a:solidFill>
+              <a:headEnd type="none" w="med" len="med"/>
+              <a:tailEnd type="arrow" w="med" len="med"/>
+            </a:ln>
+            <a:effectLst/>
+          </p:spPr>
+          <p:style>
+            <a:lnRef idx="1">
+              <a:schemeClr val="accent2"/>
+            </a:lnRef>
+            <a:fillRef idx="2">
+              <a:schemeClr val="accent2"/>
+            </a:fillRef>
+            <a:effectRef idx="1">
+              <a:schemeClr val="accent2"/>
+            </a:effectRef>
+            <a:fontRef idx="minor">
+              <a:schemeClr val="dk1"/>
+            </a:fontRef>
+          </p:style>
+        </p:cxnSp>
+        <p:sp>
+          <p:nvSpPr>
+            <p:cNvPr id="148" name="Rectangle 8">
+              <a:extLst>
+                <a:ext uri="{FF2B5EF4-FFF2-40B4-BE49-F238E27FC236}">
+                  <a16:creationId xmlns:a16="http://schemas.microsoft.com/office/drawing/2014/main" id="{ABDCDBD2-131A-4B66-A2F2-43BBEE82C773}"/>
+                </a:ext>
+              </a:extLst>
+            </p:cNvPr>
+            <p:cNvSpPr/>
+            <p:nvPr/>
+          </p:nvSpPr>
+          <p:spPr>
+            <a:xfrm>
+              <a:off x="7614194" y="1788738"/>
+              <a:ext cx="708186" cy="285783"/>
+            </a:xfrm>
+            <a:prstGeom prst="rect">
+              <a:avLst/>
+            </a:prstGeom>
+            <a:ln w="19050">
+              <a:solidFill>
+                <a:srgbClr val="7030A0"/>
+              </a:solidFill>
+            </a:ln>
+            <a:effectLst/>
+          </p:spPr>
+          <p:style>
+            <a:lnRef idx="1">
+              <a:schemeClr val="accent4"/>
+            </a:lnRef>
+            <a:fillRef idx="2">
+              <a:schemeClr val="accent4"/>
+            </a:fillRef>
+            <a:effectRef idx="1">
+              <a:schemeClr val="accent4"/>
+            </a:effectRef>
+            <a:fontRef idx="minor">
+              <a:schemeClr val="dk1"/>
+            </a:fontRef>
+          </p:style>
+          <p:txBody>
+            <a:bodyPr rtlCol="0" anchor="ctr"/>
+            <a:lstStyle/>
+            <a:p>
+              <a:pPr algn="ctr"/>
+              <a:r>
+                <a:rPr lang="en-US" sz="1050" dirty="0">
+                  <a:solidFill>
+                    <a:srgbClr val="7030A0"/>
+                  </a:solidFill>
+                </a:rPr>
+                <a:t>Code</a:t>
+              </a:r>
+              <a:endParaRPr lang="en-SG" sz="1050" dirty="0">
+                <a:solidFill>
+                  <a:srgbClr val="7030A0"/>
+                </a:solidFill>
+              </a:endParaRPr>
+            </a:p>
+          </p:txBody>
+        </p:sp>
+        <p:cxnSp>
+          <p:nvCxnSpPr>
+            <p:cNvPr id="149" name="Elbow Connector 78">
+              <a:extLst>
+                <a:ext uri="{FF2B5EF4-FFF2-40B4-BE49-F238E27FC236}">
+                  <a16:creationId xmlns:a16="http://schemas.microsoft.com/office/drawing/2014/main" id="{B97967F8-618A-448B-81FD-CDFD4AF0EC64}"/>
+                </a:ext>
+              </a:extLst>
+            </p:cNvPr>
+            <p:cNvCxnSpPr>
+              <a:cxnSpLocks/>
+              <a:stCxn id="144" idx="3"/>
+              <a:endCxn id="148" idx="1"/>
+            </p:cNvCxnSpPr>
+            <p:nvPr/>
+          </p:nvCxnSpPr>
+          <p:spPr>
+            <a:xfrm flipV="1">
+              <a:off x="7159865" y="1931630"/>
+              <a:ext cx="454329" cy="332179"/>
+            </a:xfrm>
+            <a:prstGeom prst="bentConnector3">
+              <a:avLst>
+                <a:gd name="adj1" fmla="val 50000"/>
+              </a:avLst>
+            </a:prstGeom>
+            <a:ln w="19050">
+              <a:solidFill>
+                <a:srgbClr val="7030A0"/>
+              </a:solidFill>
+              <a:headEnd type="none" w="med" len="med"/>
+              <a:tailEnd type="arrow" w="med" len="med"/>
+            </a:ln>
+            <a:effectLst/>
+          </p:spPr>
+          <p:style>
+            <a:lnRef idx="1">
+              <a:schemeClr val="accent2"/>
+            </a:lnRef>
+            <a:fillRef idx="2">
+              <a:schemeClr val="accent2"/>
+            </a:fillRef>
+            <a:effectRef idx="1">
+              <a:schemeClr val="accent2"/>
+            </a:effectRef>
+            <a:fontRef idx="minor">
+              <a:schemeClr val="dk1"/>
+            </a:fontRef>
+          </p:style>
+        </p:cxnSp>
+        <p:sp>
+          <p:nvSpPr>
+            <p:cNvPr id="291" name="TextBox 290"/>
+            <p:cNvSpPr txBox="1"/>
+            <p:nvPr/>
+          </p:nvSpPr>
+          <p:spPr>
+            <a:xfrm>
+              <a:off x="7450403" y="1686490"/>
+              <a:ext cx="189257" cy="178683"/>
+            </a:xfrm>
+            <a:prstGeom prst="rect">
+              <a:avLst/>
+            </a:prstGeom>
+            <a:noFill/>
+          </p:spPr>
+          <p:txBody>
+            <a:bodyPr wrap="square" lIns="0" tIns="0" rIns="0" bIns="0" rtlCol="0">
+              <a:noAutofit/>
+            </a:bodyPr>
+            <a:lstStyle/>
+            <a:p>
+              <a:pPr algn="ctr"/>
+              <a:r>
+                <a:rPr lang="en-US" sz="1100" dirty="0">
+                  <a:solidFill>
+                    <a:srgbClr val="7030A0"/>
+                  </a:solidFill>
+                </a:rPr>
+                <a:t>1</a:t>
+              </a:r>
+              <a:endParaRPr lang="en-SG" sz="1100" dirty="0">
+                <a:solidFill>
+                  <a:srgbClr val="7030A0"/>
+                </a:solidFill>
+              </a:endParaRPr>
+            </a:p>
+          </p:txBody>
+        </p:sp>
+        <p:sp>
+          <p:nvSpPr>
+            <p:cNvPr id="292" name="TextBox 291"/>
+            <p:cNvSpPr txBox="1"/>
+            <p:nvPr/>
+          </p:nvSpPr>
+          <p:spPr>
+            <a:xfrm>
+              <a:off x="7451118" y="2024834"/>
+              <a:ext cx="189257" cy="178683"/>
+            </a:xfrm>
+            <a:prstGeom prst="rect">
+              <a:avLst/>
+            </a:prstGeom>
+            <a:noFill/>
+          </p:spPr>
+          <p:txBody>
+            <a:bodyPr wrap="square" lIns="0" tIns="0" rIns="0" bIns="0" rtlCol="0">
+              <a:noAutofit/>
+            </a:bodyPr>
+            <a:lstStyle/>
+            <a:p>
+              <a:pPr algn="ctr"/>
+              <a:r>
+                <a:rPr lang="en-US" sz="1100" dirty="0">
+                  <a:solidFill>
+                    <a:srgbClr val="7030A0"/>
+                  </a:solidFill>
+                </a:rPr>
+                <a:t>1</a:t>
+              </a:r>
+              <a:endParaRPr lang="en-SG" sz="1100" dirty="0">
+                <a:solidFill>
+                  <a:srgbClr val="7030A0"/>
+                </a:solidFill>
+              </a:endParaRPr>
+            </a:p>
+          </p:txBody>
+        </p:sp>
+        <p:sp>
+          <p:nvSpPr>
+            <p:cNvPr id="293" name="TextBox 292"/>
+            <p:cNvSpPr txBox="1"/>
+            <p:nvPr/>
+          </p:nvSpPr>
+          <p:spPr>
+            <a:xfrm>
+              <a:off x="7438027" y="2372791"/>
+              <a:ext cx="189257" cy="178683"/>
+            </a:xfrm>
+            <a:prstGeom prst="rect">
+              <a:avLst/>
+            </a:prstGeom>
+            <a:noFill/>
+          </p:spPr>
+          <p:txBody>
+            <a:bodyPr wrap="square" lIns="0" tIns="0" rIns="0" bIns="0" rtlCol="0">
+              <a:noAutofit/>
+            </a:bodyPr>
+            <a:lstStyle/>
+            <a:p>
+              <a:pPr algn="ctr"/>
+              <a:r>
+                <a:rPr lang="en-US" sz="1100" dirty="0">
+                  <a:solidFill>
+                    <a:srgbClr val="7030A0"/>
+                  </a:solidFill>
+                </a:rPr>
+                <a:t>1</a:t>
+              </a:r>
+              <a:endParaRPr lang="en-SG" sz="1100" dirty="0">
+                <a:solidFill>
+                  <a:srgbClr val="7030A0"/>
+                </a:solidFill>
+              </a:endParaRPr>
+            </a:p>
+          </p:txBody>
+        </p:sp>
+        <p:sp>
+          <p:nvSpPr>
+            <p:cNvPr id="312" name="TextBox 311"/>
+            <p:cNvSpPr txBox="1"/>
+            <p:nvPr/>
+          </p:nvSpPr>
+          <p:spPr>
+            <a:xfrm>
+              <a:off x="5850192" y="2405788"/>
+              <a:ext cx="189257" cy="178683"/>
+            </a:xfrm>
+            <a:prstGeom prst="rect">
+              <a:avLst/>
+            </a:prstGeom>
+            <a:noFill/>
+          </p:spPr>
+          <p:txBody>
+            <a:bodyPr wrap="square" lIns="0" tIns="0" rIns="0" bIns="0" rtlCol="0">
+              <a:noAutofit/>
+            </a:bodyPr>
+            <a:lstStyle/>
+            <a:p>
+              <a:pPr algn="ctr"/>
+              <a:r>
+                <a:rPr lang="en-US" sz="1100" dirty="0">
+                  <a:solidFill>
+                    <a:srgbClr val="7030A0"/>
+                  </a:solidFill>
+                </a:rPr>
+                <a:t>1</a:t>
+              </a:r>
+              <a:endParaRPr lang="en-SG" sz="1100" dirty="0">
+                <a:solidFill>
+                  <a:srgbClr val="7030A0"/>
+                </a:solidFill>
+              </a:endParaRPr>
+            </a:p>
+          </p:txBody>
+        </p:sp>
+      </p:grpSp>
+    </p:spTree>
+    <p:extLst>
+      <p:ext uri="{BB962C8B-B14F-4D97-AF65-F5344CB8AC3E}">
+        <p14:creationId xmlns:p14="http://schemas.microsoft.com/office/powerpoint/2010/main" val="1739484130"/>
+      </p:ext>
+    </p:extLst>
+  </p:cSld>
+  <p:clrMapOvr>
+    <a:masterClrMapping/>
+  </p:clrMapOvr>
+</p:sld>
+</file>
+
+<file path=ppt/slides/slide7.xml><?xml version="1.0" encoding="utf-8"?>
+<p:sld xmlns:a="http://schemas.openxmlformats.org/drawingml/2006/main" xmlns:r="http://schemas.openxmlformats.org/officeDocument/2006/relationships" xmlns:p="http://schemas.openxmlformats.org/presentationml/2006/main">
+  <p:cSld>
+    <p:spTree>
+      <p:nvGrpSpPr>
+        <p:cNvPr id="1" name=""/>
+        <p:cNvGrpSpPr/>
+        <p:nvPr/>
+      </p:nvGrpSpPr>
+      <p:grpSpPr>
+        <a:xfrm>
+          <a:off x="0" y="0"/>
+          <a:ext cx="0" cy="0"/>
+          <a:chOff x="0" y="0"/>
+          <a:chExt cx="0" cy="0"/>
+        </a:xfrm>
+      </p:grpSpPr>
       <p:sp>
         <p:nvSpPr>
           <p:cNvPr id="118" name="Rectangle 65"/>
@@ -29599,7 +31260,7 @@
           <a:p>
             <a:pPr algn="ctr"/>
             <a:r>
-              <a:rPr lang="en-US" sz="1050" dirty="0" smtClean="0">
+              <a:rPr lang="en-US" sz="1050" dirty="0">
                 <a:solidFill>
                   <a:srgbClr val="7030A0"/>
                 </a:solidFill>
@@ -29655,7 +31316,7 @@
           <a:p>
             <a:pPr algn="ctr"/>
             <a:r>
-              <a:rPr lang="en-US" sz="1050" dirty="0" smtClean="0">
+              <a:rPr lang="en-US" sz="1050" dirty="0">
                 <a:solidFill>
                   <a:srgbClr val="7030A0"/>
                 </a:solidFill>
@@ -29911,7 +31572,7 @@
               </a:rPr>
             </a:br>
             <a:r>
-              <a:rPr lang="en-US" sz="1050" dirty="0" smtClean="0">
+              <a:rPr lang="en-US" sz="1050" dirty="0">
                 <a:solidFill>
                   <a:srgbClr val="7030A0"/>
                 </a:solidFill>
@@ -30008,7 +31669,7 @@
           <a:p>
             <a:pPr algn="ctr"/>
             <a:r>
-              <a:rPr lang="en-US" sz="1050" dirty="0" smtClean="0">
+              <a:rPr lang="en-US" sz="1050" dirty="0">
                 <a:solidFill>
                   <a:srgbClr val="7030A0"/>
                 </a:solidFill>
@@ -30304,7 +31965,7 @@
               </a:rPr>
             </a:br>
             <a:r>
-              <a:rPr lang="en-US" sz="1050" dirty="0" smtClean="0">
+              <a:rPr lang="en-US" sz="1050" dirty="0">
                 <a:solidFill>
                   <a:srgbClr val="7030A0"/>
                 </a:solidFill>
@@ -30360,7 +32021,7 @@
           <a:p>
             <a:pPr algn="ctr"/>
             <a:r>
-              <a:rPr lang="en-US" sz="1050" dirty="0" smtClean="0">
+              <a:rPr lang="en-US" sz="1050" dirty="0">
                 <a:solidFill>
                   <a:srgbClr val="7030A0"/>
                 </a:solidFill>
@@ -30585,7 +32246,7 @@
           <a:p>
             <a:pPr algn="ctr"/>
             <a:r>
-              <a:rPr lang="en-US" sz="1050" smtClean="0">
+              <a:rPr lang="en-US" sz="1050">
                 <a:solidFill>
                   <a:srgbClr val="7030A0"/>
                 </a:solidFill>
@@ -30648,7 +32309,7 @@
           <p:cNvPr id="121" name="Rectangle 8">
             <a:extLst>
               <a:ext uri="{FF2B5EF4-FFF2-40B4-BE49-F238E27FC236}">
-                <a16:creationId xmlns:a16="http://schemas.microsoft.com/office/drawing/2014/main" xmlns="" id="{ABDCDBD2-131A-4B66-A2F2-43BBEE82C773}"/>
+                <a16:creationId xmlns:a16="http://schemas.microsoft.com/office/drawing/2014/main" id="{ABDCDBD2-131A-4B66-A2F2-43BBEE82C773}"/>
               </a:ext>
             </a:extLst>
           </p:cNvPr>
@@ -30690,7 +32351,7 @@
           <a:p>
             <a:pPr algn="ctr"/>
             <a:r>
-              <a:rPr lang="en-US" sz="1050" dirty="0" smtClean="0">
+              <a:rPr lang="en-US" sz="1050" dirty="0">
                 <a:solidFill>
                   <a:srgbClr val="7030A0"/>
                 </a:solidFill>
@@ -30710,7 +32371,7 @@
           <p:cNvPr id="123" name="Elbow Connector 78">
             <a:extLst>
               <a:ext uri="{FF2B5EF4-FFF2-40B4-BE49-F238E27FC236}">
-                <a16:creationId xmlns:a16="http://schemas.microsoft.com/office/drawing/2014/main" xmlns="" id="{B97967F8-618A-448B-81FD-CDFD4AF0EC64}"/>
+                <a16:creationId xmlns:a16="http://schemas.microsoft.com/office/drawing/2014/main" id="{B97967F8-618A-448B-81FD-CDFD4AF0EC64}"/>
               </a:ext>
             </a:extLst>
           </p:cNvPr>
@@ -30860,7 +32521,7 @@
           <p:cNvPr id="148" name="Rectangle 8">
             <a:extLst>
               <a:ext uri="{FF2B5EF4-FFF2-40B4-BE49-F238E27FC236}">
-                <a16:creationId xmlns:a16="http://schemas.microsoft.com/office/drawing/2014/main" xmlns="" id="{ABDCDBD2-131A-4B66-A2F2-43BBEE82C773}"/>
+                <a16:creationId xmlns:a16="http://schemas.microsoft.com/office/drawing/2014/main" id="{ABDCDBD2-131A-4B66-A2F2-43BBEE82C773}"/>
               </a:ext>
             </a:extLst>
           </p:cNvPr>
@@ -30902,7 +32563,7 @@
           <a:p>
             <a:pPr algn="ctr"/>
             <a:r>
-              <a:rPr lang="en-US" sz="1050" dirty="0" smtClean="0">
+              <a:rPr lang="en-US" sz="1050" dirty="0">
                 <a:solidFill>
                   <a:srgbClr val="7030A0"/>
                 </a:solidFill>
@@ -30922,7 +32583,7 @@
           <p:cNvPr id="149" name="Elbow Connector 78">
             <a:extLst>
               <a:ext uri="{FF2B5EF4-FFF2-40B4-BE49-F238E27FC236}">
-                <a16:creationId xmlns:a16="http://schemas.microsoft.com/office/drawing/2014/main" xmlns="" id="{B97967F8-618A-448B-81FD-CDFD4AF0EC64}"/>
+                <a16:creationId xmlns:a16="http://schemas.microsoft.com/office/drawing/2014/main" id="{B97967F8-618A-448B-81FD-CDFD4AF0EC64}"/>
               </a:ext>
             </a:extLst>
           </p:cNvPr>

</xml_diff>

<commit_message>
Update all that stuff, DG UG, diagrams
</commit_message>
<xml_diff>
--- a/docs/diagrams/ModelComponentClassDiagram.pptx
+++ b/docs/diagrams/ModelComponentClassDiagram.pptx
@@ -208,7 +208,7 @@
           <a:p>
             <a:fld id="{F5CC4B3F-88C1-4FFA-B1B6-F41C21DC6924}" type="datetimeFigureOut">
               <a:rPr lang="en-US" smtClean="0"/>
-              <a:t>14-Apr-19</a:t>
+              <a:t>15-Apr-19</a:t>
             </a:fld>
             <a:endParaRPr lang="en-US"/>
           </a:p>
@@ -654,7 +654,7 @@
           <a:p>
             <a:fld id="{78C97017-6FC3-485B-9764-EAC9E56C1D49}" type="datetimeFigureOut">
               <a:rPr lang="en-US" smtClean="0"/>
-              <a:t>14-Apr-19</a:t>
+              <a:t>15-Apr-19</a:t>
             </a:fld>
             <a:endParaRPr lang="en-US"/>
           </a:p>
@@ -822,7 +822,7 @@
           <a:p>
             <a:fld id="{78C97017-6FC3-485B-9764-EAC9E56C1D49}" type="datetimeFigureOut">
               <a:rPr lang="en-US" smtClean="0"/>
-              <a:t>14-Apr-19</a:t>
+              <a:t>15-Apr-19</a:t>
             </a:fld>
             <a:endParaRPr lang="en-US"/>
           </a:p>
@@ -1000,7 +1000,7 @@
           <a:p>
             <a:fld id="{78C97017-6FC3-485B-9764-EAC9E56C1D49}" type="datetimeFigureOut">
               <a:rPr lang="en-US" smtClean="0"/>
-              <a:t>14-Apr-19</a:t>
+              <a:t>15-Apr-19</a:t>
             </a:fld>
             <a:endParaRPr lang="en-US"/>
           </a:p>
@@ -1168,7 +1168,7 @@
           <a:p>
             <a:fld id="{78C97017-6FC3-485B-9764-EAC9E56C1D49}" type="datetimeFigureOut">
               <a:rPr lang="en-US" smtClean="0"/>
-              <a:t>14-Apr-19</a:t>
+              <a:t>15-Apr-19</a:t>
             </a:fld>
             <a:endParaRPr lang="en-US"/>
           </a:p>
@@ -1413,7 +1413,7 @@
           <a:p>
             <a:fld id="{78C97017-6FC3-485B-9764-EAC9E56C1D49}" type="datetimeFigureOut">
               <a:rPr lang="en-US" smtClean="0"/>
-              <a:t>14-Apr-19</a:t>
+              <a:t>15-Apr-19</a:t>
             </a:fld>
             <a:endParaRPr lang="en-US"/>
           </a:p>
@@ -1698,7 +1698,7 @@
           <a:p>
             <a:fld id="{78C97017-6FC3-485B-9764-EAC9E56C1D49}" type="datetimeFigureOut">
               <a:rPr lang="en-US" smtClean="0"/>
-              <a:t>14-Apr-19</a:t>
+              <a:t>15-Apr-19</a:t>
             </a:fld>
             <a:endParaRPr lang="en-US"/>
           </a:p>
@@ -2117,7 +2117,7 @@
           <a:p>
             <a:fld id="{78C97017-6FC3-485B-9764-EAC9E56C1D49}" type="datetimeFigureOut">
               <a:rPr lang="en-US" smtClean="0"/>
-              <a:t>14-Apr-19</a:t>
+              <a:t>15-Apr-19</a:t>
             </a:fld>
             <a:endParaRPr lang="en-US"/>
           </a:p>
@@ -2234,7 +2234,7 @@
           <a:p>
             <a:fld id="{78C97017-6FC3-485B-9764-EAC9E56C1D49}" type="datetimeFigureOut">
               <a:rPr lang="en-US" smtClean="0"/>
-              <a:t>14-Apr-19</a:t>
+              <a:t>15-Apr-19</a:t>
             </a:fld>
             <a:endParaRPr lang="en-US"/>
           </a:p>
@@ -2329,7 +2329,7 @@
           <a:p>
             <a:fld id="{78C97017-6FC3-485B-9764-EAC9E56C1D49}" type="datetimeFigureOut">
               <a:rPr lang="en-US" smtClean="0"/>
-              <a:t>14-Apr-19</a:t>
+              <a:t>15-Apr-19</a:t>
             </a:fld>
             <a:endParaRPr lang="en-US"/>
           </a:p>
@@ -2604,7 +2604,7 @@
           <a:p>
             <a:fld id="{78C97017-6FC3-485B-9764-EAC9E56C1D49}" type="datetimeFigureOut">
               <a:rPr lang="en-US" smtClean="0"/>
-              <a:t>14-Apr-19</a:t>
+              <a:t>15-Apr-19</a:t>
             </a:fld>
             <a:endParaRPr lang="en-US"/>
           </a:p>
@@ -2856,7 +2856,7 @@
           <a:p>
             <a:fld id="{78C97017-6FC3-485B-9764-EAC9E56C1D49}" type="datetimeFigureOut">
               <a:rPr lang="en-US" smtClean="0"/>
-              <a:t>14-Apr-19</a:t>
+              <a:t>15-Apr-19</a:t>
             </a:fld>
             <a:endParaRPr lang="en-US"/>
           </a:p>
@@ -3067,7 +3067,7 @@
           <a:p>
             <a:fld id="{78C97017-6FC3-485B-9764-EAC9E56C1D49}" type="datetimeFigureOut">
               <a:rPr lang="en-US" smtClean="0"/>
-              <a:t>14-Apr-19</a:t>
+              <a:t>15-Apr-19</a:t>
             </a:fld>
             <a:endParaRPr lang="en-US"/>
           </a:p>
@@ -3499,7 +3499,7 @@
         </p:nvGrpSpPr>
         <p:grpSpPr>
           <a:xfrm>
-            <a:off x="990601" y="1078240"/>
+            <a:off x="990600" y="762000"/>
             <a:ext cx="7696200" cy="5398760"/>
             <a:chOff x="990601" y="1078240"/>
             <a:chExt cx="7696200" cy="5398760"/>
@@ -5441,7 +5441,7 @@
           </p:nvSpPr>
           <p:spPr>
             <a:xfrm>
-              <a:off x="7349778" y="3631317"/>
+              <a:off x="7398166" y="3630844"/>
               <a:ext cx="189257" cy="178683"/>
             </a:xfrm>
             <a:prstGeom prst="rect">
@@ -8895,6 +8895,591 @@
           </p:style>
         </p:cxnSp>
       </p:grpSp>
+      <p:sp>
+        <p:nvSpPr>
+          <p:cNvPr id="137" name="TextBox 136">
+            <a:extLst>
+              <a:ext uri="{FF2B5EF4-FFF2-40B4-BE49-F238E27FC236}">
+                <a16:creationId xmlns:a16="http://schemas.microsoft.com/office/drawing/2014/main" id="{42E84743-925D-4D95-A31D-E8EF9363BFEE}"/>
+              </a:ext>
+            </a:extLst>
+          </p:cNvPr>
+          <p:cNvSpPr txBox="1"/>
+          <p:nvPr/>
+        </p:nvSpPr>
+        <p:spPr>
+          <a:xfrm>
+            <a:off x="7410611" y="3946488"/>
+            <a:ext cx="189257" cy="178683"/>
+          </a:xfrm>
+          <a:prstGeom prst="rect">
+            <a:avLst/>
+          </a:prstGeom>
+          <a:noFill/>
+        </p:spPr>
+        <p:txBody>
+          <a:bodyPr wrap="square" lIns="0" tIns="0" rIns="0" bIns="0" rtlCol="0">
+            <a:noAutofit/>
+          </a:bodyPr>
+          <a:lstStyle/>
+          <a:p>
+            <a:pPr algn="ctr"/>
+            <a:r>
+              <a:rPr lang="en-US" sz="1000" dirty="0">
+                <a:solidFill>
+                  <a:srgbClr val="7030A0"/>
+                </a:solidFill>
+              </a:rPr>
+              <a:t>1</a:t>
+            </a:r>
+            <a:endParaRPr lang="en-SG" sz="1100" dirty="0">
+              <a:solidFill>
+                <a:srgbClr val="7030A0"/>
+              </a:solidFill>
+            </a:endParaRPr>
+          </a:p>
+        </p:txBody>
+      </p:sp>
+      <p:sp>
+        <p:nvSpPr>
+          <p:cNvPr id="138" name="TextBox 137">
+            <a:extLst>
+              <a:ext uri="{FF2B5EF4-FFF2-40B4-BE49-F238E27FC236}">
+                <a16:creationId xmlns:a16="http://schemas.microsoft.com/office/drawing/2014/main" id="{C598E1CA-BB3A-41FB-8860-DFAD224556B0}"/>
+              </a:ext>
+            </a:extLst>
+          </p:cNvPr>
+          <p:cNvSpPr txBox="1"/>
+          <p:nvPr/>
+        </p:nvSpPr>
+        <p:spPr>
+          <a:xfrm>
+            <a:off x="7411961" y="4266143"/>
+            <a:ext cx="189257" cy="178683"/>
+          </a:xfrm>
+          <a:prstGeom prst="rect">
+            <a:avLst/>
+          </a:prstGeom>
+          <a:noFill/>
+        </p:spPr>
+        <p:txBody>
+          <a:bodyPr wrap="square" lIns="0" tIns="0" rIns="0" bIns="0" rtlCol="0">
+            <a:noAutofit/>
+          </a:bodyPr>
+          <a:lstStyle/>
+          <a:p>
+            <a:pPr algn="ctr"/>
+            <a:r>
+              <a:rPr lang="en-US" sz="1000" dirty="0">
+                <a:solidFill>
+                  <a:srgbClr val="7030A0"/>
+                </a:solidFill>
+              </a:rPr>
+              <a:t>1</a:t>
+            </a:r>
+            <a:endParaRPr lang="en-SG" sz="1100" dirty="0">
+              <a:solidFill>
+                <a:srgbClr val="7030A0"/>
+              </a:solidFill>
+            </a:endParaRPr>
+          </a:p>
+        </p:txBody>
+      </p:sp>
+      <p:sp>
+        <p:nvSpPr>
+          <p:cNvPr id="139" name="TextBox 138">
+            <a:extLst>
+              <a:ext uri="{FF2B5EF4-FFF2-40B4-BE49-F238E27FC236}">
+                <a16:creationId xmlns:a16="http://schemas.microsoft.com/office/drawing/2014/main" id="{72D8F78A-E522-4CA7-82DB-6000D50D5BAB}"/>
+              </a:ext>
+            </a:extLst>
+          </p:cNvPr>
+          <p:cNvSpPr txBox="1"/>
+          <p:nvPr/>
+        </p:nvSpPr>
+        <p:spPr>
+          <a:xfrm>
+            <a:off x="7412997" y="4587256"/>
+            <a:ext cx="189257" cy="178683"/>
+          </a:xfrm>
+          <a:prstGeom prst="rect">
+            <a:avLst/>
+          </a:prstGeom>
+          <a:noFill/>
+        </p:spPr>
+        <p:txBody>
+          <a:bodyPr wrap="square" lIns="0" tIns="0" rIns="0" bIns="0" rtlCol="0">
+            <a:noAutofit/>
+          </a:bodyPr>
+          <a:lstStyle/>
+          <a:p>
+            <a:pPr algn="ctr"/>
+            <a:r>
+              <a:rPr lang="en-US" sz="1000" dirty="0">
+                <a:solidFill>
+                  <a:srgbClr val="7030A0"/>
+                </a:solidFill>
+              </a:rPr>
+              <a:t>1</a:t>
+            </a:r>
+            <a:endParaRPr lang="en-SG" sz="1100" dirty="0">
+              <a:solidFill>
+                <a:srgbClr val="7030A0"/>
+              </a:solidFill>
+            </a:endParaRPr>
+          </a:p>
+        </p:txBody>
+      </p:sp>
+      <p:sp>
+        <p:nvSpPr>
+          <p:cNvPr id="140" name="TextBox 139">
+            <a:extLst>
+              <a:ext uri="{FF2B5EF4-FFF2-40B4-BE49-F238E27FC236}">
+                <a16:creationId xmlns:a16="http://schemas.microsoft.com/office/drawing/2014/main" id="{13CACE2A-B12D-4D97-AE16-DFD9E9839BC3}"/>
+              </a:ext>
+            </a:extLst>
+          </p:cNvPr>
+          <p:cNvSpPr txBox="1"/>
+          <p:nvPr/>
+        </p:nvSpPr>
+        <p:spPr>
+          <a:xfrm>
+            <a:off x="7420226" y="4921138"/>
+            <a:ext cx="189257" cy="178683"/>
+          </a:xfrm>
+          <a:prstGeom prst="rect">
+            <a:avLst/>
+          </a:prstGeom>
+          <a:noFill/>
+        </p:spPr>
+        <p:txBody>
+          <a:bodyPr wrap="square" lIns="0" tIns="0" rIns="0" bIns="0" rtlCol="0">
+            <a:noAutofit/>
+          </a:bodyPr>
+          <a:lstStyle/>
+          <a:p>
+            <a:pPr algn="ctr"/>
+            <a:r>
+              <a:rPr lang="en-US" sz="1000" dirty="0">
+                <a:solidFill>
+                  <a:srgbClr val="7030A0"/>
+                </a:solidFill>
+              </a:rPr>
+              <a:t>1</a:t>
+            </a:r>
+            <a:endParaRPr lang="en-SG" sz="1100" dirty="0">
+              <a:solidFill>
+                <a:srgbClr val="7030A0"/>
+              </a:solidFill>
+            </a:endParaRPr>
+          </a:p>
+        </p:txBody>
+      </p:sp>
+      <p:sp>
+        <p:nvSpPr>
+          <p:cNvPr id="141" name="TextBox 140">
+            <a:extLst>
+              <a:ext uri="{FF2B5EF4-FFF2-40B4-BE49-F238E27FC236}">
+                <a16:creationId xmlns:a16="http://schemas.microsoft.com/office/drawing/2014/main" id="{95E6FCE8-AB81-4558-94DF-99A96C993CB2}"/>
+              </a:ext>
+            </a:extLst>
+          </p:cNvPr>
+          <p:cNvSpPr txBox="1"/>
+          <p:nvPr/>
+        </p:nvSpPr>
+        <p:spPr>
+          <a:xfrm>
+            <a:off x="7409544" y="5248458"/>
+            <a:ext cx="189257" cy="178683"/>
+          </a:xfrm>
+          <a:prstGeom prst="rect">
+            <a:avLst/>
+          </a:prstGeom>
+          <a:noFill/>
+        </p:spPr>
+        <p:txBody>
+          <a:bodyPr wrap="square" lIns="0" tIns="0" rIns="0" bIns="0" rtlCol="0">
+            <a:noAutofit/>
+          </a:bodyPr>
+          <a:lstStyle/>
+          <a:p>
+            <a:pPr algn="ctr"/>
+            <a:r>
+              <a:rPr lang="en-US" sz="1000" dirty="0">
+                <a:solidFill>
+                  <a:srgbClr val="7030A0"/>
+                </a:solidFill>
+              </a:rPr>
+              <a:t>1</a:t>
+            </a:r>
+            <a:endParaRPr lang="en-SG" sz="1100" dirty="0">
+              <a:solidFill>
+                <a:srgbClr val="7030A0"/>
+              </a:solidFill>
+            </a:endParaRPr>
+          </a:p>
+        </p:txBody>
+      </p:sp>
+      <p:sp>
+        <p:nvSpPr>
+          <p:cNvPr id="150" name="TextBox 149">
+            <a:extLst>
+              <a:ext uri="{FF2B5EF4-FFF2-40B4-BE49-F238E27FC236}">
+                <a16:creationId xmlns:a16="http://schemas.microsoft.com/office/drawing/2014/main" id="{8746DD33-1BB5-4247-A09D-9857954CA24E}"/>
+              </a:ext>
+            </a:extLst>
+          </p:cNvPr>
+          <p:cNvSpPr txBox="1"/>
+          <p:nvPr/>
+        </p:nvSpPr>
+        <p:spPr>
+          <a:xfrm>
+            <a:off x="7412284" y="3607743"/>
+            <a:ext cx="189257" cy="178683"/>
+          </a:xfrm>
+          <a:prstGeom prst="rect">
+            <a:avLst/>
+          </a:prstGeom>
+          <a:noFill/>
+        </p:spPr>
+        <p:txBody>
+          <a:bodyPr wrap="square" lIns="0" tIns="0" rIns="0" bIns="0" rtlCol="0">
+            <a:noAutofit/>
+          </a:bodyPr>
+          <a:lstStyle/>
+          <a:p>
+            <a:pPr algn="ctr"/>
+            <a:r>
+              <a:rPr lang="en-US" sz="1000" dirty="0">
+                <a:solidFill>
+                  <a:srgbClr val="7030A0"/>
+                </a:solidFill>
+              </a:rPr>
+              <a:t>1</a:t>
+            </a:r>
+            <a:endParaRPr lang="en-SG" sz="1100" dirty="0">
+              <a:solidFill>
+                <a:srgbClr val="7030A0"/>
+              </a:solidFill>
+            </a:endParaRPr>
+          </a:p>
+        </p:txBody>
+      </p:sp>
+      <p:sp>
+        <p:nvSpPr>
+          <p:cNvPr id="152" name="TextBox 151">
+            <a:extLst>
+              <a:ext uri="{FF2B5EF4-FFF2-40B4-BE49-F238E27FC236}">
+                <a16:creationId xmlns:a16="http://schemas.microsoft.com/office/drawing/2014/main" id="{D4DC5827-FE36-44C8-A20A-52930B1C942B}"/>
+              </a:ext>
+            </a:extLst>
+          </p:cNvPr>
+          <p:cNvSpPr txBox="1"/>
+          <p:nvPr/>
+        </p:nvSpPr>
+        <p:spPr>
+          <a:xfrm>
+            <a:off x="7391400" y="5819148"/>
+            <a:ext cx="207401" cy="178683"/>
+          </a:xfrm>
+          <a:prstGeom prst="rect">
+            <a:avLst/>
+          </a:prstGeom>
+          <a:noFill/>
+        </p:spPr>
+        <p:txBody>
+          <a:bodyPr wrap="square" lIns="0" tIns="0" rIns="0" bIns="0" rtlCol="0">
+            <a:noAutofit/>
+          </a:bodyPr>
+          <a:lstStyle/>
+          <a:p>
+            <a:pPr algn="ctr"/>
+            <a:r>
+              <a:rPr lang="en-US" sz="1000" dirty="0">
+                <a:solidFill>
+                  <a:srgbClr val="7030A0"/>
+                </a:solidFill>
+              </a:rPr>
+              <a:t>0..1</a:t>
+            </a:r>
+            <a:endParaRPr lang="en-SG" sz="1100" dirty="0">
+              <a:solidFill>
+                <a:srgbClr val="7030A0"/>
+              </a:solidFill>
+            </a:endParaRPr>
+          </a:p>
+        </p:txBody>
+      </p:sp>
+      <p:sp>
+        <p:nvSpPr>
+          <p:cNvPr id="154" name="TextBox 153">
+            <a:extLst>
+              <a:ext uri="{FF2B5EF4-FFF2-40B4-BE49-F238E27FC236}">
+                <a16:creationId xmlns:a16="http://schemas.microsoft.com/office/drawing/2014/main" id="{96593A03-A08F-428C-ADDC-2216150C6C9F}"/>
+              </a:ext>
+            </a:extLst>
+          </p:cNvPr>
+          <p:cNvSpPr txBox="1"/>
+          <p:nvPr/>
+        </p:nvSpPr>
+        <p:spPr>
+          <a:xfrm>
+            <a:off x="7340905" y="2839012"/>
+            <a:ext cx="189257" cy="190601"/>
+          </a:xfrm>
+          <a:prstGeom prst="rect">
+            <a:avLst/>
+          </a:prstGeom>
+          <a:noFill/>
+        </p:spPr>
+        <p:txBody>
+          <a:bodyPr wrap="square" lIns="0" tIns="0" rIns="0" bIns="0" rtlCol="0">
+            <a:noAutofit/>
+          </a:bodyPr>
+          <a:lstStyle/>
+          <a:p>
+            <a:pPr algn="ctr"/>
+            <a:r>
+              <a:rPr lang="en-US" sz="1000" dirty="0">
+                <a:solidFill>
+                  <a:srgbClr val="7030A0"/>
+                </a:solidFill>
+              </a:rPr>
+              <a:t>1</a:t>
+            </a:r>
+            <a:endParaRPr lang="en-SG" sz="1100" dirty="0">
+              <a:solidFill>
+                <a:srgbClr val="7030A0"/>
+              </a:solidFill>
+            </a:endParaRPr>
+          </a:p>
+        </p:txBody>
+      </p:sp>
+      <p:sp>
+        <p:nvSpPr>
+          <p:cNvPr id="155" name="TextBox 154">
+            <a:extLst>
+              <a:ext uri="{FF2B5EF4-FFF2-40B4-BE49-F238E27FC236}">
+                <a16:creationId xmlns:a16="http://schemas.microsoft.com/office/drawing/2014/main" id="{50F40BB0-548A-4156-A459-0CCD32FF9FC9}"/>
+              </a:ext>
+            </a:extLst>
+          </p:cNvPr>
+          <p:cNvSpPr txBox="1"/>
+          <p:nvPr/>
+        </p:nvSpPr>
+        <p:spPr>
+          <a:xfrm>
+            <a:off x="7333324" y="2149606"/>
+            <a:ext cx="189257" cy="190601"/>
+          </a:xfrm>
+          <a:prstGeom prst="rect">
+            <a:avLst/>
+          </a:prstGeom>
+          <a:noFill/>
+        </p:spPr>
+        <p:txBody>
+          <a:bodyPr wrap="square" lIns="0" tIns="0" rIns="0" bIns="0" rtlCol="0">
+            <a:noAutofit/>
+          </a:bodyPr>
+          <a:lstStyle/>
+          <a:p>
+            <a:pPr algn="ctr"/>
+            <a:r>
+              <a:rPr lang="en-US" sz="1000" dirty="0">
+                <a:solidFill>
+                  <a:srgbClr val="7030A0"/>
+                </a:solidFill>
+              </a:rPr>
+              <a:t>1</a:t>
+            </a:r>
+            <a:endParaRPr lang="en-SG" sz="1100" dirty="0">
+              <a:solidFill>
+                <a:srgbClr val="7030A0"/>
+              </a:solidFill>
+            </a:endParaRPr>
+          </a:p>
+        </p:txBody>
+      </p:sp>
+      <p:sp>
+        <p:nvSpPr>
+          <p:cNvPr id="156" name="TextBox 155">
+            <a:extLst>
+              <a:ext uri="{FF2B5EF4-FFF2-40B4-BE49-F238E27FC236}">
+                <a16:creationId xmlns:a16="http://schemas.microsoft.com/office/drawing/2014/main" id="{9CA3A697-75E0-4830-BC20-834CCEBA204C}"/>
+              </a:ext>
+            </a:extLst>
+          </p:cNvPr>
+          <p:cNvSpPr txBox="1"/>
+          <p:nvPr/>
+        </p:nvSpPr>
+        <p:spPr>
+          <a:xfrm>
+            <a:off x="7333324" y="1816049"/>
+            <a:ext cx="189257" cy="190601"/>
+          </a:xfrm>
+          <a:prstGeom prst="rect">
+            <a:avLst/>
+          </a:prstGeom>
+          <a:noFill/>
+        </p:spPr>
+        <p:txBody>
+          <a:bodyPr wrap="square" lIns="0" tIns="0" rIns="0" bIns="0" rtlCol="0">
+            <a:noAutofit/>
+          </a:bodyPr>
+          <a:lstStyle/>
+          <a:p>
+            <a:pPr algn="ctr"/>
+            <a:r>
+              <a:rPr lang="en-US" sz="1000" dirty="0">
+                <a:solidFill>
+                  <a:srgbClr val="7030A0"/>
+                </a:solidFill>
+              </a:rPr>
+              <a:t>1</a:t>
+            </a:r>
+            <a:endParaRPr lang="en-SG" sz="1100" dirty="0">
+              <a:solidFill>
+                <a:srgbClr val="7030A0"/>
+              </a:solidFill>
+            </a:endParaRPr>
+          </a:p>
+        </p:txBody>
+      </p:sp>
+      <p:sp>
+        <p:nvSpPr>
+          <p:cNvPr id="157" name="TextBox 156">
+            <a:extLst>
+              <a:ext uri="{FF2B5EF4-FFF2-40B4-BE49-F238E27FC236}">
+                <a16:creationId xmlns:a16="http://schemas.microsoft.com/office/drawing/2014/main" id="{D3C4B0E5-C39F-4255-BEFA-69ECAA76126C}"/>
+              </a:ext>
+            </a:extLst>
+          </p:cNvPr>
+          <p:cNvSpPr txBox="1"/>
+          <p:nvPr/>
+        </p:nvSpPr>
+        <p:spPr>
+          <a:xfrm>
+            <a:off x="7322184" y="1474370"/>
+            <a:ext cx="189257" cy="190601"/>
+          </a:xfrm>
+          <a:prstGeom prst="rect">
+            <a:avLst/>
+          </a:prstGeom>
+          <a:noFill/>
+        </p:spPr>
+        <p:txBody>
+          <a:bodyPr wrap="square" lIns="0" tIns="0" rIns="0" bIns="0" rtlCol="0">
+            <a:noAutofit/>
+          </a:bodyPr>
+          <a:lstStyle/>
+          <a:p>
+            <a:pPr algn="ctr"/>
+            <a:r>
+              <a:rPr lang="en-US" sz="1000" dirty="0">
+                <a:solidFill>
+                  <a:srgbClr val="7030A0"/>
+                </a:solidFill>
+              </a:rPr>
+              <a:t>1</a:t>
+            </a:r>
+            <a:endParaRPr lang="en-SG" sz="1100" dirty="0">
+              <a:solidFill>
+                <a:srgbClr val="7030A0"/>
+              </a:solidFill>
+            </a:endParaRPr>
+          </a:p>
+        </p:txBody>
+      </p:sp>
+      <p:sp>
+        <p:nvSpPr>
+          <p:cNvPr id="158" name="TextBox 157">
+            <a:extLst>
+              <a:ext uri="{FF2B5EF4-FFF2-40B4-BE49-F238E27FC236}">
+                <a16:creationId xmlns:a16="http://schemas.microsoft.com/office/drawing/2014/main" id="{1C15E58C-C9DC-48F0-8110-8204D7992E93}"/>
+              </a:ext>
+            </a:extLst>
+          </p:cNvPr>
+          <p:cNvSpPr txBox="1"/>
+          <p:nvPr/>
+        </p:nvSpPr>
+        <p:spPr>
+          <a:xfrm>
+            <a:off x="7322183" y="1136187"/>
+            <a:ext cx="189257" cy="190601"/>
+          </a:xfrm>
+          <a:prstGeom prst="rect">
+            <a:avLst/>
+          </a:prstGeom>
+          <a:noFill/>
+        </p:spPr>
+        <p:txBody>
+          <a:bodyPr wrap="square" lIns="0" tIns="0" rIns="0" bIns="0" rtlCol="0">
+            <a:noAutofit/>
+          </a:bodyPr>
+          <a:lstStyle/>
+          <a:p>
+            <a:pPr algn="ctr"/>
+            <a:r>
+              <a:rPr lang="en-US" sz="1000" dirty="0">
+                <a:solidFill>
+                  <a:srgbClr val="7030A0"/>
+                </a:solidFill>
+              </a:rPr>
+              <a:t>1</a:t>
+            </a:r>
+            <a:endParaRPr lang="en-SG" sz="1100" dirty="0">
+              <a:solidFill>
+                <a:srgbClr val="7030A0"/>
+              </a:solidFill>
+            </a:endParaRPr>
+          </a:p>
+        </p:txBody>
+      </p:sp>
+      <p:sp>
+        <p:nvSpPr>
+          <p:cNvPr id="159" name="TextBox 158">
+            <a:extLst>
+              <a:ext uri="{FF2B5EF4-FFF2-40B4-BE49-F238E27FC236}">
+                <a16:creationId xmlns:a16="http://schemas.microsoft.com/office/drawing/2014/main" id="{633743D5-B84E-48A2-B891-CB4BF3E1D558}"/>
+              </a:ext>
+            </a:extLst>
+          </p:cNvPr>
+          <p:cNvSpPr txBox="1"/>
+          <p:nvPr/>
+        </p:nvSpPr>
+        <p:spPr>
+          <a:xfrm>
+            <a:off x="7354543" y="2522746"/>
+            <a:ext cx="189257" cy="190601"/>
+          </a:xfrm>
+          <a:prstGeom prst="rect">
+            <a:avLst/>
+          </a:prstGeom>
+          <a:noFill/>
+        </p:spPr>
+        <p:txBody>
+          <a:bodyPr wrap="square" lIns="0" tIns="0" rIns="0" bIns="0" rtlCol="0">
+            <a:noAutofit/>
+          </a:bodyPr>
+          <a:lstStyle/>
+          <a:p>
+            <a:pPr algn="ctr"/>
+            <a:r>
+              <a:rPr lang="en-US" sz="1000" dirty="0">
+                <a:solidFill>
+                  <a:srgbClr val="7030A0"/>
+                </a:solidFill>
+              </a:rPr>
+              <a:t>1</a:t>
+            </a:r>
+            <a:endParaRPr lang="en-SG" sz="1100" dirty="0">
+              <a:solidFill>
+                <a:srgbClr val="7030A0"/>
+              </a:solidFill>
+            </a:endParaRPr>
+          </a:p>
+        </p:txBody>
+      </p:sp>
     </p:spTree>
     <p:extLst>
       <p:ext uri="{BB962C8B-B14F-4D97-AF65-F5344CB8AC3E}">

</xml_diff>

<commit_message>
Update developer guide for v1.4
</commit_message>
<xml_diff>
--- a/docs/diagrams/ModelComponentClassDiagram.pptx
+++ b/docs/diagrams/ModelComponentClassDiagram.pptx
@@ -208,7 +208,7 @@
           <a:p>
             <a:fld id="{F5CC4B3F-88C1-4FFA-B1B6-F41C21DC6924}" type="datetimeFigureOut">
               <a:rPr lang="en-US" smtClean="0"/>
-              <a:t>4/14/2019</a:t>
+              <a:t>4/15/2019</a:t>
             </a:fld>
             <a:endParaRPr lang="en-US"/>
           </a:p>
@@ -654,7 +654,7 @@
           <a:p>
             <a:fld id="{78C97017-6FC3-485B-9764-EAC9E56C1D49}" type="datetimeFigureOut">
               <a:rPr lang="en-US" smtClean="0"/>
-              <a:t>4/14/2019</a:t>
+              <a:t>4/15/2019</a:t>
             </a:fld>
             <a:endParaRPr lang="en-US"/>
           </a:p>
@@ -822,7 +822,7 @@
           <a:p>
             <a:fld id="{78C97017-6FC3-485B-9764-EAC9E56C1D49}" type="datetimeFigureOut">
               <a:rPr lang="en-US" smtClean="0"/>
-              <a:t>4/14/2019</a:t>
+              <a:t>4/15/2019</a:t>
             </a:fld>
             <a:endParaRPr lang="en-US"/>
           </a:p>
@@ -1000,7 +1000,7 @@
           <a:p>
             <a:fld id="{78C97017-6FC3-485B-9764-EAC9E56C1D49}" type="datetimeFigureOut">
               <a:rPr lang="en-US" smtClean="0"/>
-              <a:t>4/14/2019</a:t>
+              <a:t>4/15/2019</a:t>
             </a:fld>
             <a:endParaRPr lang="en-US"/>
           </a:p>
@@ -1168,7 +1168,7 @@
           <a:p>
             <a:fld id="{78C97017-6FC3-485B-9764-EAC9E56C1D49}" type="datetimeFigureOut">
               <a:rPr lang="en-US" smtClean="0"/>
-              <a:t>4/14/2019</a:t>
+              <a:t>4/15/2019</a:t>
             </a:fld>
             <a:endParaRPr lang="en-US"/>
           </a:p>
@@ -1413,7 +1413,7 @@
           <a:p>
             <a:fld id="{78C97017-6FC3-485B-9764-EAC9E56C1D49}" type="datetimeFigureOut">
               <a:rPr lang="en-US" smtClean="0"/>
-              <a:t>4/14/2019</a:t>
+              <a:t>4/15/2019</a:t>
             </a:fld>
             <a:endParaRPr lang="en-US"/>
           </a:p>
@@ -1698,7 +1698,7 @@
           <a:p>
             <a:fld id="{78C97017-6FC3-485B-9764-EAC9E56C1D49}" type="datetimeFigureOut">
               <a:rPr lang="en-US" smtClean="0"/>
-              <a:t>4/14/2019</a:t>
+              <a:t>4/15/2019</a:t>
             </a:fld>
             <a:endParaRPr lang="en-US"/>
           </a:p>
@@ -2117,7 +2117,7 @@
           <a:p>
             <a:fld id="{78C97017-6FC3-485B-9764-EAC9E56C1D49}" type="datetimeFigureOut">
               <a:rPr lang="en-US" smtClean="0"/>
-              <a:t>4/14/2019</a:t>
+              <a:t>4/15/2019</a:t>
             </a:fld>
             <a:endParaRPr lang="en-US"/>
           </a:p>
@@ -2234,7 +2234,7 @@
           <a:p>
             <a:fld id="{78C97017-6FC3-485B-9764-EAC9E56C1D49}" type="datetimeFigureOut">
               <a:rPr lang="en-US" smtClean="0"/>
-              <a:t>4/14/2019</a:t>
+              <a:t>4/15/2019</a:t>
             </a:fld>
             <a:endParaRPr lang="en-US"/>
           </a:p>
@@ -2329,7 +2329,7 @@
           <a:p>
             <a:fld id="{78C97017-6FC3-485B-9764-EAC9E56C1D49}" type="datetimeFigureOut">
               <a:rPr lang="en-US" smtClean="0"/>
-              <a:t>4/14/2019</a:t>
+              <a:t>4/15/2019</a:t>
             </a:fld>
             <a:endParaRPr lang="en-US"/>
           </a:p>
@@ -2604,7 +2604,7 @@
           <a:p>
             <a:fld id="{78C97017-6FC3-485B-9764-EAC9E56C1D49}" type="datetimeFigureOut">
               <a:rPr lang="en-US" smtClean="0"/>
-              <a:t>4/14/2019</a:t>
+              <a:t>4/15/2019</a:t>
             </a:fld>
             <a:endParaRPr lang="en-US"/>
           </a:p>
@@ -2856,7 +2856,7 @@
           <a:p>
             <a:fld id="{78C97017-6FC3-485B-9764-EAC9E56C1D49}" type="datetimeFigureOut">
               <a:rPr lang="en-US" smtClean="0"/>
-              <a:t>4/14/2019</a:t>
+              <a:t>4/15/2019</a:t>
             </a:fld>
             <a:endParaRPr lang="en-US"/>
           </a:p>
@@ -3067,7 +3067,7 @@
           <a:p>
             <a:fld id="{78C97017-6FC3-485B-9764-EAC9E56C1D49}" type="datetimeFigureOut">
               <a:rPr lang="en-US" smtClean="0"/>
-              <a:t>4/14/2019</a:t>
+              <a:t>4/15/2019</a:t>
             </a:fld>
             <a:endParaRPr lang="en-US"/>
           </a:p>
@@ -3450,8 +3450,8 @@
         </p:nvSpPr>
         <p:spPr>
           <a:xfrm>
-            <a:off x="762000" y="1866900"/>
-            <a:ext cx="7947935" cy="3124200"/>
+            <a:off x="762001" y="1866900"/>
+            <a:ext cx="7696200" cy="3124200"/>
           </a:xfrm>
           <a:prstGeom prst="roundRect">
             <a:avLst>

</xml_diff>

<commit_message>
Update MenuModelClassDiagram and PPP
</commit_message>
<xml_diff>
--- a/docs/diagrams/ModelComponentClassDiagram.pptx
+++ b/docs/diagrams/ModelComponentClassDiagram.pptx
@@ -5,7 +5,7 @@
     <p:sldMasterId id="2147483648" r:id="rId1"/>
   </p:sldMasterIdLst>
   <p:notesMasterIdLst>
-    <p:notesMasterId r:id="rId9"/>
+    <p:notesMasterId r:id="rId10"/>
   </p:notesMasterIdLst>
   <p:sldIdLst>
     <p:sldId id="263" r:id="rId2"/>
@@ -14,7 +14,8 @@
     <p:sldId id="266" r:id="rId5"/>
     <p:sldId id="267" r:id="rId6"/>
     <p:sldId id="269" r:id="rId7"/>
-    <p:sldId id="268" r:id="rId8"/>
+    <p:sldId id="270" r:id="rId8"/>
+    <p:sldId id="268" r:id="rId9"/>
   </p:sldIdLst>
   <p:sldSz cx="9144000" cy="6858000" type="screen4x3"/>
   <p:notesSz cx="6858000" cy="9144000"/>
@@ -214,7 +215,7 @@
           <a:p>
             <a:fld id="{F5CC4B3F-88C1-4FFA-B1B6-F41C21DC6924}" type="datetimeFigureOut">
               <a:rPr lang="en-US" smtClean="0"/>
-              <a:t>4/15/19</a:t>
+              <a:t>4/15/2019</a:t>
             </a:fld>
             <a:endParaRPr lang="en-US"/>
           </a:p>
@@ -926,6 +927,98 @@
     </p:spTree>
     <p:extLst>
       <p:ext uri="{BB962C8B-B14F-4D97-AF65-F5344CB8AC3E}">
+        <p14:creationId xmlns:p14="http://schemas.microsoft.com/office/powerpoint/2010/main" val="2128028363"/>
+      </p:ext>
+    </p:extLst>
+  </p:cSld>
+  <p:clrMapOvr>
+    <a:masterClrMapping/>
+  </p:clrMapOvr>
+</p:notes>
+</file>
+
+<file path=ppt/notesSlides/notesSlide6.xml><?xml version="1.0" encoding="utf-8"?>
+<p:notes xmlns:a="http://schemas.openxmlformats.org/drawingml/2006/main" xmlns:r="http://schemas.openxmlformats.org/officeDocument/2006/relationships" xmlns:p="http://schemas.openxmlformats.org/presentationml/2006/main">
+  <p:cSld>
+    <p:spTree>
+      <p:nvGrpSpPr>
+        <p:cNvPr id="1" name=""/>
+        <p:cNvGrpSpPr/>
+        <p:nvPr/>
+      </p:nvGrpSpPr>
+      <p:grpSpPr>
+        <a:xfrm>
+          <a:off x="0" y="0"/>
+          <a:ext cx="0" cy="0"/>
+          <a:chOff x="0" y="0"/>
+          <a:chExt cx="0" cy="0"/>
+        </a:xfrm>
+      </p:grpSpPr>
+      <p:sp>
+        <p:nvSpPr>
+          <p:cNvPr id="2" name="Slide Image Placeholder 1"/>
+          <p:cNvSpPr>
+            <a:spLocks noGrp="1" noRot="1" noChangeAspect="1"/>
+          </p:cNvSpPr>
+          <p:nvPr>
+            <p:ph type="sldImg"/>
+          </p:nvPr>
+        </p:nvSpPr>
+        <p:spPr/>
+      </p:sp>
+      <p:sp>
+        <p:nvSpPr>
+          <p:cNvPr id="3" name="Notes Placeholder 2"/>
+          <p:cNvSpPr>
+            <a:spLocks noGrp="1"/>
+          </p:cNvSpPr>
+          <p:nvPr>
+            <p:ph type="body" idx="1"/>
+          </p:nvPr>
+        </p:nvSpPr>
+        <p:spPr/>
+        <p:txBody>
+          <a:bodyPr/>
+          <a:lstStyle/>
+          <a:p>
+            <a:r>
+              <a:rPr lang="en-US" dirty="0"/>
+              <a:t>Without filtered</a:t>
+            </a:r>
+            <a:r>
+              <a:rPr lang="en-US" baseline="0" dirty="0"/>
+              <a:t> list</a:t>
+            </a:r>
+            <a:endParaRPr lang="en-US" dirty="0"/>
+          </a:p>
+        </p:txBody>
+      </p:sp>
+      <p:sp>
+        <p:nvSpPr>
+          <p:cNvPr id="4" name="Slide Number Placeholder 3"/>
+          <p:cNvSpPr>
+            <a:spLocks noGrp="1"/>
+          </p:cNvSpPr>
+          <p:nvPr>
+            <p:ph type="sldNum" sz="quarter" idx="10"/>
+          </p:nvPr>
+        </p:nvSpPr>
+        <p:spPr/>
+        <p:txBody>
+          <a:bodyPr/>
+          <a:lstStyle/>
+          <a:p>
+            <a:fld id="{5A7AB025-77E3-4BD1-A2FD-B3183DBA47A3}" type="slidenum">
+              <a:rPr lang="en-US" smtClean="0"/>
+              <a:t>8</a:t>
+            </a:fld>
+            <a:endParaRPr lang="en-US"/>
+          </a:p>
+        </p:txBody>
+      </p:sp>
+    </p:spTree>
+    <p:extLst>
+      <p:ext uri="{BB962C8B-B14F-4D97-AF65-F5344CB8AC3E}">
         <p14:creationId xmlns:p14="http://schemas.microsoft.com/office/powerpoint/2010/main" val="1588687795"/>
       </p:ext>
     </p:extLst>
@@ -1115,7 +1208,7 @@
           <a:p>
             <a:fld id="{78C97017-6FC3-485B-9764-EAC9E56C1D49}" type="datetimeFigureOut">
               <a:rPr lang="en-US" smtClean="0"/>
-              <a:t>4/15/19</a:t>
+              <a:t>4/15/2019</a:t>
             </a:fld>
             <a:endParaRPr lang="en-US"/>
           </a:p>
@@ -1283,7 +1376,7 @@
           <a:p>
             <a:fld id="{78C97017-6FC3-485B-9764-EAC9E56C1D49}" type="datetimeFigureOut">
               <a:rPr lang="en-US" smtClean="0"/>
-              <a:t>4/15/19</a:t>
+              <a:t>4/15/2019</a:t>
             </a:fld>
             <a:endParaRPr lang="en-US"/>
           </a:p>
@@ -1461,7 +1554,7 @@
           <a:p>
             <a:fld id="{78C97017-6FC3-485B-9764-EAC9E56C1D49}" type="datetimeFigureOut">
               <a:rPr lang="en-US" smtClean="0"/>
-              <a:t>4/15/19</a:t>
+              <a:t>4/15/2019</a:t>
             </a:fld>
             <a:endParaRPr lang="en-US"/>
           </a:p>
@@ -1629,7 +1722,7 @@
           <a:p>
             <a:fld id="{78C97017-6FC3-485B-9764-EAC9E56C1D49}" type="datetimeFigureOut">
               <a:rPr lang="en-US" smtClean="0"/>
-              <a:t>4/15/19</a:t>
+              <a:t>4/15/2019</a:t>
             </a:fld>
             <a:endParaRPr lang="en-US"/>
           </a:p>
@@ -1874,7 +1967,7 @@
           <a:p>
             <a:fld id="{78C97017-6FC3-485B-9764-EAC9E56C1D49}" type="datetimeFigureOut">
               <a:rPr lang="en-US" smtClean="0"/>
-              <a:t>4/15/19</a:t>
+              <a:t>4/15/2019</a:t>
             </a:fld>
             <a:endParaRPr lang="en-US"/>
           </a:p>
@@ -2159,7 +2252,7 @@
           <a:p>
             <a:fld id="{78C97017-6FC3-485B-9764-EAC9E56C1D49}" type="datetimeFigureOut">
               <a:rPr lang="en-US" smtClean="0"/>
-              <a:t>4/15/19</a:t>
+              <a:t>4/15/2019</a:t>
             </a:fld>
             <a:endParaRPr lang="en-US"/>
           </a:p>
@@ -2578,7 +2671,7 @@
           <a:p>
             <a:fld id="{78C97017-6FC3-485B-9764-EAC9E56C1D49}" type="datetimeFigureOut">
               <a:rPr lang="en-US" smtClean="0"/>
-              <a:t>4/15/19</a:t>
+              <a:t>4/15/2019</a:t>
             </a:fld>
             <a:endParaRPr lang="en-US"/>
           </a:p>
@@ -2695,7 +2788,7 @@
           <a:p>
             <a:fld id="{78C97017-6FC3-485B-9764-EAC9E56C1D49}" type="datetimeFigureOut">
               <a:rPr lang="en-US" smtClean="0"/>
-              <a:t>4/15/19</a:t>
+              <a:t>4/15/2019</a:t>
             </a:fld>
             <a:endParaRPr lang="en-US"/>
           </a:p>
@@ -2790,7 +2883,7 @@
           <a:p>
             <a:fld id="{78C97017-6FC3-485B-9764-EAC9E56C1D49}" type="datetimeFigureOut">
               <a:rPr lang="en-US" smtClean="0"/>
-              <a:t>4/15/19</a:t>
+              <a:t>4/15/2019</a:t>
             </a:fld>
             <a:endParaRPr lang="en-US"/>
           </a:p>
@@ -3065,7 +3158,7 @@
           <a:p>
             <a:fld id="{78C97017-6FC3-485B-9764-EAC9E56C1D49}" type="datetimeFigureOut">
               <a:rPr lang="en-US" smtClean="0"/>
-              <a:t>4/15/19</a:t>
+              <a:t>4/15/2019</a:t>
             </a:fld>
             <a:endParaRPr lang="en-US"/>
           </a:p>
@@ -3317,7 +3410,7 @@
           <a:p>
             <a:fld id="{78C97017-6FC3-485B-9764-EAC9E56C1D49}" type="datetimeFigureOut">
               <a:rPr lang="en-US" smtClean="0"/>
-              <a:t>4/15/19</a:t>
+              <a:t>4/15/2019</a:t>
             </a:fld>
             <a:endParaRPr lang="en-US"/>
           </a:p>
@@ -3528,7 +3621,7 @@
           <a:p>
             <a:fld id="{78C97017-6FC3-485B-9764-EAC9E56C1D49}" type="datetimeFigureOut">
               <a:rPr lang="en-US" smtClean="0"/>
-              <a:t>4/15/19</a:t>
+              <a:t>4/15/2019</a:t>
             </a:fld>
             <a:endParaRPr lang="en-US"/>
           </a:p>
@@ -5488,14 +5581,6 @@
               </a:rPr>
               <a:t>&lt;&lt;interface&gt;&gt;</a:t>
             </a:r>
-            <a:r>
-              <a:rPr lang="en-US" sz="1050">
-                <a:solidFill>
-                  <a:srgbClr val="7030A0"/>
-                </a:solidFill>
-              </a:rPr>
-              <a:t/>
-            </a:r>
             <a:br>
               <a:rPr lang="en-US" sz="1050">
                 <a:solidFill>
@@ -5761,7 +5846,7 @@
           <p:cNvPr id="52" name="Rectangle 8">
             <a:extLst>
               <a:ext uri="{FF2B5EF4-FFF2-40B4-BE49-F238E27FC236}">
-                <a16:creationId xmlns:a16="http://schemas.microsoft.com/office/drawing/2014/main" xmlns="" id="{ABDCDBD2-131A-4B66-A2F2-43BBEE82C773}"/>
+                <a16:creationId xmlns:a16="http://schemas.microsoft.com/office/drawing/2014/main" id="{ABDCDBD2-131A-4B66-A2F2-43BBEE82C773}"/>
               </a:ext>
             </a:extLst>
           </p:cNvPr>
@@ -5823,7 +5908,7 @@
           <p:cNvPr id="53" name="Elbow Connector 78">
             <a:extLst>
               <a:ext uri="{FF2B5EF4-FFF2-40B4-BE49-F238E27FC236}">
-                <a16:creationId xmlns:a16="http://schemas.microsoft.com/office/drawing/2014/main" xmlns="" id="{B97967F8-618A-448B-81FD-CDFD4AF0EC64}"/>
+                <a16:creationId xmlns:a16="http://schemas.microsoft.com/office/drawing/2014/main" id="{B97967F8-618A-448B-81FD-CDFD4AF0EC64}"/>
               </a:ext>
             </a:extLst>
           </p:cNvPr>
@@ -5873,7 +5958,7 @@
           <p:cNvPr id="50" name="TextBox 49">
             <a:extLst>
               <a:ext uri="{FF2B5EF4-FFF2-40B4-BE49-F238E27FC236}">
-                <a16:creationId xmlns:a16="http://schemas.microsoft.com/office/drawing/2014/main" xmlns="" id="{B3FA9D57-880F-49C4-AD0B-A64E30D6F403}"/>
+                <a16:creationId xmlns:a16="http://schemas.microsoft.com/office/drawing/2014/main" id="{B3FA9D57-880F-49C4-AD0B-A64E30D6F403}"/>
               </a:ext>
             </a:extLst>
           </p:cNvPr>
@@ -6111,7 +6196,7 @@
           <p:cNvPr id="57" name="Rectangle 8">
             <a:extLst>
               <a:ext uri="{FF2B5EF4-FFF2-40B4-BE49-F238E27FC236}">
-                <a16:creationId xmlns:a16="http://schemas.microsoft.com/office/drawing/2014/main" xmlns="" id="{6A42DA50-9012-4391-9EF3-285E4FA3FCD8}"/>
+                <a16:creationId xmlns:a16="http://schemas.microsoft.com/office/drawing/2014/main" id="{6A42DA50-9012-4391-9EF3-285E4FA3FCD8}"/>
               </a:ext>
             </a:extLst>
           </p:cNvPr>
@@ -6184,7 +6269,7 @@
           <p:cNvPr id="59" name="Isosceles Triangle 102">
             <a:extLst>
               <a:ext uri="{FF2B5EF4-FFF2-40B4-BE49-F238E27FC236}">
-                <a16:creationId xmlns:a16="http://schemas.microsoft.com/office/drawing/2014/main" xmlns="" id="{B263B2D7-6E76-465E-B40E-7E2A46254A84}"/>
+                <a16:creationId xmlns:a16="http://schemas.microsoft.com/office/drawing/2014/main" id="{B263B2D7-6E76-465E-B40E-7E2A46254A84}"/>
               </a:ext>
             </a:extLst>
           </p:cNvPr>
@@ -6242,7 +6327,7 @@
           <p:cNvPr id="67" name="Elbow Connector 63">
             <a:extLst>
               <a:ext uri="{FF2B5EF4-FFF2-40B4-BE49-F238E27FC236}">
-                <a16:creationId xmlns:a16="http://schemas.microsoft.com/office/drawing/2014/main" xmlns="" id="{BA3A25CD-7C1D-4B3B-B294-1B05ABCFECFD}"/>
+                <a16:creationId xmlns:a16="http://schemas.microsoft.com/office/drawing/2014/main" id="{BA3A25CD-7C1D-4B3B-B294-1B05ABCFECFD}"/>
               </a:ext>
             </a:extLst>
           </p:cNvPr>
@@ -7904,14 +7989,6 @@
               </a:rPr>
               <a:t>&lt;&lt;interface&gt;&gt;</a:t>
             </a:r>
-            <a:r>
-              <a:rPr lang="en-US" sz="1050">
-                <a:solidFill>
-                  <a:srgbClr val="7030A0"/>
-                </a:solidFill>
-              </a:rPr>
-              <a:t/>
-            </a:r>
             <a:br>
               <a:rPr lang="en-US" sz="1050">
                 <a:solidFill>
@@ -8177,7 +8254,7 @@
           <p:cNvPr id="52" name="Rectangle 8">
             <a:extLst>
               <a:ext uri="{FF2B5EF4-FFF2-40B4-BE49-F238E27FC236}">
-                <a16:creationId xmlns:a16="http://schemas.microsoft.com/office/drawing/2014/main" xmlns="" id="{ABDCDBD2-131A-4B66-A2F2-43BBEE82C773}"/>
+                <a16:creationId xmlns:a16="http://schemas.microsoft.com/office/drawing/2014/main" id="{ABDCDBD2-131A-4B66-A2F2-43BBEE82C773}"/>
               </a:ext>
             </a:extLst>
           </p:cNvPr>
@@ -8239,7 +8316,7 @@
           <p:cNvPr id="53" name="Elbow Connector 78">
             <a:extLst>
               <a:ext uri="{FF2B5EF4-FFF2-40B4-BE49-F238E27FC236}">
-                <a16:creationId xmlns:a16="http://schemas.microsoft.com/office/drawing/2014/main" xmlns="" id="{B97967F8-618A-448B-81FD-CDFD4AF0EC64}"/>
+                <a16:creationId xmlns:a16="http://schemas.microsoft.com/office/drawing/2014/main" id="{B97967F8-618A-448B-81FD-CDFD4AF0EC64}"/>
               </a:ext>
             </a:extLst>
           </p:cNvPr>
@@ -8289,7 +8366,7 @@
           <p:cNvPr id="50" name="TextBox 49">
             <a:extLst>
               <a:ext uri="{FF2B5EF4-FFF2-40B4-BE49-F238E27FC236}">
-                <a16:creationId xmlns:a16="http://schemas.microsoft.com/office/drawing/2014/main" xmlns="" id="{B3FA9D57-880F-49C4-AD0B-A64E30D6F403}"/>
+                <a16:creationId xmlns:a16="http://schemas.microsoft.com/office/drawing/2014/main" id="{B3FA9D57-880F-49C4-AD0B-A64E30D6F403}"/>
               </a:ext>
             </a:extLst>
           </p:cNvPr>
@@ -8527,7 +8604,7 @@
           <p:cNvPr id="57" name="Rectangle 8">
             <a:extLst>
               <a:ext uri="{FF2B5EF4-FFF2-40B4-BE49-F238E27FC236}">
-                <a16:creationId xmlns:a16="http://schemas.microsoft.com/office/drawing/2014/main" xmlns="" id="{6A42DA50-9012-4391-9EF3-285E4FA3FCD8}"/>
+                <a16:creationId xmlns:a16="http://schemas.microsoft.com/office/drawing/2014/main" id="{6A42DA50-9012-4391-9EF3-285E4FA3FCD8}"/>
               </a:ext>
             </a:extLst>
           </p:cNvPr>
@@ -8600,7 +8677,7 @@
           <p:cNvPr id="59" name="Isosceles Triangle 102">
             <a:extLst>
               <a:ext uri="{FF2B5EF4-FFF2-40B4-BE49-F238E27FC236}">
-                <a16:creationId xmlns:a16="http://schemas.microsoft.com/office/drawing/2014/main" xmlns="" id="{B263B2D7-6E76-465E-B40E-7E2A46254A84}"/>
+                <a16:creationId xmlns:a16="http://schemas.microsoft.com/office/drawing/2014/main" id="{B263B2D7-6E76-465E-B40E-7E2A46254A84}"/>
               </a:ext>
             </a:extLst>
           </p:cNvPr>
@@ -8658,7 +8735,7 @@
           <p:cNvPr id="67" name="Elbow Connector 63">
             <a:extLst>
               <a:ext uri="{FF2B5EF4-FFF2-40B4-BE49-F238E27FC236}">
-                <a16:creationId xmlns:a16="http://schemas.microsoft.com/office/drawing/2014/main" xmlns="" id="{BA3A25CD-7C1D-4B3B-B294-1B05ABCFECFD}"/>
+                <a16:creationId xmlns:a16="http://schemas.microsoft.com/office/drawing/2014/main" id="{BA3A25CD-7C1D-4B3B-B294-1B05ABCFECFD}"/>
               </a:ext>
             </a:extLst>
           </p:cNvPr>
@@ -10284,7 +10361,7 @@
           <p:cNvPr id="117" name="Rectangle 8">
             <a:extLst>
               <a:ext uri="{FF2B5EF4-FFF2-40B4-BE49-F238E27FC236}">
-                <a16:creationId xmlns:a16="http://schemas.microsoft.com/office/drawing/2014/main" xmlns="" id="{ABDCDBD2-131A-4B66-A2F2-43BBEE82C773}"/>
+                <a16:creationId xmlns:a16="http://schemas.microsoft.com/office/drawing/2014/main" id="{ABDCDBD2-131A-4B66-A2F2-43BBEE82C773}"/>
               </a:ext>
             </a:extLst>
           </p:cNvPr>
@@ -10346,7 +10423,7 @@
           <p:cNvPr id="121" name="Elbow Connector 78">
             <a:extLst>
               <a:ext uri="{FF2B5EF4-FFF2-40B4-BE49-F238E27FC236}">
-                <a16:creationId xmlns:a16="http://schemas.microsoft.com/office/drawing/2014/main" xmlns="" id="{B97967F8-618A-448B-81FD-CDFD4AF0EC64}"/>
+                <a16:creationId xmlns:a16="http://schemas.microsoft.com/office/drawing/2014/main" id="{B97967F8-618A-448B-81FD-CDFD4AF0EC64}"/>
               </a:ext>
             </a:extLst>
           </p:cNvPr>
@@ -10436,7 +10513,7 @@
           <p:cNvPr id="125" name="Rectangle 8">
             <a:extLst>
               <a:ext uri="{FF2B5EF4-FFF2-40B4-BE49-F238E27FC236}">
-                <a16:creationId xmlns:a16="http://schemas.microsoft.com/office/drawing/2014/main" xmlns="" id="{6A42DA50-9012-4391-9EF3-285E4FA3FCD8}"/>
+                <a16:creationId xmlns:a16="http://schemas.microsoft.com/office/drawing/2014/main" id="{6A42DA50-9012-4391-9EF3-285E4FA3FCD8}"/>
               </a:ext>
             </a:extLst>
           </p:cNvPr>
@@ -10509,7 +10586,7 @@
           <p:cNvPr id="126" name="Isosceles Triangle 102">
             <a:extLst>
               <a:ext uri="{FF2B5EF4-FFF2-40B4-BE49-F238E27FC236}">
-                <a16:creationId xmlns:a16="http://schemas.microsoft.com/office/drawing/2014/main" xmlns="" id="{B263B2D7-6E76-465E-B40E-7E2A46254A84}"/>
+                <a16:creationId xmlns:a16="http://schemas.microsoft.com/office/drawing/2014/main" id="{B263B2D7-6E76-465E-B40E-7E2A46254A84}"/>
               </a:ext>
             </a:extLst>
           </p:cNvPr>
@@ -10567,7 +10644,7 @@
           <p:cNvPr id="127" name="Elbow Connector 63">
             <a:extLst>
               <a:ext uri="{FF2B5EF4-FFF2-40B4-BE49-F238E27FC236}">
-                <a16:creationId xmlns:a16="http://schemas.microsoft.com/office/drawing/2014/main" xmlns="" id="{BA3A25CD-7C1D-4B3B-B294-1B05ABCFECFD}"/>
+                <a16:creationId xmlns:a16="http://schemas.microsoft.com/office/drawing/2014/main" id="{BA3A25CD-7C1D-4B3B-B294-1B05ABCFECFD}"/>
               </a:ext>
             </a:extLst>
           </p:cNvPr>
@@ -13025,14 +13102,6 @@
               </a:rPr>
               <a:t>&lt;&lt;interface&gt;&gt;</a:t>
             </a:r>
-            <a:r>
-              <a:rPr lang="en-US" sz="1050">
-                <a:solidFill>
-                  <a:srgbClr val="7030A0"/>
-                </a:solidFill>
-              </a:rPr>
-              <a:t/>
-            </a:r>
             <a:br>
               <a:rPr lang="en-US" sz="1050">
                 <a:solidFill>
@@ -13332,7 +13401,7 @@
           <p:cNvPr id="57" name="Rectangle 8">
             <a:extLst>
               <a:ext uri="{FF2B5EF4-FFF2-40B4-BE49-F238E27FC236}">
-                <a16:creationId xmlns:a16="http://schemas.microsoft.com/office/drawing/2014/main" xmlns="" id="{6A42DA50-9012-4391-9EF3-285E4FA3FCD8}"/>
+                <a16:creationId xmlns:a16="http://schemas.microsoft.com/office/drawing/2014/main" id="{6A42DA50-9012-4391-9EF3-285E4FA3FCD8}"/>
               </a:ext>
             </a:extLst>
           </p:cNvPr>
@@ -13405,7 +13474,7 @@
           <p:cNvPr id="59" name="Isosceles Triangle 102">
             <a:extLst>
               <a:ext uri="{FF2B5EF4-FFF2-40B4-BE49-F238E27FC236}">
-                <a16:creationId xmlns:a16="http://schemas.microsoft.com/office/drawing/2014/main" xmlns="" id="{B263B2D7-6E76-465E-B40E-7E2A46254A84}"/>
+                <a16:creationId xmlns:a16="http://schemas.microsoft.com/office/drawing/2014/main" id="{B263B2D7-6E76-465E-B40E-7E2A46254A84}"/>
               </a:ext>
             </a:extLst>
           </p:cNvPr>
@@ -13463,7 +13532,7 @@
           <p:cNvPr id="67" name="Elbow Connector 63">
             <a:extLst>
               <a:ext uri="{FF2B5EF4-FFF2-40B4-BE49-F238E27FC236}">
-                <a16:creationId xmlns:a16="http://schemas.microsoft.com/office/drawing/2014/main" xmlns="" id="{BA3A25CD-7C1D-4B3B-B294-1B05ABCFECFD}"/>
+                <a16:creationId xmlns:a16="http://schemas.microsoft.com/office/drawing/2014/main" id="{BA3A25CD-7C1D-4B3B-B294-1B05ABCFECFD}"/>
               </a:ext>
             </a:extLst>
           </p:cNvPr>
@@ -15093,7 +15162,7 @@
           <p:cNvPr id="121" name="Rectangle 8">
             <a:extLst>
               <a:ext uri="{FF2B5EF4-FFF2-40B4-BE49-F238E27FC236}">
-                <a16:creationId xmlns:a16="http://schemas.microsoft.com/office/drawing/2014/main" xmlns="" id="{ABDCDBD2-131A-4B66-A2F2-43BBEE82C773}"/>
+                <a16:creationId xmlns:a16="http://schemas.microsoft.com/office/drawing/2014/main" id="{ABDCDBD2-131A-4B66-A2F2-43BBEE82C773}"/>
               </a:ext>
             </a:extLst>
           </p:cNvPr>
@@ -15155,7 +15224,7 @@
           <p:cNvPr id="123" name="Elbow Connector 78">
             <a:extLst>
               <a:ext uri="{FF2B5EF4-FFF2-40B4-BE49-F238E27FC236}">
-                <a16:creationId xmlns:a16="http://schemas.microsoft.com/office/drawing/2014/main" xmlns="" id="{B97967F8-618A-448B-81FD-CDFD4AF0EC64}"/>
+                <a16:creationId xmlns:a16="http://schemas.microsoft.com/office/drawing/2014/main" id="{B97967F8-618A-448B-81FD-CDFD4AF0EC64}"/>
               </a:ext>
             </a:extLst>
           </p:cNvPr>
@@ -15608,7 +15677,7 @@
           <p:cNvPr id="134" name="Elbow Connector 78">
             <a:extLst>
               <a:ext uri="{FF2B5EF4-FFF2-40B4-BE49-F238E27FC236}">
-                <a16:creationId xmlns:a16="http://schemas.microsoft.com/office/drawing/2014/main" xmlns="" id="{B97967F8-618A-448B-81FD-CDFD4AF0EC64}"/>
+                <a16:creationId xmlns:a16="http://schemas.microsoft.com/office/drawing/2014/main" id="{B97967F8-618A-448B-81FD-CDFD4AF0EC64}"/>
               </a:ext>
             </a:extLst>
           </p:cNvPr>
@@ -16256,7 +16325,7 @@
           <p:cNvPr id="148" name="Rectangle 8">
             <a:extLst>
               <a:ext uri="{FF2B5EF4-FFF2-40B4-BE49-F238E27FC236}">
-                <a16:creationId xmlns:a16="http://schemas.microsoft.com/office/drawing/2014/main" xmlns="" id="{ABDCDBD2-131A-4B66-A2F2-43BBEE82C773}"/>
+                <a16:creationId xmlns:a16="http://schemas.microsoft.com/office/drawing/2014/main" id="{ABDCDBD2-131A-4B66-A2F2-43BBEE82C773}"/>
               </a:ext>
             </a:extLst>
           </p:cNvPr>
@@ -16318,7 +16387,7 @@
           <p:cNvPr id="149" name="Elbow Connector 78">
             <a:extLst>
               <a:ext uri="{FF2B5EF4-FFF2-40B4-BE49-F238E27FC236}">
-                <a16:creationId xmlns:a16="http://schemas.microsoft.com/office/drawing/2014/main" xmlns="" id="{B97967F8-618A-448B-81FD-CDFD4AF0EC64}"/>
+                <a16:creationId xmlns:a16="http://schemas.microsoft.com/office/drawing/2014/main" id="{B97967F8-618A-448B-81FD-CDFD4AF0EC64}"/>
               </a:ext>
             </a:extLst>
           </p:cNvPr>
@@ -16368,7 +16437,7 @@
           <p:cNvPr id="151" name="Elbow Connector 78">
             <a:extLst>
               <a:ext uri="{FF2B5EF4-FFF2-40B4-BE49-F238E27FC236}">
-                <a16:creationId xmlns:a16="http://schemas.microsoft.com/office/drawing/2014/main" xmlns="" id="{B97967F8-618A-448B-81FD-CDFD4AF0EC64}"/>
+                <a16:creationId xmlns:a16="http://schemas.microsoft.com/office/drawing/2014/main" id="{B97967F8-618A-448B-81FD-CDFD4AF0EC64}"/>
               </a:ext>
             </a:extLst>
           </p:cNvPr>
@@ -17018,7 +17087,7 @@
           <p:cNvPr id="167" name="Rectangle 8">
             <a:extLst>
               <a:ext uri="{FF2B5EF4-FFF2-40B4-BE49-F238E27FC236}">
-                <a16:creationId xmlns:a16="http://schemas.microsoft.com/office/drawing/2014/main" xmlns="" id="{ABDCDBD2-131A-4B66-A2F2-43BBEE82C773}"/>
+                <a16:creationId xmlns:a16="http://schemas.microsoft.com/office/drawing/2014/main" id="{ABDCDBD2-131A-4B66-A2F2-43BBEE82C773}"/>
               </a:ext>
             </a:extLst>
           </p:cNvPr>
@@ -17080,7 +17149,7 @@
           <p:cNvPr id="168" name="Elbow Connector 78">
             <a:extLst>
               <a:ext uri="{FF2B5EF4-FFF2-40B4-BE49-F238E27FC236}">
-                <a16:creationId xmlns:a16="http://schemas.microsoft.com/office/drawing/2014/main" xmlns="" id="{B97967F8-618A-448B-81FD-CDFD4AF0EC64}"/>
+                <a16:creationId xmlns:a16="http://schemas.microsoft.com/office/drawing/2014/main" id="{B97967F8-618A-448B-81FD-CDFD4AF0EC64}"/>
               </a:ext>
             </a:extLst>
           </p:cNvPr>
@@ -17130,7 +17199,7 @@
           <p:cNvPr id="178" name="Elbow Connector 78">
             <a:extLst>
               <a:ext uri="{FF2B5EF4-FFF2-40B4-BE49-F238E27FC236}">
-                <a16:creationId xmlns:a16="http://schemas.microsoft.com/office/drawing/2014/main" xmlns="" id="{B97967F8-618A-448B-81FD-CDFD4AF0EC64}"/>
+                <a16:creationId xmlns:a16="http://schemas.microsoft.com/office/drawing/2014/main" id="{B97967F8-618A-448B-81FD-CDFD4AF0EC64}"/>
               </a:ext>
             </a:extLst>
           </p:cNvPr>
@@ -17177,7 +17246,7 @@
           <p:cNvPr id="186" name="Elbow Connector 78">
             <a:extLst>
               <a:ext uri="{FF2B5EF4-FFF2-40B4-BE49-F238E27FC236}">
-                <a16:creationId xmlns:a16="http://schemas.microsoft.com/office/drawing/2014/main" xmlns="" id="{B97967F8-618A-448B-81FD-CDFD4AF0EC64}"/>
+                <a16:creationId xmlns:a16="http://schemas.microsoft.com/office/drawing/2014/main" id="{B97967F8-618A-448B-81FD-CDFD4AF0EC64}"/>
               </a:ext>
             </a:extLst>
           </p:cNvPr>
@@ -17225,7 +17294,7 @@
           <p:cNvPr id="191" name="Elbow Connector 78">
             <a:extLst>
               <a:ext uri="{FF2B5EF4-FFF2-40B4-BE49-F238E27FC236}">
-                <a16:creationId xmlns:a16="http://schemas.microsoft.com/office/drawing/2014/main" xmlns="" id="{B97967F8-618A-448B-81FD-CDFD4AF0EC64}"/>
+                <a16:creationId xmlns:a16="http://schemas.microsoft.com/office/drawing/2014/main" id="{B97967F8-618A-448B-81FD-CDFD4AF0EC64}"/>
               </a:ext>
             </a:extLst>
           </p:cNvPr>
@@ -17273,7 +17342,7 @@
           <p:cNvPr id="194" name="Elbow Connector 78">
             <a:extLst>
               <a:ext uri="{FF2B5EF4-FFF2-40B4-BE49-F238E27FC236}">
-                <a16:creationId xmlns:a16="http://schemas.microsoft.com/office/drawing/2014/main" xmlns="" id="{B97967F8-618A-448B-81FD-CDFD4AF0EC64}"/>
+                <a16:creationId xmlns:a16="http://schemas.microsoft.com/office/drawing/2014/main" id="{B97967F8-618A-448B-81FD-CDFD4AF0EC64}"/>
               </a:ext>
             </a:extLst>
           </p:cNvPr>
@@ -18201,14 +18270,6 @@
               </a:rPr>
               <a:t>&lt;&lt;interface&gt;&gt;</a:t>
             </a:r>
-            <a:r>
-              <a:rPr lang="en-US" sz="1050">
-                <a:solidFill>
-                  <a:srgbClr val="7030A0"/>
-                </a:solidFill>
-              </a:rPr>
-              <a:t/>
-            </a:r>
             <a:br>
               <a:rPr lang="en-US" sz="1050">
                 <a:solidFill>
@@ -18508,7 +18569,7 @@
           <p:cNvPr id="57" name="Rectangle 8">
             <a:extLst>
               <a:ext uri="{FF2B5EF4-FFF2-40B4-BE49-F238E27FC236}">
-                <a16:creationId xmlns:a16="http://schemas.microsoft.com/office/drawing/2014/main" xmlns="" id="{6A42DA50-9012-4391-9EF3-285E4FA3FCD8}"/>
+                <a16:creationId xmlns:a16="http://schemas.microsoft.com/office/drawing/2014/main" id="{6A42DA50-9012-4391-9EF3-285E4FA3FCD8}"/>
               </a:ext>
             </a:extLst>
           </p:cNvPr>
@@ -18581,7 +18642,7 @@
           <p:cNvPr id="59" name="Isosceles Triangle 102">
             <a:extLst>
               <a:ext uri="{FF2B5EF4-FFF2-40B4-BE49-F238E27FC236}">
-                <a16:creationId xmlns:a16="http://schemas.microsoft.com/office/drawing/2014/main" xmlns="" id="{B263B2D7-6E76-465E-B40E-7E2A46254A84}"/>
+                <a16:creationId xmlns:a16="http://schemas.microsoft.com/office/drawing/2014/main" id="{B263B2D7-6E76-465E-B40E-7E2A46254A84}"/>
               </a:ext>
             </a:extLst>
           </p:cNvPr>
@@ -18639,7 +18700,7 @@
           <p:cNvPr id="67" name="Elbow Connector 63">
             <a:extLst>
               <a:ext uri="{FF2B5EF4-FFF2-40B4-BE49-F238E27FC236}">
-                <a16:creationId xmlns:a16="http://schemas.microsoft.com/office/drawing/2014/main" xmlns="" id="{BA3A25CD-7C1D-4B3B-B294-1B05ABCFECFD}"/>
+                <a16:creationId xmlns:a16="http://schemas.microsoft.com/office/drawing/2014/main" id="{BA3A25CD-7C1D-4B3B-B294-1B05ABCFECFD}"/>
               </a:ext>
             </a:extLst>
           </p:cNvPr>
@@ -20269,7 +20330,7 @@
           <p:cNvPr id="121" name="Rectangle 8">
             <a:extLst>
               <a:ext uri="{FF2B5EF4-FFF2-40B4-BE49-F238E27FC236}">
-                <a16:creationId xmlns:a16="http://schemas.microsoft.com/office/drawing/2014/main" xmlns="" id="{ABDCDBD2-131A-4B66-A2F2-43BBEE82C773}"/>
+                <a16:creationId xmlns:a16="http://schemas.microsoft.com/office/drawing/2014/main" id="{ABDCDBD2-131A-4B66-A2F2-43BBEE82C773}"/>
               </a:ext>
             </a:extLst>
           </p:cNvPr>
@@ -20331,7 +20392,7 @@
           <p:cNvPr id="123" name="Elbow Connector 78">
             <a:extLst>
               <a:ext uri="{FF2B5EF4-FFF2-40B4-BE49-F238E27FC236}">
-                <a16:creationId xmlns:a16="http://schemas.microsoft.com/office/drawing/2014/main" xmlns="" id="{B97967F8-618A-448B-81FD-CDFD4AF0EC64}"/>
+                <a16:creationId xmlns:a16="http://schemas.microsoft.com/office/drawing/2014/main" id="{B97967F8-618A-448B-81FD-CDFD4AF0EC64}"/>
               </a:ext>
             </a:extLst>
           </p:cNvPr>
@@ -20784,7 +20845,7 @@
           <p:cNvPr id="134" name="Elbow Connector 78">
             <a:extLst>
               <a:ext uri="{FF2B5EF4-FFF2-40B4-BE49-F238E27FC236}">
-                <a16:creationId xmlns:a16="http://schemas.microsoft.com/office/drawing/2014/main" xmlns="" id="{B97967F8-618A-448B-81FD-CDFD4AF0EC64}"/>
+                <a16:creationId xmlns:a16="http://schemas.microsoft.com/office/drawing/2014/main" id="{B97967F8-618A-448B-81FD-CDFD4AF0EC64}"/>
               </a:ext>
             </a:extLst>
           </p:cNvPr>
@@ -21432,7 +21493,7 @@
           <p:cNvPr id="148" name="Rectangle 8">
             <a:extLst>
               <a:ext uri="{FF2B5EF4-FFF2-40B4-BE49-F238E27FC236}">
-                <a16:creationId xmlns:a16="http://schemas.microsoft.com/office/drawing/2014/main" xmlns="" id="{ABDCDBD2-131A-4B66-A2F2-43BBEE82C773}"/>
+                <a16:creationId xmlns:a16="http://schemas.microsoft.com/office/drawing/2014/main" id="{ABDCDBD2-131A-4B66-A2F2-43BBEE82C773}"/>
               </a:ext>
             </a:extLst>
           </p:cNvPr>
@@ -21494,7 +21555,7 @@
           <p:cNvPr id="149" name="Elbow Connector 78">
             <a:extLst>
               <a:ext uri="{FF2B5EF4-FFF2-40B4-BE49-F238E27FC236}">
-                <a16:creationId xmlns:a16="http://schemas.microsoft.com/office/drawing/2014/main" xmlns="" id="{B97967F8-618A-448B-81FD-CDFD4AF0EC64}"/>
+                <a16:creationId xmlns:a16="http://schemas.microsoft.com/office/drawing/2014/main" id="{B97967F8-618A-448B-81FD-CDFD4AF0EC64}"/>
               </a:ext>
             </a:extLst>
           </p:cNvPr>
@@ -21544,7 +21605,7 @@
           <p:cNvPr id="151" name="Elbow Connector 78">
             <a:extLst>
               <a:ext uri="{FF2B5EF4-FFF2-40B4-BE49-F238E27FC236}">
-                <a16:creationId xmlns:a16="http://schemas.microsoft.com/office/drawing/2014/main" xmlns="" id="{B97967F8-618A-448B-81FD-CDFD4AF0EC64}"/>
+                <a16:creationId xmlns:a16="http://schemas.microsoft.com/office/drawing/2014/main" id="{B97967F8-618A-448B-81FD-CDFD4AF0EC64}"/>
               </a:ext>
             </a:extLst>
           </p:cNvPr>
@@ -22194,7 +22255,7 @@
           <p:cNvPr id="167" name="Rectangle 8">
             <a:extLst>
               <a:ext uri="{FF2B5EF4-FFF2-40B4-BE49-F238E27FC236}">
-                <a16:creationId xmlns:a16="http://schemas.microsoft.com/office/drawing/2014/main" xmlns="" id="{ABDCDBD2-131A-4B66-A2F2-43BBEE82C773}"/>
+                <a16:creationId xmlns:a16="http://schemas.microsoft.com/office/drawing/2014/main" id="{ABDCDBD2-131A-4B66-A2F2-43BBEE82C773}"/>
               </a:ext>
             </a:extLst>
           </p:cNvPr>
@@ -22256,7 +22317,7 @@
           <p:cNvPr id="168" name="Elbow Connector 78">
             <a:extLst>
               <a:ext uri="{FF2B5EF4-FFF2-40B4-BE49-F238E27FC236}">
-                <a16:creationId xmlns:a16="http://schemas.microsoft.com/office/drawing/2014/main" xmlns="" id="{B97967F8-618A-448B-81FD-CDFD4AF0EC64}"/>
+                <a16:creationId xmlns:a16="http://schemas.microsoft.com/office/drawing/2014/main" id="{B97967F8-618A-448B-81FD-CDFD4AF0EC64}"/>
               </a:ext>
             </a:extLst>
           </p:cNvPr>
@@ -23486,7 +23547,7 @@
           <p:cNvPr id="57" name="Rectangle 8">
             <a:extLst>
               <a:ext uri="{FF2B5EF4-FFF2-40B4-BE49-F238E27FC236}">
-                <a16:creationId xmlns:a16="http://schemas.microsoft.com/office/drawing/2014/main" xmlns="" id="{6A42DA50-9012-4391-9EF3-285E4FA3FCD8}"/>
+                <a16:creationId xmlns:a16="http://schemas.microsoft.com/office/drawing/2014/main" id="{6A42DA50-9012-4391-9EF3-285E4FA3FCD8}"/>
               </a:ext>
             </a:extLst>
           </p:cNvPr>
@@ -23559,7 +23620,7 @@
           <p:cNvPr id="59" name="Isosceles Triangle 102">
             <a:extLst>
               <a:ext uri="{FF2B5EF4-FFF2-40B4-BE49-F238E27FC236}">
-                <a16:creationId xmlns:a16="http://schemas.microsoft.com/office/drawing/2014/main" xmlns="" id="{B263B2D7-6E76-465E-B40E-7E2A46254A84}"/>
+                <a16:creationId xmlns:a16="http://schemas.microsoft.com/office/drawing/2014/main" id="{B263B2D7-6E76-465E-B40E-7E2A46254A84}"/>
               </a:ext>
             </a:extLst>
           </p:cNvPr>
@@ -23617,7 +23678,7 @@
           <p:cNvPr id="67" name="Elbow Connector 63">
             <a:extLst>
               <a:ext uri="{FF2B5EF4-FFF2-40B4-BE49-F238E27FC236}">
-                <a16:creationId xmlns:a16="http://schemas.microsoft.com/office/drawing/2014/main" xmlns="" id="{BA3A25CD-7C1D-4B3B-B294-1B05ABCFECFD}"/>
+                <a16:creationId xmlns:a16="http://schemas.microsoft.com/office/drawing/2014/main" id="{BA3A25CD-7C1D-4B3B-B294-1B05ABCFECFD}"/>
               </a:ext>
             </a:extLst>
           </p:cNvPr>
@@ -25252,7 +25313,7 @@
           <p:cNvPr id="121" name="Rectangle 8">
             <a:extLst>
               <a:ext uri="{FF2B5EF4-FFF2-40B4-BE49-F238E27FC236}">
-                <a16:creationId xmlns:a16="http://schemas.microsoft.com/office/drawing/2014/main" xmlns="" id="{ABDCDBD2-131A-4B66-A2F2-43BBEE82C773}"/>
+                <a16:creationId xmlns:a16="http://schemas.microsoft.com/office/drawing/2014/main" id="{ABDCDBD2-131A-4B66-A2F2-43BBEE82C773}"/>
               </a:ext>
             </a:extLst>
           </p:cNvPr>
@@ -25314,7 +25375,7 @@
           <p:cNvPr id="123" name="Elbow Connector 78">
             <a:extLst>
               <a:ext uri="{FF2B5EF4-FFF2-40B4-BE49-F238E27FC236}">
-                <a16:creationId xmlns:a16="http://schemas.microsoft.com/office/drawing/2014/main" xmlns="" id="{B97967F8-618A-448B-81FD-CDFD4AF0EC64}"/>
+                <a16:creationId xmlns:a16="http://schemas.microsoft.com/office/drawing/2014/main" id="{B97967F8-618A-448B-81FD-CDFD4AF0EC64}"/>
               </a:ext>
             </a:extLst>
           </p:cNvPr>
@@ -25767,7 +25828,7 @@
           <p:cNvPr id="134" name="Elbow Connector 78">
             <a:extLst>
               <a:ext uri="{FF2B5EF4-FFF2-40B4-BE49-F238E27FC236}">
-                <a16:creationId xmlns:a16="http://schemas.microsoft.com/office/drawing/2014/main" xmlns="" id="{B97967F8-618A-448B-81FD-CDFD4AF0EC64}"/>
+                <a16:creationId xmlns:a16="http://schemas.microsoft.com/office/drawing/2014/main" id="{B97967F8-618A-448B-81FD-CDFD4AF0EC64}"/>
               </a:ext>
             </a:extLst>
           </p:cNvPr>
@@ -26415,7 +26476,7 @@
           <p:cNvPr id="148" name="Rectangle 8">
             <a:extLst>
               <a:ext uri="{FF2B5EF4-FFF2-40B4-BE49-F238E27FC236}">
-                <a16:creationId xmlns:a16="http://schemas.microsoft.com/office/drawing/2014/main" xmlns="" id="{ABDCDBD2-131A-4B66-A2F2-43BBEE82C773}"/>
+                <a16:creationId xmlns:a16="http://schemas.microsoft.com/office/drawing/2014/main" id="{ABDCDBD2-131A-4B66-A2F2-43BBEE82C773}"/>
               </a:ext>
             </a:extLst>
           </p:cNvPr>
@@ -26477,7 +26538,7 @@
           <p:cNvPr id="149" name="Elbow Connector 78">
             <a:extLst>
               <a:ext uri="{FF2B5EF4-FFF2-40B4-BE49-F238E27FC236}">
-                <a16:creationId xmlns:a16="http://schemas.microsoft.com/office/drawing/2014/main" xmlns="" id="{B97967F8-618A-448B-81FD-CDFD4AF0EC64}"/>
+                <a16:creationId xmlns:a16="http://schemas.microsoft.com/office/drawing/2014/main" id="{B97967F8-618A-448B-81FD-CDFD4AF0EC64}"/>
               </a:ext>
             </a:extLst>
           </p:cNvPr>
@@ -26527,7 +26588,7 @@
           <p:cNvPr id="151" name="Elbow Connector 78">
             <a:extLst>
               <a:ext uri="{FF2B5EF4-FFF2-40B4-BE49-F238E27FC236}">
-                <a16:creationId xmlns:a16="http://schemas.microsoft.com/office/drawing/2014/main" xmlns="" id="{B97967F8-618A-448B-81FD-CDFD4AF0EC64}"/>
+                <a16:creationId xmlns:a16="http://schemas.microsoft.com/office/drawing/2014/main" id="{B97967F8-618A-448B-81FD-CDFD4AF0EC64}"/>
               </a:ext>
             </a:extLst>
           </p:cNvPr>
@@ -27177,7 +27238,7 @@
           <p:cNvPr id="167" name="Rectangle 8">
             <a:extLst>
               <a:ext uri="{FF2B5EF4-FFF2-40B4-BE49-F238E27FC236}">
-                <a16:creationId xmlns:a16="http://schemas.microsoft.com/office/drawing/2014/main" xmlns="" id="{ABDCDBD2-131A-4B66-A2F2-43BBEE82C773}"/>
+                <a16:creationId xmlns:a16="http://schemas.microsoft.com/office/drawing/2014/main" id="{ABDCDBD2-131A-4B66-A2F2-43BBEE82C773}"/>
               </a:ext>
             </a:extLst>
           </p:cNvPr>
@@ -27239,7 +27300,7 @@
           <p:cNvPr id="168" name="Elbow Connector 78">
             <a:extLst>
               <a:ext uri="{FF2B5EF4-FFF2-40B4-BE49-F238E27FC236}">
-                <a16:creationId xmlns:a16="http://schemas.microsoft.com/office/drawing/2014/main" xmlns="" id="{B97967F8-618A-448B-81FD-CDFD4AF0EC64}"/>
+                <a16:creationId xmlns:a16="http://schemas.microsoft.com/office/drawing/2014/main" id="{B97967F8-618A-448B-81FD-CDFD4AF0EC64}"/>
               </a:ext>
             </a:extLst>
           </p:cNvPr>
@@ -27326,7 +27387,7 @@
           <p:cNvPr id="114" name="Elbow Connector 78">
             <a:extLst>
               <a:ext uri="{FF2B5EF4-FFF2-40B4-BE49-F238E27FC236}">
-                <a16:creationId xmlns:a16="http://schemas.microsoft.com/office/drawing/2014/main" xmlns="" id="{B97967F8-618A-448B-81FD-CDFD4AF0EC64}"/>
+                <a16:creationId xmlns:a16="http://schemas.microsoft.com/office/drawing/2014/main" id="{B97967F8-618A-448B-81FD-CDFD4AF0EC64}"/>
               </a:ext>
             </a:extLst>
           </p:cNvPr>
@@ -27372,7 +27433,7 @@
           <p:cNvPr id="150" name="Elbow Connector 78">
             <a:extLst>
               <a:ext uri="{FF2B5EF4-FFF2-40B4-BE49-F238E27FC236}">
-                <a16:creationId xmlns:a16="http://schemas.microsoft.com/office/drawing/2014/main" xmlns="" id="{B97967F8-618A-448B-81FD-CDFD4AF0EC64}"/>
+                <a16:creationId xmlns:a16="http://schemas.microsoft.com/office/drawing/2014/main" id="{B97967F8-618A-448B-81FD-CDFD4AF0EC64}"/>
               </a:ext>
             </a:extLst>
           </p:cNvPr>
@@ -27420,7 +27481,7 @@
           <p:cNvPr id="152" name="Elbow Connector 78">
             <a:extLst>
               <a:ext uri="{FF2B5EF4-FFF2-40B4-BE49-F238E27FC236}">
-                <a16:creationId xmlns:a16="http://schemas.microsoft.com/office/drawing/2014/main" xmlns="" id="{B97967F8-618A-448B-81FD-CDFD4AF0EC64}"/>
+                <a16:creationId xmlns:a16="http://schemas.microsoft.com/office/drawing/2014/main" id="{B97967F8-618A-448B-81FD-CDFD4AF0EC64}"/>
               </a:ext>
             </a:extLst>
           </p:cNvPr>
@@ -27468,7 +27529,7 @@
           <p:cNvPr id="153" name="Elbow Connector 78">
             <a:extLst>
               <a:ext uri="{FF2B5EF4-FFF2-40B4-BE49-F238E27FC236}">
-                <a16:creationId xmlns:a16="http://schemas.microsoft.com/office/drawing/2014/main" xmlns="" id="{B97967F8-618A-448B-81FD-CDFD4AF0EC64}"/>
+                <a16:creationId xmlns:a16="http://schemas.microsoft.com/office/drawing/2014/main" id="{B97967F8-618A-448B-81FD-CDFD4AF0EC64}"/>
               </a:ext>
             </a:extLst>
           </p:cNvPr>
@@ -27516,7 +27577,7 @@
           <p:cNvPr id="169" name="Rectangle 8">
             <a:extLst>
               <a:ext uri="{FF2B5EF4-FFF2-40B4-BE49-F238E27FC236}">
-                <a16:creationId xmlns:a16="http://schemas.microsoft.com/office/drawing/2014/main" xmlns="" id="{ABDCDBD2-131A-4B66-A2F2-43BBEE82C773}"/>
+                <a16:creationId xmlns:a16="http://schemas.microsoft.com/office/drawing/2014/main" id="{ABDCDBD2-131A-4B66-A2F2-43BBEE82C773}"/>
               </a:ext>
             </a:extLst>
           </p:cNvPr>
@@ -27816,7 +27877,7 @@
           <p:cNvPr id="174" name="Rectangle 8">
             <a:extLst>
               <a:ext uri="{FF2B5EF4-FFF2-40B4-BE49-F238E27FC236}">
-                <a16:creationId xmlns:a16="http://schemas.microsoft.com/office/drawing/2014/main" xmlns="" id="{ABDCDBD2-131A-4B66-A2F2-43BBEE82C773}"/>
+                <a16:creationId xmlns:a16="http://schemas.microsoft.com/office/drawing/2014/main" id="{ABDCDBD2-131A-4B66-A2F2-43BBEE82C773}"/>
               </a:ext>
             </a:extLst>
           </p:cNvPr>
@@ -27925,7 +27986,7 @@
           <p:cNvPr id="178" name="Elbow Connector 78">
             <a:extLst>
               <a:ext uri="{FF2B5EF4-FFF2-40B4-BE49-F238E27FC236}">
-                <a16:creationId xmlns:a16="http://schemas.microsoft.com/office/drawing/2014/main" xmlns="" id="{B97967F8-618A-448B-81FD-CDFD4AF0EC64}"/>
+                <a16:creationId xmlns:a16="http://schemas.microsoft.com/office/drawing/2014/main" id="{B97967F8-618A-448B-81FD-CDFD4AF0EC64}"/>
               </a:ext>
             </a:extLst>
           </p:cNvPr>
@@ -27973,7 +28034,7 @@
           <p:cNvPr id="179" name="Elbow Connector 78">
             <a:extLst>
               <a:ext uri="{FF2B5EF4-FFF2-40B4-BE49-F238E27FC236}">
-                <a16:creationId xmlns:a16="http://schemas.microsoft.com/office/drawing/2014/main" xmlns="" id="{B97967F8-618A-448B-81FD-CDFD4AF0EC64}"/>
+                <a16:creationId xmlns:a16="http://schemas.microsoft.com/office/drawing/2014/main" id="{B97967F8-618A-448B-81FD-CDFD4AF0EC64}"/>
               </a:ext>
             </a:extLst>
           </p:cNvPr>
@@ -28021,7 +28082,7 @@
           <p:cNvPr id="180" name="Elbow Connector 78">
             <a:extLst>
               <a:ext uri="{FF2B5EF4-FFF2-40B4-BE49-F238E27FC236}">
-                <a16:creationId xmlns:a16="http://schemas.microsoft.com/office/drawing/2014/main" xmlns="" id="{B97967F8-618A-448B-81FD-CDFD4AF0EC64}"/>
+                <a16:creationId xmlns:a16="http://schemas.microsoft.com/office/drawing/2014/main" id="{B97967F8-618A-448B-81FD-CDFD4AF0EC64}"/>
               </a:ext>
             </a:extLst>
           </p:cNvPr>
@@ -28420,7 +28481,7 @@
           <p:cNvPr id="254" name="Elbow Connector 78">
             <a:extLst>
               <a:ext uri="{FF2B5EF4-FFF2-40B4-BE49-F238E27FC236}">
-                <a16:creationId xmlns:a16="http://schemas.microsoft.com/office/drawing/2014/main" xmlns="" id="{B97967F8-618A-448B-81FD-CDFD4AF0EC64}"/>
+                <a16:creationId xmlns:a16="http://schemas.microsoft.com/office/drawing/2014/main" id="{B97967F8-618A-448B-81FD-CDFD4AF0EC64}"/>
               </a:ext>
             </a:extLst>
           </p:cNvPr>
@@ -28468,7 +28529,7 @@
           <p:cNvPr id="257" name="Elbow Connector 78">
             <a:extLst>
               <a:ext uri="{FF2B5EF4-FFF2-40B4-BE49-F238E27FC236}">
-                <a16:creationId xmlns:a16="http://schemas.microsoft.com/office/drawing/2014/main" xmlns="" id="{B97967F8-618A-448B-81FD-CDFD4AF0EC64}"/>
+                <a16:creationId xmlns:a16="http://schemas.microsoft.com/office/drawing/2014/main" id="{B97967F8-618A-448B-81FD-CDFD4AF0EC64}"/>
               </a:ext>
             </a:extLst>
           </p:cNvPr>
@@ -28516,7 +28577,7 @@
           <p:cNvPr id="261" name="Elbow Connector 78">
             <a:extLst>
               <a:ext uri="{FF2B5EF4-FFF2-40B4-BE49-F238E27FC236}">
-                <a16:creationId xmlns:a16="http://schemas.microsoft.com/office/drawing/2014/main" xmlns="" id="{B97967F8-618A-448B-81FD-CDFD4AF0EC64}"/>
+                <a16:creationId xmlns:a16="http://schemas.microsoft.com/office/drawing/2014/main" id="{B97967F8-618A-448B-81FD-CDFD4AF0EC64}"/>
               </a:ext>
             </a:extLst>
           </p:cNvPr>
@@ -29266,7 +29327,7 @@
           <p:cNvPr id="304" name="Elbow Connector 78">
             <a:extLst>
               <a:ext uri="{FF2B5EF4-FFF2-40B4-BE49-F238E27FC236}">
-                <a16:creationId xmlns:a16="http://schemas.microsoft.com/office/drawing/2014/main" xmlns="" id="{B97967F8-618A-448B-81FD-CDFD4AF0EC64}"/>
+                <a16:creationId xmlns:a16="http://schemas.microsoft.com/office/drawing/2014/main" id="{B97967F8-618A-448B-81FD-CDFD4AF0EC64}"/>
               </a:ext>
             </a:extLst>
           </p:cNvPr>
@@ -29470,7 +29531,7 @@
           <p:cNvPr id="175" name="Elbow Connector 78">
             <a:extLst>
               <a:ext uri="{FF2B5EF4-FFF2-40B4-BE49-F238E27FC236}">
-                <a16:creationId xmlns:a16="http://schemas.microsoft.com/office/drawing/2014/main" xmlns="" id="{B97967F8-618A-448B-81FD-CDFD4AF0EC64}"/>
+                <a16:creationId xmlns:a16="http://schemas.microsoft.com/office/drawing/2014/main" id="{B97967F8-618A-448B-81FD-CDFD4AF0EC64}"/>
               </a:ext>
             </a:extLst>
           </p:cNvPr>
@@ -29787,7 +29848,7 @@
           <a:p>
             <a:pPr algn="ctr"/>
             <a:r>
-              <a:rPr lang="en-US" sz="1050" dirty="0" smtClean="0">
+              <a:rPr lang="en-US" sz="1050" dirty="0">
                 <a:solidFill>
                   <a:srgbClr val="7030A0"/>
                 </a:solidFill>
@@ -30141,7 +30202,7 @@
           <a:p>
             <a:pPr algn="ctr"/>
             <a:r>
-              <a:rPr lang="en-US" sz="1050" dirty="0" smtClean="0">
+              <a:rPr lang="en-US" sz="1050" dirty="0">
                 <a:solidFill>
                   <a:srgbClr val="7030A0"/>
                 </a:solidFill>
@@ -30437,7 +30498,7 @@
               </a:rPr>
             </a:br>
             <a:r>
-              <a:rPr lang="en-US" sz="1050" dirty="0" smtClean="0">
+              <a:rPr lang="en-US" sz="1050" dirty="0">
                 <a:solidFill>
                   <a:srgbClr val="7030A0"/>
                 </a:solidFill>
@@ -30493,7 +30554,7 @@
           <a:p>
             <a:pPr algn="ctr"/>
             <a:r>
-              <a:rPr lang="en-US" sz="1050" dirty="0" smtClean="0">
+              <a:rPr lang="en-US" sz="1050" dirty="0">
                 <a:solidFill>
                   <a:srgbClr val="7030A0"/>
                 </a:solidFill>
@@ -30633,7 +30694,7 @@
           <a:p>
             <a:pPr algn="ctr"/>
             <a:r>
-              <a:rPr lang="en-US" sz="1050" smtClean="0">
+              <a:rPr lang="en-US" sz="1050">
                 <a:solidFill>
                   <a:srgbClr val="7030A0"/>
                 </a:solidFill>
@@ -30742,7 +30803,7 @@
           <p:cNvPr id="148" name="Rectangle 8">
             <a:extLst>
               <a:ext uri="{FF2B5EF4-FFF2-40B4-BE49-F238E27FC236}">
-                <a16:creationId xmlns:a16="http://schemas.microsoft.com/office/drawing/2014/main" xmlns="" id="{ABDCDBD2-131A-4B66-A2F2-43BBEE82C773}"/>
+                <a16:creationId xmlns:a16="http://schemas.microsoft.com/office/drawing/2014/main" id="{ABDCDBD2-131A-4B66-A2F2-43BBEE82C773}"/>
               </a:ext>
             </a:extLst>
           </p:cNvPr>
@@ -30784,7 +30845,7 @@
           <a:p>
             <a:pPr algn="ctr"/>
             <a:r>
-              <a:rPr lang="en-US" sz="1050" smtClean="0">
+              <a:rPr lang="en-US" sz="1050">
                 <a:solidFill>
                   <a:srgbClr val="7030A0"/>
                 </a:solidFill>
@@ -30804,7 +30865,7 @@
           <p:cNvPr id="149" name="Elbow Connector 78">
             <a:extLst>
               <a:ext uri="{FF2B5EF4-FFF2-40B4-BE49-F238E27FC236}">
-                <a16:creationId xmlns:a16="http://schemas.microsoft.com/office/drawing/2014/main" xmlns="" id="{B97967F8-618A-448B-81FD-CDFD4AF0EC64}"/>
+                <a16:creationId xmlns:a16="http://schemas.microsoft.com/office/drawing/2014/main" id="{B97967F8-618A-448B-81FD-CDFD4AF0EC64}"/>
               </a:ext>
             </a:extLst>
           </p:cNvPr>
@@ -30932,7 +30993,7 @@
           <p:cNvPr id="42" name="Straight Arrow Connector 41">
             <a:extLst>
               <a:ext uri="{FF2B5EF4-FFF2-40B4-BE49-F238E27FC236}">
-                <a16:creationId xmlns:a16="http://schemas.microsoft.com/office/drawing/2014/main" xmlns="" id="{2B86B789-F6B9-4669-A430-1729E39120B1}"/>
+                <a16:creationId xmlns:a16="http://schemas.microsoft.com/office/drawing/2014/main" id="{2B86B789-F6B9-4669-A430-1729E39120B1}"/>
               </a:ext>
             </a:extLst>
           </p:cNvPr>
@@ -31004,6 +31065,1602 @@
           <a:chExt cx="0" cy="0"/>
         </a:xfrm>
       </p:grpSpPr>
+      <p:grpSp>
+        <p:nvGrpSpPr>
+          <p:cNvPr id="8" name="Group 7">
+            <a:extLst>
+              <a:ext uri="{FF2B5EF4-FFF2-40B4-BE49-F238E27FC236}">
+                <a16:creationId xmlns:a16="http://schemas.microsoft.com/office/drawing/2014/main" id="{3472B105-7DCF-4063-9025-BE35A4CEB0BF}"/>
+              </a:ext>
+            </a:extLst>
+          </p:cNvPr>
+          <p:cNvGrpSpPr/>
+          <p:nvPr/>
+        </p:nvGrpSpPr>
+        <p:grpSpPr>
+          <a:xfrm>
+            <a:off x="152400" y="740699"/>
+            <a:ext cx="8686800" cy="2819400"/>
+            <a:chOff x="152400" y="740699"/>
+            <a:chExt cx="8686800" cy="2819400"/>
+          </a:xfrm>
+        </p:grpSpPr>
+        <p:sp>
+          <p:nvSpPr>
+            <p:cNvPr id="118" name="Rectangle 65"/>
+            <p:cNvSpPr/>
+            <p:nvPr/>
+          </p:nvSpPr>
+          <p:spPr>
+            <a:xfrm>
+              <a:off x="152400" y="740699"/>
+              <a:ext cx="8686800" cy="2819400"/>
+            </a:xfrm>
+            <a:prstGeom prst="roundRect">
+              <a:avLst>
+                <a:gd name="adj" fmla="val 3484"/>
+              </a:avLst>
+            </a:prstGeom>
+            <a:solidFill>
+              <a:schemeClr val="accent4">
+                <a:lumMod val="20000"/>
+                <a:lumOff val="80000"/>
+              </a:schemeClr>
+            </a:solidFill>
+            <a:ln w="19050">
+              <a:noFill/>
+            </a:ln>
+            <a:effectLst/>
+          </p:spPr>
+          <p:style>
+            <a:lnRef idx="1">
+              <a:schemeClr val="accent2"/>
+            </a:lnRef>
+            <a:fillRef idx="2">
+              <a:schemeClr val="accent2"/>
+            </a:fillRef>
+            <a:effectRef idx="1">
+              <a:schemeClr val="accent2"/>
+            </a:effectRef>
+            <a:fontRef idx="minor">
+              <a:schemeClr val="dk1"/>
+            </a:fontRef>
+          </p:style>
+          <p:txBody>
+            <a:bodyPr rtlCol="0" anchor="t"/>
+            <a:lstStyle/>
+            <a:p>
+              <a:r>
+                <a:rPr lang="en-US" sz="1200" b="1" dirty="0">
+                  <a:solidFill>
+                    <a:srgbClr val="7030A0"/>
+                  </a:solidFill>
+                </a:rPr>
+                <a:t>Model</a:t>
+              </a:r>
+              <a:endParaRPr lang="en-SG" sz="1200" b="1" dirty="0">
+                <a:solidFill>
+                  <a:srgbClr val="7030A0"/>
+                </a:solidFill>
+              </a:endParaRPr>
+            </a:p>
+          </p:txBody>
+        </p:sp>
+        <p:cxnSp>
+          <p:nvCxnSpPr>
+            <p:cNvPr id="75" name="Elbow Connector 122"/>
+            <p:cNvCxnSpPr>
+              <a:cxnSpLocks/>
+            </p:cNvCxnSpPr>
+            <p:nvPr/>
+          </p:nvCxnSpPr>
+          <p:spPr>
+            <a:xfrm>
+              <a:off x="452525" y="2248636"/>
+              <a:ext cx="624865" cy="1"/>
+            </a:xfrm>
+            <a:prstGeom prst="bentConnector3">
+              <a:avLst>
+                <a:gd name="adj1" fmla="val 50000"/>
+              </a:avLst>
+            </a:prstGeom>
+            <a:ln w="19050">
+              <a:solidFill>
+                <a:schemeClr val="bg1">
+                  <a:lumMod val="75000"/>
+                </a:schemeClr>
+              </a:solidFill>
+              <a:prstDash val="sysDot"/>
+              <a:headEnd type="none" w="med" len="med"/>
+              <a:tailEnd type="arrow" w="med" len="med"/>
+            </a:ln>
+            <a:effectLst/>
+          </p:spPr>
+          <p:style>
+            <a:lnRef idx="1">
+              <a:schemeClr val="accent2"/>
+            </a:lnRef>
+            <a:fillRef idx="2">
+              <a:schemeClr val="accent2"/>
+            </a:fillRef>
+            <a:effectRef idx="1">
+              <a:schemeClr val="accent2"/>
+            </a:effectRef>
+            <a:fontRef idx="minor">
+              <a:schemeClr val="dk1"/>
+            </a:fontRef>
+          </p:style>
+        </p:cxnSp>
+        <p:sp>
+          <p:nvSpPr>
+            <p:cNvPr id="46" name="Rectangle 8"/>
+            <p:cNvSpPr/>
+            <p:nvPr/>
+          </p:nvSpPr>
+          <p:spPr>
+            <a:xfrm>
+              <a:off x="1085509" y="2081208"/>
+              <a:ext cx="1170020" cy="334856"/>
+            </a:xfrm>
+            <a:prstGeom prst="rect">
+              <a:avLst/>
+            </a:prstGeom>
+            <a:ln w="19050">
+              <a:solidFill>
+                <a:srgbClr val="7030A0"/>
+              </a:solidFill>
+            </a:ln>
+            <a:effectLst/>
+          </p:spPr>
+          <p:style>
+            <a:lnRef idx="1">
+              <a:schemeClr val="accent4"/>
+            </a:lnRef>
+            <a:fillRef idx="2">
+              <a:schemeClr val="accent4"/>
+            </a:fillRef>
+            <a:effectRef idx="1">
+              <a:schemeClr val="accent4"/>
+            </a:effectRef>
+            <a:fontRef idx="minor">
+              <a:schemeClr val="dk1"/>
+            </a:fontRef>
+          </p:style>
+          <p:txBody>
+            <a:bodyPr rtlCol="0" anchor="ctr"/>
+            <a:lstStyle/>
+            <a:p>
+              <a:pPr algn="ctr"/>
+              <a:r>
+                <a:rPr lang="en-US" sz="1050" dirty="0">
+                  <a:solidFill>
+                    <a:srgbClr val="7030A0"/>
+                  </a:solidFill>
+                </a:rPr>
+                <a:t>RestOrRant</a:t>
+              </a:r>
+              <a:endParaRPr lang="en-SG" sz="1050" dirty="0">
+                <a:solidFill>
+                  <a:srgbClr val="7030A0"/>
+                </a:solidFill>
+              </a:endParaRPr>
+            </a:p>
+          </p:txBody>
+        </p:sp>
+        <p:sp>
+          <p:nvSpPr>
+            <p:cNvPr id="49" name="Rectangle 8"/>
+            <p:cNvSpPr/>
+            <p:nvPr/>
+          </p:nvSpPr>
+          <p:spPr>
+            <a:xfrm>
+              <a:off x="4205877" y="2076029"/>
+              <a:ext cx="1369229" cy="346760"/>
+            </a:xfrm>
+            <a:prstGeom prst="rect">
+              <a:avLst/>
+            </a:prstGeom>
+            <a:ln w="19050">
+              <a:solidFill>
+                <a:srgbClr val="7030A0"/>
+              </a:solidFill>
+            </a:ln>
+            <a:effectLst/>
+          </p:spPr>
+          <p:style>
+            <a:lnRef idx="1">
+              <a:schemeClr val="accent4"/>
+            </a:lnRef>
+            <a:fillRef idx="2">
+              <a:schemeClr val="accent4"/>
+            </a:fillRef>
+            <a:effectRef idx="1">
+              <a:schemeClr val="accent4"/>
+            </a:effectRef>
+            <a:fontRef idx="minor">
+              <a:schemeClr val="dk1"/>
+            </a:fontRef>
+          </p:style>
+          <p:txBody>
+            <a:bodyPr rtlCol="0" anchor="ctr"/>
+            <a:lstStyle/>
+            <a:p>
+              <a:pPr algn="ctr"/>
+              <a:r>
+                <a:rPr lang="en-US" sz="1050" dirty="0" err="1">
+                  <a:solidFill>
+                    <a:srgbClr val="7030A0"/>
+                  </a:solidFill>
+                </a:rPr>
+                <a:t>UniqueMenuItemList</a:t>
+              </a:r>
+              <a:endParaRPr lang="en-SG" sz="1050" dirty="0">
+                <a:solidFill>
+                  <a:srgbClr val="7030A0"/>
+                </a:solidFill>
+              </a:endParaRPr>
+            </a:p>
+          </p:txBody>
+        </p:sp>
+        <p:sp>
+          <p:nvSpPr>
+            <p:cNvPr id="51" name="Flowchart: Decision 96"/>
+            <p:cNvSpPr/>
+            <p:nvPr/>
+          </p:nvSpPr>
+          <p:spPr>
+            <a:xfrm>
+              <a:off x="3833035" y="2161946"/>
+              <a:ext cx="236048" cy="173380"/>
+            </a:xfrm>
+            <a:prstGeom prst="flowChartDecision">
+              <a:avLst/>
+            </a:prstGeom>
+            <a:solidFill>
+              <a:srgbClr val="7030A0"/>
+            </a:solidFill>
+            <a:ln w="19050">
+              <a:solidFill>
+                <a:srgbClr val="7030A0"/>
+              </a:solidFill>
+            </a:ln>
+            <a:effectLst/>
+          </p:spPr>
+          <p:style>
+            <a:lnRef idx="1">
+              <a:schemeClr val="accent6"/>
+            </a:lnRef>
+            <a:fillRef idx="2">
+              <a:schemeClr val="accent6"/>
+            </a:fillRef>
+            <a:effectRef idx="1">
+              <a:schemeClr val="accent6"/>
+            </a:effectRef>
+            <a:fontRef idx="minor">
+              <a:schemeClr val="dk1"/>
+            </a:fontRef>
+          </p:style>
+          <p:txBody>
+            <a:bodyPr rtlCol="0" anchor="ctr"/>
+            <a:lstStyle/>
+            <a:p>
+              <a:pPr algn="ctr"/>
+              <a:endParaRPr lang="en-US" sz="1050"/>
+            </a:p>
+          </p:txBody>
+        </p:sp>
+        <p:cxnSp>
+          <p:nvCxnSpPr>
+            <p:cNvPr id="97" name="Elbow Connector 63"/>
+            <p:cNvCxnSpPr>
+              <a:cxnSpLocks/>
+              <a:stCxn id="99" idx="3"/>
+              <a:endCxn id="46" idx="0"/>
+            </p:cNvCxnSpPr>
+            <p:nvPr/>
+          </p:nvCxnSpPr>
+          <p:spPr>
+            <a:xfrm rot="16200000" flipH="1">
+              <a:off x="1497706" y="1908394"/>
+              <a:ext cx="341199" cy="4428"/>
+            </a:xfrm>
+            <a:prstGeom prst="bentConnector3">
+              <a:avLst>
+                <a:gd name="adj1" fmla="val 50000"/>
+              </a:avLst>
+            </a:prstGeom>
+            <a:ln w="19050">
+              <a:solidFill>
+                <a:srgbClr val="7030A0"/>
+              </a:solidFill>
+              <a:prstDash val="sysDot"/>
+              <a:headEnd type="none" w="med" len="med"/>
+              <a:tailEnd type="none" w="med" len="med"/>
+            </a:ln>
+            <a:effectLst/>
+          </p:spPr>
+          <p:style>
+            <a:lnRef idx="1">
+              <a:schemeClr val="accent2"/>
+            </a:lnRef>
+            <a:fillRef idx="2">
+              <a:schemeClr val="accent2"/>
+            </a:fillRef>
+            <a:effectRef idx="1">
+              <a:schemeClr val="accent2"/>
+            </a:effectRef>
+            <a:fontRef idx="minor">
+              <a:schemeClr val="dk1"/>
+            </a:fontRef>
+          </p:style>
+        </p:cxnSp>
+        <p:sp>
+          <p:nvSpPr>
+            <p:cNvPr id="99" name="Isosceles Triangle 102"/>
+            <p:cNvSpPr/>
+            <p:nvPr/>
+          </p:nvSpPr>
+          <p:spPr>
+            <a:xfrm rot="10800000" flipV="1">
+              <a:off x="1524898" y="1582947"/>
+              <a:ext cx="282387" cy="157062"/>
+            </a:xfrm>
+            <a:prstGeom prst="triangle">
+              <a:avLst/>
+            </a:prstGeom>
+            <a:solidFill>
+              <a:schemeClr val="accent4">
+                <a:lumMod val="20000"/>
+                <a:lumOff val="80000"/>
+              </a:schemeClr>
+            </a:solidFill>
+            <a:ln w="19050">
+              <a:solidFill>
+                <a:srgbClr val="7030A0"/>
+              </a:solidFill>
+            </a:ln>
+            <a:effectLst/>
+          </p:spPr>
+          <p:style>
+            <a:lnRef idx="1">
+              <a:schemeClr val="accent4"/>
+            </a:lnRef>
+            <a:fillRef idx="2">
+              <a:schemeClr val="accent4"/>
+            </a:fillRef>
+            <a:effectRef idx="1">
+              <a:schemeClr val="accent4"/>
+            </a:effectRef>
+            <a:fontRef idx="minor">
+              <a:schemeClr val="dk1"/>
+            </a:fontRef>
+          </p:style>
+          <p:txBody>
+            <a:bodyPr rtlCol="0" anchor="ctr"/>
+            <a:lstStyle/>
+            <a:p>
+              <a:pPr algn="ctr"/>
+              <a:endParaRPr lang="en-SG" sz="1050" b="1">
+                <a:solidFill>
+                  <a:srgbClr val="92D050"/>
+                </a:solidFill>
+              </a:endParaRPr>
+            </a:p>
+          </p:txBody>
+        </p:sp>
+        <p:sp>
+          <p:nvSpPr>
+            <p:cNvPr id="54" name="TextBox 53"/>
+            <p:cNvSpPr txBox="1"/>
+            <p:nvPr/>
+          </p:nvSpPr>
+          <p:spPr>
+            <a:xfrm>
+              <a:off x="4036533" y="2018570"/>
+              <a:ext cx="189257" cy="178683"/>
+            </a:xfrm>
+            <a:prstGeom prst="rect">
+              <a:avLst/>
+            </a:prstGeom>
+            <a:noFill/>
+          </p:spPr>
+          <p:txBody>
+            <a:bodyPr wrap="square" lIns="0" tIns="0" rIns="0" bIns="0" rtlCol="0">
+              <a:noAutofit/>
+            </a:bodyPr>
+            <a:lstStyle/>
+            <a:p>
+              <a:pPr algn="ctr"/>
+              <a:r>
+                <a:rPr lang="en-US" sz="1100" dirty="0">
+                  <a:solidFill>
+                    <a:srgbClr val="7030A0"/>
+                  </a:solidFill>
+                </a:rPr>
+                <a:t>1</a:t>
+              </a:r>
+              <a:endParaRPr lang="en-SG" sz="1100" dirty="0">
+                <a:solidFill>
+                  <a:srgbClr val="7030A0"/>
+                </a:solidFill>
+              </a:endParaRPr>
+            </a:p>
+          </p:txBody>
+        </p:sp>
+        <p:sp>
+          <p:nvSpPr>
+            <p:cNvPr id="55" name="Rectangle 8"/>
+            <p:cNvSpPr/>
+            <p:nvPr/>
+          </p:nvSpPr>
+          <p:spPr>
+            <a:xfrm>
+              <a:off x="884590" y="1209587"/>
+              <a:ext cx="1458689" cy="364396"/>
+            </a:xfrm>
+            <a:prstGeom prst="rect">
+              <a:avLst/>
+            </a:prstGeom>
+            <a:ln w="19050">
+              <a:solidFill>
+                <a:srgbClr val="7030A0"/>
+              </a:solidFill>
+            </a:ln>
+            <a:effectLst/>
+          </p:spPr>
+          <p:style>
+            <a:lnRef idx="1">
+              <a:schemeClr val="accent4"/>
+            </a:lnRef>
+            <a:fillRef idx="2">
+              <a:schemeClr val="accent4"/>
+            </a:fillRef>
+            <a:effectRef idx="1">
+              <a:schemeClr val="accent4"/>
+            </a:effectRef>
+            <a:fontRef idx="minor">
+              <a:schemeClr val="dk1"/>
+            </a:fontRef>
+          </p:style>
+          <p:txBody>
+            <a:bodyPr rtlCol="0" anchor="ctr"/>
+            <a:lstStyle/>
+            <a:p>
+              <a:pPr algn="ctr"/>
+              <a:r>
+                <a:rPr lang="en-US" sz="1050" dirty="0">
+                  <a:solidFill>
+                    <a:srgbClr val="7030A0"/>
+                  </a:solidFill>
+                </a:rPr>
+                <a:t>&lt;&lt;interface&gt;&gt;</a:t>
+              </a:r>
+              <a:br>
+                <a:rPr lang="en-US" sz="1050" dirty="0">
+                  <a:solidFill>
+                    <a:srgbClr val="7030A0"/>
+                  </a:solidFill>
+                </a:rPr>
+              </a:br>
+              <a:r>
+                <a:rPr lang="en-US" sz="1050" dirty="0">
+                  <a:solidFill>
+                    <a:srgbClr val="7030A0"/>
+                  </a:solidFill>
+                </a:rPr>
+                <a:t>ReadOnlyRestOrRant</a:t>
+              </a:r>
+              <a:endParaRPr lang="en-SG" sz="1050" dirty="0">
+                <a:solidFill>
+                  <a:srgbClr val="7030A0"/>
+                </a:solidFill>
+              </a:endParaRPr>
+            </a:p>
+          </p:txBody>
+        </p:sp>
+        <p:cxnSp>
+          <p:nvCxnSpPr>
+            <p:cNvPr id="60" name="Straight Arrow Connector 59"/>
+            <p:cNvCxnSpPr>
+              <a:cxnSpLocks/>
+              <a:stCxn id="51" idx="1"/>
+              <a:endCxn id="49" idx="1"/>
+            </p:cNvCxnSpPr>
+            <p:nvPr/>
+          </p:nvCxnSpPr>
+          <p:spPr>
+            <a:xfrm>
+              <a:off x="3833035" y="2248636"/>
+              <a:ext cx="372842" cy="773"/>
+            </a:xfrm>
+            <a:prstGeom prst="straightConnector1">
+              <a:avLst/>
+            </a:prstGeom>
+            <a:ln w="19050">
+              <a:solidFill>
+                <a:srgbClr val="7030A0"/>
+              </a:solidFill>
+              <a:headEnd type="none" w="med" len="med"/>
+              <a:tailEnd type="arrow" w="med" len="med"/>
+            </a:ln>
+            <a:effectLst/>
+          </p:spPr>
+          <p:style>
+            <a:lnRef idx="1">
+              <a:schemeClr val="accent2"/>
+            </a:lnRef>
+            <a:fillRef idx="2">
+              <a:schemeClr val="accent2"/>
+            </a:fillRef>
+            <a:effectRef idx="1">
+              <a:schemeClr val="accent2"/>
+            </a:effectRef>
+            <a:fontRef idx="minor">
+              <a:schemeClr val="dk1"/>
+            </a:fontRef>
+          </p:style>
+        </p:cxnSp>
+        <p:sp>
+          <p:nvSpPr>
+            <p:cNvPr id="71" name="Rectangle 8"/>
+            <p:cNvSpPr/>
+            <p:nvPr/>
+          </p:nvSpPr>
+          <p:spPr>
+            <a:xfrm>
+              <a:off x="2824240" y="2076029"/>
+              <a:ext cx="991799" cy="346760"/>
+            </a:xfrm>
+            <a:prstGeom prst="rect">
+              <a:avLst/>
+            </a:prstGeom>
+            <a:ln w="19050">
+              <a:solidFill>
+                <a:srgbClr val="7030A0"/>
+              </a:solidFill>
+            </a:ln>
+            <a:effectLst/>
+          </p:spPr>
+          <p:style>
+            <a:lnRef idx="1">
+              <a:schemeClr val="accent4"/>
+            </a:lnRef>
+            <a:fillRef idx="2">
+              <a:schemeClr val="accent4"/>
+            </a:fillRef>
+            <a:effectRef idx="1">
+              <a:schemeClr val="accent4"/>
+            </a:effectRef>
+            <a:fontRef idx="minor">
+              <a:schemeClr val="dk1"/>
+            </a:fontRef>
+          </p:style>
+          <p:txBody>
+            <a:bodyPr rtlCol="0" anchor="ctr"/>
+            <a:lstStyle/>
+            <a:p>
+              <a:pPr algn="ctr"/>
+              <a:r>
+                <a:rPr lang="en-US" sz="1050" dirty="0">
+                  <a:solidFill>
+                    <a:srgbClr val="7030A0"/>
+                  </a:solidFill>
+                </a:rPr>
+                <a:t>Menu</a:t>
+              </a:r>
+              <a:endParaRPr lang="en-SG" sz="1050" dirty="0">
+                <a:solidFill>
+                  <a:srgbClr val="7030A0"/>
+                </a:solidFill>
+              </a:endParaRPr>
+            </a:p>
+          </p:txBody>
+        </p:sp>
+        <p:sp>
+          <p:nvSpPr>
+            <p:cNvPr id="72" name="Flowchart: Decision 96"/>
+            <p:cNvSpPr/>
+            <p:nvPr/>
+          </p:nvSpPr>
+          <p:spPr>
+            <a:xfrm>
+              <a:off x="2270008" y="2181970"/>
+              <a:ext cx="236048" cy="173380"/>
+            </a:xfrm>
+            <a:prstGeom prst="flowChartDecision">
+              <a:avLst/>
+            </a:prstGeom>
+            <a:solidFill>
+              <a:srgbClr val="7030A0"/>
+            </a:solidFill>
+            <a:ln w="19050">
+              <a:solidFill>
+                <a:srgbClr val="7030A0"/>
+              </a:solidFill>
+            </a:ln>
+            <a:effectLst/>
+          </p:spPr>
+          <p:style>
+            <a:lnRef idx="1">
+              <a:schemeClr val="accent6"/>
+            </a:lnRef>
+            <a:fillRef idx="2">
+              <a:schemeClr val="accent6"/>
+            </a:fillRef>
+            <a:effectRef idx="1">
+              <a:schemeClr val="accent6"/>
+            </a:effectRef>
+            <a:fontRef idx="minor">
+              <a:schemeClr val="dk1"/>
+            </a:fontRef>
+          </p:style>
+          <p:txBody>
+            <a:bodyPr rtlCol="0" anchor="ctr"/>
+            <a:lstStyle/>
+            <a:p>
+              <a:pPr algn="ctr"/>
+              <a:endParaRPr lang="en-US" sz="1050"/>
+            </a:p>
+          </p:txBody>
+        </p:sp>
+        <p:sp>
+          <p:nvSpPr>
+            <p:cNvPr id="73" name="TextBox 72"/>
+            <p:cNvSpPr txBox="1"/>
+            <p:nvPr/>
+          </p:nvSpPr>
+          <p:spPr>
+            <a:xfrm>
+              <a:off x="2648079" y="1993911"/>
+              <a:ext cx="154714" cy="219068"/>
+            </a:xfrm>
+            <a:prstGeom prst="rect">
+              <a:avLst/>
+            </a:prstGeom>
+            <a:noFill/>
+          </p:spPr>
+          <p:txBody>
+            <a:bodyPr wrap="square" lIns="0" tIns="0" rIns="0" bIns="0" rtlCol="0">
+              <a:noAutofit/>
+            </a:bodyPr>
+            <a:lstStyle/>
+            <a:p>
+              <a:pPr algn="ctr"/>
+              <a:r>
+                <a:rPr lang="en-US" sz="1100" dirty="0">
+                  <a:solidFill>
+                    <a:srgbClr val="7030A0"/>
+                  </a:solidFill>
+                </a:rPr>
+                <a:t>1</a:t>
+              </a:r>
+              <a:endParaRPr lang="en-SG" sz="1100" dirty="0">
+                <a:solidFill>
+                  <a:srgbClr val="7030A0"/>
+                </a:solidFill>
+              </a:endParaRPr>
+            </a:p>
+          </p:txBody>
+        </p:sp>
+        <p:cxnSp>
+          <p:nvCxnSpPr>
+            <p:cNvPr id="74" name="Straight Arrow Connector 73"/>
+            <p:cNvCxnSpPr>
+              <a:cxnSpLocks/>
+            </p:cNvCxnSpPr>
+            <p:nvPr/>
+          </p:nvCxnSpPr>
+          <p:spPr>
+            <a:xfrm flipV="1">
+              <a:off x="2270217" y="2262291"/>
+              <a:ext cx="554023" cy="5537"/>
+            </a:xfrm>
+            <a:prstGeom prst="straightConnector1">
+              <a:avLst/>
+            </a:prstGeom>
+            <a:ln w="19050">
+              <a:solidFill>
+                <a:srgbClr val="7030A0"/>
+              </a:solidFill>
+              <a:headEnd type="none" w="med" len="med"/>
+              <a:tailEnd type="arrow" w="med" len="med"/>
+            </a:ln>
+            <a:effectLst/>
+          </p:spPr>
+          <p:style>
+            <a:lnRef idx="1">
+              <a:schemeClr val="accent2"/>
+            </a:lnRef>
+            <a:fillRef idx="2">
+              <a:schemeClr val="accent2"/>
+            </a:fillRef>
+            <a:effectRef idx="1">
+              <a:schemeClr val="accent2"/>
+            </a:effectRef>
+            <a:fontRef idx="minor">
+              <a:schemeClr val="dk1"/>
+            </a:fontRef>
+          </p:style>
+        </p:cxnSp>
+        <p:cxnSp>
+          <p:nvCxnSpPr>
+            <p:cNvPr id="91" name="Elbow Connector 63"/>
+            <p:cNvCxnSpPr>
+              <a:cxnSpLocks/>
+              <a:stCxn id="92" idx="3"/>
+              <a:endCxn id="71" idx="0"/>
+            </p:cNvCxnSpPr>
+            <p:nvPr/>
+          </p:nvCxnSpPr>
+          <p:spPr>
+            <a:xfrm rot="5400000">
+              <a:off x="3159692" y="1913048"/>
+              <a:ext cx="323429" cy="2532"/>
+            </a:xfrm>
+            <a:prstGeom prst="bentConnector3">
+              <a:avLst>
+                <a:gd name="adj1" fmla="val 50000"/>
+              </a:avLst>
+            </a:prstGeom>
+            <a:ln w="19050">
+              <a:solidFill>
+                <a:srgbClr val="7030A0"/>
+              </a:solidFill>
+              <a:prstDash val="sysDot"/>
+              <a:headEnd type="none" w="med" len="med"/>
+              <a:tailEnd type="none" w="med" len="med"/>
+            </a:ln>
+            <a:effectLst/>
+          </p:spPr>
+          <p:style>
+            <a:lnRef idx="1">
+              <a:schemeClr val="accent2"/>
+            </a:lnRef>
+            <a:fillRef idx="2">
+              <a:schemeClr val="accent2"/>
+            </a:fillRef>
+            <a:effectRef idx="1">
+              <a:schemeClr val="accent2"/>
+            </a:effectRef>
+            <a:fontRef idx="minor">
+              <a:schemeClr val="dk1"/>
+            </a:fontRef>
+          </p:style>
+        </p:cxnSp>
+        <p:sp>
+          <p:nvSpPr>
+            <p:cNvPr id="92" name="Isosceles Triangle 102"/>
+            <p:cNvSpPr/>
+            <p:nvPr/>
+          </p:nvSpPr>
+          <p:spPr>
+            <a:xfrm rot="10800000" flipV="1">
+              <a:off x="3181479" y="1595538"/>
+              <a:ext cx="282387" cy="157062"/>
+            </a:xfrm>
+            <a:prstGeom prst="triangle">
+              <a:avLst/>
+            </a:prstGeom>
+            <a:solidFill>
+              <a:schemeClr val="accent4">
+                <a:lumMod val="20000"/>
+                <a:lumOff val="80000"/>
+              </a:schemeClr>
+            </a:solidFill>
+            <a:ln w="19050">
+              <a:solidFill>
+                <a:srgbClr val="7030A0"/>
+              </a:solidFill>
+            </a:ln>
+            <a:effectLst/>
+          </p:spPr>
+          <p:style>
+            <a:lnRef idx="1">
+              <a:schemeClr val="accent4"/>
+            </a:lnRef>
+            <a:fillRef idx="2">
+              <a:schemeClr val="accent4"/>
+            </a:fillRef>
+            <a:effectRef idx="1">
+              <a:schemeClr val="accent4"/>
+            </a:effectRef>
+            <a:fontRef idx="minor">
+              <a:schemeClr val="dk1"/>
+            </a:fontRef>
+          </p:style>
+          <p:txBody>
+            <a:bodyPr rtlCol="0" anchor="ctr"/>
+            <a:lstStyle/>
+            <a:p>
+              <a:pPr algn="ctr"/>
+              <a:endParaRPr lang="en-SG" sz="1050" b="1">
+                <a:solidFill>
+                  <a:srgbClr val="92D050"/>
+                </a:solidFill>
+              </a:endParaRPr>
+            </a:p>
+          </p:txBody>
+        </p:sp>
+        <p:sp>
+          <p:nvSpPr>
+            <p:cNvPr id="93" name="Rectangle 8"/>
+            <p:cNvSpPr/>
+            <p:nvPr/>
+          </p:nvSpPr>
+          <p:spPr>
+            <a:xfrm>
+              <a:off x="2709819" y="1204809"/>
+              <a:ext cx="1230893" cy="364396"/>
+            </a:xfrm>
+            <a:prstGeom prst="rect">
+              <a:avLst/>
+            </a:prstGeom>
+            <a:ln w="19050">
+              <a:solidFill>
+                <a:srgbClr val="7030A0"/>
+              </a:solidFill>
+            </a:ln>
+            <a:effectLst/>
+          </p:spPr>
+          <p:style>
+            <a:lnRef idx="1">
+              <a:schemeClr val="accent4"/>
+            </a:lnRef>
+            <a:fillRef idx="2">
+              <a:schemeClr val="accent4"/>
+            </a:fillRef>
+            <a:effectRef idx="1">
+              <a:schemeClr val="accent4"/>
+            </a:effectRef>
+            <a:fontRef idx="minor">
+              <a:schemeClr val="dk1"/>
+            </a:fontRef>
+          </p:style>
+          <p:txBody>
+            <a:bodyPr rtlCol="0" anchor="ctr"/>
+            <a:lstStyle/>
+            <a:p>
+              <a:pPr algn="ctr"/>
+              <a:r>
+                <a:rPr lang="en-US" sz="1050" dirty="0">
+                  <a:solidFill>
+                    <a:srgbClr val="7030A0"/>
+                  </a:solidFill>
+                </a:rPr>
+                <a:t>&lt;&lt;interface&gt;&gt;</a:t>
+              </a:r>
+              <a:br>
+                <a:rPr lang="en-US" sz="1050" dirty="0">
+                  <a:solidFill>
+                    <a:srgbClr val="7030A0"/>
+                  </a:solidFill>
+                </a:rPr>
+              </a:br>
+              <a:r>
+                <a:rPr lang="en-US" sz="1050" dirty="0" err="1">
+                  <a:solidFill>
+                    <a:srgbClr val="7030A0"/>
+                  </a:solidFill>
+                </a:rPr>
+                <a:t>ReadOnlyMenu</a:t>
+              </a:r>
+              <a:endParaRPr lang="en-SG" sz="1050" dirty="0">
+                <a:solidFill>
+                  <a:srgbClr val="7030A0"/>
+                </a:solidFill>
+              </a:endParaRPr>
+            </a:p>
+          </p:txBody>
+        </p:sp>
+        <p:sp>
+          <p:nvSpPr>
+            <p:cNvPr id="139" name="Rectangle 8"/>
+            <p:cNvSpPr/>
+            <p:nvPr/>
+          </p:nvSpPr>
+          <p:spPr>
+            <a:xfrm>
+              <a:off x="6011790" y="2091640"/>
+              <a:ext cx="887788" cy="346760"/>
+            </a:xfrm>
+            <a:prstGeom prst="rect">
+              <a:avLst/>
+            </a:prstGeom>
+            <a:ln w="19050">
+              <a:solidFill>
+                <a:srgbClr val="7030A0"/>
+              </a:solidFill>
+            </a:ln>
+            <a:effectLst/>
+          </p:spPr>
+          <p:style>
+            <a:lnRef idx="1">
+              <a:schemeClr val="accent4"/>
+            </a:lnRef>
+            <a:fillRef idx="2">
+              <a:schemeClr val="accent4"/>
+            </a:fillRef>
+            <a:effectRef idx="1">
+              <a:schemeClr val="accent4"/>
+            </a:effectRef>
+            <a:fontRef idx="minor">
+              <a:schemeClr val="dk1"/>
+            </a:fontRef>
+          </p:style>
+          <p:txBody>
+            <a:bodyPr rtlCol="0" anchor="ctr"/>
+            <a:lstStyle/>
+            <a:p>
+              <a:pPr algn="ctr"/>
+              <a:r>
+                <a:rPr lang="en-US" sz="1050" dirty="0" err="1">
+                  <a:solidFill>
+                    <a:srgbClr val="7030A0"/>
+                  </a:solidFill>
+                </a:rPr>
+                <a:t>MenuItem</a:t>
+              </a:r>
+              <a:endParaRPr lang="en-SG" sz="1050" dirty="0">
+                <a:solidFill>
+                  <a:srgbClr val="7030A0"/>
+                </a:solidFill>
+              </a:endParaRPr>
+            </a:p>
+          </p:txBody>
+        </p:sp>
+        <p:sp>
+          <p:nvSpPr>
+            <p:cNvPr id="140" name="Flowchart: Decision 96"/>
+            <p:cNvSpPr/>
+            <p:nvPr/>
+          </p:nvSpPr>
+          <p:spPr>
+            <a:xfrm>
+              <a:off x="5585860" y="2189484"/>
+              <a:ext cx="236048" cy="161677"/>
+            </a:xfrm>
+            <a:prstGeom prst="flowChartDecision">
+              <a:avLst/>
+            </a:prstGeom>
+            <a:noFill/>
+            <a:ln w="19050">
+              <a:solidFill>
+                <a:srgbClr val="7030A0"/>
+              </a:solidFill>
+            </a:ln>
+            <a:effectLst/>
+          </p:spPr>
+          <p:style>
+            <a:lnRef idx="1">
+              <a:schemeClr val="accent6"/>
+            </a:lnRef>
+            <a:fillRef idx="2">
+              <a:schemeClr val="accent6"/>
+            </a:fillRef>
+            <a:effectRef idx="1">
+              <a:schemeClr val="accent6"/>
+            </a:effectRef>
+            <a:fontRef idx="minor">
+              <a:schemeClr val="dk1"/>
+            </a:fontRef>
+          </p:style>
+          <p:txBody>
+            <a:bodyPr rtlCol="0" anchor="ctr"/>
+            <a:lstStyle/>
+            <a:p>
+              <a:pPr algn="ctr"/>
+              <a:endParaRPr lang="en-US" sz="1050"/>
+            </a:p>
+          </p:txBody>
+        </p:sp>
+        <p:sp>
+          <p:nvSpPr>
+            <p:cNvPr id="142" name="TextBox 141"/>
+            <p:cNvSpPr txBox="1"/>
+            <p:nvPr/>
+          </p:nvSpPr>
+          <p:spPr>
+            <a:xfrm>
+              <a:off x="5835063" y="2074521"/>
+              <a:ext cx="189257" cy="178683"/>
+            </a:xfrm>
+            <a:prstGeom prst="rect">
+              <a:avLst/>
+            </a:prstGeom>
+            <a:noFill/>
+          </p:spPr>
+          <p:txBody>
+            <a:bodyPr wrap="square" lIns="0" tIns="0" rIns="0" bIns="0" rtlCol="0">
+              <a:noAutofit/>
+            </a:bodyPr>
+            <a:lstStyle/>
+            <a:p>
+              <a:pPr algn="ctr"/>
+              <a:r>
+                <a:rPr lang="en-US" sz="1100" dirty="0">
+                  <a:solidFill>
+                    <a:srgbClr val="7030A0"/>
+                  </a:solidFill>
+                </a:rPr>
+                <a:t>*</a:t>
+              </a:r>
+              <a:endParaRPr lang="en-SG" sz="1100" dirty="0">
+                <a:solidFill>
+                  <a:srgbClr val="7030A0"/>
+                </a:solidFill>
+              </a:endParaRPr>
+            </a:p>
+          </p:txBody>
+        </p:sp>
+        <p:sp>
+          <p:nvSpPr>
+            <p:cNvPr id="143" name="Rectangle 8"/>
+            <p:cNvSpPr/>
+            <p:nvPr/>
+          </p:nvSpPr>
+          <p:spPr>
+            <a:xfrm>
+              <a:off x="7620738" y="2136823"/>
+              <a:ext cx="989861" cy="282560"/>
+            </a:xfrm>
+            <a:prstGeom prst="rect">
+              <a:avLst/>
+            </a:prstGeom>
+            <a:ln w="19050">
+              <a:solidFill>
+                <a:srgbClr val="7030A0"/>
+              </a:solidFill>
+            </a:ln>
+            <a:effectLst/>
+          </p:spPr>
+          <p:style>
+            <a:lnRef idx="1">
+              <a:schemeClr val="accent4"/>
+            </a:lnRef>
+            <a:fillRef idx="2">
+              <a:schemeClr val="accent4"/>
+            </a:fillRef>
+            <a:effectRef idx="1">
+              <a:schemeClr val="accent4"/>
+            </a:effectRef>
+            <a:fontRef idx="minor">
+              <a:schemeClr val="dk1"/>
+            </a:fontRef>
+          </p:style>
+          <p:txBody>
+            <a:bodyPr rtlCol="0" anchor="ctr"/>
+            <a:lstStyle/>
+            <a:p>
+              <a:pPr algn="ctr"/>
+              <a:r>
+                <a:rPr lang="en-US" sz="1050" dirty="0">
+                  <a:solidFill>
+                    <a:srgbClr val="7030A0"/>
+                  </a:solidFill>
+                </a:rPr>
+                <a:t>Code</a:t>
+              </a:r>
+              <a:endParaRPr lang="en-SG" sz="1050" dirty="0">
+                <a:solidFill>
+                  <a:srgbClr val="7030A0"/>
+                </a:solidFill>
+              </a:endParaRPr>
+            </a:p>
+          </p:txBody>
+        </p:sp>
+        <p:sp>
+          <p:nvSpPr>
+            <p:cNvPr id="144" name="Flowchart: Decision 96"/>
+            <p:cNvSpPr/>
+            <p:nvPr/>
+          </p:nvSpPr>
+          <p:spPr>
+            <a:xfrm>
+              <a:off x="6917845" y="2188421"/>
+              <a:ext cx="236048" cy="173380"/>
+            </a:xfrm>
+            <a:prstGeom prst="flowChartDecision">
+              <a:avLst/>
+            </a:prstGeom>
+            <a:solidFill>
+              <a:srgbClr val="7030A0"/>
+            </a:solidFill>
+            <a:ln w="19050">
+              <a:solidFill>
+                <a:srgbClr val="7030A0"/>
+              </a:solidFill>
+            </a:ln>
+            <a:effectLst/>
+          </p:spPr>
+          <p:style>
+            <a:lnRef idx="1">
+              <a:schemeClr val="accent6"/>
+            </a:lnRef>
+            <a:fillRef idx="2">
+              <a:schemeClr val="accent6"/>
+            </a:fillRef>
+            <a:effectRef idx="1">
+              <a:schemeClr val="accent6"/>
+            </a:effectRef>
+            <a:fontRef idx="minor">
+              <a:schemeClr val="dk1"/>
+            </a:fontRef>
+          </p:style>
+          <p:txBody>
+            <a:bodyPr rtlCol="0" anchor="ctr"/>
+            <a:lstStyle/>
+            <a:p>
+              <a:pPr algn="ctr"/>
+              <a:endParaRPr lang="en-US" sz="1050"/>
+            </a:p>
+          </p:txBody>
+        </p:sp>
+        <p:cxnSp>
+          <p:nvCxnSpPr>
+            <p:cNvPr id="145" name="Elbow Connector 144"/>
+            <p:cNvCxnSpPr>
+              <a:cxnSpLocks/>
+              <a:stCxn id="144" idx="3"/>
+              <a:endCxn id="143" idx="1"/>
+            </p:cNvCxnSpPr>
+            <p:nvPr/>
+          </p:nvCxnSpPr>
+          <p:spPr>
+            <a:xfrm>
+              <a:off x="7153893" y="2275111"/>
+              <a:ext cx="466845" cy="2992"/>
+            </a:xfrm>
+            <a:prstGeom prst="bentConnector3">
+              <a:avLst/>
+            </a:prstGeom>
+            <a:ln w="19050">
+              <a:solidFill>
+                <a:srgbClr val="7030A0"/>
+              </a:solidFill>
+              <a:headEnd type="none" w="med" len="med"/>
+              <a:tailEnd type="arrow" w="med" len="med"/>
+            </a:ln>
+            <a:effectLst/>
+          </p:spPr>
+          <p:style>
+            <a:lnRef idx="1">
+              <a:schemeClr val="accent2"/>
+            </a:lnRef>
+            <a:fillRef idx="2">
+              <a:schemeClr val="accent2"/>
+            </a:fillRef>
+            <a:effectRef idx="1">
+              <a:schemeClr val="accent2"/>
+            </a:effectRef>
+            <a:fontRef idx="minor">
+              <a:schemeClr val="dk1"/>
+            </a:fontRef>
+          </p:style>
+        </p:cxnSp>
+        <p:sp>
+          <p:nvSpPr>
+            <p:cNvPr id="148" name="Rectangle 8">
+              <a:extLst>
+                <a:ext uri="{FF2B5EF4-FFF2-40B4-BE49-F238E27FC236}">
+                  <a16:creationId xmlns:a16="http://schemas.microsoft.com/office/drawing/2014/main" id="{ABDCDBD2-131A-4B66-A2F2-43BBEE82C773}"/>
+                </a:ext>
+              </a:extLst>
+            </p:cNvPr>
+            <p:cNvSpPr/>
+            <p:nvPr/>
+          </p:nvSpPr>
+          <p:spPr>
+            <a:xfrm>
+              <a:off x="7614194" y="1752599"/>
+              <a:ext cx="996406" cy="332531"/>
+            </a:xfrm>
+            <a:prstGeom prst="rect">
+              <a:avLst/>
+            </a:prstGeom>
+            <a:ln w="19050">
+              <a:solidFill>
+                <a:srgbClr val="7030A0"/>
+              </a:solidFill>
+            </a:ln>
+            <a:effectLst/>
+          </p:spPr>
+          <p:style>
+            <a:lnRef idx="1">
+              <a:schemeClr val="accent4"/>
+            </a:lnRef>
+            <a:fillRef idx="2">
+              <a:schemeClr val="accent4"/>
+            </a:fillRef>
+            <a:effectRef idx="1">
+              <a:schemeClr val="accent4"/>
+            </a:effectRef>
+            <a:fontRef idx="minor">
+              <a:schemeClr val="dk1"/>
+            </a:fontRef>
+          </p:style>
+          <p:txBody>
+            <a:bodyPr rtlCol="0" anchor="ctr"/>
+            <a:lstStyle/>
+            <a:p>
+              <a:pPr algn="ctr"/>
+              <a:r>
+                <a:rPr lang="en-US" sz="1050" dirty="0">
+                  <a:solidFill>
+                    <a:srgbClr val="7030A0"/>
+                  </a:solidFill>
+                </a:rPr>
+                <a:t>Name</a:t>
+              </a:r>
+              <a:endParaRPr lang="en-SG" sz="1050" dirty="0">
+                <a:solidFill>
+                  <a:srgbClr val="7030A0"/>
+                </a:solidFill>
+              </a:endParaRPr>
+            </a:p>
+          </p:txBody>
+        </p:sp>
+        <p:cxnSp>
+          <p:nvCxnSpPr>
+            <p:cNvPr id="149" name="Elbow Connector 78">
+              <a:extLst>
+                <a:ext uri="{FF2B5EF4-FFF2-40B4-BE49-F238E27FC236}">
+                  <a16:creationId xmlns:a16="http://schemas.microsoft.com/office/drawing/2014/main" id="{B97967F8-618A-448B-81FD-CDFD4AF0EC64}"/>
+                </a:ext>
+              </a:extLst>
+            </p:cNvPr>
+            <p:cNvCxnSpPr>
+              <a:cxnSpLocks/>
+              <a:stCxn id="144" idx="3"/>
+              <a:endCxn id="148" idx="1"/>
+            </p:cNvCxnSpPr>
+            <p:nvPr/>
+          </p:nvCxnSpPr>
+          <p:spPr>
+            <a:xfrm flipV="1">
+              <a:off x="7153893" y="1918865"/>
+              <a:ext cx="460301" cy="356246"/>
+            </a:xfrm>
+            <a:prstGeom prst="bentConnector3">
+              <a:avLst>
+                <a:gd name="adj1" fmla="val 50000"/>
+              </a:avLst>
+            </a:prstGeom>
+            <a:ln w="19050">
+              <a:solidFill>
+                <a:srgbClr val="7030A0"/>
+              </a:solidFill>
+              <a:headEnd type="none" w="med" len="med"/>
+              <a:tailEnd type="arrow" w="med" len="med"/>
+            </a:ln>
+            <a:effectLst/>
+          </p:spPr>
+          <p:style>
+            <a:lnRef idx="1">
+              <a:schemeClr val="accent2"/>
+            </a:lnRef>
+            <a:fillRef idx="2">
+              <a:schemeClr val="accent2"/>
+            </a:fillRef>
+            <a:effectRef idx="1">
+              <a:schemeClr val="accent2"/>
+            </a:effectRef>
+            <a:fontRef idx="minor">
+              <a:schemeClr val="dk1"/>
+            </a:fontRef>
+          </p:style>
+        </p:cxnSp>
+        <p:sp>
+          <p:nvSpPr>
+            <p:cNvPr id="291" name="TextBox 290"/>
+            <p:cNvSpPr txBox="1"/>
+            <p:nvPr/>
+          </p:nvSpPr>
+          <p:spPr>
+            <a:xfrm>
+              <a:off x="7450403" y="2362200"/>
+              <a:ext cx="189257" cy="178683"/>
+            </a:xfrm>
+            <a:prstGeom prst="rect">
+              <a:avLst/>
+            </a:prstGeom>
+            <a:noFill/>
+          </p:spPr>
+          <p:txBody>
+            <a:bodyPr wrap="square" lIns="0" tIns="0" rIns="0" bIns="0" rtlCol="0">
+              <a:noAutofit/>
+            </a:bodyPr>
+            <a:lstStyle/>
+            <a:p>
+              <a:pPr algn="ctr"/>
+              <a:r>
+                <a:rPr lang="en-US" sz="1100" dirty="0">
+                  <a:solidFill>
+                    <a:srgbClr val="7030A0"/>
+                  </a:solidFill>
+                </a:rPr>
+                <a:t>1</a:t>
+              </a:r>
+              <a:endParaRPr lang="en-SG" sz="1100" dirty="0">
+                <a:solidFill>
+                  <a:srgbClr val="7030A0"/>
+                </a:solidFill>
+              </a:endParaRPr>
+            </a:p>
+          </p:txBody>
+        </p:sp>
+        <p:sp>
+          <p:nvSpPr>
+            <p:cNvPr id="292" name="TextBox 291"/>
+            <p:cNvSpPr txBox="1"/>
+            <p:nvPr/>
+          </p:nvSpPr>
+          <p:spPr>
+            <a:xfrm>
+              <a:off x="7440942" y="2031117"/>
+              <a:ext cx="189257" cy="178683"/>
+            </a:xfrm>
+            <a:prstGeom prst="rect">
+              <a:avLst/>
+            </a:prstGeom>
+            <a:noFill/>
+          </p:spPr>
+          <p:txBody>
+            <a:bodyPr wrap="square" lIns="0" tIns="0" rIns="0" bIns="0" rtlCol="0">
+              <a:noAutofit/>
+            </a:bodyPr>
+            <a:lstStyle/>
+            <a:p>
+              <a:pPr algn="ctr"/>
+              <a:r>
+                <a:rPr lang="en-US" sz="1100" dirty="0">
+                  <a:solidFill>
+                    <a:srgbClr val="7030A0"/>
+                  </a:solidFill>
+                </a:rPr>
+                <a:t>1</a:t>
+              </a:r>
+              <a:endParaRPr lang="en-SG" sz="1100" dirty="0">
+                <a:solidFill>
+                  <a:srgbClr val="7030A0"/>
+                </a:solidFill>
+              </a:endParaRPr>
+            </a:p>
+          </p:txBody>
+        </p:sp>
+        <p:cxnSp>
+          <p:nvCxnSpPr>
+            <p:cNvPr id="42" name="Straight Arrow Connector 41">
+              <a:extLst>
+                <a:ext uri="{FF2B5EF4-FFF2-40B4-BE49-F238E27FC236}">
+                  <a16:creationId xmlns:a16="http://schemas.microsoft.com/office/drawing/2014/main" id="{2B86B789-F6B9-4669-A430-1729E39120B1}"/>
+                </a:ext>
+              </a:extLst>
+            </p:cNvPr>
+            <p:cNvCxnSpPr>
+              <a:cxnSpLocks/>
+              <a:stCxn id="140" idx="3"/>
+            </p:cNvCxnSpPr>
+            <p:nvPr/>
+          </p:nvCxnSpPr>
+          <p:spPr>
+            <a:xfrm flipV="1">
+              <a:off x="5821908" y="2266997"/>
+              <a:ext cx="181866" cy="3326"/>
+            </a:xfrm>
+            <a:prstGeom prst="straightConnector1">
+              <a:avLst/>
+            </a:prstGeom>
+            <a:ln w="19050">
+              <a:solidFill>
+                <a:srgbClr val="7030A0"/>
+              </a:solidFill>
+              <a:headEnd type="none" w="med" len="med"/>
+              <a:tailEnd type="arrow" w="med" len="med"/>
+            </a:ln>
+            <a:effectLst/>
+          </p:spPr>
+          <p:style>
+            <a:lnRef idx="1">
+              <a:schemeClr val="accent2"/>
+            </a:lnRef>
+            <a:fillRef idx="2">
+              <a:schemeClr val="accent2"/>
+            </a:fillRef>
+            <a:effectRef idx="1">
+              <a:schemeClr val="accent2"/>
+            </a:effectRef>
+            <a:fontRef idx="minor">
+              <a:schemeClr val="dk1"/>
+            </a:fontRef>
+          </p:style>
+        </p:cxnSp>
+        <p:sp>
+          <p:nvSpPr>
+            <p:cNvPr id="32" name="Rectangle 8">
+              <a:extLst>
+                <a:ext uri="{FF2B5EF4-FFF2-40B4-BE49-F238E27FC236}">
+                  <a16:creationId xmlns:a16="http://schemas.microsoft.com/office/drawing/2014/main" id="{3BB1DDB5-DF9D-4FF5-B126-18375F306D59}"/>
+                </a:ext>
+              </a:extLst>
+            </p:cNvPr>
+            <p:cNvSpPr/>
+            <p:nvPr/>
+          </p:nvSpPr>
+          <p:spPr>
+            <a:xfrm>
+              <a:off x="7630199" y="2471076"/>
+              <a:ext cx="989861" cy="282560"/>
+            </a:xfrm>
+            <a:prstGeom prst="rect">
+              <a:avLst/>
+            </a:prstGeom>
+            <a:ln w="19050">
+              <a:solidFill>
+                <a:srgbClr val="7030A0"/>
+              </a:solidFill>
+            </a:ln>
+            <a:effectLst/>
+          </p:spPr>
+          <p:style>
+            <a:lnRef idx="1">
+              <a:schemeClr val="accent4"/>
+            </a:lnRef>
+            <a:fillRef idx="2">
+              <a:schemeClr val="accent4"/>
+            </a:fillRef>
+            <a:effectRef idx="1">
+              <a:schemeClr val="accent4"/>
+            </a:effectRef>
+            <a:fontRef idx="minor">
+              <a:schemeClr val="dk1"/>
+            </a:fontRef>
+          </p:style>
+          <p:txBody>
+            <a:bodyPr rtlCol="0" anchor="ctr"/>
+            <a:lstStyle/>
+            <a:p>
+              <a:pPr algn="ctr"/>
+              <a:r>
+                <a:rPr lang="en-US" sz="1050" dirty="0">
+                  <a:solidFill>
+                    <a:srgbClr val="7030A0"/>
+                  </a:solidFill>
+                </a:rPr>
+                <a:t>Price</a:t>
+              </a:r>
+              <a:endParaRPr lang="en-SG" sz="1050" dirty="0">
+                <a:solidFill>
+                  <a:srgbClr val="7030A0"/>
+                </a:solidFill>
+              </a:endParaRPr>
+            </a:p>
+          </p:txBody>
+        </p:sp>
+        <p:cxnSp>
+          <p:nvCxnSpPr>
+            <p:cNvPr id="35" name="Elbow Connector 78">
+              <a:extLst>
+                <a:ext uri="{FF2B5EF4-FFF2-40B4-BE49-F238E27FC236}">
+                  <a16:creationId xmlns:a16="http://schemas.microsoft.com/office/drawing/2014/main" id="{20EDF7A1-EDFF-499B-86AC-DEE4755D8BDC}"/>
+                </a:ext>
+              </a:extLst>
+            </p:cNvPr>
+            <p:cNvCxnSpPr>
+              <a:cxnSpLocks/>
+            </p:cNvCxnSpPr>
+            <p:nvPr/>
+          </p:nvCxnSpPr>
+          <p:spPr>
+            <a:xfrm>
+              <a:off x="7153893" y="2268660"/>
+              <a:ext cx="455588" cy="311578"/>
+            </a:xfrm>
+            <a:prstGeom prst="bentConnector3">
+              <a:avLst>
+                <a:gd name="adj1" fmla="val 50000"/>
+              </a:avLst>
+            </a:prstGeom>
+            <a:ln w="19050">
+              <a:solidFill>
+                <a:srgbClr val="7030A0"/>
+              </a:solidFill>
+              <a:headEnd type="none" w="med" len="med"/>
+              <a:tailEnd type="arrow" w="med" len="med"/>
+            </a:ln>
+            <a:effectLst/>
+          </p:spPr>
+          <p:style>
+            <a:lnRef idx="1">
+              <a:schemeClr val="accent2"/>
+            </a:lnRef>
+            <a:fillRef idx="2">
+              <a:schemeClr val="accent2"/>
+            </a:fillRef>
+            <a:effectRef idx="1">
+              <a:schemeClr val="accent2"/>
+            </a:effectRef>
+            <a:fontRef idx="minor">
+              <a:schemeClr val="dk1"/>
+            </a:fontRef>
+          </p:style>
+        </p:cxnSp>
+        <p:sp>
+          <p:nvSpPr>
+            <p:cNvPr id="38" name="TextBox 37">
+              <a:extLst>
+                <a:ext uri="{FF2B5EF4-FFF2-40B4-BE49-F238E27FC236}">
+                  <a16:creationId xmlns:a16="http://schemas.microsoft.com/office/drawing/2014/main" id="{F22CA693-0849-4BE8-BCEE-E80CA8DD3A58}"/>
+                </a:ext>
+              </a:extLst>
+            </p:cNvPr>
+            <p:cNvSpPr txBox="1"/>
+            <p:nvPr/>
+          </p:nvSpPr>
+          <p:spPr>
+            <a:xfrm>
+              <a:off x="7430743" y="1676400"/>
+              <a:ext cx="189257" cy="178683"/>
+            </a:xfrm>
+            <a:prstGeom prst="rect">
+              <a:avLst/>
+            </a:prstGeom>
+            <a:noFill/>
+          </p:spPr>
+          <p:txBody>
+            <a:bodyPr wrap="square" lIns="0" tIns="0" rIns="0" bIns="0" rtlCol="0">
+              <a:noAutofit/>
+            </a:bodyPr>
+            <a:lstStyle/>
+            <a:p>
+              <a:pPr algn="ctr"/>
+              <a:r>
+                <a:rPr lang="en-US" sz="1100" dirty="0">
+                  <a:solidFill>
+                    <a:srgbClr val="7030A0"/>
+                  </a:solidFill>
+                </a:rPr>
+                <a:t>1</a:t>
+              </a:r>
+              <a:endParaRPr lang="en-SG" sz="1100" dirty="0">
+                <a:solidFill>
+                  <a:srgbClr val="7030A0"/>
+                </a:solidFill>
+              </a:endParaRPr>
+            </a:p>
+          </p:txBody>
+        </p:sp>
+      </p:grpSp>
+    </p:spTree>
+    <p:extLst>
+      <p:ext uri="{BB962C8B-B14F-4D97-AF65-F5344CB8AC3E}">
+        <p14:creationId xmlns:p14="http://schemas.microsoft.com/office/powerpoint/2010/main" val="3405687252"/>
+      </p:ext>
+    </p:extLst>
+  </p:cSld>
+  <p:clrMapOvr>
+    <a:masterClrMapping/>
+  </p:clrMapOvr>
+</p:sld>
+</file>
+
+<file path=ppt/slides/slide8.xml><?xml version="1.0" encoding="utf-8"?>
+<p:sld xmlns:a="http://schemas.openxmlformats.org/drawingml/2006/main" xmlns:r="http://schemas.openxmlformats.org/officeDocument/2006/relationships" xmlns:p="http://schemas.openxmlformats.org/presentationml/2006/main">
+  <p:cSld>
+    <p:spTree>
+      <p:nvGrpSpPr>
+        <p:cNvPr id="1" name=""/>
+        <p:cNvGrpSpPr/>
+        <p:nvPr/>
+      </p:nvGrpSpPr>
+      <p:grpSpPr>
+        <a:xfrm>
+          <a:off x="0" y="0"/>
+          <a:ext cx="0" cy="0"/>
+          <a:chOff x="0" y="0"/>
+          <a:chExt cx="0" cy="0"/>
+        </a:xfrm>
+      </p:grpSpPr>
       <p:sp>
         <p:nvSpPr>
           <p:cNvPr id="118" name="Rectangle 65"/>
@@ -32155,7 +33812,7 @@
           <p:cNvPr id="121" name="Rectangle 8">
             <a:extLst>
               <a:ext uri="{FF2B5EF4-FFF2-40B4-BE49-F238E27FC236}">
-                <a16:creationId xmlns:a16="http://schemas.microsoft.com/office/drawing/2014/main" xmlns="" id="{ABDCDBD2-131A-4B66-A2F2-43BBEE82C773}"/>
+                <a16:creationId xmlns:a16="http://schemas.microsoft.com/office/drawing/2014/main" id="{ABDCDBD2-131A-4B66-A2F2-43BBEE82C773}"/>
               </a:ext>
             </a:extLst>
           </p:cNvPr>
@@ -32217,7 +33874,7 @@
           <p:cNvPr id="123" name="Elbow Connector 78">
             <a:extLst>
               <a:ext uri="{FF2B5EF4-FFF2-40B4-BE49-F238E27FC236}">
-                <a16:creationId xmlns:a16="http://schemas.microsoft.com/office/drawing/2014/main" xmlns="" id="{B97967F8-618A-448B-81FD-CDFD4AF0EC64}"/>
+                <a16:creationId xmlns:a16="http://schemas.microsoft.com/office/drawing/2014/main" id="{B97967F8-618A-448B-81FD-CDFD4AF0EC64}"/>
               </a:ext>
             </a:extLst>
           </p:cNvPr>
@@ -32367,7 +34024,7 @@
           <p:cNvPr id="148" name="Rectangle 8">
             <a:extLst>
               <a:ext uri="{FF2B5EF4-FFF2-40B4-BE49-F238E27FC236}">
-                <a16:creationId xmlns:a16="http://schemas.microsoft.com/office/drawing/2014/main" xmlns="" id="{ABDCDBD2-131A-4B66-A2F2-43BBEE82C773}"/>
+                <a16:creationId xmlns:a16="http://schemas.microsoft.com/office/drawing/2014/main" id="{ABDCDBD2-131A-4B66-A2F2-43BBEE82C773}"/>
               </a:ext>
             </a:extLst>
           </p:cNvPr>
@@ -32429,7 +34086,7 @@
           <p:cNvPr id="149" name="Elbow Connector 78">
             <a:extLst>
               <a:ext uri="{FF2B5EF4-FFF2-40B4-BE49-F238E27FC236}">
-                <a16:creationId xmlns:a16="http://schemas.microsoft.com/office/drawing/2014/main" xmlns="" id="{B97967F8-618A-448B-81FD-CDFD4AF0EC64}"/>
+                <a16:creationId xmlns:a16="http://schemas.microsoft.com/office/drawing/2014/main" id="{B97967F8-618A-448B-81FD-CDFD4AF0EC64}"/>
               </a:ext>
             </a:extLst>
           </p:cNvPr>

</xml_diff>